<commit_message>
Changed title slide for lesson #1
</commit_message>
<xml_diff>
--- a/Presentation/lesson-01.pptx
+++ b/Presentation/lesson-01.pptx
@@ -314,7 +314,7 @@
           <a:p>
             <a:fld id="{8E6E6A2A-E9D3-4A0D-B04A-ABDD367A1E08}" type="datetimeFigureOut">
               <a:rPr lang="ru-RU" smtClean="0"/>
-              <a:t>10.08.2012</a:t>
+              <a:t>13.08.2012</a:t>
             </a:fld>
             <a:endParaRPr lang="ru-RU"/>
           </a:p>
@@ -484,7 +484,7 @@
           <a:p>
             <a:fld id="{8E6E6A2A-E9D3-4A0D-B04A-ABDD367A1E08}" type="datetimeFigureOut">
               <a:rPr lang="ru-RU" smtClean="0"/>
-              <a:t>10.08.2012</a:t>
+              <a:t>13.08.2012</a:t>
             </a:fld>
             <a:endParaRPr lang="ru-RU"/>
           </a:p>
@@ -664,7 +664,7 @@
           <a:p>
             <a:fld id="{8E6E6A2A-E9D3-4A0D-B04A-ABDD367A1E08}" type="datetimeFigureOut">
               <a:rPr lang="ru-RU" smtClean="0"/>
-              <a:t>10.08.2012</a:t>
+              <a:t>13.08.2012</a:t>
             </a:fld>
             <a:endParaRPr lang="ru-RU"/>
           </a:p>
@@ -834,7 +834,7 @@
           <a:p>
             <a:fld id="{8E6E6A2A-E9D3-4A0D-B04A-ABDD367A1E08}" type="datetimeFigureOut">
               <a:rPr lang="ru-RU" smtClean="0"/>
-              <a:t>10.08.2012</a:t>
+              <a:t>13.08.2012</a:t>
             </a:fld>
             <a:endParaRPr lang="ru-RU"/>
           </a:p>
@@ -1080,7 +1080,7 @@
           <a:p>
             <a:fld id="{8E6E6A2A-E9D3-4A0D-B04A-ABDD367A1E08}" type="datetimeFigureOut">
               <a:rPr lang="ru-RU" smtClean="0"/>
-              <a:t>10.08.2012</a:t>
+              <a:t>13.08.2012</a:t>
             </a:fld>
             <a:endParaRPr lang="ru-RU"/>
           </a:p>
@@ -1368,7 +1368,7 @@
           <a:p>
             <a:fld id="{8E6E6A2A-E9D3-4A0D-B04A-ABDD367A1E08}" type="datetimeFigureOut">
               <a:rPr lang="ru-RU" smtClean="0"/>
-              <a:t>10.08.2012</a:t>
+              <a:t>13.08.2012</a:t>
             </a:fld>
             <a:endParaRPr lang="ru-RU"/>
           </a:p>
@@ -1790,7 +1790,7 @@
           <a:p>
             <a:fld id="{8E6E6A2A-E9D3-4A0D-B04A-ABDD367A1E08}" type="datetimeFigureOut">
               <a:rPr lang="ru-RU" smtClean="0"/>
-              <a:t>10.08.2012</a:t>
+              <a:t>13.08.2012</a:t>
             </a:fld>
             <a:endParaRPr lang="ru-RU"/>
           </a:p>
@@ -1908,7 +1908,7 @@
           <a:p>
             <a:fld id="{8E6E6A2A-E9D3-4A0D-B04A-ABDD367A1E08}" type="datetimeFigureOut">
               <a:rPr lang="ru-RU" smtClean="0"/>
-              <a:t>10.08.2012</a:t>
+              <a:t>13.08.2012</a:t>
             </a:fld>
             <a:endParaRPr lang="ru-RU"/>
           </a:p>
@@ -2003,7 +2003,7 @@
           <a:p>
             <a:fld id="{8E6E6A2A-E9D3-4A0D-B04A-ABDD367A1E08}" type="datetimeFigureOut">
               <a:rPr lang="ru-RU" smtClean="0"/>
-              <a:t>10.08.2012</a:t>
+              <a:t>13.08.2012</a:t>
             </a:fld>
             <a:endParaRPr lang="ru-RU"/>
           </a:p>
@@ -2280,7 +2280,7 @@
           <a:p>
             <a:fld id="{8E6E6A2A-E9D3-4A0D-B04A-ABDD367A1E08}" type="datetimeFigureOut">
               <a:rPr lang="ru-RU" smtClean="0"/>
-              <a:t>10.08.2012</a:t>
+              <a:t>13.08.2012</a:t>
             </a:fld>
             <a:endParaRPr lang="ru-RU"/>
           </a:p>
@@ -2533,7 +2533,7 @@
           <a:p>
             <a:fld id="{8E6E6A2A-E9D3-4A0D-B04A-ABDD367A1E08}" type="datetimeFigureOut">
               <a:rPr lang="ru-RU" smtClean="0"/>
-              <a:t>10.08.2012</a:t>
+              <a:t>13.08.2012</a:t>
             </a:fld>
             <a:endParaRPr lang="ru-RU"/>
           </a:p>
@@ -2746,7 +2746,7 @@
           <a:p>
             <a:fld id="{8E6E6A2A-E9D3-4A0D-B04A-ABDD367A1E08}" type="datetimeFigureOut">
               <a:rPr lang="ru-RU" smtClean="0"/>
-              <a:t>10.08.2012</a:t>
+              <a:t>13.08.2012</a:t>
             </a:fld>
             <a:endParaRPr lang="ru-RU"/>
           </a:p>
@@ -3133,13 +3133,13 @@
       </p:grpSpPr>
       <p:sp>
         <p:nvSpPr>
-          <p:cNvPr id="4" name="Rectangle 3"/>
+          <p:cNvPr id="5" name="Rectangle 4"/>
           <p:cNvSpPr/>
           <p:nvPr/>
         </p:nvSpPr>
         <p:spPr>
           <a:xfrm>
-            <a:off x="143508" y="1630884"/>
+            <a:off x="143508" y="1304764"/>
             <a:ext cx="8856984" cy="646331"/>
           </a:xfrm>
           <a:prstGeom prst="rect">
@@ -3167,7 +3167,15 @@
                   <a:schemeClr val="bg1"/>
                 </a:solidFill>
               </a:rPr>
-              <a:t>C#</a:t>
+              <a:t>C</a:t>
+            </a:r>
+            <a:r>
+              <a:rPr lang="en-US" sz="3600" b="1" i="1" dirty="0" smtClean="0">
+                <a:solidFill>
+                  <a:schemeClr val="bg1"/>
+                </a:solidFill>
+              </a:rPr>
+              <a:t>#</a:t>
             </a:r>
             <a:endParaRPr lang="ru-RU" sz="3600" b="1" i="1" dirty="0">
               <a:solidFill>
@@ -3179,7 +3187,7 @@
       </p:sp>
       <p:pic>
         <p:nvPicPr>
-          <p:cNvPr id="1029" name="Picture 5"/>
+          <p:cNvPr id="6" name="Picture 5"/>
           <p:cNvPicPr>
             <a:picLocks noChangeAspect="1" noChangeArrowheads="1"/>
           </p:cNvPicPr>
@@ -3200,7 +3208,7 @@
         </p:blipFill>
         <p:spPr bwMode="auto">
           <a:xfrm>
-            <a:off x="1638300" y="3503092"/>
+            <a:off x="1638300" y="3829211"/>
             <a:ext cx="5867400" cy="1724025"/>
           </a:xfrm>
           <a:prstGeom prst="rect">
@@ -3241,6 +3249,44 @@
           </a:extLst>
         </p:spPr>
       </p:pic>
+      <p:sp>
+        <p:nvSpPr>
+          <p:cNvPr id="7" name="TextBox 6"/>
+          <p:cNvSpPr txBox="1"/>
+          <p:nvPr/>
+        </p:nvSpPr>
+        <p:spPr>
+          <a:xfrm>
+            <a:off x="1495741" y="2528900"/>
+            <a:ext cx="6152518" cy="461665"/>
+          </a:xfrm>
+          <a:prstGeom prst="rect">
+            <a:avLst/>
+          </a:prstGeom>
+          <a:noFill/>
+        </p:spPr>
+        <p:txBody>
+          <a:bodyPr wrap="none" rtlCol="0">
+            <a:spAutoFit/>
+          </a:bodyPr>
+          <a:lstStyle/>
+          <a:p>
+            <a:r>
+              <a:rPr lang="ru-RU" sz="2400" dirty="0">
+                <a:solidFill>
+                  <a:schemeClr val="bg1"/>
+                </a:solidFill>
+              </a:rPr>
+              <a:t>Занятие №1. Введение в С# и .NET Framework</a:t>
+            </a:r>
+            <a:endParaRPr lang="en-US" sz="2400" dirty="0">
+              <a:solidFill>
+                <a:schemeClr val="bg1"/>
+              </a:solidFill>
+            </a:endParaRPr>
+          </a:p>
+        </p:txBody>
+      </p:sp>
     </p:spTree>
     <p:extLst>
       <p:ext uri="{BB962C8B-B14F-4D97-AF65-F5344CB8AC3E}">
@@ -12945,16 +12991,6 @@
                         </a:rPr>
                         <a:t>:</a:t>
                       </a:r>
-                      <a:endParaRPr kumimoji="0" lang="en-US" sz="1800" b="0" i="0" u="none" strike="noStrike" cap="none" normalizeH="0" baseline="0" dirty="0" smtClean="0">
-                        <a:ln>
-                          <a:noFill/>
-                        </a:ln>
-                        <a:solidFill>
-                          <a:srgbClr val="000000"/>
-                        </a:solidFill>
-                        <a:effectLst/>
-                        <a:latin typeface="Calibri" pitchFamily="34" charset="0"/>
-                      </a:endParaRPr>
                     </a:p>
                   </a:txBody>
                   <a:tcPr horzOverflow="overflow">
@@ -25473,11 +25509,6 @@
               </a:rPr>
               <a:t>://blackrabbitcoder.net/category/11989.aspx</a:t>
             </a:r>
-            <a:endParaRPr lang="en-US" dirty="0">
-              <a:solidFill>
-                <a:schemeClr val="bg1"/>
-              </a:solidFill>
-            </a:endParaRPr>
           </a:p>
         </p:txBody>
       </p:sp>

</xml_diff>

<commit_message>
Amended background for lesson #1 presentation
</commit_message>
<xml_diff>
--- a/Presentation/lesson-01.pptx
+++ b/Presentation/lesson-01.pptx
@@ -1,6 +1,6 @@
 
 <file path=ppt/presentation.xml><?xml version="1.0" encoding="utf-8"?>
-<p:presentation xmlns:a="http://schemas.openxmlformats.org/drawingml/2006/main" xmlns:r="http://schemas.openxmlformats.org/officeDocument/2006/relationships" xmlns:p="http://schemas.openxmlformats.org/presentationml/2006/main" saveSubsetFonts="1">
+<p:presentation xmlns:a="http://schemas.openxmlformats.org/drawingml/2006/main" xmlns:r="http://schemas.openxmlformats.org/officeDocument/2006/relationships" xmlns:p="http://schemas.openxmlformats.org/presentationml/2006/main" removePersonalInfoOnSave="1" saveSubsetFonts="1">
   <p:sldMasterIdLst>
     <p:sldMasterId id="2147483648" r:id="rId1"/>
   </p:sldMasterIdLst>
@@ -3109,11 +3109,15 @@
   <p:cSld>
     <p:bg>
       <p:bgPr>
-        <a:solidFill>
-          <a:schemeClr val="accent1">
-            <a:lumMod val="75000"/>
-          </a:schemeClr>
-        </a:solidFill>
+        <a:blipFill dpi="0" rotWithShape="1">
+          <a:blip r:embed="rId2">
+            <a:lum/>
+          </a:blip>
+          <a:srcRect/>
+          <a:stretch>
+            <a:fillRect/>
+          </a:stretch>
+        </a:blipFill>
         <a:effectLst/>
       </p:bgPr>
     </p:bg>
@@ -3167,15 +3171,7 @@
                   <a:schemeClr val="bg1"/>
                 </a:solidFill>
               </a:rPr>
-              <a:t>C</a:t>
-            </a:r>
-            <a:r>
-              <a:rPr lang="en-US" sz="3600" b="1" i="1" dirty="0" smtClean="0">
-                <a:solidFill>
-                  <a:schemeClr val="bg1"/>
-                </a:solidFill>
-              </a:rPr>
-              <a:t>#</a:t>
+              <a:t>C#</a:t>
             </a:r>
             <a:endParaRPr lang="ru-RU" sz="3600" b="1" i="1" dirty="0">
               <a:solidFill>
@@ -3194,7 +3190,7 @@
           <p:nvPr/>
         </p:nvPicPr>
         <p:blipFill>
-          <a:blip r:embed="rId2">
+          <a:blip r:embed="rId3">
             <a:extLst>
               <a:ext uri="{28A0092B-C50C-407E-A947-70E740481C1C}">
                 <a14:useLocalDpi xmlns:a14="http://schemas.microsoft.com/office/drawing/2010/main" val="0"/>
@@ -3312,11 +3308,15 @@
   <p:cSld>
     <p:bg>
       <p:bgPr>
-        <a:solidFill>
-          <a:schemeClr val="accent1">
-            <a:lumMod val="75000"/>
-          </a:schemeClr>
-        </a:solidFill>
+        <a:blipFill dpi="0" rotWithShape="1">
+          <a:blip r:embed="rId2">
+            <a:lum/>
+          </a:blip>
+          <a:srcRect/>
+          <a:stretch>
+            <a:fillRect/>
+          </a:stretch>
+        </a:blipFill>
         <a:effectLst/>
       </p:bgPr>
     </p:bg>
@@ -3544,11 +3544,15 @@
   <p:cSld>
     <p:bg>
       <p:bgPr>
-        <a:solidFill>
-          <a:schemeClr val="accent1">
-            <a:lumMod val="75000"/>
-          </a:schemeClr>
-        </a:solidFill>
+        <a:blipFill dpi="0" rotWithShape="1">
+          <a:blip r:embed="rId2">
+            <a:lum/>
+          </a:blip>
+          <a:srcRect/>
+          <a:stretch>
+            <a:fillRect/>
+          </a:stretch>
+        </a:blipFill>
         <a:effectLst/>
       </p:bgPr>
     </p:bg>
@@ -3659,11 +3663,15 @@
   <p:cSld>
     <p:bg>
       <p:bgPr>
-        <a:solidFill>
-          <a:schemeClr val="accent1">
-            <a:lumMod val="75000"/>
-          </a:schemeClr>
-        </a:solidFill>
+        <a:blipFill dpi="0" rotWithShape="1">
+          <a:blip r:embed="rId2">
+            <a:lum/>
+          </a:blip>
+          <a:srcRect/>
+          <a:stretch>
+            <a:fillRect/>
+          </a:stretch>
+        </a:blipFill>
         <a:effectLst/>
       </p:bgPr>
     </p:bg>
@@ -3838,11 +3846,15 @@
   <p:cSld>
     <p:bg>
       <p:bgPr>
-        <a:solidFill>
-          <a:schemeClr val="accent1">
-            <a:lumMod val="75000"/>
-          </a:schemeClr>
-        </a:solidFill>
+        <a:blipFill dpi="0" rotWithShape="1">
+          <a:blip r:embed="rId2">
+            <a:lum/>
+          </a:blip>
+          <a:srcRect/>
+          <a:stretch>
+            <a:fillRect/>
+          </a:stretch>
+        </a:blipFill>
         <a:effectLst/>
       </p:bgPr>
     </p:bg>
@@ -4498,11 +4510,15 @@
   <p:cSld>
     <p:bg>
       <p:bgPr>
-        <a:solidFill>
-          <a:schemeClr val="accent1">
-            <a:lumMod val="75000"/>
-          </a:schemeClr>
-        </a:solidFill>
+        <a:blipFill dpi="0" rotWithShape="1">
+          <a:blip r:embed="rId2">
+            <a:lum/>
+          </a:blip>
+          <a:srcRect/>
+          <a:stretch>
+            <a:fillRect/>
+          </a:stretch>
+        </a:blipFill>
         <a:effectLst/>
       </p:bgPr>
     </p:bg>
@@ -6412,11 +6428,15 @@
   <p:cSld>
     <p:bg>
       <p:bgPr>
-        <a:solidFill>
-          <a:schemeClr val="accent1">
-            <a:lumMod val="75000"/>
-          </a:schemeClr>
-        </a:solidFill>
+        <a:blipFill dpi="0" rotWithShape="1">
+          <a:blip r:embed="rId2">
+            <a:lum/>
+          </a:blip>
+          <a:srcRect/>
+          <a:stretch>
+            <a:fillRect/>
+          </a:stretch>
+        </a:blipFill>
         <a:effectLst/>
       </p:bgPr>
     </p:bg>
@@ -11178,11 +11198,15 @@
   <p:cSld>
     <p:bg>
       <p:bgPr>
-        <a:solidFill>
-          <a:schemeClr val="accent1">
-            <a:lumMod val="75000"/>
-          </a:schemeClr>
-        </a:solidFill>
+        <a:blipFill dpi="0" rotWithShape="1">
+          <a:blip r:embed="rId2">
+            <a:lum/>
+          </a:blip>
+          <a:srcRect/>
+          <a:stretch>
+            <a:fillRect/>
+          </a:stretch>
+        </a:blipFill>
         <a:effectLst/>
       </p:bgPr>
     </p:bg>
@@ -11690,11 +11714,15 @@
   <p:cSld>
     <p:bg>
       <p:bgPr>
-        <a:solidFill>
-          <a:schemeClr val="accent1">
-            <a:lumMod val="75000"/>
-          </a:schemeClr>
-        </a:solidFill>
+        <a:blipFill dpi="0" rotWithShape="1">
+          <a:blip r:embed="rId2">
+            <a:lum/>
+          </a:blip>
+          <a:srcRect/>
+          <a:stretch>
+            <a:fillRect/>
+          </a:stretch>
+        </a:blipFill>
         <a:effectLst/>
       </p:bgPr>
     </p:bg>
@@ -13289,11 +13317,15 @@
   <p:cSld>
     <p:bg>
       <p:bgPr>
-        <a:solidFill>
-          <a:schemeClr val="accent1">
-            <a:lumMod val="75000"/>
-          </a:schemeClr>
-        </a:solidFill>
+        <a:blipFill dpi="0" rotWithShape="1">
+          <a:blip r:embed="rId2">
+            <a:lum/>
+          </a:blip>
+          <a:srcRect/>
+          <a:stretch>
+            <a:fillRect/>
+          </a:stretch>
+        </a:blipFill>
         <a:effectLst/>
       </p:bgPr>
     </p:bg>
@@ -14255,11 +14287,15 @@
   <p:cSld>
     <p:bg>
       <p:bgPr>
-        <a:solidFill>
-          <a:schemeClr val="accent1">
-            <a:lumMod val="75000"/>
-          </a:schemeClr>
-        </a:solidFill>
+        <a:blipFill dpi="0" rotWithShape="1">
+          <a:blip r:embed="rId2">
+            <a:lum/>
+          </a:blip>
+          <a:srcRect/>
+          <a:stretch>
+            <a:fillRect/>
+          </a:stretch>
+        </a:blipFill>
         <a:effectLst/>
       </p:bgPr>
     </p:bg>
@@ -15358,11 +15394,15 @@
   <p:cSld>
     <p:bg>
       <p:bgPr>
-        <a:solidFill>
-          <a:schemeClr val="accent1">
-            <a:lumMod val="75000"/>
-          </a:schemeClr>
-        </a:solidFill>
+        <a:blipFill dpi="0" rotWithShape="1">
+          <a:blip r:embed="rId2">
+            <a:lum/>
+          </a:blip>
+          <a:srcRect/>
+          <a:stretch>
+            <a:fillRect/>
+          </a:stretch>
+        </a:blipFill>
         <a:effectLst/>
       </p:bgPr>
     </p:bg>
@@ -15498,7 +15538,7 @@
                 <a:solidFill>
                   <a:schemeClr val="bg1"/>
                 </a:solidFill>
-                <a:hlinkClick r:id="rId2"/>
+                <a:hlinkClick r:id="rId3"/>
               </a:rPr>
               <a:t>http://</a:t>
             </a:r>
@@ -15507,7 +15547,7 @@
                 <a:solidFill>
                   <a:schemeClr val="bg1"/>
                 </a:solidFill>
-                <a:hlinkClick r:id="rId2"/>
+                <a:hlinkClick r:id="rId3"/>
               </a:rPr>
               <a:t>www.microsoft.com/learning/en/us/book.aspx?ID=13874&amp;Locale=en-us</a:t>
             </a:r>
@@ -15776,11 +15816,15 @@
   <p:cSld>
     <p:bg>
       <p:bgPr>
-        <a:solidFill>
-          <a:schemeClr val="accent1">
-            <a:lumMod val="75000"/>
-          </a:schemeClr>
-        </a:solidFill>
+        <a:blipFill dpi="0" rotWithShape="1">
+          <a:blip r:embed="rId2">
+            <a:lum/>
+          </a:blip>
+          <a:srcRect/>
+          <a:stretch>
+            <a:fillRect/>
+          </a:stretch>
+        </a:blipFill>
         <a:effectLst/>
       </p:bgPr>
     </p:bg>
@@ -18183,11 +18227,15 @@
   <p:cSld>
     <p:bg>
       <p:bgPr>
-        <a:solidFill>
-          <a:schemeClr val="accent1">
-            <a:lumMod val="75000"/>
-          </a:schemeClr>
-        </a:solidFill>
+        <a:blipFill dpi="0" rotWithShape="1">
+          <a:blip r:embed="rId2">
+            <a:lum/>
+          </a:blip>
+          <a:srcRect/>
+          <a:stretch>
+            <a:fillRect/>
+          </a:stretch>
+        </a:blipFill>
         <a:effectLst/>
       </p:bgPr>
     </p:bg>
@@ -19180,11 +19228,15 @@
   <p:cSld>
     <p:bg>
       <p:bgPr>
-        <a:solidFill>
-          <a:schemeClr val="accent1">
-            <a:lumMod val="75000"/>
-          </a:schemeClr>
-        </a:solidFill>
+        <a:blipFill dpi="0" rotWithShape="1">
+          <a:blip r:embed="rId2">
+            <a:lum/>
+          </a:blip>
+          <a:srcRect/>
+          <a:stretch>
+            <a:fillRect/>
+          </a:stretch>
+        </a:blipFill>
         <a:effectLst/>
       </p:bgPr>
     </p:bg>
@@ -19445,11 +19497,15 @@
   <p:cSld>
     <p:bg>
       <p:bgPr>
-        <a:solidFill>
-          <a:schemeClr val="accent1">
-            <a:lumMod val="75000"/>
-          </a:schemeClr>
-        </a:solidFill>
+        <a:blipFill dpi="0" rotWithShape="1">
+          <a:blip r:embed="rId2">
+            <a:lum/>
+          </a:blip>
+          <a:srcRect/>
+          <a:stretch>
+            <a:fillRect/>
+          </a:stretch>
+        </a:blipFill>
         <a:effectLst/>
       </p:bgPr>
     </p:bg>
@@ -20676,11 +20732,15 @@
   <p:cSld>
     <p:bg>
       <p:bgPr>
-        <a:solidFill>
-          <a:schemeClr val="accent1">
-            <a:lumMod val="75000"/>
-          </a:schemeClr>
-        </a:solidFill>
+        <a:blipFill dpi="0" rotWithShape="1">
+          <a:blip r:embed="rId2">
+            <a:lum/>
+          </a:blip>
+          <a:srcRect/>
+          <a:stretch>
+            <a:fillRect/>
+          </a:stretch>
+        </a:blipFill>
         <a:effectLst/>
       </p:bgPr>
     </p:bg>
@@ -21874,11 +21934,15 @@
   <p:cSld>
     <p:bg>
       <p:bgPr>
-        <a:solidFill>
-          <a:schemeClr val="accent1">
-            <a:lumMod val="75000"/>
-          </a:schemeClr>
-        </a:solidFill>
+        <a:blipFill dpi="0" rotWithShape="1">
+          <a:blip r:embed="rId2">
+            <a:lum/>
+          </a:blip>
+          <a:srcRect/>
+          <a:stretch>
+            <a:fillRect/>
+          </a:stretch>
+        </a:blipFill>
         <a:effectLst/>
       </p:bgPr>
     </p:bg>
@@ -22936,11 +23000,15 @@
   <p:cSld>
     <p:bg>
       <p:bgPr>
-        <a:solidFill>
-          <a:schemeClr val="accent1">
-            <a:lumMod val="75000"/>
-          </a:schemeClr>
-        </a:solidFill>
+        <a:blipFill dpi="0" rotWithShape="1">
+          <a:blip r:embed="rId2">
+            <a:lum/>
+          </a:blip>
+          <a:srcRect/>
+          <a:stretch>
+            <a:fillRect/>
+          </a:stretch>
+        </a:blipFill>
         <a:effectLst/>
       </p:bgPr>
     </p:bg>
@@ -24830,11 +24898,15 @@
   <p:cSld>
     <p:bg>
       <p:bgPr>
-        <a:solidFill>
-          <a:schemeClr val="accent1">
-            <a:lumMod val="75000"/>
-          </a:schemeClr>
-        </a:solidFill>
+        <a:blipFill dpi="0" rotWithShape="1">
+          <a:blip r:embed="rId2">
+            <a:lum/>
+          </a:blip>
+          <a:srcRect/>
+          <a:stretch>
+            <a:fillRect/>
+          </a:stretch>
+        </a:blipFill>
         <a:effectLst/>
       </p:bgPr>
     </p:bg>
@@ -25333,11 +25405,15 @@
   <p:cSld>
     <p:bg>
       <p:bgPr>
-        <a:solidFill>
-          <a:schemeClr val="accent1">
-            <a:lumMod val="75000"/>
-          </a:schemeClr>
-        </a:solidFill>
+        <a:blipFill dpi="0" rotWithShape="1">
+          <a:blip r:embed="rId2">
+            <a:lum/>
+          </a:blip>
+          <a:srcRect/>
+          <a:stretch>
+            <a:fillRect/>
+          </a:stretch>
+        </a:blipFill>
         <a:effectLst/>
       </p:bgPr>
     </p:bg>
@@ -25537,11 +25613,15 @@
   <p:cSld>
     <p:bg>
       <p:bgPr>
-        <a:solidFill>
-          <a:schemeClr val="accent1">
-            <a:lumMod val="75000"/>
-          </a:schemeClr>
-        </a:solidFill>
+        <a:blipFill dpi="0" rotWithShape="1">
+          <a:blip r:embed="rId2">
+            <a:lum/>
+          </a:blip>
+          <a:srcRect/>
+          <a:stretch>
+            <a:fillRect/>
+          </a:stretch>
+        </a:blipFill>
         <a:effectLst/>
       </p:bgPr>
     </p:bg>
@@ -25928,11 +26008,15 @@
   <p:cSld>
     <p:bg>
       <p:bgPr>
-        <a:solidFill>
-          <a:schemeClr val="accent1">
-            <a:lumMod val="75000"/>
-          </a:schemeClr>
-        </a:solidFill>
+        <a:blipFill dpi="0" rotWithShape="1">
+          <a:blip r:embed="rId2">
+            <a:lum/>
+          </a:blip>
+          <a:srcRect/>
+          <a:stretch>
+            <a:fillRect/>
+          </a:stretch>
+        </a:blipFill>
         <a:effectLst/>
       </p:bgPr>
     </p:bg>
@@ -26010,7 +26094,7 @@
           <p:nvPr/>
         </p:nvPicPr>
         <p:blipFill>
-          <a:blip r:embed="rId2">
+          <a:blip r:embed="rId3">
             <a:extLst>
               <a:ext uri="{28A0092B-C50C-407E-A947-70E740481C1C}">
                 <a14:useLocalDpi xmlns:a14="http://schemas.microsoft.com/office/drawing/2010/main" val="0"/>
@@ -26061,11 +26145,15 @@
   <p:cSld>
     <p:bg>
       <p:bgPr>
-        <a:solidFill>
-          <a:schemeClr val="accent1">
-            <a:lumMod val="75000"/>
-          </a:schemeClr>
-        </a:solidFill>
+        <a:blipFill dpi="0" rotWithShape="1">
+          <a:blip r:embed="rId2">
+            <a:lum/>
+          </a:blip>
+          <a:srcRect/>
+          <a:stretch>
+            <a:fillRect/>
+          </a:stretch>
+        </a:blipFill>
         <a:effectLst/>
       </p:bgPr>
     </p:bg>
@@ -26143,7 +26231,7 @@
           <p:nvPr/>
         </p:nvPicPr>
         <p:blipFill>
-          <a:blip r:embed="rId2">
+          <a:blip r:embed="rId3">
             <a:extLst>
               <a:ext uri="{28A0092B-C50C-407E-A947-70E740481C1C}">
                 <a14:useLocalDpi xmlns:a14="http://schemas.microsoft.com/office/drawing/2010/main" val="0"/>
@@ -26194,11 +26282,15 @@
   <p:cSld>
     <p:bg>
       <p:bgPr>
-        <a:solidFill>
-          <a:schemeClr val="accent1">
-            <a:lumMod val="75000"/>
-          </a:schemeClr>
-        </a:solidFill>
+        <a:blipFill dpi="0" rotWithShape="1">
+          <a:blip r:embed="rId2">
+            <a:lum/>
+          </a:blip>
+          <a:srcRect/>
+          <a:stretch>
+            <a:fillRect/>
+          </a:stretch>
+        </a:blipFill>
         <a:effectLst/>
       </p:bgPr>
     </p:bg>
@@ -26547,11 +26639,15 @@
   <p:cSld>
     <p:bg>
       <p:bgPr>
-        <a:solidFill>
-          <a:schemeClr val="accent1">
-            <a:lumMod val="75000"/>
-          </a:schemeClr>
-        </a:solidFill>
+        <a:blipFill dpi="0" rotWithShape="1">
+          <a:blip r:embed="rId2">
+            <a:lum/>
+          </a:blip>
+          <a:srcRect/>
+          <a:stretch>
+            <a:fillRect/>
+          </a:stretch>
+        </a:blipFill>
         <a:effectLst/>
       </p:bgPr>
     </p:bg>
@@ -26646,11 +26742,15 @@
   <p:cSld>
     <p:bg>
       <p:bgPr>
-        <a:solidFill>
-          <a:schemeClr val="accent1">
-            <a:lumMod val="75000"/>
-          </a:schemeClr>
-        </a:solidFill>
+        <a:blipFill dpi="0" rotWithShape="1">
+          <a:blip r:embed="rId2">
+            <a:lum/>
+          </a:blip>
+          <a:srcRect/>
+          <a:stretch>
+            <a:fillRect/>
+          </a:stretch>
+        </a:blipFill>
         <a:effectLst/>
       </p:bgPr>
     </p:bg>

</xml_diff>

<commit_message>
Added slide about System.String
</commit_message>
<xml_diff>
--- a/Presentation/lesson-01.pptx
+++ b/Presentation/lesson-01.pptx
@@ -20,18 +20,19 @@
     <p:sldId id="279" r:id="rId14"/>
     <p:sldId id="280" r:id="rId15"/>
     <p:sldId id="267" r:id="rId16"/>
-    <p:sldId id="268" r:id="rId17"/>
-    <p:sldId id="269" r:id="rId18"/>
-    <p:sldId id="270" r:id="rId19"/>
-    <p:sldId id="271" r:id="rId20"/>
-    <p:sldId id="272" r:id="rId21"/>
-    <p:sldId id="273" r:id="rId22"/>
-    <p:sldId id="274" r:id="rId23"/>
-    <p:sldId id="275" r:id="rId24"/>
-    <p:sldId id="276" r:id="rId25"/>
-    <p:sldId id="277" r:id="rId26"/>
-    <p:sldId id="278" r:id="rId27"/>
-    <p:sldId id="281" r:id="rId28"/>
+    <p:sldId id="283" r:id="rId17"/>
+    <p:sldId id="268" r:id="rId18"/>
+    <p:sldId id="269" r:id="rId19"/>
+    <p:sldId id="270" r:id="rId20"/>
+    <p:sldId id="271" r:id="rId21"/>
+    <p:sldId id="272" r:id="rId22"/>
+    <p:sldId id="273" r:id="rId23"/>
+    <p:sldId id="274" r:id="rId24"/>
+    <p:sldId id="275" r:id="rId25"/>
+    <p:sldId id="276" r:id="rId26"/>
+    <p:sldId id="277" r:id="rId27"/>
+    <p:sldId id="278" r:id="rId28"/>
+    <p:sldId id="281" r:id="rId29"/>
   </p:sldIdLst>
   <p:sldSz cx="9144000" cy="6858000" type="screen4x3"/>
   <p:notesSz cx="6858000" cy="9144000"/>
@@ -11226,6 +11227,253 @@
       </p:grpSpPr>
       <p:sp>
         <p:nvSpPr>
+          <p:cNvPr id="2" name="TextBox 1"/>
+          <p:cNvSpPr txBox="1"/>
+          <p:nvPr/>
+        </p:nvSpPr>
+        <p:spPr>
+          <a:xfrm>
+            <a:off x="611560" y="692696"/>
+            <a:ext cx="7992888" cy="2185214"/>
+          </a:xfrm>
+          <a:prstGeom prst="rect">
+            <a:avLst/>
+          </a:prstGeom>
+          <a:noFill/>
+        </p:spPr>
+        <p:txBody>
+          <a:bodyPr wrap="square" rtlCol="0">
+            <a:spAutoFit/>
+          </a:bodyPr>
+          <a:lstStyle/>
+          <a:p>
+            <a:r>
+              <a:rPr lang="ru-RU" sz="2800" dirty="0" smtClean="0">
+                <a:solidFill>
+                  <a:schemeClr val="bg1"/>
+                </a:solidFill>
+              </a:rPr>
+              <a:t>Класс </a:t>
+            </a:r>
+            <a:r>
+              <a:rPr lang="en-US" sz="2800" dirty="0" smtClean="0">
+                <a:solidFill>
+                  <a:schemeClr val="bg1"/>
+                </a:solidFill>
+              </a:rPr>
+              <a:t>String</a:t>
+            </a:r>
+            <a:endParaRPr lang="ru-RU" sz="2800" dirty="0" smtClean="0">
+              <a:solidFill>
+                <a:schemeClr val="bg1"/>
+              </a:solidFill>
+            </a:endParaRPr>
+          </a:p>
+          <a:p>
+            <a:pPr marL="285750" indent="-285750">
+              <a:buFont typeface="Arial" pitchFamily="34" charset="0"/>
+              <a:buChar char="•"/>
+            </a:pPr>
+            <a:r>
+              <a:rPr lang="ru-RU" dirty="0" smtClean="0">
+                <a:solidFill>
+                  <a:schemeClr val="bg1"/>
+                </a:solidFill>
+              </a:rPr>
+              <a:t>Ссылочный тип, но!</a:t>
+            </a:r>
+          </a:p>
+          <a:p>
+            <a:pPr marL="742950" lvl="1" indent="-285750">
+              <a:buFont typeface="Arial" pitchFamily="34" charset="0"/>
+              <a:buChar char="•"/>
+            </a:pPr>
+            <a:r>
+              <a:rPr lang="ru-RU" dirty="0" smtClean="0">
+                <a:solidFill>
+                  <a:schemeClr val="bg1"/>
+                </a:solidFill>
+              </a:rPr>
+              <a:t>Значение </a:t>
+            </a:r>
+            <a:r>
+              <a:rPr lang="en-US" dirty="0" smtClean="0">
+                <a:solidFill>
+                  <a:schemeClr val="bg1"/>
+                </a:solidFill>
+              </a:rPr>
+              <a:t>string </a:t>
+            </a:r>
+            <a:r>
+              <a:rPr lang="ru-RU" dirty="0" smtClean="0">
+                <a:solidFill>
+                  <a:schemeClr val="bg1"/>
+                </a:solidFill>
+              </a:rPr>
+              <a:t>являются не</a:t>
+            </a:r>
+            <a:r>
+              <a:rPr lang="ru-RU" dirty="0" smtClean="0">
+                <a:solidFill>
+                  <a:schemeClr val="bg1"/>
+                </a:solidFill>
+              </a:rPr>
+              <a:t>изменяемыми</a:t>
+            </a:r>
+          </a:p>
+          <a:p>
+            <a:pPr marL="742950" lvl="1" indent="-285750">
+              <a:buFont typeface="Arial" pitchFamily="34" charset="0"/>
+              <a:buChar char="•"/>
+            </a:pPr>
+            <a:r>
+              <a:rPr lang="ru-RU" dirty="0" smtClean="0">
+                <a:solidFill>
+                  <a:schemeClr val="bg1"/>
+                </a:solidFill>
+              </a:rPr>
+              <a:t>Каждая операция создает новый экземпляр</a:t>
+            </a:r>
+          </a:p>
+          <a:p>
+            <a:pPr marL="742950" lvl="1" indent="-285750">
+              <a:buFont typeface="Arial" pitchFamily="34" charset="0"/>
+              <a:buChar char="•"/>
+            </a:pPr>
+            <a:r>
+              <a:rPr lang="ru-RU" dirty="0" smtClean="0">
+                <a:solidFill>
+                  <a:schemeClr val="bg1"/>
+                </a:solidFill>
+              </a:rPr>
+              <a:t>Класс </a:t>
+            </a:r>
+            <a:r>
+              <a:rPr lang="en-US" dirty="0" smtClean="0">
+                <a:solidFill>
+                  <a:schemeClr val="bg1"/>
+                </a:solidFill>
+              </a:rPr>
+              <a:t>string </a:t>
+            </a:r>
+            <a:r>
+              <a:rPr lang="ru-RU" dirty="0" smtClean="0">
+                <a:solidFill>
+                  <a:schemeClr val="bg1"/>
+                </a:solidFill>
+              </a:rPr>
+              <a:t>я</a:t>
+            </a:r>
+            <a:r>
+              <a:rPr lang="ru-RU" dirty="0" smtClean="0">
+                <a:solidFill>
+                  <a:schemeClr val="bg1"/>
+                </a:solidFill>
+              </a:rPr>
+              <a:t>вляется </a:t>
+            </a:r>
+            <a:r>
+              <a:rPr lang="en-US" dirty="0" smtClean="0">
+                <a:solidFill>
+                  <a:schemeClr val="bg1"/>
+                </a:solidFill>
+              </a:rPr>
+              <a:t>sealed</a:t>
+            </a:r>
+          </a:p>
+          <a:p>
+            <a:pPr marL="742950" lvl="1" indent="-285750">
+              <a:buFont typeface="Arial" pitchFamily="34" charset="0"/>
+              <a:buChar char="•"/>
+            </a:pPr>
+            <a:r>
+              <a:rPr lang="ru-RU" dirty="0" smtClean="0">
+                <a:solidFill>
+                  <a:schemeClr val="bg1"/>
+                </a:solidFill>
+              </a:rPr>
+              <a:t>При сборке строки используйте </a:t>
+            </a:r>
+            <a:r>
+              <a:rPr lang="en-US" dirty="0" err="1" smtClean="0">
+                <a:solidFill>
+                  <a:schemeClr val="bg1"/>
+                </a:solidFill>
+              </a:rPr>
+              <a:t>System.Text.StringBuilder</a:t>
+            </a:r>
+            <a:endParaRPr lang="ru-RU" dirty="0" smtClean="0">
+              <a:solidFill>
+                <a:schemeClr val="bg1"/>
+              </a:solidFill>
+            </a:endParaRPr>
+          </a:p>
+          <a:p>
+            <a:pPr marL="285750" indent="-285750">
+              <a:buFont typeface="Arial" pitchFamily="34" charset="0"/>
+              <a:buChar char="•"/>
+            </a:pPr>
+            <a:endParaRPr lang="en-US" dirty="0" smtClean="0">
+              <a:solidFill>
+                <a:schemeClr val="bg1"/>
+              </a:solidFill>
+            </a:endParaRPr>
+          </a:p>
+        </p:txBody>
+      </p:sp>
+    </p:spTree>
+    <p:extLst>
+      <p:ext uri="{BB962C8B-B14F-4D97-AF65-F5344CB8AC3E}">
+        <p14:creationId xmlns:p14="http://schemas.microsoft.com/office/powerpoint/2010/main" val="2688483590"/>
+      </p:ext>
+    </p:extLst>
+  </p:cSld>
+  <p:clrMapOvr>
+    <a:masterClrMapping/>
+  </p:clrMapOvr>
+  <p:timing>
+    <p:tnLst>
+      <p:par>
+        <p:cTn id="1" dur="indefinite" restart="never" nodeType="tmRoot"/>
+      </p:par>
+    </p:tnLst>
+  </p:timing>
+</p:sld>
+</file>
+
+<file path=ppt/slides/slide17.xml><?xml version="1.0" encoding="utf-8"?>
+<p:sld xmlns:a="http://schemas.openxmlformats.org/drawingml/2006/main" xmlns:r="http://schemas.openxmlformats.org/officeDocument/2006/relationships" xmlns:p="http://schemas.openxmlformats.org/presentationml/2006/main">
+  <p:cSld>
+    <p:bg>
+      <p:bgPr>
+        <a:blipFill dpi="0" rotWithShape="1">
+          <a:blip r:embed="rId2">
+            <a:lum/>
+          </a:blip>
+          <a:srcRect/>
+          <a:stretch>
+            <a:fillRect/>
+          </a:stretch>
+        </a:blipFill>
+        <a:effectLst/>
+      </p:bgPr>
+    </p:bg>
+    <p:spTree>
+      <p:nvGrpSpPr>
+        <p:cNvPr id="1" name=""/>
+        <p:cNvGrpSpPr/>
+        <p:nvPr/>
+      </p:nvGrpSpPr>
+      <p:grpSpPr>
+        <a:xfrm>
+          <a:off x="0" y="0"/>
+          <a:ext cx="0" cy="0"/>
+          <a:chOff x="0" y="0"/>
+          <a:chExt cx="0" cy="0"/>
+        </a:xfrm>
+      </p:grpSpPr>
+      <p:sp>
+        <p:nvSpPr>
           <p:cNvPr id="9218" name="Прямоугольник 6"/>
           <p:cNvSpPr>
             <a:spLocks noChangeArrowheads="1"/>
@@ -11709,7 +11957,7 @@
 </p:sld>
 </file>
 
-<file path=ppt/slides/slide17.xml><?xml version="1.0" encoding="utf-8"?>
+<file path=ppt/slides/slide18.xml><?xml version="1.0" encoding="utf-8"?>
 <p:sld xmlns:a="http://schemas.openxmlformats.org/drawingml/2006/main" xmlns:r="http://schemas.openxmlformats.org/officeDocument/2006/relationships" xmlns:p="http://schemas.openxmlformats.org/presentationml/2006/main">
   <p:cSld>
     <p:bg>
@@ -13312,7 +13560,7 @@
 </p:sld>
 </file>
 
-<file path=ppt/slides/slide18.xml><?xml version="1.0" encoding="utf-8"?>
+<file path=ppt/slides/slide19.xml><?xml version="1.0" encoding="utf-8"?>
 <p:sld xmlns:a="http://schemas.openxmlformats.org/drawingml/2006/main" xmlns:r="http://schemas.openxmlformats.org/officeDocument/2006/relationships" xmlns:p="http://schemas.openxmlformats.org/presentationml/2006/main">
   <p:cSld>
     <p:bg>
@@ -14273,1113 +14521,6 @@
     <p:extLst>
       <p:ext uri="{BB962C8B-B14F-4D97-AF65-F5344CB8AC3E}">
         <p14:creationId xmlns:p14="http://schemas.microsoft.com/office/powerpoint/2010/main" val="801124777"/>
-      </p:ext>
-    </p:extLst>
-  </p:cSld>
-  <p:clrMapOvr>
-    <a:masterClrMapping/>
-  </p:clrMapOvr>
-</p:sld>
-</file>
-
-<file path=ppt/slides/slide19.xml><?xml version="1.0" encoding="utf-8"?>
-<p:sld xmlns:a="http://schemas.openxmlformats.org/drawingml/2006/main" xmlns:r="http://schemas.openxmlformats.org/officeDocument/2006/relationships" xmlns:p="http://schemas.openxmlformats.org/presentationml/2006/main">
-  <p:cSld>
-    <p:bg>
-      <p:bgPr>
-        <a:blipFill dpi="0" rotWithShape="1">
-          <a:blip r:embed="rId2">
-            <a:lum/>
-          </a:blip>
-          <a:srcRect/>
-          <a:stretch>
-            <a:fillRect/>
-          </a:stretch>
-        </a:blipFill>
-        <a:effectLst/>
-      </p:bgPr>
-    </p:bg>
-    <p:spTree>
-      <p:nvGrpSpPr>
-        <p:cNvPr id="1" name=""/>
-        <p:cNvGrpSpPr/>
-        <p:nvPr/>
-      </p:nvGrpSpPr>
-      <p:grpSpPr>
-        <a:xfrm>
-          <a:off x="0" y="0"/>
-          <a:ext cx="0" cy="0"/>
-          <a:chOff x="0" y="0"/>
-          <a:chExt cx="0" cy="0"/>
-        </a:xfrm>
-      </p:grpSpPr>
-      <p:sp>
-        <p:nvSpPr>
-          <p:cNvPr id="12290" name="Прямоугольник 10"/>
-          <p:cNvSpPr>
-            <a:spLocks noChangeArrowheads="1"/>
-          </p:cNvSpPr>
-          <p:nvPr/>
-        </p:nvSpPr>
-        <p:spPr bwMode="auto">
-          <a:xfrm>
-            <a:off x="609600" y="71438"/>
-            <a:ext cx="7924800" cy="461962"/>
-          </a:xfrm>
-          <a:prstGeom prst="rect">
-            <a:avLst/>
-          </a:prstGeom>
-          <a:noFill/>
-          <a:ln>
-            <a:noFill/>
-          </a:ln>
-          <a:extLst>
-            <a:ext uri="{909E8E84-426E-40DD-AFC4-6F175D3DCCD1}">
-              <a14:hiddenFill xmlns:a14="http://schemas.microsoft.com/office/drawing/2010/main">
-                <a:solidFill>
-                  <a:srgbClr val="FFFFFF"/>
-                </a:solidFill>
-              </a14:hiddenFill>
-            </a:ext>
-            <a:ext uri="{91240B29-F687-4F45-9708-019B960494DF}">
-              <a14:hiddenLine xmlns:a14="http://schemas.microsoft.com/office/drawing/2010/main" w="9525">
-                <a:solidFill>
-                  <a:srgbClr val="000000"/>
-                </a:solidFill>
-                <a:miter lim="800000"/>
-                <a:headEnd/>
-                <a:tailEnd/>
-              </a14:hiddenLine>
-            </a:ext>
-          </a:extLst>
-        </p:spPr>
-        <p:txBody>
-          <a:bodyPr>
-            <a:spAutoFit/>
-          </a:bodyPr>
-          <a:lstStyle/>
-          <a:p>
-            <a:pPr algn="ctr" eaLnBrk="0" hangingPunct="0">
-              <a:tabLst>
-                <a:tab pos="457200" algn="l"/>
-              </a:tabLst>
-            </a:pPr>
-            <a:r>
-              <a:rPr lang="en-US" sz="2400" dirty="0" err="1">
-                <a:solidFill>
-                  <a:schemeClr val="bg1"/>
-                </a:solidFill>
-                <a:cs typeface="Times New Roman" pitchFamily="18" charset="0"/>
-              </a:rPr>
-              <a:t>Switch..case..default</a:t>
-            </a:r>
-            <a:endParaRPr lang="en-US" sz="2400" dirty="0">
-              <a:solidFill>
-                <a:schemeClr val="bg1"/>
-              </a:solidFill>
-              <a:cs typeface="Times New Roman" pitchFamily="18" charset="0"/>
-            </a:endParaRPr>
-          </a:p>
-        </p:txBody>
-      </p:sp>
-      <p:sp>
-        <p:nvSpPr>
-          <p:cNvPr id="11273" name="Rectangle 9"/>
-          <p:cNvSpPr>
-            <a:spLocks noChangeArrowheads="1"/>
-          </p:cNvSpPr>
-          <p:nvPr/>
-        </p:nvSpPr>
-        <p:spPr bwMode="auto">
-          <a:xfrm>
-            <a:off x="1143000" y="3505200"/>
-            <a:ext cx="7010400" cy="3170238"/>
-          </a:xfrm>
-          <a:prstGeom prst="rect">
-            <a:avLst/>
-          </a:prstGeom>
-          <a:noFill/>
-          <a:ln w="9525">
-            <a:solidFill>
-              <a:schemeClr val="bg1">
-                <a:lumMod val="65000"/>
-              </a:schemeClr>
-            </a:solidFill>
-            <a:miter lim="800000"/>
-            <a:headEnd/>
-            <a:tailEnd/>
-          </a:ln>
-          <a:effectLst/>
-        </p:spPr>
-        <p:txBody>
-          <a:bodyPr anchor="ctr">
-            <a:spAutoFit/>
-          </a:bodyPr>
-          <a:lstStyle/>
-          <a:p>
-            <a:pPr eaLnBrk="0" hangingPunct="0">
-              <a:defRPr/>
-            </a:pPr>
-            <a:r>
-              <a:rPr lang="be-BY" sz="1000" dirty="0">
-                <a:solidFill>
-                  <a:schemeClr val="bg1"/>
-                </a:solidFill>
-                <a:latin typeface="Courier New" pitchFamily="49" charset="0"/>
-                <a:ea typeface="Calibri" pitchFamily="34" charset="0"/>
-                <a:cs typeface="Courier New" pitchFamily="49" charset="0"/>
-              </a:rPr>
-              <a:t>        static void Main(string[] args)</a:t>
-            </a:r>
-            <a:endParaRPr lang="be-BY" sz="900" dirty="0">
-              <a:solidFill>
-                <a:schemeClr val="bg1"/>
-              </a:solidFill>
-              <a:latin typeface="Arial" pitchFamily="34" charset="0"/>
-            </a:endParaRPr>
-          </a:p>
-          <a:p>
-            <a:pPr eaLnBrk="0" hangingPunct="0">
-              <a:defRPr/>
-            </a:pPr>
-            <a:r>
-              <a:rPr lang="be-BY" sz="1000" dirty="0">
-                <a:solidFill>
-                  <a:schemeClr val="bg1"/>
-                </a:solidFill>
-                <a:latin typeface="Courier New" pitchFamily="49" charset="0"/>
-                <a:ea typeface="Calibri" pitchFamily="34" charset="0"/>
-                <a:cs typeface="Courier New" pitchFamily="49" charset="0"/>
-              </a:rPr>
-              <a:t>        {</a:t>
-            </a:r>
-            <a:endParaRPr lang="be-BY" sz="900" dirty="0">
-              <a:solidFill>
-                <a:schemeClr val="bg1"/>
-              </a:solidFill>
-              <a:latin typeface="Arial" pitchFamily="34" charset="0"/>
-            </a:endParaRPr>
-          </a:p>
-          <a:p>
-            <a:pPr eaLnBrk="0" hangingPunct="0">
-              <a:defRPr/>
-            </a:pPr>
-            <a:r>
-              <a:rPr lang="be-BY" sz="1000" dirty="0">
-                <a:solidFill>
-                  <a:schemeClr val="bg1"/>
-                </a:solidFill>
-                <a:latin typeface="Courier New" pitchFamily="49" charset="0"/>
-                <a:ea typeface="Calibri" pitchFamily="34" charset="0"/>
-                <a:cs typeface="Courier New" pitchFamily="49" charset="0"/>
-              </a:rPr>
-              <a:t>            Console.Write("Your unswer(yes\\no\\maybe): ");</a:t>
-            </a:r>
-            <a:endParaRPr lang="be-BY" sz="900" dirty="0">
-              <a:solidFill>
-                <a:schemeClr val="bg1"/>
-              </a:solidFill>
-              <a:latin typeface="Arial" pitchFamily="34" charset="0"/>
-            </a:endParaRPr>
-          </a:p>
-          <a:p>
-            <a:pPr eaLnBrk="0" hangingPunct="0">
-              <a:defRPr/>
-            </a:pPr>
-            <a:r>
-              <a:rPr lang="be-BY" sz="1000" dirty="0">
-                <a:solidFill>
-                  <a:schemeClr val="bg1"/>
-                </a:solidFill>
-                <a:latin typeface="Courier New" pitchFamily="49" charset="0"/>
-                <a:ea typeface="Calibri" pitchFamily="34" charset="0"/>
-                <a:cs typeface="Courier New" pitchFamily="49" charset="0"/>
-              </a:rPr>
-              <a:t>            string str = Console.ReadLine();</a:t>
-            </a:r>
-            <a:endParaRPr lang="be-BY" sz="900" dirty="0">
-              <a:solidFill>
-                <a:schemeClr val="bg1"/>
-              </a:solidFill>
-              <a:latin typeface="Arial" pitchFamily="34" charset="0"/>
-            </a:endParaRPr>
-          </a:p>
-          <a:p>
-            <a:pPr eaLnBrk="0" hangingPunct="0">
-              <a:defRPr/>
-            </a:pPr>
-            <a:r>
-              <a:rPr lang="be-BY" sz="1000" dirty="0">
-                <a:solidFill>
-                  <a:schemeClr val="bg1"/>
-                </a:solidFill>
-                <a:latin typeface="Courier New" pitchFamily="49" charset="0"/>
-                <a:ea typeface="Calibri" pitchFamily="34" charset="0"/>
-                <a:cs typeface="Courier New" pitchFamily="49" charset="0"/>
-              </a:rPr>
-              <a:t>            switch (str)</a:t>
-            </a:r>
-            <a:endParaRPr lang="be-BY" sz="900" dirty="0">
-              <a:solidFill>
-                <a:schemeClr val="bg1"/>
-              </a:solidFill>
-              <a:latin typeface="Arial" pitchFamily="34" charset="0"/>
-            </a:endParaRPr>
-          </a:p>
-          <a:p>
-            <a:pPr eaLnBrk="0" hangingPunct="0">
-              <a:defRPr/>
-            </a:pPr>
-            <a:r>
-              <a:rPr lang="be-BY" sz="1000" dirty="0">
-                <a:solidFill>
-                  <a:schemeClr val="bg1"/>
-                </a:solidFill>
-                <a:latin typeface="Courier New" pitchFamily="49" charset="0"/>
-                <a:ea typeface="Calibri" pitchFamily="34" charset="0"/>
-                <a:cs typeface="Courier New" pitchFamily="49" charset="0"/>
-              </a:rPr>
-              <a:t>            {</a:t>
-            </a:r>
-            <a:endParaRPr lang="be-BY" sz="900" dirty="0">
-              <a:solidFill>
-                <a:schemeClr val="bg1"/>
-              </a:solidFill>
-              <a:latin typeface="Arial" pitchFamily="34" charset="0"/>
-            </a:endParaRPr>
-          </a:p>
-          <a:p>
-            <a:pPr eaLnBrk="0" hangingPunct="0">
-              <a:defRPr/>
-            </a:pPr>
-            <a:r>
-              <a:rPr lang="be-BY" sz="1000" dirty="0">
-                <a:solidFill>
-                  <a:schemeClr val="bg1"/>
-                </a:solidFill>
-                <a:latin typeface="Courier New" pitchFamily="49" charset="0"/>
-                <a:ea typeface="Calibri" pitchFamily="34" charset="0"/>
-                <a:cs typeface="Courier New" pitchFamily="49" charset="0"/>
-              </a:rPr>
-              <a:t>                case "yes" :</a:t>
-            </a:r>
-            <a:endParaRPr lang="be-BY" sz="900" dirty="0">
-              <a:solidFill>
-                <a:schemeClr val="bg1"/>
-              </a:solidFill>
-              <a:latin typeface="Arial" pitchFamily="34" charset="0"/>
-            </a:endParaRPr>
-          </a:p>
-          <a:p>
-            <a:pPr eaLnBrk="0" hangingPunct="0">
-              <a:defRPr/>
-            </a:pPr>
-            <a:r>
-              <a:rPr lang="be-BY" sz="1000" dirty="0">
-                <a:solidFill>
-                  <a:schemeClr val="bg1"/>
-                </a:solidFill>
-                <a:latin typeface="Courier New" pitchFamily="49" charset="0"/>
-                <a:ea typeface="Calibri" pitchFamily="34" charset="0"/>
-                <a:cs typeface="Courier New" pitchFamily="49" charset="0"/>
-              </a:rPr>
-              <a:t>                    Console.WriteLine("Agreed!");</a:t>
-            </a:r>
-            <a:endParaRPr lang="be-BY" sz="900" dirty="0">
-              <a:solidFill>
-                <a:schemeClr val="bg1"/>
-              </a:solidFill>
-              <a:latin typeface="Arial" pitchFamily="34" charset="0"/>
-            </a:endParaRPr>
-          </a:p>
-          <a:p>
-            <a:pPr eaLnBrk="0" hangingPunct="0">
-              <a:defRPr/>
-            </a:pPr>
-            <a:r>
-              <a:rPr lang="be-BY" sz="1000" dirty="0">
-                <a:solidFill>
-                  <a:schemeClr val="bg1"/>
-                </a:solidFill>
-                <a:latin typeface="Courier New" pitchFamily="49" charset="0"/>
-                <a:ea typeface="Calibri" pitchFamily="34" charset="0"/>
-                <a:cs typeface="Courier New" pitchFamily="49" charset="0"/>
-              </a:rPr>
-              <a:t>                    break;</a:t>
-            </a:r>
-            <a:endParaRPr lang="be-BY" sz="900" dirty="0">
-              <a:solidFill>
-                <a:schemeClr val="bg1"/>
-              </a:solidFill>
-              <a:latin typeface="Arial" pitchFamily="34" charset="0"/>
-            </a:endParaRPr>
-          </a:p>
-          <a:p>
-            <a:pPr eaLnBrk="0" hangingPunct="0">
-              <a:defRPr/>
-            </a:pPr>
-            <a:r>
-              <a:rPr lang="be-BY" sz="1000" dirty="0">
-                <a:solidFill>
-                  <a:schemeClr val="bg1"/>
-                </a:solidFill>
-                <a:latin typeface="Courier New" pitchFamily="49" charset="0"/>
-                <a:ea typeface="Calibri" pitchFamily="34" charset="0"/>
-                <a:cs typeface="Courier New" pitchFamily="49" charset="0"/>
-              </a:rPr>
-              <a:t>                case "no" :</a:t>
-            </a:r>
-            <a:endParaRPr lang="be-BY" sz="900" dirty="0">
-              <a:solidFill>
-                <a:schemeClr val="bg1"/>
-              </a:solidFill>
-              <a:latin typeface="Arial" pitchFamily="34" charset="0"/>
-            </a:endParaRPr>
-          </a:p>
-          <a:p>
-            <a:pPr eaLnBrk="0" hangingPunct="0">
-              <a:defRPr/>
-            </a:pPr>
-            <a:r>
-              <a:rPr lang="be-BY" sz="1000" dirty="0">
-                <a:solidFill>
-                  <a:schemeClr val="bg1"/>
-                </a:solidFill>
-                <a:latin typeface="Courier New" pitchFamily="49" charset="0"/>
-                <a:ea typeface="Calibri" pitchFamily="34" charset="0"/>
-                <a:cs typeface="Courier New" pitchFamily="49" charset="0"/>
-              </a:rPr>
-              <a:t>                    Console.WriteLine("Canseled!");</a:t>
-            </a:r>
-            <a:endParaRPr lang="be-BY" sz="900" dirty="0">
-              <a:solidFill>
-                <a:schemeClr val="bg1"/>
-              </a:solidFill>
-              <a:latin typeface="Arial" pitchFamily="34" charset="0"/>
-            </a:endParaRPr>
-          </a:p>
-          <a:p>
-            <a:pPr eaLnBrk="0" hangingPunct="0">
-              <a:defRPr/>
-            </a:pPr>
-            <a:r>
-              <a:rPr lang="be-BY" sz="1000" dirty="0">
-                <a:solidFill>
-                  <a:schemeClr val="bg1"/>
-                </a:solidFill>
-                <a:latin typeface="Courier New" pitchFamily="49" charset="0"/>
-                <a:ea typeface="Calibri" pitchFamily="34" charset="0"/>
-                <a:cs typeface="Courier New" pitchFamily="49" charset="0"/>
-              </a:rPr>
-              <a:t>                    break;</a:t>
-            </a:r>
-            <a:endParaRPr lang="be-BY" sz="900" dirty="0">
-              <a:solidFill>
-                <a:schemeClr val="bg1"/>
-              </a:solidFill>
-              <a:latin typeface="Arial" pitchFamily="34" charset="0"/>
-            </a:endParaRPr>
-          </a:p>
-          <a:p>
-            <a:pPr eaLnBrk="0" hangingPunct="0">
-              <a:defRPr/>
-            </a:pPr>
-            <a:r>
-              <a:rPr lang="be-BY" sz="1000" dirty="0">
-                <a:solidFill>
-                  <a:schemeClr val="bg1"/>
-                </a:solidFill>
-                <a:latin typeface="Courier New" pitchFamily="49" charset="0"/>
-                <a:ea typeface="Calibri" pitchFamily="34" charset="0"/>
-                <a:cs typeface="Courier New" pitchFamily="49" charset="0"/>
-              </a:rPr>
-              <a:t>                case "maybe" :</a:t>
-            </a:r>
-            <a:endParaRPr lang="be-BY" sz="900" dirty="0">
-              <a:solidFill>
-                <a:schemeClr val="bg1"/>
-              </a:solidFill>
-              <a:latin typeface="Arial" pitchFamily="34" charset="0"/>
-            </a:endParaRPr>
-          </a:p>
-          <a:p>
-            <a:pPr eaLnBrk="0" hangingPunct="0">
-              <a:defRPr/>
-            </a:pPr>
-            <a:r>
-              <a:rPr lang="be-BY" sz="1000" dirty="0">
-                <a:solidFill>
-                  <a:schemeClr val="bg1"/>
-                </a:solidFill>
-                <a:latin typeface="Courier New" pitchFamily="49" charset="0"/>
-                <a:ea typeface="Calibri" pitchFamily="34" charset="0"/>
-                <a:cs typeface="Courier New" pitchFamily="49" charset="0"/>
-              </a:rPr>
-              <a:t>                    Console.WriteLine("Wrong unswer! Tru again!");</a:t>
-            </a:r>
-            <a:endParaRPr lang="be-BY" sz="900" dirty="0">
-              <a:solidFill>
-                <a:schemeClr val="bg1"/>
-              </a:solidFill>
-              <a:latin typeface="Arial" pitchFamily="34" charset="0"/>
-            </a:endParaRPr>
-          </a:p>
-          <a:p>
-            <a:pPr eaLnBrk="0" hangingPunct="0">
-              <a:defRPr/>
-            </a:pPr>
-            <a:r>
-              <a:rPr lang="be-BY" sz="1000" dirty="0">
-                <a:solidFill>
-                  <a:schemeClr val="bg1"/>
-                </a:solidFill>
-                <a:latin typeface="Courier New" pitchFamily="49" charset="0"/>
-                <a:ea typeface="Calibri" pitchFamily="34" charset="0"/>
-                <a:cs typeface="Courier New" pitchFamily="49" charset="0"/>
-              </a:rPr>
-              <a:t>                    break;</a:t>
-            </a:r>
-            <a:endParaRPr lang="be-BY" sz="900" dirty="0">
-              <a:solidFill>
-                <a:schemeClr val="bg1"/>
-              </a:solidFill>
-              <a:latin typeface="Arial" pitchFamily="34" charset="0"/>
-            </a:endParaRPr>
-          </a:p>
-          <a:p>
-            <a:pPr eaLnBrk="0" hangingPunct="0">
-              <a:defRPr/>
-            </a:pPr>
-            <a:r>
-              <a:rPr lang="be-BY" sz="1000" dirty="0">
-                <a:solidFill>
-                  <a:schemeClr val="bg1"/>
-                </a:solidFill>
-                <a:latin typeface="Courier New" pitchFamily="49" charset="0"/>
-                <a:ea typeface="Calibri" pitchFamily="34" charset="0"/>
-                <a:cs typeface="Courier New" pitchFamily="49" charset="0"/>
-              </a:rPr>
-              <a:t>                default:</a:t>
-            </a:r>
-            <a:endParaRPr lang="be-BY" sz="900" dirty="0">
-              <a:solidFill>
-                <a:schemeClr val="bg1"/>
-              </a:solidFill>
-              <a:latin typeface="Arial" pitchFamily="34" charset="0"/>
-            </a:endParaRPr>
-          </a:p>
-          <a:p>
-            <a:pPr eaLnBrk="0" hangingPunct="0">
-              <a:defRPr/>
-            </a:pPr>
-            <a:r>
-              <a:rPr lang="be-BY" sz="1000" dirty="0">
-                <a:solidFill>
-                  <a:schemeClr val="bg1"/>
-                </a:solidFill>
-                <a:latin typeface="Courier New" pitchFamily="49" charset="0"/>
-                <a:ea typeface="Calibri" pitchFamily="34" charset="0"/>
-                <a:cs typeface="Courier New" pitchFamily="49" charset="0"/>
-              </a:rPr>
-              <a:t>                    Console.WriteLine("Fatal ERROR!");</a:t>
-            </a:r>
-            <a:endParaRPr lang="be-BY" sz="900" dirty="0">
-              <a:solidFill>
-                <a:schemeClr val="bg1"/>
-              </a:solidFill>
-              <a:latin typeface="Arial" pitchFamily="34" charset="0"/>
-            </a:endParaRPr>
-          </a:p>
-          <a:p>
-            <a:pPr eaLnBrk="0" hangingPunct="0">
-              <a:defRPr/>
-            </a:pPr>
-            <a:r>
-              <a:rPr lang="be-BY" sz="1000" dirty="0">
-                <a:solidFill>
-                  <a:schemeClr val="bg1"/>
-                </a:solidFill>
-                <a:latin typeface="Courier New" pitchFamily="49" charset="0"/>
-                <a:ea typeface="Calibri" pitchFamily="34" charset="0"/>
-                <a:cs typeface="Courier New" pitchFamily="49" charset="0"/>
-              </a:rPr>
-              <a:t>                    break;</a:t>
-            </a:r>
-            <a:endParaRPr lang="be-BY" sz="900" dirty="0">
-              <a:solidFill>
-                <a:schemeClr val="bg1"/>
-              </a:solidFill>
-              <a:latin typeface="Arial" pitchFamily="34" charset="0"/>
-            </a:endParaRPr>
-          </a:p>
-          <a:p>
-            <a:pPr eaLnBrk="0" hangingPunct="0">
-              <a:defRPr/>
-            </a:pPr>
-            <a:r>
-              <a:rPr lang="be-BY" sz="1000" dirty="0">
-                <a:solidFill>
-                  <a:schemeClr val="bg1"/>
-                </a:solidFill>
-                <a:latin typeface="Courier New" pitchFamily="49" charset="0"/>
-                <a:ea typeface="Calibri" pitchFamily="34" charset="0"/>
-                <a:cs typeface="Courier New" pitchFamily="49" charset="0"/>
-              </a:rPr>
-              <a:t>            }</a:t>
-            </a:r>
-          </a:p>
-          <a:p>
-            <a:pPr eaLnBrk="0" hangingPunct="0">
-              <a:defRPr/>
-            </a:pPr>
-            <a:r>
-              <a:rPr lang="be-BY" sz="1000" dirty="0">
-                <a:solidFill>
-                  <a:schemeClr val="bg1"/>
-                </a:solidFill>
-                <a:latin typeface="Courier New" pitchFamily="49" charset="0"/>
-                <a:ea typeface="Calibri" pitchFamily="34" charset="0"/>
-                <a:cs typeface="Courier New" pitchFamily="49" charset="0"/>
-              </a:rPr>
-              <a:t>        }</a:t>
-            </a:r>
-            <a:r>
-              <a:rPr lang="be-BY" sz="900" dirty="0">
-                <a:solidFill>
-                  <a:schemeClr val="bg1"/>
-                </a:solidFill>
-                <a:latin typeface="Arial" pitchFamily="34" charset="0"/>
-              </a:rPr>
-              <a:t> </a:t>
-            </a:r>
-            <a:endParaRPr lang="be-BY" dirty="0">
-              <a:solidFill>
-                <a:schemeClr val="bg1"/>
-              </a:solidFill>
-              <a:latin typeface="Calibri" pitchFamily="34" charset="0"/>
-            </a:endParaRPr>
-          </a:p>
-        </p:txBody>
-      </p:sp>
-      <p:sp>
-        <p:nvSpPr>
-          <p:cNvPr id="12292" name="Подзаголовок 2"/>
-          <p:cNvSpPr txBox="1">
-            <a:spLocks/>
-          </p:cNvSpPr>
-          <p:nvPr/>
-        </p:nvSpPr>
-        <p:spPr bwMode="auto">
-          <a:xfrm>
-            <a:off x="3090863" y="533400"/>
-            <a:ext cx="2928937" cy="2895600"/>
-          </a:xfrm>
-          <a:prstGeom prst="rect">
-            <a:avLst/>
-          </a:prstGeom>
-          <a:noFill/>
-          <a:ln w="9525">
-            <a:solidFill>
-              <a:srgbClr val="FF0000"/>
-            </a:solidFill>
-            <a:miter lim="800000"/>
-            <a:headEnd/>
-            <a:tailEnd/>
-          </a:ln>
-          <a:extLst>
-            <a:ext uri="{909E8E84-426E-40DD-AFC4-6F175D3DCCD1}">
-              <a14:hiddenFill xmlns:a14="http://schemas.microsoft.com/office/drawing/2010/main">
-                <a:solidFill>
-                  <a:srgbClr val="FFFFFF"/>
-                </a:solidFill>
-              </a14:hiddenFill>
-            </a:ext>
-          </a:extLst>
-        </p:spPr>
-        <p:txBody>
-          <a:bodyPr/>
-          <a:lstStyle>
-            <a:lvl1pPr eaLnBrk="0" hangingPunct="0">
-              <a:defRPr>
-                <a:solidFill>
-                  <a:schemeClr val="tx1"/>
-                </a:solidFill>
-                <a:latin typeface="Arial" charset="0"/>
-              </a:defRPr>
-            </a:lvl1pPr>
-            <a:lvl2pPr marL="742950" indent="-285750" eaLnBrk="0" hangingPunct="0">
-              <a:defRPr>
-                <a:solidFill>
-                  <a:schemeClr val="tx1"/>
-                </a:solidFill>
-                <a:latin typeface="Arial" charset="0"/>
-              </a:defRPr>
-            </a:lvl2pPr>
-            <a:lvl3pPr marL="1143000" indent="-228600" eaLnBrk="0" hangingPunct="0">
-              <a:defRPr>
-                <a:solidFill>
-                  <a:schemeClr val="tx1"/>
-                </a:solidFill>
-                <a:latin typeface="Arial" charset="0"/>
-              </a:defRPr>
-            </a:lvl3pPr>
-            <a:lvl4pPr marL="1600200" indent="-228600" eaLnBrk="0" hangingPunct="0">
-              <a:defRPr>
-                <a:solidFill>
-                  <a:schemeClr val="tx1"/>
-                </a:solidFill>
-                <a:latin typeface="Arial" charset="0"/>
-              </a:defRPr>
-            </a:lvl4pPr>
-            <a:lvl5pPr marL="2057400" indent="-228600" eaLnBrk="0" hangingPunct="0">
-              <a:defRPr>
-                <a:solidFill>
-                  <a:schemeClr val="tx1"/>
-                </a:solidFill>
-                <a:latin typeface="Arial" charset="0"/>
-              </a:defRPr>
-            </a:lvl5pPr>
-            <a:lvl6pPr marL="2514600" indent="-228600" eaLnBrk="0" fontAlgn="base" hangingPunct="0">
-              <a:spcBef>
-                <a:spcPct val="0"/>
-              </a:spcBef>
-              <a:spcAft>
-                <a:spcPct val="0"/>
-              </a:spcAft>
-              <a:defRPr>
-                <a:solidFill>
-                  <a:schemeClr val="tx1"/>
-                </a:solidFill>
-                <a:latin typeface="Arial" charset="0"/>
-              </a:defRPr>
-            </a:lvl6pPr>
-            <a:lvl7pPr marL="2971800" indent="-228600" eaLnBrk="0" fontAlgn="base" hangingPunct="0">
-              <a:spcBef>
-                <a:spcPct val="0"/>
-              </a:spcBef>
-              <a:spcAft>
-                <a:spcPct val="0"/>
-              </a:spcAft>
-              <a:defRPr>
-                <a:solidFill>
-                  <a:schemeClr val="tx1"/>
-                </a:solidFill>
-                <a:latin typeface="Arial" charset="0"/>
-              </a:defRPr>
-            </a:lvl7pPr>
-            <a:lvl8pPr marL="3429000" indent="-228600" eaLnBrk="0" fontAlgn="base" hangingPunct="0">
-              <a:spcBef>
-                <a:spcPct val="0"/>
-              </a:spcBef>
-              <a:spcAft>
-                <a:spcPct val="0"/>
-              </a:spcAft>
-              <a:defRPr>
-                <a:solidFill>
-                  <a:schemeClr val="tx1"/>
-                </a:solidFill>
-                <a:latin typeface="Arial" charset="0"/>
-              </a:defRPr>
-            </a:lvl8pPr>
-            <a:lvl9pPr marL="3886200" indent="-228600" eaLnBrk="0" fontAlgn="base" hangingPunct="0">
-              <a:spcBef>
-                <a:spcPct val="0"/>
-              </a:spcBef>
-              <a:spcAft>
-                <a:spcPct val="0"/>
-              </a:spcAft>
-              <a:defRPr>
-                <a:solidFill>
-                  <a:schemeClr val="tx1"/>
-                </a:solidFill>
-                <a:latin typeface="Arial" charset="0"/>
-              </a:defRPr>
-            </a:lvl9pPr>
-          </a:lstStyle>
-          <a:p>
-            <a:pPr eaLnBrk="1" hangingPunct="1"/>
-            <a:r>
-              <a:rPr lang="en-US" sz="1400">
-                <a:solidFill>
-                  <a:schemeClr val="bg1"/>
-                </a:solidFill>
-                <a:latin typeface="Courier New" pitchFamily="49" charset="0"/>
-                <a:cs typeface="Courier New" pitchFamily="49" charset="0"/>
-              </a:rPr>
-              <a:t>switch( &lt;</a:t>
-            </a:r>
-            <a:r>
-              <a:rPr lang="ru-RU" sz="1400">
-                <a:solidFill>
-                  <a:schemeClr val="bg1"/>
-                </a:solidFill>
-                <a:latin typeface="Courier New" pitchFamily="49" charset="0"/>
-                <a:cs typeface="Courier New" pitchFamily="49" charset="0"/>
-              </a:rPr>
-              <a:t>переменная</a:t>
-            </a:r>
-            <a:r>
-              <a:rPr lang="en-US" sz="1400">
-                <a:solidFill>
-                  <a:schemeClr val="bg1"/>
-                </a:solidFill>
-                <a:latin typeface="Courier New" pitchFamily="49" charset="0"/>
-                <a:cs typeface="Courier New" pitchFamily="49" charset="0"/>
-              </a:rPr>
-              <a:t>&gt;</a:t>
-            </a:r>
-            <a:r>
-              <a:rPr lang="ru-RU" sz="1400">
-                <a:solidFill>
-                  <a:schemeClr val="bg1"/>
-                </a:solidFill>
-                <a:latin typeface="Courier New" pitchFamily="49" charset="0"/>
-                <a:cs typeface="Courier New" pitchFamily="49" charset="0"/>
-              </a:rPr>
-              <a:t> )</a:t>
-            </a:r>
-          </a:p>
-          <a:p>
-            <a:pPr eaLnBrk="1" hangingPunct="1"/>
-            <a:r>
-              <a:rPr lang="en-US" sz="1400">
-                <a:solidFill>
-                  <a:schemeClr val="bg1"/>
-                </a:solidFill>
-                <a:latin typeface="Courier New" pitchFamily="49" charset="0"/>
-                <a:cs typeface="Courier New" pitchFamily="49" charset="0"/>
-              </a:rPr>
-              <a:t>{</a:t>
-            </a:r>
-          </a:p>
-          <a:p>
-            <a:pPr eaLnBrk="1" hangingPunct="1"/>
-            <a:r>
-              <a:rPr lang="en-US" sz="1400">
-                <a:solidFill>
-                  <a:schemeClr val="bg1"/>
-                </a:solidFill>
-                <a:latin typeface="Courier New" pitchFamily="49" charset="0"/>
-                <a:cs typeface="Courier New" pitchFamily="49" charset="0"/>
-              </a:rPr>
-              <a:t>case &lt;</a:t>
-            </a:r>
-            <a:r>
-              <a:rPr lang="ru-RU" sz="1400">
-                <a:solidFill>
-                  <a:schemeClr val="bg1"/>
-                </a:solidFill>
-                <a:latin typeface="Courier New" pitchFamily="49" charset="0"/>
-                <a:cs typeface="Courier New" pitchFamily="49" charset="0"/>
-              </a:rPr>
-              <a:t>значение1</a:t>
-            </a:r>
-            <a:r>
-              <a:rPr lang="en-US" sz="1400">
-                <a:solidFill>
-                  <a:schemeClr val="bg1"/>
-                </a:solidFill>
-                <a:latin typeface="Courier New" pitchFamily="49" charset="0"/>
-                <a:cs typeface="Courier New" pitchFamily="49" charset="0"/>
-              </a:rPr>
-              <a:t>&gt;:		</a:t>
-            </a:r>
-            <a:endParaRPr lang="ru-RU" sz="1400">
-              <a:solidFill>
-                <a:schemeClr val="bg1"/>
-              </a:solidFill>
-              <a:latin typeface="Courier New" pitchFamily="49" charset="0"/>
-              <a:cs typeface="Courier New" pitchFamily="49" charset="0"/>
-            </a:endParaRPr>
-          </a:p>
-          <a:p>
-            <a:pPr eaLnBrk="1" hangingPunct="1"/>
-            <a:r>
-              <a:rPr lang="ru-RU" sz="1400">
-                <a:solidFill>
-                  <a:schemeClr val="bg1"/>
-                </a:solidFill>
-                <a:latin typeface="Courier New" pitchFamily="49" charset="0"/>
-                <a:cs typeface="Courier New" pitchFamily="49" charset="0"/>
-              </a:rPr>
-              <a:t>     </a:t>
-            </a:r>
-            <a:r>
-              <a:rPr lang="en-US" sz="1400">
-                <a:solidFill>
-                  <a:schemeClr val="bg1"/>
-                </a:solidFill>
-                <a:latin typeface="Courier New" pitchFamily="49" charset="0"/>
-                <a:cs typeface="Courier New" pitchFamily="49" charset="0"/>
-              </a:rPr>
-              <a:t>&lt;</a:t>
-            </a:r>
-            <a:r>
-              <a:rPr lang="ru-RU" sz="1400">
-                <a:solidFill>
-                  <a:schemeClr val="bg1"/>
-                </a:solidFill>
-                <a:latin typeface="Courier New" pitchFamily="49" charset="0"/>
-                <a:cs typeface="Courier New" pitchFamily="49" charset="0"/>
-              </a:rPr>
-              <a:t>операторы</a:t>
-            </a:r>
-            <a:r>
-              <a:rPr lang="en-US" sz="1400">
-                <a:solidFill>
-                  <a:schemeClr val="bg1"/>
-                </a:solidFill>
-                <a:latin typeface="Courier New" pitchFamily="49" charset="0"/>
-                <a:cs typeface="Courier New" pitchFamily="49" charset="0"/>
-              </a:rPr>
-              <a:t>&gt;</a:t>
-            </a:r>
-            <a:endParaRPr lang="ru-RU" sz="1400">
-              <a:solidFill>
-                <a:schemeClr val="bg1"/>
-              </a:solidFill>
-              <a:latin typeface="Courier New" pitchFamily="49" charset="0"/>
-              <a:cs typeface="Courier New" pitchFamily="49" charset="0"/>
-            </a:endParaRPr>
-          </a:p>
-          <a:p>
-            <a:pPr eaLnBrk="1" hangingPunct="1"/>
-            <a:r>
-              <a:rPr lang="en-US" sz="1400">
-                <a:solidFill>
-                  <a:schemeClr val="bg1"/>
-                </a:solidFill>
-                <a:latin typeface="Courier New" pitchFamily="49" charset="0"/>
-                <a:cs typeface="Courier New" pitchFamily="49" charset="0"/>
-              </a:rPr>
-              <a:t>     break;</a:t>
-            </a:r>
-          </a:p>
-          <a:p>
-            <a:pPr eaLnBrk="1" hangingPunct="1"/>
-            <a:r>
-              <a:rPr lang="en-US" sz="1400">
-                <a:solidFill>
-                  <a:schemeClr val="bg1"/>
-                </a:solidFill>
-                <a:latin typeface="Courier New" pitchFamily="49" charset="0"/>
-                <a:cs typeface="Courier New" pitchFamily="49" charset="0"/>
-              </a:rPr>
-              <a:t>case &lt;</a:t>
-            </a:r>
-            <a:r>
-              <a:rPr lang="ru-RU" sz="1400">
-                <a:solidFill>
-                  <a:schemeClr val="bg1"/>
-                </a:solidFill>
-                <a:latin typeface="Courier New" pitchFamily="49" charset="0"/>
-                <a:cs typeface="Courier New" pitchFamily="49" charset="0"/>
-              </a:rPr>
-              <a:t>значение</a:t>
-            </a:r>
-            <a:r>
-              <a:rPr lang="en-US" sz="1400">
-                <a:solidFill>
-                  <a:schemeClr val="bg1"/>
-                </a:solidFill>
-                <a:latin typeface="Courier New" pitchFamily="49" charset="0"/>
-                <a:cs typeface="Courier New" pitchFamily="49" charset="0"/>
-              </a:rPr>
-              <a:t>2&gt;:</a:t>
-            </a:r>
-            <a:endParaRPr lang="ru-RU" sz="1400">
-              <a:solidFill>
-                <a:schemeClr val="bg1"/>
-              </a:solidFill>
-              <a:latin typeface="Courier New" pitchFamily="49" charset="0"/>
-              <a:cs typeface="Courier New" pitchFamily="49" charset="0"/>
-            </a:endParaRPr>
-          </a:p>
-          <a:p>
-            <a:pPr eaLnBrk="1" hangingPunct="1"/>
-            <a:r>
-              <a:rPr lang="ru-RU" sz="1400">
-                <a:solidFill>
-                  <a:schemeClr val="bg1"/>
-                </a:solidFill>
-                <a:latin typeface="Courier New" pitchFamily="49" charset="0"/>
-                <a:cs typeface="Courier New" pitchFamily="49" charset="0"/>
-              </a:rPr>
-              <a:t>     </a:t>
-            </a:r>
-            <a:r>
-              <a:rPr lang="en-US" sz="1400">
-                <a:solidFill>
-                  <a:schemeClr val="bg1"/>
-                </a:solidFill>
-                <a:latin typeface="Courier New" pitchFamily="49" charset="0"/>
-                <a:cs typeface="Courier New" pitchFamily="49" charset="0"/>
-              </a:rPr>
-              <a:t>&lt;</a:t>
-            </a:r>
-            <a:r>
-              <a:rPr lang="ru-RU" sz="1400">
-                <a:solidFill>
-                  <a:schemeClr val="bg1"/>
-                </a:solidFill>
-                <a:latin typeface="Courier New" pitchFamily="49" charset="0"/>
-                <a:cs typeface="Courier New" pitchFamily="49" charset="0"/>
-              </a:rPr>
-              <a:t>операторы</a:t>
-            </a:r>
-            <a:r>
-              <a:rPr lang="en-US" sz="1400">
-                <a:solidFill>
-                  <a:schemeClr val="bg1"/>
-                </a:solidFill>
-                <a:latin typeface="Courier New" pitchFamily="49" charset="0"/>
-                <a:cs typeface="Courier New" pitchFamily="49" charset="0"/>
-              </a:rPr>
-              <a:t>&gt;</a:t>
-            </a:r>
-            <a:endParaRPr lang="ru-RU" sz="1400">
-              <a:solidFill>
-                <a:schemeClr val="bg1"/>
-              </a:solidFill>
-              <a:latin typeface="Courier New" pitchFamily="49" charset="0"/>
-              <a:cs typeface="Courier New" pitchFamily="49" charset="0"/>
-            </a:endParaRPr>
-          </a:p>
-          <a:p>
-            <a:pPr eaLnBrk="1" hangingPunct="1"/>
-            <a:r>
-              <a:rPr lang="en-US" sz="1400">
-                <a:solidFill>
-                  <a:schemeClr val="bg1"/>
-                </a:solidFill>
-                <a:latin typeface="Courier New" pitchFamily="49" charset="0"/>
-                <a:cs typeface="Courier New" pitchFamily="49" charset="0"/>
-              </a:rPr>
-              <a:t>     break;</a:t>
-            </a:r>
-          </a:p>
-          <a:p>
-            <a:pPr eaLnBrk="1" hangingPunct="1"/>
-            <a:r>
-              <a:rPr lang="en-US" sz="1400">
-                <a:solidFill>
-                  <a:schemeClr val="bg1"/>
-                </a:solidFill>
-                <a:latin typeface="Courier New" pitchFamily="49" charset="0"/>
-                <a:cs typeface="Courier New" pitchFamily="49" charset="0"/>
-              </a:rPr>
-              <a:t>...</a:t>
-            </a:r>
-          </a:p>
-          <a:p>
-            <a:pPr eaLnBrk="1" hangingPunct="1"/>
-            <a:r>
-              <a:rPr lang="en-US" sz="1400">
-                <a:solidFill>
-                  <a:schemeClr val="bg1"/>
-                </a:solidFill>
-                <a:latin typeface="Courier New" pitchFamily="49" charset="0"/>
-                <a:cs typeface="Courier New" pitchFamily="49" charset="0"/>
-              </a:rPr>
-              <a:t>default:</a:t>
-            </a:r>
-            <a:endParaRPr lang="ru-RU" sz="1400">
-              <a:solidFill>
-                <a:schemeClr val="bg1"/>
-              </a:solidFill>
-              <a:latin typeface="Courier New" pitchFamily="49" charset="0"/>
-              <a:cs typeface="Courier New" pitchFamily="49" charset="0"/>
-            </a:endParaRPr>
-          </a:p>
-          <a:p>
-            <a:pPr eaLnBrk="1" hangingPunct="1"/>
-            <a:r>
-              <a:rPr lang="ru-RU" sz="1400">
-                <a:solidFill>
-                  <a:schemeClr val="bg1"/>
-                </a:solidFill>
-                <a:latin typeface="Courier New" pitchFamily="49" charset="0"/>
-                <a:cs typeface="Courier New" pitchFamily="49" charset="0"/>
-              </a:rPr>
-              <a:t>     </a:t>
-            </a:r>
-            <a:r>
-              <a:rPr lang="en-US" sz="1400">
-                <a:solidFill>
-                  <a:schemeClr val="bg1"/>
-                </a:solidFill>
-                <a:latin typeface="Courier New" pitchFamily="49" charset="0"/>
-                <a:cs typeface="Courier New" pitchFamily="49" charset="0"/>
-              </a:rPr>
-              <a:t>&lt;</a:t>
-            </a:r>
-            <a:r>
-              <a:rPr lang="ru-RU" sz="1400">
-                <a:solidFill>
-                  <a:schemeClr val="bg1"/>
-                </a:solidFill>
-                <a:latin typeface="Courier New" pitchFamily="49" charset="0"/>
-                <a:cs typeface="Courier New" pitchFamily="49" charset="0"/>
-              </a:rPr>
-              <a:t>операторы</a:t>
-            </a:r>
-            <a:r>
-              <a:rPr lang="en-US" sz="1400">
-                <a:solidFill>
-                  <a:schemeClr val="bg1"/>
-                </a:solidFill>
-                <a:latin typeface="Courier New" pitchFamily="49" charset="0"/>
-                <a:cs typeface="Courier New" pitchFamily="49" charset="0"/>
-              </a:rPr>
-              <a:t>&gt;</a:t>
-            </a:r>
-            <a:endParaRPr lang="ru-RU" sz="1400">
-              <a:solidFill>
-                <a:schemeClr val="bg1"/>
-              </a:solidFill>
-              <a:latin typeface="Courier New" pitchFamily="49" charset="0"/>
-              <a:cs typeface="Courier New" pitchFamily="49" charset="0"/>
-            </a:endParaRPr>
-          </a:p>
-          <a:p>
-            <a:pPr eaLnBrk="1" hangingPunct="1"/>
-            <a:r>
-              <a:rPr lang="en-US" sz="1400">
-                <a:solidFill>
-                  <a:schemeClr val="bg1"/>
-                </a:solidFill>
-                <a:latin typeface="Courier New" pitchFamily="49" charset="0"/>
-                <a:cs typeface="Courier New" pitchFamily="49" charset="0"/>
-              </a:rPr>
-              <a:t>     break;</a:t>
-            </a:r>
-          </a:p>
-          <a:p>
-            <a:pPr eaLnBrk="1" hangingPunct="1"/>
-            <a:r>
-              <a:rPr lang="en-US" sz="1400">
-                <a:solidFill>
-                  <a:schemeClr val="bg1"/>
-                </a:solidFill>
-                <a:latin typeface="Courier New" pitchFamily="49" charset="0"/>
-                <a:cs typeface="Courier New" pitchFamily="49" charset="0"/>
-              </a:rPr>
-              <a:t>}</a:t>
-            </a:r>
-            <a:endParaRPr lang="ru-RU" sz="1400">
-              <a:solidFill>
-                <a:schemeClr val="bg1"/>
-              </a:solidFill>
-              <a:latin typeface="Courier New" pitchFamily="49" charset="0"/>
-              <a:cs typeface="Courier New" pitchFamily="49" charset="0"/>
-            </a:endParaRPr>
-          </a:p>
-        </p:txBody>
-      </p:sp>
-    </p:spTree>
-    <p:extLst>
-      <p:ext uri="{BB962C8B-B14F-4D97-AF65-F5344CB8AC3E}">
-        <p14:creationId xmlns:p14="http://schemas.microsoft.com/office/powerpoint/2010/main" val="1588249421"/>
       </p:ext>
     </p:extLst>
   </p:cSld>
@@ -15844,6 +14985,1113 @@
       </p:grpSpPr>
       <p:sp>
         <p:nvSpPr>
+          <p:cNvPr id="12290" name="Прямоугольник 10"/>
+          <p:cNvSpPr>
+            <a:spLocks noChangeArrowheads="1"/>
+          </p:cNvSpPr>
+          <p:nvPr/>
+        </p:nvSpPr>
+        <p:spPr bwMode="auto">
+          <a:xfrm>
+            <a:off x="609600" y="71438"/>
+            <a:ext cx="7924800" cy="461962"/>
+          </a:xfrm>
+          <a:prstGeom prst="rect">
+            <a:avLst/>
+          </a:prstGeom>
+          <a:noFill/>
+          <a:ln>
+            <a:noFill/>
+          </a:ln>
+          <a:extLst>
+            <a:ext uri="{909E8E84-426E-40DD-AFC4-6F175D3DCCD1}">
+              <a14:hiddenFill xmlns:a14="http://schemas.microsoft.com/office/drawing/2010/main">
+                <a:solidFill>
+                  <a:srgbClr val="FFFFFF"/>
+                </a:solidFill>
+              </a14:hiddenFill>
+            </a:ext>
+            <a:ext uri="{91240B29-F687-4F45-9708-019B960494DF}">
+              <a14:hiddenLine xmlns:a14="http://schemas.microsoft.com/office/drawing/2010/main" w="9525">
+                <a:solidFill>
+                  <a:srgbClr val="000000"/>
+                </a:solidFill>
+                <a:miter lim="800000"/>
+                <a:headEnd/>
+                <a:tailEnd/>
+              </a14:hiddenLine>
+            </a:ext>
+          </a:extLst>
+        </p:spPr>
+        <p:txBody>
+          <a:bodyPr>
+            <a:spAutoFit/>
+          </a:bodyPr>
+          <a:lstStyle/>
+          <a:p>
+            <a:pPr algn="ctr" eaLnBrk="0" hangingPunct="0">
+              <a:tabLst>
+                <a:tab pos="457200" algn="l"/>
+              </a:tabLst>
+            </a:pPr>
+            <a:r>
+              <a:rPr lang="en-US" sz="2400" dirty="0" err="1">
+                <a:solidFill>
+                  <a:schemeClr val="bg1"/>
+                </a:solidFill>
+                <a:cs typeface="Times New Roman" pitchFamily="18" charset="0"/>
+              </a:rPr>
+              <a:t>Switch..case..default</a:t>
+            </a:r>
+            <a:endParaRPr lang="en-US" sz="2400" dirty="0">
+              <a:solidFill>
+                <a:schemeClr val="bg1"/>
+              </a:solidFill>
+              <a:cs typeface="Times New Roman" pitchFamily="18" charset="0"/>
+            </a:endParaRPr>
+          </a:p>
+        </p:txBody>
+      </p:sp>
+      <p:sp>
+        <p:nvSpPr>
+          <p:cNvPr id="11273" name="Rectangle 9"/>
+          <p:cNvSpPr>
+            <a:spLocks noChangeArrowheads="1"/>
+          </p:cNvSpPr>
+          <p:nvPr/>
+        </p:nvSpPr>
+        <p:spPr bwMode="auto">
+          <a:xfrm>
+            <a:off x="1143000" y="3505200"/>
+            <a:ext cx="7010400" cy="3170238"/>
+          </a:xfrm>
+          <a:prstGeom prst="rect">
+            <a:avLst/>
+          </a:prstGeom>
+          <a:noFill/>
+          <a:ln w="9525">
+            <a:solidFill>
+              <a:schemeClr val="bg1">
+                <a:lumMod val="65000"/>
+              </a:schemeClr>
+            </a:solidFill>
+            <a:miter lim="800000"/>
+            <a:headEnd/>
+            <a:tailEnd/>
+          </a:ln>
+          <a:effectLst/>
+        </p:spPr>
+        <p:txBody>
+          <a:bodyPr anchor="ctr">
+            <a:spAutoFit/>
+          </a:bodyPr>
+          <a:lstStyle/>
+          <a:p>
+            <a:pPr eaLnBrk="0" hangingPunct="0">
+              <a:defRPr/>
+            </a:pPr>
+            <a:r>
+              <a:rPr lang="be-BY" sz="1000" dirty="0">
+                <a:solidFill>
+                  <a:schemeClr val="bg1"/>
+                </a:solidFill>
+                <a:latin typeface="Courier New" pitchFamily="49" charset="0"/>
+                <a:ea typeface="Calibri" pitchFamily="34" charset="0"/>
+                <a:cs typeface="Courier New" pitchFamily="49" charset="0"/>
+              </a:rPr>
+              <a:t>        static void Main(string[] args)</a:t>
+            </a:r>
+            <a:endParaRPr lang="be-BY" sz="900" dirty="0">
+              <a:solidFill>
+                <a:schemeClr val="bg1"/>
+              </a:solidFill>
+              <a:latin typeface="Arial" pitchFamily="34" charset="0"/>
+            </a:endParaRPr>
+          </a:p>
+          <a:p>
+            <a:pPr eaLnBrk="0" hangingPunct="0">
+              <a:defRPr/>
+            </a:pPr>
+            <a:r>
+              <a:rPr lang="be-BY" sz="1000" dirty="0">
+                <a:solidFill>
+                  <a:schemeClr val="bg1"/>
+                </a:solidFill>
+                <a:latin typeface="Courier New" pitchFamily="49" charset="0"/>
+                <a:ea typeface="Calibri" pitchFamily="34" charset="0"/>
+                <a:cs typeface="Courier New" pitchFamily="49" charset="0"/>
+              </a:rPr>
+              <a:t>        {</a:t>
+            </a:r>
+            <a:endParaRPr lang="be-BY" sz="900" dirty="0">
+              <a:solidFill>
+                <a:schemeClr val="bg1"/>
+              </a:solidFill>
+              <a:latin typeface="Arial" pitchFamily="34" charset="0"/>
+            </a:endParaRPr>
+          </a:p>
+          <a:p>
+            <a:pPr eaLnBrk="0" hangingPunct="0">
+              <a:defRPr/>
+            </a:pPr>
+            <a:r>
+              <a:rPr lang="be-BY" sz="1000" dirty="0">
+                <a:solidFill>
+                  <a:schemeClr val="bg1"/>
+                </a:solidFill>
+                <a:latin typeface="Courier New" pitchFamily="49" charset="0"/>
+                <a:ea typeface="Calibri" pitchFamily="34" charset="0"/>
+                <a:cs typeface="Courier New" pitchFamily="49" charset="0"/>
+              </a:rPr>
+              <a:t>            Console.Write("Your unswer(yes\\no\\maybe): ");</a:t>
+            </a:r>
+            <a:endParaRPr lang="be-BY" sz="900" dirty="0">
+              <a:solidFill>
+                <a:schemeClr val="bg1"/>
+              </a:solidFill>
+              <a:latin typeface="Arial" pitchFamily="34" charset="0"/>
+            </a:endParaRPr>
+          </a:p>
+          <a:p>
+            <a:pPr eaLnBrk="0" hangingPunct="0">
+              <a:defRPr/>
+            </a:pPr>
+            <a:r>
+              <a:rPr lang="be-BY" sz="1000" dirty="0">
+                <a:solidFill>
+                  <a:schemeClr val="bg1"/>
+                </a:solidFill>
+                <a:latin typeface="Courier New" pitchFamily="49" charset="0"/>
+                <a:ea typeface="Calibri" pitchFamily="34" charset="0"/>
+                <a:cs typeface="Courier New" pitchFamily="49" charset="0"/>
+              </a:rPr>
+              <a:t>            string str = Console.ReadLine();</a:t>
+            </a:r>
+            <a:endParaRPr lang="be-BY" sz="900" dirty="0">
+              <a:solidFill>
+                <a:schemeClr val="bg1"/>
+              </a:solidFill>
+              <a:latin typeface="Arial" pitchFamily="34" charset="0"/>
+            </a:endParaRPr>
+          </a:p>
+          <a:p>
+            <a:pPr eaLnBrk="0" hangingPunct="0">
+              <a:defRPr/>
+            </a:pPr>
+            <a:r>
+              <a:rPr lang="be-BY" sz="1000" dirty="0">
+                <a:solidFill>
+                  <a:schemeClr val="bg1"/>
+                </a:solidFill>
+                <a:latin typeface="Courier New" pitchFamily="49" charset="0"/>
+                <a:ea typeface="Calibri" pitchFamily="34" charset="0"/>
+                <a:cs typeface="Courier New" pitchFamily="49" charset="0"/>
+              </a:rPr>
+              <a:t>            switch (str)</a:t>
+            </a:r>
+            <a:endParaRPr lang="be-BY" sz="900" dirty="0">
+              <a:solidFill>
+                <a:schemeClr val="bg1"/>
+              </a:solidFill>
+              <a:latin typeface="Arial" pitchFamily="34" charset="0"/>
+            </a:endParaRPr>
+          </a:p>
+          <a:p>
+            <a:pPr eaLnBrk="0" hangingPunct="0">
+              <a:defRPr/>
+            </a:pPr>
+            <a:r>
+              <a:rPr lang="be-BY" sz="1000" dirty="0">
+                <a:solidFill>
+                  <a:schemeClr val="bg1"/>
+                </a:solidFill>
+                <a:latin typeface="Courier New" pitchFamily="49" charset="0"/>
+                <a:ea typeface="Calibri" pitchFamily="34" charset="0"/>
+                <a:cs typeface="Courier New" pitchFamily="49" charset="0"/>
+              </a:rPr>
+              <a:t>            {</a:t>
+            </a:r>
+            <a:endParaRPr lang="be-BY" sz="900" dirty="0">
+              <a:solidFill>
+                <a:schemeClr val="bg1"/>
+              </a:solidFill>
+              <a:latin typeface="Arial" pitchFamily="34" charset="0"/>
+            </a:endParaRPr>
+          </a:p>
+          <a:p>
+            <a:pPr eaLnBrk="0" hangingPunct="0">
+              <a:defRPr/>
+            </a:pPr>
+            <a:r>
+              <a:rPr lang="be-BY" sz="1000" dirty="0">
+                <a:solidFill>
+                  <a:schemeClr val="bg1"/>
+                </a:solidFill>
+                <a:latin typeface="Courier New" pitchFamily="49" charset="0"/>
+                <a:ea typeface="Calibri" pitchFamily="34" charset="0"/>
+                <a:cs typeface="Courier New" pitchFamily="49" charset="0"/>
+              </a:rPr>
+              <a:t>                case "yes" :</a:t>
+            </a:r>
+            <a:endParaRPr lang="be-BY" sz="900" dirty="0">
+              <a:solidFill>
+                <a:schemeClr val="bg1"/>
+              </a:solidFill>
+              <a:latin typeface="Arial" pitchFamily="34" charset="0"/>
+            </a:endParaRPr>
+          </a:p>
+          <a:p>
+            <a:pPr eaLnBrk="0" hangingPunct="0">
+              <a:defRPr/>
+            </a:pPr>
+            <a:r>
+              <a:rPr lang="be-BY" sz="1000" dirty="0">
+                <a:solidFill>
+                  <a:schemeClr val="bg1"/>
+                </a:solidFill>
+                <a:latin typeface="Courier New" pitchFamily="49" charset="0"/>
+                <a:ea typeface="Calibri" pitchFamily="34" charset="0"/>
+                <a:cs typeface="Courier New" pitchFamily="49" charset="0"/>
+              </a:rPr>
+              <a:t>                    Console.WriteLine("Agreed!");</a:t>
+            </a:r>
+            <a:endParaRPr lang="be-BY" sz="900" dirty="0">
+              <a:solidFill>
+                <a:schemeClr val="bg1"/>
+              </a:solidFill>
+              <a:latin typeface="Arial" pitchFamily="34" charset="0"/>
+            </a:endParaRPr>
+          </a:p>
+          <a:p>
+            <a:pPr eaLnBrk="0" hangingPunct="0">
+              <a:defRPr/>
+            </a:pPr>
+            <a:r>
+              <a:rPr lang="be-BY" sz="1000" dirty="0">
+                <a:solidFill>
+                  <a:schemeClr val="bg1"/>
+                </a:solidFill>
+                <a:latin typeface="Courier New" pitchFamily="49" charset="0"/>
+                <a:ea typeface="Calibri" pitchFamily="34" charset="0"/>
+                <a:cs typeface="Courier New" pitchFamily="49" charset="0"/>
+              </a:rPr>
+              <a:t>                    break;</a:t>
+            </a:r>
+            <a:endParaRPr lang="be-BY" sz="900" dirty="0">
+              <a:solidFill>
+                <a:schemeClr val="bg1"/>
+              </a:solidFill>
+              <a:latin typeface="Arial" pitchFamily="34" charset="0"/>
+            </a:endParaRPr>
+          </a:p>
+          <a:p>
+            <a:pPr eaLnBrk="0" hangingPunct="0">
+              <a:defRPr/>
+            </a:pPr>
+            <a:r>
+              <a:rPr lang="be-BY" sz="1000" dirty="0">
+                <a:solidFill>
+                  <a:schemeClr val="bg1"/>
+                </a:solidFill>
+                <a:latin typeface="Courier New" pitchFamily="49" charset="0"/>
+                <a:ea typeface="Calibri" pitchFamily="34" charset="0"/>
+                <a:cs typeface="Courier New" pitchFamily="49" charset="0"/>
+              </a:rPr>
+              <a:t>                case "no" :</a:t>
+            </a:r>
+            <a:endParaRPr lang="be-BY" sz="900" dirty="0">
+              <a:solidFill>
+                <a:schemeClr val="bg1"/>
+              </a:solidFill>
+              <a:latin typeface="Arial" pitchFamily="34" charset="0"/>
+            </a:endParaRPr>
+          </a:p>
+          <a:p>
+            <a:pPr eaLnBrk="0" hangingPunct="0">
+              <a:defRPr/>
+            </a:pPr>
+            <a:r>
+              <a:rPr lang="be-BY" sz="1000" dirty="0">
+                <a:solidFill>
+                  <a:schemeClr val="bg1"/>
+                </a:solidFill>
+                <a:latin typeface="Courier New" pitchFamily="49" charset="0"/>
+                <a:ea typeface="Calibri" pitchFamily="34" charset="0"/>
+                <a:cs typeface="Courier New" pitchFamily="49" charset="0"/>
+              </a:rPr>
+              <a:t>                    Console.WriteLine("Canseled!");</a:t>
+            </a:r>
+            <a:endParaRPr lang="be-BY" sz="900" dirty="0">
+              <a:solidFill>
+                <a:schemeClr val="bg1"/>
+              </a:solidFill>
+              <a:latin typeface="Arial" pitchFamily="34" charset="0"/>
+            </a:endParaRPr>
+          </a:p>
+          <a:p>
+            <a:pPr eaLnBrk="0" hangingPunct="0">
+              <a:defRPr/>
+            </a:pPr>
+            <a:r>
+              <a:rPr lang="be-BY" sz="1000" dirty="0">
+                <a:solidFill>
+                  <a:schemeClr val="bg1"/>
+                </a:solidFill>
+                <a:latin typeface="Courier New" pitchFamily="49" charset="0"/>
+                <a:ea typeface="Calibri" pitchFamily="34" charset="0"/>
+                <a:cs typeface="Courier New" pitchFamily="49" charset="0"/>
+              </a:rPr>
+              <a:t>                    break;</a:t>
+            </a:r>
+            <a:endParaRPr lang="be-BY" sz="900" dirty="0">
+              <a:solidFill>
+                <a:schemeClr val="bg1"/>
+              </a:solidFill>
+              <a:latin typeface="Arial" pitchFamily="34" charset="0"/>
+            </a:endParaRPr>
+          </a:p>
+          <a:p>
+            <a:pPr eaLnBrk="0" hangingPunct="0">
+              <a:defRPr/>
+            </a:pPr>
+            <a:r>
+              <a:rPr lang="be-BY" sz="1000" dirty="0">
+                <a:solidFill>
+                  <a:schemeClr val="bg1"/>
+                </a:solidFill>
+                <a:latin typeface="Courier New" pitchFamily="49" charset="0"/>
+                <a:ea typeface="Calibri" pitchFamily="34" charset="0"/>
+                <a:cs typeface="Courier New" pitchFamily="49" charset="0"/>
+              </a:rPr>
+              <a:t>                case "maybe" :</a:t>
+            </a:r>
+            <a:endParaRPr lang="be-BY" sz="900" dirty="0">
+              <a:solidFill>
+                <a:schemeClr val="bg1"/>
+              </a:solidFill>
+              <a:latin typeface="Arial" pitchFamily="34" charset="0"/>
+            </a:endParaRPr>
+          </a:p>
+          <a:p>
+            <a:pPr eaLnBrk="0" hangingPunct="0">
+              <a:defRPr/>
+            </a:pPr>
+            <a:r>
+              <a:rPr lang="be-BY" sz="1000" dirty="0">
+                <a:solidFill>
+                  <a:schemeClr val="bg1"/>
+                </a:solidFill>
+                <a:latin typeface="Courier New" pitchFamily="49" charset="0"/>
+                <a:ea typeface="Calibri" pitchFamily="34" charset="0"/>
+                <a:cs typeface="Courier New" pitchFamily="49" charset="0"/>
+              </a:rPr>
+              <a:t>                    Console.WriteLine("Wrong unswer! Tru again!");</a:t>
+            </a:r>
+            <a:endParaRPr lang="be-BY" sz="900" dirty="0">
+              <a:solidFill>
+                <a:schemeClr val="bg1"/>
+              </a:solidFill>
+              <a:latin typeface="Arial" pitchFamily="34" charset="0"/>
+            </a:endParaRPr>
+          </a:p>
+          <a:p>
+            <a:pPr eaLnBrk="0" hangingPunct="0">
+              <a:defRPr/>
+            </a:pPr>
+            <a:r>
+              <a:rPr lang="be-BY" sz="1000" dirty="0">
+                <a:solidFill>
+                  <a:schemeClr val="bg1"/>
+                </a:solidFill>
+                <a:latin typeface="Courier New" pitchFamily="49" charset="0"/>
+                <a:ea typeface="Calibri" pitchFamily="34" charset="0"/>
+                <a:cs typeface="Courier New" pitchFamily="49" charset="0"/>
+              </a:rPr>
+              <a:t>                    break;</a:t>
+            </a:r>
+            <a:endParaRPr lang="be-BY" sz="900" dirty="0">
+              <a:solidFill>
+                <a:schemeClr val="bg1"/>
+              </a:solidFill>
+              <a:latin typeface="Arial" pitchFamily="34" charset="0"/>
+            </a:endParaRPr>
+          </a:p>
+          <a:p>
+            <a:pPr eaLnBrk="0" hangingPunct="0">
+              <a:defRPr/>
+            </a:pPr>
+            <a:r>
+              <a:rPr lang="be-BY" sz="1000" dirty="0">
+                <a:solidFill>
+                  <a:schemeClr val="bg1"/>
+                </a:solidFill>
+                <a:latin typeface="Courier New" pitchFamily="49" charset="0"/>
+                <a:ea typeface="Calibri" pitchFamily="34" charset="0"/>
+                <a:cs typeface="Courier New" pitchFamily="49" charset="0"/>
+              </a:rPr>
+              <a:t>                default:</a:t>
+            </a:r>
+            <a:endParaRPr lang="be-BY" sz="900" dirty="0">
+              <a:solidFill>
+                <a:schemeClr val="bg1"/>
+              </a:solidFill>
+              <a:latin typeface="Arial" pitchFamily="34" charset="0"/>
+            </a:endParaRPr>
+          </a:p>
+          <a:p>
+            <a:pPr eaLnBrk="0" hangingPunct="0">
+              <a:defRPr/>
+            </a:pPr>
+            <a:r>
+              <a:rPr lang="be-BY" sz="1000" dirty="0">
+                <a:solidFill>
+                  <a:schemeClr val="bg1"/>
+                </a:solidFill>
+                <a:latin typeface="Courier New" pitchFamily="49" charset="0"/>
+                <a:ea typeface="Calibri" pitchFamily="34" charset="0"/>
+                <a:cs typeface="Courier New" pitchFamily="49" charset="0"/>
+              </a:rPr>
+              <a:t>                    Console.WriteLine("Fatal ERROR!");</a:t>
+            </a:r>
+            <a:endParaRPr lang="be-BY" sz="900" dirty="0">
+              <a:solidFill>
+                <a:schemeClr val="bg1"/>
+              </a:solidFill>
+              <a:latin typeface="Arial" pitchFamily="34" charset="0"/>
+            </a:endParaRPr>
+          </a:p>
+          <a:p>
+            <a:pPr eaLnBrk="0" hangingPunct="0">
+              <a:defRPr/>
+            </a:pPr>
+            <a:r>
+              <a:rPr lang="be-BY" sz="1000" dirty="0">
+                <a:solidFill>
+                  <a:schemeClr val="bg1"/>
+                </a:solidFill>
+                <a:latin typeface="Courier New" pitchFamily="49" charset="0"/>
+                <a:ea typeface="Calibri" pitchFamily="34" charset="0"/>
+                <a:cs typeface="Courier New" pitchFamily="49" charset="0"/>
+              </a:rPr>
+              <a:t>                    break;</a:t>
+            </a:r>
+            <a:endParaRPr lang="be-BY" sz="900" dirty="0">
+              <a:solidFill>
+                <a:schemeClr val="bg1"/>
+              </a:solidFill>
+              <a:latin typeface="Arial" pitchFamily="34" charset="0"/>
+            </a:endParaRPr>
+          </a:p>
+          <a:p>
+            <a:pPr eaLnBrk="0" hangingPunct="0">
+              <a:defRPr/>
+            </a:pPr>
+            <a:r>
+              <a:rPr lang="be-BY" sz="1000" dirty="0">
+                <a:solidFill>
+                  <a:schemeClr val="bg1"/>
+                </a:solidFill>
+                <a:latin typeface="Courier New" pitchFamily="49" charset="0"/>
+                <a:ea typeface="Calibri" pitchFamily="34" charset="0"/>
+                <a:cs typeface="Courier New" pitchFamily="49" charset="0"/>
+              </a:rPr>
+              <a:t>            }</a:t>
+            </a:r>
+          </a:p>
+          <a:p>
+            <a:pPr eaLnBrk="0" hangingPunct="0">
+              <a:defRPr/>
+            </a:pPr>
+            <a:r>
+              <a:rPr lang="be-BY" sz="1000" dirty="0">
+                <a:solidFill>
+                  <a:schemeClr val="bg1"/>
+                </a:solidFill>
+                <a:latin typeface="Courier New" pitchFamily="49" charset="0"/>
+                <a:ea typeface="Calibri" pitchFamily="34" charset="0"/>
+                <a:cs typeface="Courier New" pitchFamily="49" charset="0"/>
+              </a:rPr>
+              <a:t>        }</a:t>
+            </a:r>
+            <a:r>
+              <a:rPr lang="be-BY" sz="900" dirty="0">
+                <a:solidFill>
+                  <a:schemeClr val="bg1"/>
+                </a:solidFill>
+                <a:latin typeface="Arial" pitchFamily="34" charset="0"/>
+              </a:rPr>
+              <a:t> </a:t>
+            </a:r>
+            <a:endParaRPr lang="be-BY" dirty="0">
+              <a:solidFill>
+                <a:schemeClr val="bg1"/>
+              </a:solidFill>
+              <a:latin typeface="Calibri" pitchFamily="34" charset="0"/>
+            </a:endParaRPr>
+          </a:p>
+        </p:txBody>
+      </p:sp>
+      <p:sp>
+        <p:nvSpPr>
+          <p:cNvPr id="12292" name="Подзаголовок 2"/>
+          <p:cNvSpPr txBox="1">
+            <a:spLocks/>
+          </p:cNvSpPr>
+          <p:nvPr/>
+        </p:nvSpPr>
+        <p:spPr bwMode="auto">
+          <a:xfrm>
+            <a:off x="3090863" y="533400"/>
+            <a:ext cx="2928937" cy="2895600"/>
+          </a:xfrm>
+          <a:prstGeom prst="rect">
+            <a:avLst/>
+          </a:prstGeom>
+          <a:noFill/>
+          <a:ln w="9525">
+            <a:solidFill>
+              <a:srgbClr val="FF0000"/>
+            </a:solidFill>
+            <a:miter lim="800000"/>
+            <a:headEnd/>
+            <a:tailEnd/>
+          </a:ln>
+          <a:extLst>
+            <a:ext uri="{909E8E84-426E-40DD-AFC4-6F175D3DCCD1}">
+              <a14:hiddenFill xmlns:a14="http://schemas.microsoft.com/office/drawing/2010/main">
+                <a:solidFill>
+                  <a:srgbClr val="FFFFFF"/>
+                </a:solidFill>
+              </a14:hiddenFill>
+            </a:ext>
+          </a:extLst>
+        </p:spPr>
+        <p:txBody>
+          <a:bodyPr/>
+          <a:lstStyle>
+            <a:lvl1pPr eaLnBrk="0" hangingPunct="0">
+              <a:defRPr>
+                <a:solidFill>
+                  <a:schemeClr val="tx1"/>
+                </a:solidFill>
+                <a:latin typeface="Arial" charset="0"/>
+              </a:defRPr>
+            </a:lvl1pPr>
+            <a:lvl2pPr marL="742950" indent="-285750" eaLnBrk="0" hangingPunct="0">
+              <a:defRPr>
+                <a:solidFill>
+                  <a:schemeClr val="tx1"/>
+                </a:solidFill>
+                <a:latin typeface="Arial" charset="0"/>
+              </a:defRPr>
+            </a:lvl2pPr>
+            <a:lvl3pPr marL="1143000" indent="-228600" eaLnBrk="0" hangingPunct="0">
+              <a:defRPr>
+                <a:solidFill>
+                  <a:schemeClr val="tx1"/>
+                </a:solidFill>
+                <a:latin typeface="Arial" charset="0"/>
+              </a:defRPr>
+            </a:lvl3pPr>
+            <a:lvl4pPr marL="1600200" indent="-228600" eaLnBrk="0" hangingPunct="0">
+              <a:defRPr>
+                <a:solidFill>
+                  <a:schemeClr val="tx1"/>
+                </a:solidFill>
+                <a:latin typeface="Arial" charset="0"/>
+              </a:defRPr>
+            </a:lvl4pPr>
+            <a:lvl5pPr marL="2057400" indent="-228600" eaLnBrk="0" hangingPunct="0">
+              <a:defRPr>
+                <a:solidFill>
+                  <a:schemeClr val="tx1"/>
+                </a:solidFill>
+                <a:latin typeface="Arial" charset="0"/>
+              </a:defRPr>
+            </a:lvl5pPr>
+            <a:lvl6pPr marL="2514600" indent="-228600" eaLnBrk="0" fontAlgn="base" hangingPunct="0">
+              <a:spcBef>
+                <a:spcPct val="0"/>
+              </a:spcBef>
+              <a:spcAft>
+                <a:spcPct val="0"/>
+              </a:spcAft>
+              <a:defRPr>
+                <a:solidFill>
+                  <a:schemeClr val="tx1"/>
+                </a:solidFill>
+                <a:latin typeface="Arial" charset="0"/>
+              </a:defRPr>
+            </a:lvl6pPr>
+            <a:lvl7pPr marL="2971800" indent="-228600" eaLnBrk="0" fontAlgn="base" hangingPunct="0">
+              <a:spcBef>
+                <a:spcPct val="0"/>
+              </a:spcBef>
+              <a:spcAft>
+                <a:spcPct val="0"/>
+              </a:spcAft>
+              <a:defRPr>
+                <a:solidFill>
+                  <a:schemeClr val="tx1"/>
+                </a:solidFill>
+                <a:latin typeface="Arial" charset="0"/>
+              </a:defRPr>
+            </a:lvl7pPr>
+            <a:lvl8pPr marL="3429000" indent="-228600" eaLnBrk="0" fontAlgn="base" hangingPunct="0">
+              <a:spcBef>
+                <a:spcPct val="0"/>
+              </a:spcBef>
+              <a:spcAft>
+                <a:spcPct val="0"/>
+              </a:spcAft>
+              <a:defRPr>
+                <a:solidFill>
+                  <a:schemeClr val="tx1"/>
+                </a:solidFill>
+                <a:latin typeface="Arial" charset="0"/>
+              </a:defRPr>
+            </a:lvl8pPr>
+            <a:lvl9pPr marL="3886200" indent="-228600" eaLnBrk="0" fontAlgn="base" hangingPunct="0">
+              <a:spcBef>
+                <a:spcPct val="0"/>
+              </a:spcBef>
+              <a:spcAft>
+                <a:spcPct val="0"/>
+              </a:spcAft>
+              <a:defRPr>
+                <a:solidFill>
+                  <a:schemeClr val="tx1"/>
+                </a:solidFill>
+                <a:latin typeface="Arial" charset="0"/>
+              </a:defRPr>
+            </a:lvl9pPr>
+          </a:lstStyle>
+          <a:p>
+            <a:pPr eaLnBrk="1" hangingPunct="1"/>
+            <a:r>
+              <a:rPr lang="en-US" sz="1400">
+                <a:solidFill>
+                  <a:schemeClr val="bg1"/>
+                </a:solidFill>
+                <a:latin typeface="Courier New" pitchFamily="49" charset="0"/>
+                <a:cs typeface="Courier New" pitchFamily="49" charset="0"/>
+              </a:rPr>
+              <a:t>switch( &lt;</a:t>
+            </a:r>
+            <a:r>
+              <a:rPr lang="ru-RU" sz="1400">
+                <a:solidFill>
+                  <a:schemeClr val="bg1"/>
+                </a:solidFill>
+                <a:latin typeface="Courier New" pitchFamily="49" charset="0"/>
+                <a:cs typeface="Courier New" pitchFamily="49" charset="0"/>
+              </a:rPr>
+              <a:t>переменная</a:t>
+            </a:r>
+            <a:r>
+              <a:rPr lang="en-US" sz="1400">
+                <a:solidFill>
+                  <a:schemeClr val="bg1"/>
+                </a:solidFill>
+                <a:latin typeface="Courier New" pitchFamily="49" charset="0"/>
+                <a:cs typeface="Courier New" pitchFamily="49" charset="0"/>
+              </a:rPr>
+              <a:t>&gt;</a:t>
+            </a:r>
+            <a:r>
+              <a:rPr lang="ru-RU" sz="1400">
+                <a:solidFill>
+                  <a:schemeClr val="bg1"/>
+                </a:solidFill>
+                <a:latin typeface="Courier New" pitchFamily="49" charset="0"/>
+                <a:cs typeface="Courier New" pitchFamily="49" charset="0"/>
+              </a:rPr>
+              <a:t> )</a:t>
+            </a:r>
+          </a:p>
+          <a:p>
+            <a:pPr eaLnBrk="1" hangingPunct="1"/>
+            <a:r>
+              <a:rPr lang="en-US" sz="1400">
+                <a:solidFill>
+                  <a:schemeClr val="bg1"/>
+                </a:solidFill>
+                <a:latin typeface="Courier New" pitchFamily="49" charset="0"/>
+                <a:cs typeface="Courier New" pitchFamily="49" charset="0"/>
+              </a:rPr>
+              <a:t>{</a:t>
+            </a:r>
+          </a:p>
+          <a:p>
+            <a:pPr eaLnBrk="1" hangingPunct="1"/>
+            <a:r>
+              <a:rPr lang="en-US" sz="1400">
+                <a:solidFill>
+                  <a:schemeClr val="bg1"/>
+                </a:solidFill>
+                <a:latin typeface="Courier New" pitchFamily="49" charset="0"/>
+                <a:cs typeface="Courier New" pitchFamily="49" charset="0"/>
+              </a:rPr>
+              <a:t>case &lt;</a:t>
+            </a:r>
+            <a:r>
+              <a:rPr lang="ru-RU" sz="1400">
+                <a:solidFill>
+                  <a:schemeClr val="bg1"/>
+                </a:solidFill>
+                <a:latin typeface="Courier New" pitchFamily="49" charset="0"/>
+                <a:cs typeface="Courier New" pitchFamily="49" charset="0"/>
+              </a:rPr>
+              <a:t>значение1</a:t>
+            </a:r>
+            <a:r>
+              <a:rPr lang="en-US" sz="1400">
+                <a:solidFill>
+                  <a:schemeClr val="bg1"/>
+                </a:solidFill>
+                <a:latin typeface="Courier New" pitchFamily="49" charset="0"/>
+                <a:cs typeface="Courier New" pitchFamily="49" charset="0"/>
+              </a:rPr>
+              <a:t>&gt;:		</a:t>
+            </a:r>
+            <a:endParaRPr lang="ru-RU" sz="1400">
+              <a:solidFill>
+                <a:schemeClr val="bg1"/>
+              </a:solidFill>
+              <a:latin typeface="Courier New" pitchFamily="49" charset="0"/>
+              <a:cs typeface="Courier New" pitchFamily="49" charset="0"/>
+            </a:endParaRPr>
+          </a:p>
+          <a:p>
+            <a:pPr eaLnBrk="1" hangingPunct="1"/>
+            <a:r>
+              <a:rPr lang="ru-RU" sz="1400">
+                <a:solidFill>
+                  <a:schemeClr val="bg1"/>
+                </a:solidFill>
+                <a:latin typeface="Courier New" pitchFamily="49" charset="0"/>
+                <a:cs typeface="Courier New" pitchFamily="49" charset="0"/>
+              </a:rPr>
+              <a:t>     </a:t>
+            </a:r>
+            <a:r>
+              <a:rPr lang="en-US" sz="1400">
+                <a:solidFill>
+                  <a:schemeClr val="bg1"/>
+                </a:solidFill>
+                <a:latin typeface="Courier New" pitchFamily="49" charset="0"/>
+                <a:cs typeface="Courier New" pitchFamily="49" charset="0"/>
+              </a:rPr>
+              <a:t>&lt;</a:t>
+            </a:r>
+            <a:r>
+              <a:rPr lang="ru-RU" sz="1400">
+                <a:solidFill>
+                  <a:schemeClr val="bg1"/>
+                </a:solidFill>
+                <a:latin typeface="Courier New" pitchFamily="49" charset="0"/>
+                <a:cs typeface="Courier New" pitchFamily="49" charset="0"/>
+              </a:rPr>
+              <a:t>операторы</a:t>
+            </a:r>
+            <a:r>
+              <a:rPr lang="en-US" sz="1400">
+                <a:solidFill>
+                  <a:schemeClr val="bg1"/>
+                </a:solidFill>
+                <a:latin typeface="Courier New" pitchFamily="49" charset="0"/>
+                <a:cs typeface="Courier New" pitchFamily="49" charset="0"/>
+              </a:rPr>
+              <a:t>&gt;</a:t>
+            </a:r>
+            <a:endParaRPr lang="ru-RU" sz="1400">
+              <a:solidFill>
+                <a:schemeClr val="bg1"/>
+              </a:solidFill>
+              <a:latin typeface="Courier New" pitchFamily="49" charset="0"/>
+              <a:cs typeface="Courier New" pitchFamily="49" charset="0"/>
+            </a:endParaRPr>
+          </a:p>
+          <a:p>
+            <a:pPr eaLnBrk="1" hangingPunct="1"/>
+            <a:r>
+              <a:rPr lang="en-US" sz="1400">
+                <a:solidFill>
+                  <a:schemeClr val="bg1"/>
+                </a:solidFill>
+                <a:latin typeface="Courier New" pitchFamily="49" charset="0"/>
+                <a:cs typeface="Courier New" pitchFamily="49" charset="0"/>
+              </a:rPr>
+              <a:t>     break;</a:t>
+            </a:r>
+          </a:p>
+          <a:p>
+            <a:pPr eaLnBrk="1" hangingPunct="1"/>
+            <a:r>
+              <a:rPr lang="en-US" sz="1400">
+                <a:solidFill>
+                  <a:schemeClr val="bg1"/>
+                </a:solidFill>
+                <a:latin typeface="Courier New" pitchFamily="49" charset="0"/>
+                <a:cs typeface="Courier New" pitchFamily="49" charset="0"/>
+              </a:rPr>
+              <a:t>case &lt;</a:t>
+            </a:r>
+            <a:r>
+              <a:rPr lang="ru-RU" sz="1400">
+                <a:solidFill>
+                  <a:schemeClr val="bg1"/>
+                </a:solidFill>
+                <a:latin typeface="Courier New" pitchFamily="49" charset="0"/>
+                <a:cs typeface="Courier New" pitchFamily="49" charset="0"/>
+              </a:rPr>
+              <a:t>значение</a:t>
+            </a:r>
+            <a:r>
+              <a:rPr lang="en-US" sz="1400">
+                <a:solidFill>
+                  <a:schemeClr val="bg1"/>
+                </a:solidFill>
+                <a:latin typeface="Courier New" pitchFamily="49" charset="0"/>
+                <a:cs typeface="Courier New" pitchFamily="49" charset="0"/>
+              </a:rPr>
+              <a:t>2&gt;:</a:t>
+            </a:r>
+            <a:endParaRPr lang="ru-RU" sz="1400">
+              <a:solidFill>
+                <a:schemeClr val="bg1"/>
+              </a:solidFill>
+              <a:latin typeface="Courier New" pitchFamily="49" charset="0"/>
+              <a:cs typeface="Courier New" pitchFamily="49" charset="0"/>
+            </a:endParaRPr>
+          </a:p>
+          <a:p>
+            <a:pPr eaLnBrk="1" hangingPunct="1"/>
+            <a:r>
+              <a:rPr lang="ru-RU" sz="1400">
+                <a:solidFill>
+                  <a:schemeClr val="bg1"/>
+                </a:solidFill>
+                <a:latin typeface="Courier New" pitchFamily="49" charset="0"/>
+                <a:cs typeface="Courier New" pitchFamily="49" charset="0"/>
+              </a:rPr>
+              <a:t>     </a:t>
+            </a:r>
+            <a:r>
+              <a:rPr lang="en-US" sz="1400">
+                <a:solidFill>
+                  <a:schemeClr val="bg1"/>
+                </a:solidFill>
+                <a:latin typeface="Courier New" pitchFamily="49" charset="0"/>
+                <a:cs typeface="Courier New" pitchFamily="49" charset="0"/>
+              </a:rPr>
+              <a:t>&lt;</a:t>
+            </a:r>
+            <a:r>
+              <a:rPr lang="ru-RU" sz="1400">
+                <a:solidFill>
+                  <a:schemeClr val="bg1"/>
+                </a:solidFill>
+                <a:latin typeface="Courier New" pitchFamily="49" charset="0"/>
+                <a:cs typeface="Courier New" pitchFamily="49" charset="0"/>
+              </a:rPr>
+              <a:t>операторы</a:t>
+            </a:r>
+            <a:r>
+              <a:rPr lang="en-US" sz="1400">
+                <a:solidFill>
+                  <a:schemeClr val="bg1"/>
+                </a:solidFill>
+                <a:latin typeface="Courier New" pitchFamily="49" charset="0"/>
+                <a:cs typeface="Courier New" pitchFamily="49" charset="0"/>
+              </a:rPr>
+              <a:t>&gt;</a:t>
+            </a:r>
+            <a:endParaRPr lang="ru-RU" sz="1400">
+              <a:solidFill>
+                <a:schemeClr val="bg1"/>
+              </a:solidFill>
+              <a:latin typeface="Courier New" pitchFamily="49" charset="0"/>
+              <a:cs typeface="Courier New" pitchFamily="49" charset="0"/>
+            </a:endParaRPr>
+          </a:p>
+          <a:p>
+            <a:pPr eaLnBrk="1" hangingPunct="1"/>
+            <a:r>
+              <a:rPr lang="en-US" sz="1400">
+                <a:solidFill>
+                  <a:schemeClr val="bg1"/>
+                </a:solidFill>
+                <a:latin typeface="Courier New" pitchFamily="49" charset="0"/>
+                <a:cs typeface="Courier New" pitchFamily="49" charset="0"/>
+              </a:rPr>
+              <a:t>     break;</a:t>
+            </a:r>
+          </a:p>
+          <a:p>
+            <a:pPr eaLnBrk="1" hangingPunct="1"/>
+            <a:r>
+              <a:rPr lang="en-US" sz="1400">
+                <a:solidFill>
+                  <a:schemeClr val="bg1"/>
+                </a:solidFill>
+                <a:latin typeface="Courier New" pitchFamily="49" charset="0"/>
+                <a:cs typeface="Courier New" pitchFamily="49" charset="0"/>
+              </a:rPr>
+              <a:t>...</a:t>
+            </a:r>
+          </a:p>
+          <a:p>
+            <a:pPr eaLnBrk="1" hangingPunct="1"/>
+            <a:r>
+              <a:rPr lang="en-US" sz="1400">
+                <a:solidFill>
+                  <a:schemeClr val="bg1"/>
+                </a:solidFill>
+                <a:latin typeface="Courier New" pitchFamily="49" charset="0"/>
+                <a:cs typeface="Courier New" pitchFamily="49" charset="0"/>
+              </a:rPr>
+              <a:t>default:</a:t>
+            </a:r>
+            <a:endParaRPr lang="ru-RU" sz="1400">
+              <a:solidFill>
+                <a:schemeClr val="bg1"/>
+              </a:solidFill>
+              <a:latin typeface="Courier New" pitchFamily="49" charset="0"/>
+              <a:cs typeface="Courier New" pitchFamily="49" charset="0"/>
+            </a:endParaRPr>
+          </a:p>
+          <a:p>
+            <a:pPr eaLnBrk="1" hangingPunct="1"/>
+            <a:r>
+              <a:rPr lang="ru-RU" sz="1400">
+                <a:solidFill>
+                  <a:schemeClr val="bg1"/>
+                </a:solidFill>
+                <a:latin typeface="Courier New" pitchFamily="49" charset="0"/>
+                <a:cs typeface="Courier New" pitchFamily="49" charset="0"/>
+              </a:rPr>
+              <a:t>     </a:t>
+            </a:r>
+            <a:r>
+              <a:rPr lang="en-US" sz="1400">
+                <a:solidFill>
+                  <a:schemeClr val="bg1"/>
+                </a:solidFill>
+                <a:latin typeface="Courier New" pitchFamily="49" charset="0"/>
+                <a:cs typeface="Courier New" pitchFamily="49" charset="0"/>
+              </a:rPr>
+              <a:t>&lt;</a:t>
+            </a:r>
+            <a:r>
+              <a:rPr lang="ru-RU" sz="1400">
+                <a:solidFill>
+                  <a:schemeClr val="bg1"/>
+                </a:solidFill>
+                <a:latin typeface="Courier New" pitchFamily="49" charset="0"/>
+                <a:cs typeface="Courier New" pitchFamily="49" charset="0"/>
+              </a:rPr>
+              <a:t>операторы</a:t>
+            </a:r>
+            <a:r>
+              <a:rPr lang="en-US" sz="1400">
+                <a:solidFill>
+                  <a:schemeClr val="bg1"/>
+                </a:solidFill>
+                <a:latin typeface="Courier New" pitchFamily="49" charset="0"/>
+                <a:cs typeface="Courier New" pitchFamily="49" charset="0"/>
+              </a:rPr>
+              <a:t>&gt;</a:t>
+            </a:r>
+            <a:endParaRPr lang="ru-RU" sz="1400">
+              <a:solidFill>
+                <a:schemeClr val="bg1"/>
+              </a:solidFill>
+              <a:latin typeface="Courier New" pitchFamily="49" charset="0"/>
+              <a:cs typeface="Courier New" pitchFamily="49" charset="0"/>
+            </a:endParaRPr>
+          </a:p>
+          <a:p>
+            <a:pPr eaLnBrk="1" hangingPunct="1"/>
+            <a:r>
+              <a:rPr lang="en-US" sz="1400">
+                <a:solidFill>
+                  <a:schemeClr val="bg1"/>
+                </a:solidFill>
+                <a:latin typeface="Courier New" pitchFamily="49" charset="0"/>
+                <a:cs typeface="Courier New" pitchFamily="49" charset="0"/>
+              </a:rPr>
+              <a:t>     break;</a:t>
+            </a:r>
+          </a:p>
+          <a:p>
+            <a:pPr eaLnBrk="1" hangingPunct="1"/>
+            <a:r>
+              <a:rPr lang="en-US" sz="1400">
+                <a:solidFill>
+                  <a:schemeClr val="bg1"/>
+                </a:solidFill>
+                <a:latin typeface="Courier New" pitchFamily="49" charset="0"/>
+                <a:cs typeface="Courier New" pitchFamily="49" charset="0"/>
+              </a:rPr>
+              <a:t>}</a:t>
+            </a:r>
+            <a:endParaRPr lang="ru-RU" sz="1400">
+              <a:solidFill>
+                <a:schemeClr val="bg1"/>
+              </a:solidFill>
+              <a:latin typeface="Courier New" pitchFamily="49" charset="0"/>
+              <a:cs typeface="Courier New" pitchFamily="49" charset="0"/>
+            </a:endParaRPr>
+          </a:p>
+        </p:txBody>
+      </p:sp>
+    </p:spTree>
+    <p:extLst>
+      <p:ext uri="{BB962C8B-B14F-4D97-AF65-F5344CB8AC3E}">
+        <p14:creationId xmlns:p14="http://schemas.microsoft.com/office/powerpoint/2010/main" val="1588249421"/>
+      </p:ext>
+    </p:extLst>
+  </p:cSld>
+  <p:clrMapOvr>
+    <a:masterClrMapping/>
+  </p:clrMapOvr>
+</p:sld>
+</file>
+
+<file path=ppt/slides/slide21.xml><?xml version="1.0" encoding="utf-8"?>
+<p:sld xmlns:a="http://schemas.openxmlformats.org/drawingml/2006/main" xmlns:r="http://schemas.openxmlformats.org/officeDocument/2006/relationships" xmlns:p="http://schemas.openxmlformats.org/presentationml/2006/main">
+  <p:cSld>
+    <p:bg>
+      <p:bgPr>
+        <a:blipFill dpi="0" rotWithShape="1">
+          <a:blip r:embed="rId2">
+            <a:lum/>
+          </a:blip>
+          <a:srcRect/>
+          <a:stretch>
+            <a:fillRect/>
+          </a:stretch>
+        </a:blipFill>
+        <a:effectLst/>
+      </p:bgPr>
+    </p:bg>
+    <p:spTree>
+      <p:nvGrpSpPr>
+        <p:cNvPr id="1" name=""/>
+        <p:cNvGrpSpPr/>
+        <p:nvPr/>
+      </p:nvGrpSpPr>
+      <p:grpSpPr>
+        <a:xfrm>
+          <a:off x="0" y="0"/>
+          <a:ext cx="0" cy="0"/>
+          <a:chOff x="0" y="0"/>
+          <a:chExt cx="0" cy="0"/>
+        </a:xfrm>
+      </p:grpSpPr>
+      <p:sp>
+        <p:nvSpPr>
           <p:cNvPr id="13314" name="Прямоугольник 6"/>
           <p:cNvSpPr>
             <a:spLocks noChangeArrowheads="1"/>
@@ -18222,7 +18470,7 @@
 </p:sld>
 </file>
 
-<file path=ppt/slides/slide21.xml><?xml version="1.0" encoding="utf-8"?>
+<file path=ppt/slides/slide22.xml><?xml version="1.0" encoding="utf-8"?>
 <p:sld xmlns:a="http://schemas.openxmlformats.org/drawingml/2006/main" xmlns:r="http://schemas.openxmlformats.org/officeDocument/2006/relationships" xmlns:p="http://schemas.openxmlformats.org/presentationml/2006/main">
   <p:cSld>
     <p:bg>
@@ -19223,7 +19471,7 @@
 </p:sld>
 </file>
 
-<file path=ppt/slides/slide22.xml><?xml version="1.0" encoding="utf-8"?>
+<file path=ppt/slides/slide23.xml><?xml version="1.0" encoding="utf-8"?>
 <p:sld xmlns:a="http://schemas.openxmlformats.org/drawingml/2006/main" xmlns:r="http://schemas.openxmlformats.org/officeDocument/2006/relationships" xmlns:p="http://schemas.openxmlformats.org/presentationml/2006/main">
   <p:cSld>
     <p:bg>
@@ -19492,7 +19740,7 @@
 </p:sld>
 </file>
 
-<file path=ppt/slides/slide23.xml><?xml version="1.0" encoding="utf-8"?>
+<file path=ppt/slides/slide24.xml><?xml version="1.0" encoding="utf-8"?>
 <p:sld xmlns:a="http://schemas.openxmlformats.org/drawingml/2006/main" xmlns:r="http://schemas.openxmlformats.org/officeDocument/2006/relationships" xmlns:p="http://schemas.openxmlformats.org/presentationml/2006/main">
   <p:cSld>
     <p:bg>
@@ -20727,7 +20975,7 @@
 </p:sld>
 </file>
 
-<file path=ppt/slides/slide24.xml><?xml version="1.0" encoding="utf-8"?>
+<file path=ppt/slides/slide25.xml><?xml version="1.0" encoding="utf-8"?>
 <p:sld xmlns:a="http://schemas.openxmlformats.org/drawingml/2006/main" xmlns:r="http://schemas.openxmlformats.org/officeDocument/2006/relationships" xmlns:p="http://schemas.openxmlformats.org/presentationml/2006/main">
   <p:cSld>
     <p:bg>
@@ -21929,7 +22177,7 @@
 </p:sld>
 </file>
 
-<file path=ppt/slides/slide25.xml><?xml version="1.0" encoding="utf-8"?>
+<file path=ppt/slides/slide26.xml><?xml version="1.0" encoding="utf-8"?>
 <p:sld xmlns:a="http://schemas.openxmlformats.org/drawingml/2006/main" xmlns:r="http://schemas.openxmlformats.org/officeDocument/2006/relationships" xmlns:p="http://schemas.openxmlformats.org/presentationml/2006/main">
   <p:cSld>
     <p:bg>
@@ -22995,7 +23243,7 @@
 </p:sld>
 </file>
 
-<file path=ppt/slides/slide26.xml><?xml version="1.0" encoding="utf-8"?>
+<file path=ppt/slides/slide27.xml><?xml version="1.0" encoding="utf-8"?>
 <p:sld xmlns:a="http://schemas.openxmlformats.org/drawingml/2006/main" xmlns:r="http://schemas.openxmlformats.org/officeDocument/2006/relationships" xmlns:p="http://schemas.openxmlformats.org/presentationml/2006/main">
   <p:cSld>
     <p:bg>
@@ -24893,7 +25141,7 @@
 </p:sld>
 </file>
 
-<file path=ppt/slides/slide27.xml><?xml version="1.0" encoding="utf-8"?>
+<file path=ppt/slides/slide28.xml><?xml version="1.0" encoding="utf-8"?>
 <p:sld xmlns:a="http://schemas.openxmlformats.org/drawingml/2006/main" xmlns:r="http://schemas.openxmlformats.org/officeDocument/2006/relationships" xmlns:p="http://schemas.openxmlformats.org/presentationml/2006/main">
   <p:cSld>
     <p:bg>

</xml_diff>

<commit_message>
Added ArraySegment class to lesson #1 presentation
</commit_message>
<xml_diff>
--- a/Presentation/lesson-01.pptx
+++ b/Presentation/lesson-01.pptx
@@ -11310,15 +11310,7 @@
                   <a:schemeClr val="bg1"/>
                 </a:solidFill>
               </a:rPr>
-              <a:t>являются не</a:t>
-            </a:r>
-            <a:r>
-              <a:rPr lang="ru-RU" dirty="0" smtClean="0">
-                <a:solidFill>
-                  <a:schemeClr val="bg1"/>
-                </a:solidFill>
-              </a:rPr>
-              <a:t>изменяемыми</a:t>
+              <a:t>являются неизменяемыми</a:t>
             </a:r>
           </a:p>
           <a:p>
@@ -11362,15 +11354,7 @@
                   <a:schemeClr val="bg1"/>
                 </a:solidFill>
               </a:rPr>
-              <a:t>я</a:t>
-            </a:r>
-            <a:r>
-              <a:rPr lang="ru-RU" dirty="0" smtClean="0">
-                <a:solidFill>
-                  <a:schemeClr val="bg1"/>
-                </a:solidFill>
-              </a:rPr>
-              <a:t>вляется </a:t>
+              <a:t>является </a:t>
             </a:r>
             <a:r>
               <a:rPr lang="en-US" dirty="0" smtClean="0">
@@ -20772,7 +20756,7 @@
         <p:spPr bwMode="auto">
           <a:xfrm>
             <a:off x="762000" y="4648200"/>
-            <a:ext cx="7696200" cy="2032000"/>
+            <a:ext cx="7696200" cy="1477328"/>
           </a:xfrm>
           <a:prstGeom prst="rect">
             <a:avLst/>
@@ -20833,132 +20817,129 @@
                 </a:solidFill>
                 <a:latin typeface="Calibri" pitchFamily="34" charset="0"/>
               </a:rPr>
-              <a:t>Clear()</a:t>
+              <a:t>Clear</a:t>
+            </a:r>
+            <a:r>
+              <a:rPr lang="en-US" dirty="0" smtClean="0">
+                <a:solidFill>
+                  <a:schemeClr val="bg1"/>
+                </a:solidFill>
+                <a:latin typeface="Calibri" pitchFamily="34" charset="0"/>
+              </a:rPr>
+              <a:t>(), </a:t>
+            </a:r>
+            <a:r>
+              <a:rPr lang="en-US" dirty="0" err="1" smtClean="0">
+                <a:solidFill>
+                  <a:schemeClr val="bg1"/>
+                </a:solidFill>
+                <a:latin typeface="Calibri" pitchFamily="34" charset="0"/>
+              </a:rPr>
+              <a:t>CopyTo</a:t>
+            </a:r>
+            <a:r>
+              <a:rPr lang="en-US" dirty="0" smtClean="0">
+                <a:solidFill>
+                  <a:schemeClr val="bg1"/>
+                </a:solidFill>
+                <a:latin typeface="Calibri" pitchFamily="34" charset="0"/>
+              </a:rPr>
+              <a:t>(), </a:t>
+            </a:r>
+            <a:r>
+              <a:rPr lang="en-US" dirty="0" err="1" smtClean="0">
+                <a:solidFill>
+                  <a:schemeClr val="bg1"/>
+                </a:solidFill>
+                <a:latin typeface="Calibri" pitchFamily="34" charset="0"/>
+              </a:rPr>
+              <a:t>GetLength</a:t>
+            </a:r>
+            <a:r>
+              <a:rPr lang="en-US" dirty="0" smtClean="0">
+                <a:solidFill>
+                  <a:schemeClr val="bg1"/>
+                </a:solidFill>
+                <a:latin typeface="Calibri" pitchFamily="34" charset="0"/>
+              </a:rPr>
+              <a:t>(), Length, </a:t>
+            </a:r>
+            <a:r>
+              <a:rPr lang="en-US" dirty="0" err="1" smtClean="0">
+                <a:solidFill>
+                  <a:schemeClr val="bg1"/>
+                </a:solidFill>
+                <a:latin typeface="Calibri" pitchFamily="34" charset="0"/>
+              </a:rPr>
+              <a:t>GetValue</a:t>
+            </a:r>
+            <a:r>
+              <a:rPr lang="en-US" dirty="0">
+                <a:solidFill>
+                  <a:schemeClr val="bg1"/>
+                </a:solidFill>
+                <a:latin typeface="Calibri" pitchFamily="34" charset="0"/>
+              </a:rPr>
+              <a:t>() </a:t>
+            </a:r>
+            <a:r>
+              <a:rPr lang="en-US" dirty="0" err="1">
+                <a:solidFill>
+                  <a:schemeClr val="bg1"/>
+                </a:solidFill>
+                <a:latin typeface="Calibri" pitchFamily="34" charset="0"/>
+              </a:rPr>
+              <a:t>SetValue</a:t>
+            </a:r>
+            <a:r>
+              <a:rPr lang="en-US" dirty="0" smtClean="0">
+                <a:solidFill>
+                  <a:schemeClr val="bg1"/>
+                </a:solidFill>
+                <a:latin typeface="Calibri" pitchFamily="34" charset="0"/>
+              </a:rPr>
+              <a:t>(),Reverse(), Sort()</a:t>
             </a:r>
           </a:p>
           <a:p>
             <a:pPr lvl="6">
               <a:defRPr/>
             </a:pPr>
-            <a:r>
-              <a:rPr lang="en-US" dirty="0" err="1">
-                <a:solidFill>
-                  <a:schemeClr val="bg1"/>
-                </a:solidFill>
-                <a:latin typeface="Calibri" pitchFamily="34" charset="0"/>
-              </a:rPr>
-              <a:t>CopyTo</a:t>
-            </a:r>
-            <a:r>
-              <a:rPr lang="en-US" dirty="0">
-                <a:solidFill>
-                  <a:schemeClr val="bg1"/>
-                </a:solidFill>
-                <a:latin typeface="Calibri" pitchFamily="34" charset="0"/>
-              </a:rPr>
-              <a:t>()</a:t>
-            </a:r>
+            <a:endParaRPr lang="en-US" dirty="0">
+              <a:solidFill>
+                <a:schemeClr val="bg1"/>
+              </a:solidFill>
+              <a:latin typeface="Calibri" pitchFamily="34" charset="0"/>
+            </a:endParaRPr>
           </a:p>
           <a:p>
             <a:pPr lvl="6">
               <a:defRPr/>
             </a:pPr>
             <a:r>
-              <a:rPr lang="en-US" dirty="0" err="1">
+              <a:rPr lang="ru-RU" dirty="0" smtClean="0">
                 <a:solidFill>
                   <a:schemeClr val="bg1"/>
                 </a:solidFill>
                 <a:latin typeface="Calibri" pitchFamily="34" charset="0"/>
               </a:rPr>
-              <a:t>GetLength</a:t>
-            </a:r>
-            <a:r>
-              <a:rPr lang="en-US" dirty="0">
+              <a:t>См. также класс </a:t>
+            </a:r>
+            <a:r>
+              <a:rPr lang="en-US" dirty="0" err="1" smtClean="0">
                 <a:solidFill>
                   <a:schemeClr val="bg1"/>
                 </a:solidFill>
                 <a:latin typeface="Calibri" pitchFamily="34" charset="0"/>
               </a:rPr>
-              <a:t>() Length</a:t>
-            </a:r>
-          </a:p>
-          <a:p>
-            <a:pPr lvl="6">
-              <a:defRPr/>
-            </a:pPr>
-            <a:r>
-              <a:rPr lang="en-US" dirty="0" err="1">
-                <a:solidFill>
-                  <a:schemeClr val="bg1"/>
-                </a:solidFill>
-                <a:latin typeface="Calibri" pitchFamily="34" charset="0"/>
-              </a:rPr>
-              <a:t>GetValue</a:t>
-            </a:r>
-            <a:r>
-              <a:rPr lang="en-US" dirty="0">
-                <a:solidFill>
-                  <a:schemeClr val="bg1"/>
-                </a:solidFill>
-                <a:latin typeface="Calibri" pitchFamily="34" charset="0"/>
-              </a:rPr>
-              <a:t>() </a:t>
-            </a:r>
-            <a:r>
-              <a:rPr lang="en-US" dirty="0" err="1">
-                <a:solidFill>
-                  <a:schemeClr val="bg1"/>
-                </a:solidFill>
-                <a:latin typeface="Calibri" pitchFamily="34" charset="0"/>
-              </a:rPr>
-              <a:t>SetValue</a:t>
-            </a:r>
-            <a:r>
-              <a:rPr lang="en-US" dirty="0">
-                <a:solidFill>
-                  <a:schemeClr val="bg1"/>
-                </a:solidFill>
-                <a:latin typeface="Calibri" pitchFamily="34" charset="0"/>
-              </a:rPr>
-              <a:t>()</a:t>
-            </a:r>
-          </a:p>
-          <a:p>
-            <a:pPr lvl="6">
-              <a:defRPr/>
-            </a:pPr>
-            <a:r>
-              <a:rPr lang="en-US" dirty="0" err="1">
-                <a:solidFill>
-                  <a:schemeClr val="bg1"/>
-                </a:solidFill>
-                <a:latin typeface="Calibri" pitchFamily="34" charset="0"/>
-              </a:rPr>
-              <a:t>Reverce</a:t>
-            </a:r>
-            <a:r>
-              <a:rPr lang="en-US" dirty="0">
-                <a:solidFill>
-                  <a:schemeClr val="bg1"/>
-                </a:solidFill>
-                <a:latin typeface="Calibri" pitchFamily="34" charset="0"/>
-              </a:rPr>
-              <a:t>()</a:t>
-            </a:r>
-          </a:p>
-          <a:p>
-            <a:pPr lvl="6">
-              <a:defRPr/>
-            </a:pPr>
-            <a:r>
-              <a:rPr lang="en-US" dirty="0">
-                <a:solidFill>
-                  <a:schemeClr val="bg1"/>
-                </a:solidFill>
-                <a:latin typeface="Calibri" pitchFamily="34" charset="0"/>
-              </a:rPr>
-              <a:t>Sort()</a:t>
-            </a:r>
+              <a:t>ArraySegment</a:t>
+            </a:r>
+            <a:endParaRPr lang="en-US" dirty="0">
+              <a:solidFill>
+                <a:schemeClr val="bg1"/>
+              </a:solidFill>
+              <a:latin typeface="Calibri" pitchFamily="34" charset="0"/>
+            </a:endParaRPr>
           </a:p>
         </p:txBody>
       </p:sp>

</xml_diff>

<commit_message>
Added forum links to lesson #1 presentation
</commit_message>
<xml_diff>
--- a/Presentation/lesson-01.pptx
+++ b/Presentation/lesson-01.pptx
@@ -315,7 +315,7 @@
           <a:p>
             <a:fld id="{8E6E6A2A-E9D3-4A0D-B04A-ABDD367A1E08}" type="datetimeFigureOut">
               <a:rPr lang="ru-RU" smtClean="0"/>
-              <a:t>13.08.2012</a:t>
+              <a:t>15.08.2012</a:t>
             </a:fld>
             <a:endParaRPr lang="ru-RU"/>
           </a:p>
@@ -485,7 +485,7 @@
           <a:p>
             <a:fld id="{8E6E6A2A-E9D3-4A0D-B04A-ABDD367A1E08}" type="datetimeFigureOut">
               <a:rPr lang="ru-RU" smtClean="0"/>
-              <a:t>13.08.2012</a:t>
+              <a:t>15.08.2012</a:t>
             </a:fld>
             <a:endParaRPr lang="ru-RU"/>
           </a:p>
@@ -665,7 +665,7 @@
           <a:p>
             <a:fld id="{8E6E6A2A-E9D3-4A0D-B04A-ABDD367A1E08}" type="datetimeFigureOut">
               <a:rPr lang="ru-RU" smtClean="0"/>
-              <a:t>13.08.2012</a:t>
+              <a:t>15.08.2012</a:t>
             </a:fld>
             <a:endParaRPr lang="ru-RU"/>
           </a:p>
@@ -835,7 +835,7 @@
           <a:p>
             <a:fld id="{8E6E6A2A-E9D3-4A0D-B04A-ABDD367A1E08}" type="datetimeFigureOut">
               <a:rPr lang="ru-RU" smtClean="0"/>
-              <a:t>13.08.2012</a:t>
+              <a:t>15.08.2012</a:t>
             </a:fld>
             <a:endParaRPr lang="ru-RU"/>
           </a:p>
@@ -1081,7 +1081,7 @@
           <a:p>
             <a:fld id="{8E6E6A2A-E9D3-4A0D-B04A-ABDD367A1E08}" type="datetimeFigureOut">
               <a:rPr lang="ru-RU" smtClean="0"/>
-              <a:t>13.08.2012</a:t>
+              <a:t>15.08.2012</a:t>
             </a:fld>
             <a:endParaRPr lang="ru-RU"/>
           </a:p>
@@ -1369,7 +1369,7 @@
           <a:p>
             <a:fld id="{8E6E6A2A-E9D3-4A0D-B04A-ABDD367A1E08}" type="datetimeFigureOut">
               <a:rPr lang="ru-RU" smtClean="0"/>
-              <a:t>13.08.2012</a:t>
+              <a:t>15.08.2012</a:t>
             </a:fld>
             <a:endParaRPr lang="ru-RU"/>
           </a:p>
@@ -1791,7 +1791,7 @@
           <a:p>
             <a:fld id="{8E6E6A2A-E9D3-4A0D-B04A-ABDD367A1E08}" type="datetimeFigureOut">
               <a:rPr lang="ru-RU" smtClean="0"/>
-              <a:t>13.08.2012</a:t>
+              <a:t>15.08.2012</a:t>
             </a:fld>
             <a:endParaRPr lang="ru-RU"/>
           </a:p>
@@ -1909,7 +1909,7 @@
           <a:p>
             <a:fld id="{8E6E6A2A-E9D3-4A0D-B04A-ABDD367A1E08}" type="datetimeFigureOut">
               <a:rPr lang="ru-RU" smtClean="0"/>
-              <a:t>13.08.2012</a:t>
+              <a:t>15.08.2012</a:t>
             </a:fld>
             <a:endParaRPr lang="ru-RU"/>
           </a:p>
@@ -2004,7 +2004,7 @@
           <a:p>
             <a:fld id="{8E6E6A2A-E9D3-4A0D-B04A-ABDD367A1E08}" type="datetimeFigureOut">
               <a:rPr lang="ru-RU" smtClean="0"/>
-              <a:t>13.08.2012</a:t>
+              <a:t>15.08.2012</a:t>
             </a:fld>
             <a:endParaRPr lang="ru-RU"/>
           </a:p>
@@ -2281,7 +2281,7 @@
           <a:p>
             <a:fld id="{8E6E6A2A-E9D3-4A0D-B04A-ABDD367A1E08}" type="datetimeFigureOut">
               <a:rPr lang="ru-RU" smtClean="0"/>
-              <a:t>13.08.2012</a:t>
+              <a:t>15.08.2012</a:t>
             </a:fld>
             <a:endParaRPr lang="ru-RU"/>
           </a:p>
@@ -2534,7 +2534,7 @@
           <a:p>
             <a:fld id="{8E6E6A2A-E9D3-4A0D-B04A-ABDD367A1E08}" type="datetimeFigureOut">
               <a:rPr lang="ru-RU" smtClean="0"/>
-              <a:t>13.08.2012</a:t>
+              <a:t>15.08.2012</a:t>
             </a:fld>
             <a:endParaRPr lang="ru-RU"/>
           </a:p>
@@ -2747,7 +2747,7 @@
           <a:p>
             <a:fld id="{8E6E6A2A-E9D3-4A0D-B04A-ABDD367A1E08}" type="datetimeFigureOut">
               <a:rPr lang="ru-RU" smtClean="0"/>
-              <a:t>13.08.2012</a:t>
+              <a:t>15.08.2012</a:t>
             </a:fld>
             <a:endParaRPr lang="ru-RU"/>
           </a:p>
@@ -14665,10 +14665,19 @@
                 </a:solidFill>
                 <a:hlinkClick r:id="rId3"/>
               </a:rPr>
-              <a:t>http://</a:t>
-            </a:r>
-            <a:r>
-              <a:rPr lang="ru-RU" u="sng" dirty="0" smtClean="0">
+              <a:t>http</a:t>
+            </a:r>
+            <a:r>
+              <a:rPr lang="ru-RU" u="sng">
+                <a:solidFill>
+                  <a:schemeClr val="bg1"/>
+                </a:solidFill>
+                <a:hlinkClick r:id="rId3"/>
+              </a:rPr>
+              <a:t>://</a:t>
+            </a:r>
+            <a:r>
+              <a:rPr lang="ru-RU" u="sng" smtClean="0">
                 <a:solidFill>
                   <a:schemeClr val="bg1"/>
                 </a:solidFill>
@@ -25669,7 +25678,7 @@
         <p:spPr>
           <a:xfrm>
             <a:off x="251520" y="188640"/>
-            <a:ext cx="8640960" cy="2800767"/>
+            <a:ext cx="8640960" cy="3077766"/>
           </a:xfrm>
           <a:prstGeom prst="rect">
             <a:avLst/>
@@ -25690,9 +25699,221 @@
               </a:rPr>
               <a:t>Ссылки</a:t>
             </a:r>
-          </a:p>
-          <a:p>
-            <a:pPr lvl="0"/>
+            <a:endParaRPr lang="en-US" sz="3200" dirty="0" smtClean="0">
+              <a:solidFill>
+                <a:schemeClr val="bg1"/>
+              </a:solidFill>
+            </a:endParaRPr>
+          </a:p>
+          <a:p>
+            <a:pPr marL="742950" lvl="1" indent="-285750">
+              <a:buFont typeface="Arial" pitchFamily="34" charset="0"/>
+              <a:buChar char="•"/>
+            </a:pPr>
+            <a:r>
+              <a:rPr lang="en-US" dirty="0" smtClean="0">
+                <a:solidFill>
+                  <a:schemeClr val="bg1"/>
+                </a:solidFill>
+              </a:rPr>
+              <a:t>Microsoft Developer Network</a:t>
+            </a:r>
+            <a:r>
+              <a:rPr lang="ru-RU" dirty="0" smtClean="0">
+                <a:solidFill>
+                  <a:schemeClr val="bg1"/>
+                </a:solidFill>
+              </a:rPr>
+              <a:t> - </a:t>
+            </a:r>
+            <a:r>
+              <a:rPr lang="en-US" u="sng" dirty="0" smtClean="0">
+                <a:solidFill>
+                  <a:schemeClr val="bg1"/>
+                </a:solidFill>
+                <a:hlinkClick r:id="rId3"/>
+              </a:rPr>
+              <a:t>http</a:t>
+            </a:r>
+            <a:r>
+              <a:rPr lang="en-US" u="sng" dirty="0">
+                <a:solidFill>
+                  <a:schemeClr val="bg1"/>
+                </a:solidFill>
+                <a:hlinkClick r:id="rId3"/>
+              </a:rPr>
+              <a:t>://</a:t>
+            </a:r>
+            <a:r>
+              <a:rPr lang="en-US" u="sng" dirty="0" smtClean="0">
+                <a:solidFill>
+                  <a:schemeClr val="bg1"/>
+                </a:solidFill>
+                <a:hlinkClick r:id="rId3"/>
+              </a:rPr>
+              <a:t>msdn.microsoft.com/ru-ru/</a:t>
+            </a:r>
+            <a:endParaRPr lang="en-US" u="sng" dirty="0" smtClean="0">
+              <a:solidFill>
+                <a:schemeClr val="bg1"/>
+              </a:solidFill>
+            </a:endParaRPr>
+          </a:p>
+          <a:p>
+            <a:pPr marL="742950" lvl="1" indent="-285750">
+              <a:buFont typeface="Arial" pitchFamily="34" charset="0"/>
+              <a:buChar char="•"/>
+            </a:pPr>
+            <a:r>
+              <a:rPr lang="en-US" u="sng" dirty="0" smtClean="0">
+                <a:solidFill>
+                  <a:schemeClr val="bg1"/>
+                </a:solidFill>
+                <a:hlinkClick r:id="rId4"/>
+              </a:rPr>
+              <a:t>http</a:t>
+            </a:r>
+            <a:r>
+              <a:rPr lang="en-US" u="sng" dirty="0">
+                <a:solidFill>
+                  <a:schemeClr val="bg1"/>
+                </a:solidFill>
+                <a:hlinkClick r:id="rId4"/>
+              </a:rPr>
+              <a:t>://</a:t>
+            </a:r>
+            <a:r>
+              <a:rPr lang="en-US" u="sng" dirty="0" smtClean="0">
+                <a:solidFill>
+                  <a:schemeClr val="bg1"/>
+                </a:solidFill>
+                <a:hlinkClick r:id="rId4"/>
+              </a:rPr>
+              <a:t>www.asp.net/</a:t>
+            </a:r>
+            <a:endParaRPr lang="ru-RU" u="sng" dirty="0" smtClean="0">
+              <a:solidFill>
+                <a:schemeClr val="bg1"/>
+              </a:solidFill>
+            </a:endParaRPr>
+          </a:p>
+          <a:p>
+            <a:pPr marL="742950" lvl="1" indent="-285750">
+              <a:buFont typeface="Arial" pitchFamily="34" charset="0"/>
+              <a:buChar char="•"/>
+            </a:pPr>
+            <a:r>
+              <a:rPr lang="en-US" u="sng" dirty="0" smtClean="0">
+                <a:solidFill>
+                  <a:schemeClr val="bg1"/>
+                </a:solidFill>
+                <a:hlinkClick r:id="rId5"/>
+              </a:rPr>
+              <a:t>http</a:t>
+            </a:r>
+            <a:r>
+              <a:rPr lang="en-US" u="sng" dirty="0">
+                <a:solidFill>
+                  <a:schemeClr val="bg1"/>
+                </a:solidFill>
+                <a:hlinkClick r:id="rId5"/>
+              </a:rPr>
+              <a:t>://</a:t>
+            </a:r>
+            <a:r>
+              <a:rPr lang="en-US" u="sng" dirty="0" smtClean="0">
+                <a:solidFill>
+                  <a:schemeClr val="bg1"/>
+                </a:solidFill>
+                <a:hlinkClick r:id="rId5"/>
+              </a:rPr>
+              <a:t>channel9.msdn.com/</a:t>
+            </a:r>
+            <a:endParaRPr lang="ru-RU" u="sng" dirty="0" smtClean="0">
+              <a:solidFill>
+                <a:schemeClr val="bg1"/>
+              </a:solidFill>
+            </a:endParaRPr>
+          </a:p>
+          <a:p>
+            <a:pPr marL="742950" lvl="1" indent="-285750">
+              <a:buFont typeface="Arial" pitchFamily="34" charset="0"/>
+              <a:buChar char="•"/>
+            </a:pPr>
+            <a:r>
+              <a:rPr lang="ru-RU" dirty="0" smtClean="0">
+                <a:solidFill>
+                  <a:schemeClr val="bg1"/>
+                </a:solidFill>
+              </a:rPr>
+              <a:t>С</a:t>
+            </a:r>
+            <a:r>
+              <a:rPr lang="en-US" dirty="0" smtClean="0">
+                <a:solidFill>
+                  <a:schemeClr val="bg1"/>
+                </a:solidFill>
+              </a:rPr>
+              <a:t># Little </a:t>
+            </a:r>
+            <a:r>
+              <a:rPr lang="en-US" dirty="0" smtClean="0">
+                <a:solidFill>
+                  <a:schemeClr val="bg1"/>
+                </a:solidFill>
+              </a:rPr>
+              <a:t>Wonders</a:t>
+            </a:r>
+            <a:r>
+              <a:rPr lang="ru-RU" dirty="0" smtClean="0">
+                <a:solidFill>
+                  <a:schemeClr val="bg1"/>
+                </a:solidFill>
+              </a:rPr>
+              <a:t> -</a:t>
+            </a:r>
+            <a:r>
+              <a:rPr lang="en-US" dirty="0" smtClean="0">
+                <a:solidFill>
+                  <a:schemeClr val="bg1"/>
+                </a:solidFill>
+              </a:rPr>
+              <a:t> </a:t>
+            </a:r>
+            <a:r>
+              <a:rPr lang="en-US" dirty="0" smtClean="0">
+                <a:solidFill>
+                  <a:schemeClr val="bg1"/>
+                </a:solidFill>
+                <a:hlinkClick r:id="rId6"/>
+              </a:rPr>
+              <a:t>http</a:t>
+            </a:r>
+            <a:r>
+              <a:rPr lang="en-US" dirty="0">
+                <a:solidFill>
+                  <a:schemeClr val="bg1"/>
+                </a:solidFill>
+                <a:hlinkClick r:id="rId6"/>
+              </a:rPr>
+              <a:t>://</a:t>
+            </a:r>
+            <a:r>
+              <a:rPr lang="en-US" dirty="0" smtClean="0">
+                <a:solidFill>
+                  <a:schemeClr val="bg1"/>
+                </a:solidFill>
+                <a:hlinkClick r:id="rId6"/>
+              </a:rPr>
+              <a:t>blackrabbitcoder.net/category/11989.aspx</a:t>
+            </a:r>
+            <a:endParaRPr lang="en-US" dirty="0" smtClean="0">
+              <a:solidFill>
+                <a:schemeClr val="bg1"/>
+              </a:solidFill>
+            </a:endParaRPr>
+          </a:p>
+          <a:p>
             <a:endParaRPr lang="ru-RU" dirty="0" smtClean="0">
               <a:solidFill>
                 <a:schemeClr val="bg1"/>
@@ -25701,119 +25922,148 @@
           </a:p>
           <a:p>
             <a:r>
-              <a:rPr lang="en-US" u="sng" dirty="0">
-                <a:solidFill>
-                  <a:schemeClr val="bg1"/>
-                </a:solidFill>
-              </a:rPr>
-              <a:t>http://msdn.microsoft.com/ru-ru</a:t>
-            </a:r>
-            <a:r>
-              <a:rPr lang="en-US" u="sng" dirty="0" smtClean="0">
-                <a:solidFill>
-                  <a:schemeClr val="bg1"/>
-                </a:solidFill>
+              <a:rPr lang="ru-RU" dirty="0" smtClean="0">
+                <a:solidFill>
+                  <a:schemeClr val="bg1"/>
+                </a:solidFill>
+              </a:rPr>
+              <a:t>Форумы:</a:t>
+            </a:r>
+          </a:p>
+          <a:p>
+            <a:pPr marL="742950" lvl="1" indent="-285750">
+              <a:buFont typeface="Arial" pitchFamily="34" charset="0"/>
+              <a:buChar char="•"/>
+            </a:pPr>
+            <a:r>
+              <a:rPr lang="en-US" dirty="0" smtClean="0">
+                <a:solidFill>
+                  <a:schemeClr val="bg1"/>
+                </a:solidFill>
+              </a:rPr>
+              <a:t>[RUS</a:t>
+            </a:r>
+            <a:r>
+              <a:rPr lang="en-US" dirty="0">
+                <a:solidFill>
+                  <a:schemeClr val="bg1"/>
+                </a:solidFill>
+              </a:rPr>
+              <a:t>] </a:t>
+            </a:r>
+            <a:r>
+              <a:rPr lang="en-US" dirty="0">
+                <a:solidFill>
+                  <a:schemeClr val="bg1"/>
+                </a:solidFill>
+                <a:hlinkClick r:id="rId7"/>
+              </a:rPr>
+              <a:t>http://www.rsdn.ru</a:t>
+            </a:r>
+            <a:r>
+              <a:rPr lang="en-US" dirty="0" smtClean="0">
+                <a:solidFill>
+                  <a:schemeClr val="bg1"/>
+                </a:solidFill>
+                <a:hlinkClick r:id="rId7"/>
               </a:rPr>
               <a:t>/</a:t>
             </a:r>
-            <a:endParaRPr lang="ru-RU" u="sng" dirty="0" smtClean="0">
-              <a:solidFill>
-                <a:schemeClr val="bg1"/>
-              </a:solidFill>
-            </a:endParaRPr>
-          </a:p>
-          <a:p>
+            <a:endParaRPr lang="ru-RU" dirty="0" smtClean="0">
+              <a:solidFill>
+                <a:schemeClr val="bg1"/>
+              </a:solidFill>
+            </a:endParaRPr>
+          </a:p>
+          <a:p>
+            <a:pPr marL="742950" lvl="1" indent="-285750">
+              <a:buFont typeface="Arial" pitchFamily="34" charset="0"/>
+              <a:buChar char="•"/>
+            </a:pPr>
+            <a:r>
+              <a:rPr lang="en-US" dirty="0">
+                <a:solidFill>
+                  <a:schemeClr val="bg1"/>
+                </a:solidFill>
+              </a:rPr>
+              <a:t>[RUS</a:t>
+            </a:r>
+            <a:r>
+              <a:rPr lang="en-US" dirty="0" smtClean="0">
+                <a:solidFill>
+                  <a:schemeClr val="bg1"/>
+                </a:solidFill>
+              </a:rPr>
+              <a:t>]</a:t>
+            </a:r>
+            <a:r>
+              <a:rPr lang="ru-RU" dirty="0" smtClean="0">
+                <a:solidFill>
+                  <a:schemeClr val="bg1"/>
+                </a:solidFill>
+              </a:rPr>
+              <a:t> </a:t>
+            </a:r>
+            <a:r>
+              <a:rPr lang="en-US" dirty="0">
+                <a:solidFill>
+                  <a:schemeClr val="bg1"/>
+                </a:solidFill>
+                <a:hlinkClick r:id="rId8"/>
+              </a:rPr>
+              <a:t>www.sql.ru/forum</a:t>
+            </a:r>
+            <a:r>
+              <a:rPr lang="en-US" dirty="0" smtClean="0">
+                <a:solidFill>
+                  <a:schemeClr val="bg1"/>
+                </a:solidFill>
+                <a:hlinkClick r:id="rId8"/>
+              </a:rPr>
+              <a:t>/</a:t>
+            </a:r>
+            <a:endParaRPr lang="en-US" dirty="0" smtClean="0">
+              <a:solidFill>
+                <a:schemeClr val="bg1"/>
+              </a:solidFill>
+            </a:endParaRPr>
+          </a:p>
+          <a:p>
+            <a:pPr marL="742950" lvl="1" indent="-285750">
+              <a:buFont typeface="Arial" pitchFamily="34" charset="0"/>
+              <a:buChar char="•"/>
+            </a:pPr>
+            <a:r>
+              <a:rPr lang="en-US" dirty="0">
+                <a:solidFill>
+                  <a:schemeClr val="bg1"/>
+                </a:solidFill>
+              </a:rPr>
+              <a:t>[ENG] </a:t>
+            </a:r>
+            <a:r>
+              <a:rPr lang="en-US" dirty="0">
+                <a:solidFill>
+                  <a:schemeClr val="bg1"/>
+                </a:solidFill>
+                <a:hlinkClick r:id="rId9"/>
+              </a:rPr>
+              <a:t>http://stackoverflow.com</a:t>
+            </a:r>
+            <a:r>
+              <a:rPr lang="en-US" dirty="0" smtClean="0">
+                <a:solidFill>
+                  <a:schemeClr val="bg1"/>
+                </a:solidFill>
+                <a:hlinkClick r:id="rId9"/>
+              </a:rPr>
+              <a:t>/</a:t>
+            </a:r>
             <a:endParaRPr lang="en-US" dirty="0">
               <a:solidFill>
                 <a:schemeClr val="bg1"/>
               </a:solidFill>
             </a:endParaRPr>
-          </a:p>
-          <a:p>
-            <a:r>
-              <a:rPr lang="en-US" u="sng" dirty="0">
-                <a:solidFill>
-                  <a:schemeClr val="bg1"/>
-                </a:solidFill>
-              </a:rPr>
-              <a:t>http://www.asp.net</a:t>
-            </a:r>
-            <a:r>
-              <a:rPr lang="en-US" u="sng" dirty="0" smtClean="0">
-                <a:solidFill>
-                  <a:schemeClr val="bg1"/>
-                </a:solidFill>
-              </a:rPr>
-              <a:t>/</a:t>
-            </a:r>
-            <a:endParaRPr lang="ru-RU" u="sng" dirty="0" smtClean="0">
-              <a:solidFill>
-                <a:schemeClr val="bg1"/>
-              </a:solidFill>
-            </a:endParaRPr>
-          </a:p>
-          <a:p>
-            <a:endParaRPr lang="en-US" dirty="0">
-              <a:solidFill>
-                <a:schemeClr val="bg1"/>
-              </a:solidFill>
-            </a:endParaRPr>
-          </a:p>
-          <a:p>
-            <a:r>
-              <a:rPr lang="en-US" u="sng" dirty="0">
-                <a:solidFill>
-                  <a:schemeClr val="bg1"/>
-                </a:solidFill>
-              </a:rPr>
-              <a:t>http://channel9.msdn.com</a:t>
-            </a:r>
-            <a:r>
-              <a:rPr lang="en-US" u="sng" dirty="0" smtClean="0">
-                <a:solidFill>
-                  <a:schemeClr val="bg1"/>
-                </a:solidFill>
-              </a:rPr>
-              <a:t>/</a:t>
-            </a:r>
-            <a:endParaRPr lang="ru-RU" u="sng" dirty="0" smtClean="0">
-              <a:solidFill>
-                <a:schemeClr val="bg1"/>
-              </a:solidFill>
-            </a:endParaRPr>
-          </a:p>
-          <a:p>
-            <a:endParaRPr lang="ru-RU" dirty="0" smtClean="0">
-              <a:solidFill>
-                <a:schemeClr val="bg1"/>
-              </a:solidFill>
-            </a:endParaRPr>
-          </a:p>
-          <a:p>
-            <a:r>
-              <a:rPr lang="ru-RU" dirty="0" smtClean="0">
-                <a:solidFill>
-                  <a:schemeClr val="bg1"/>
-                </a:solidFill>
-              </a:rPr>
-              <a:t>С</a:t>
-            </a:r>
-            <a:r>
-              <a:rPr lang="en-US" dirty="0" smtClean="0">
-                <a:solidFill>
-                  <a:schemeClr val="bg1"/>
-                </a:solidFill>
-              </a:rPr>
-              <a:t># Little Wonders: http</a:t>
-            </a:r>
-            <a:r>
-              <a:rPr lang="en-US" dirty="0">
-                <a:solidFill>
-                  <a:schemeClr val="bg1"/>
-                </a:solidFill>
-              </a:rPr>
-              <a:t>://blackrabbitcoder.net/category/11989.aspx</a:t>
-            </a:r>
           </a:p>
         </p:txBody>
       </p:sp>
@@ -27816,7 +28066,7 @@
 <file path=ppt/theme/theme1.xml><?xml version="1.0" encoding="utf-8"?>
 <a:theme xmlns:a="http://schemas.openxmlformats.org/drawingml/2006/main" name="Office Theme">
   <a:themeElements>
-    <a:clrScheme name="Office">
+    <a:clrScheme name="While hyperlink">
       <a:dk1>
         <a:sysClr val="windowText" lastClr="000000"/>
       </a:dk1>
@@ -27848,10 +28098,10 @@
         <a:srgbClr val="F79646"/>
       </a:accent6>
       <a:hlink>
-        <a:srgbClr val="0000FF"/>
+        <a:srgbClr val="FFFFFF"/>
       </a:hlink>
       <a:folHlink>
-        <a:srgbClr val="800080"/>
+        <a:srgbClr val="FFFFFF"/>
       </a:folHlink>
     </a:clrScheme>
     <a:fontScheme name="Office">

</xml_diff>

<commit_message>
Added link to github to all presentations
</commit_message>
<xml_diff>
--- a/Presentation/lesson-01.pptx
+++ b/Presentation/lesson-01.pptx
@@ -8,31 +8,32 @@
     <p:sldId id="256" r:id="rId2"/>
     <p:sldId id="257" r:id="rId3"/>
     <p:sldId id="258" r:id="rId4"/>
-    <p:sldId id="259" r:id="rId5"/>
-    <p:sldId id="260" r:id="rId6"/>
-    <p:sldId id="261" r:id="rId7"/>
-    <p:sldId id="262" r:id="rId8"/>
-    <p:sldId id="263" r:id="rId9"/>
-    <p:sldId id="264" r:id="rId10"/>
-    <p:sldId id="265" r:id="rId11"/>
-    <p:sldId id="282" r:id="rId12"/>
-    <p:sldId id="266" r:id="rId13"/>
-    <p:sldId id="279" r:id="rId14"/>
-    <p:sldId id="280" r:id="rId15"/>
-    <p:sldId id="267" r:id="rId16"/>
-    <p:sldId id="283" r:id="rId17"/>
-    <p:sldId id="278" r:id="rId18"/>
-    <p:sldId id="268" r:id="rId19"/>
-    <p:sldId id="269" r:id="rId20"/>
-    <p:sldId id="270" r:id="rId21"/>
-    <p:sldId id="271" r:id="rId22"/>
-    <p:sldId id="272" r:id="rId23"/>
-    <p:sldId id="273" r:id="rId24"/>
-    <p:sldId id="274" r:id="rId25"/>
-    <p:sldId id="275" r:id="rId26"/>
-    <p:sldId id="276" r:id="rId27"/>
-    <p:sldId id="277" r:id="rId28"/>
-    <p:sldId id="281" r:id="rId29"/>
+    <p:sldId id="284" r:id="rId5"/>
+    <p:sldId id="259" r:id="rId6"/>
+    <p:sldId id="260" r:id="rId7"/>
+    <p:sldId id="261" r:id="rId8"/>
+    <p:sldId id="262" r:id="rId9"/>
+    <p:sldId id="263" r:id="rId10"/>
+    <p:sldId id="264" r:id="rId11"/>
+    <p:sldId id="265" r:id="rId12"/>
+    <p:sldId id="282" r:id="rId13"/>
+    <p:sldId id="266" r:id="rId14"/>
+    <p:sldId id="279" r:id="rId15"/>
+    <p:sldId id="280" r:id="rId16"/>
+    <p:sldId id="267" r:id="rId17"/>
+    <p:sldId id="283" r:id="rId18"/>
+    <p:sldId id="278" r:id="rId19"/>
+    <p:sldId id="268" r:id="rId20"/>
+    <p:sldId id="269" r:id="rId21"/>
+    <p:sldId id="270" r:id="rId22"/>
+    <p:sldId id="271" r:id="rId23"/>
+    <p:sldId id="272" r:id="rId24"/>
+    <p:sldId id="273" r:id="rId25"/>
+    <p:sldId id="274" r:id="rId26"/>
+    <p:sldId id="275" r:id="rId27"/>
+    <p:sldId id="276" r:id="rId28"/>
+    <p:sldId id="277" r:id="rId29"/>
+    <p:sldId id="281" r:id="rId30"/>
   </p:sldIdLst>
   <p:sldSz cx="9144000" cy="6858000" type="screen4x3"/>
   <p:notesSz cx="6858000" cy="9144000"/>
@@ -315,7 +316,7 @@
           <a:p>
             <a:fld id="{8E6E6A2A-E9D3-4A0D-B04A-ABDD367A1E08}" type="datetimeFigureOut">
               <a:rPr lang="ru-RU" smtClean="0"/>
-              <a:t>15.08.2012</a:t>
+              <a:t>16.08.2012</a:t>
             </a:fld>
             <a:endParaRPr lang="ru-RU"/>
           </a:p>
@@ -485,7 +486,7 @@
           <a:p>
             <a:fld id="{8E6E6A2A-E9D3-4A0D-B04A-ABDD367A1E08}" type="datetimeFigureOut">
               <a:rPr lang="ru-RU" smtClean="0"/>
-              <a:t>15.08.2012</a:t>
+              <a:t>16.08.2012</a:t>
             </a:fld>
             <a:endParaRPr lang="ru-RU"/>
           </a:p>
@@ -665,7 +666,7 @@
           <a:p>
             <a:fld id="{8E6E6A2A-E9D3-4A0D-B04A-ABDD367A1E08}" type="datetimeFigureOut">
               <a:rPr lang="ru-RU" smtClean="0"/>
-              <a:t>15.08.2012</a:t>
+              <a:t>16.08.2012</a:t>
             </a:fld>
             <a:endParaRPr lang="ru-RU"/>
           </a:p>
@@ -835,7 +836,7 @@
           <a:p>
             <a:fld id="{8E6E6A2A-E9D3-4A0D-B04A-ABDD367A1E08}" type="datetimeFigureOut">
               <a:rPr lang="ru-RU" smtClean="0"/>
-              <a:t>15.08.2012</a:t>
+              <a:t>16.08.2012</a:t>
             </a:fld>
             <a:endParaRPr lang="ru-RU"/>
           </a:p>
@@ -1081,7 +1082,7 @@
           <a:p>
             <a:fld id="{8E6E6A2A-E9D3-4A0D-B04A-ABDD367A1E08}" type="datetimeFigureOut">
               <a:rPr lang="ru-RU" smtClean="0"/>
-              <a:t>15.08.2012</a:t>
+              <a:t>16.08.2012</a:t>
             </a:fld>
             <a:endParaRPr lang="ru-RU"/>
           </a:p>
@@ -1369,7 +1370,7 @@
           <a:p>
             <a:fld id="{8E6E6A2A-E9D3-4A0D-B04A-ABDD367A1E08}" type="datetimeFigureOut">
               <a:rPr lang="ru-RU" smtClean="0"/>
-              <a:t>15.08.2012</a:t>
+              <a:t>16.08.2012</a:t>
             </a:fld>
             <a:endParaRPr lang="ru-RU"/>
           </a:p>
@@ -1791,7 +1792,7 @@
           <a:p>
             <a:fld id="{8E6E6A2A-E9D3-4A0D-B04A-ABDD367A1E08}" type="datetimeFigureOut">
               <a:rPr lang="ru-RU" smtClean="0"/>
-              <a:t>15.08.2012</a:t>
+              <a:t>16.08.2012</a:t>
             </a:fld>
             <a:endParaRPr lang="ru-RU"/>
           </a:p>
@@ -1909,7 +1910,7 @@
           <a:p>
             <a:fld id="{8E6E6A2A-E9D3-4A0D-B04A-ABDD367A1E08}" type="datetimeFigureOut">
               <a:rPr lang="ru-RU" smtClean="0"/>
-              <a:t>15.08.2012</a:t>
+              <a:t>16.08.2012</a:t>
             </a:fld>
             <a:endParaRPr lang="ru-RU"/>
           </a:p>
@@ -2004,7 +2005,7 @@
           <a:p>
             <a:fld id="{8E6E6A2A-E9D3-4A0D-B04A-ABDD367A1E08}" type="datetimeFigureOut">
               <a:rPr lang="ru-RU" smtClean="0"/>
-              <a:t>15.08.2012</a:t>
+              <a:t>16.08.2012</a:t>
             </a:fld>
             <a:endParaRPr lang="ru-RU"/>
           </a:p>
@@ -2281,7 +2282,7 @@
           <a:p>
             <a:fld id="{8E6E6A2A-E9D3-4A0D-B04A-ABDD367A1E08}" type="datetimeFigureOut">
               <a:rPr lang="ru-RU" smtClean="0"/>
-              <a:t>15.08.2012</a:t>
+              <a:t>16.08.2012</a:t>
             </a:fld>
             <a:endParaRPr lang="ru-RU"/>
           </a:p>
@@ -2534,7 +2535,7 @@
           <a:p>
             <a:fld id="{8E6E6A2A-E9D3-4A0D-B04A-ABDD367A1E08}" type="datetimeFigureOut">
               <a:rPr lang="ru-RU" smtClean="0"/>
-              <a:t>15.08.2012</a:t>
+              <a:t>16.08.2012</a:t>
             </a:fld>
             <a:endParaRPr lang="ru-RU"/>
           </a:p>
@@ -2747,7 +2748,7 @@
           <a:p>
             <a:fld id="{8E6E6A2A-E9D3-4A0D-B04A-ABDD367A1E08}" type="datetimeFigureOut">
               <a:rPr lang="ru-RU" smtClean="0"/>
-              <a:t>15.08.2012</a:t>
+              <a:t>16.08.2012</a:t>
             </a:fld>
             <a:endParaRPr lang="ru-RU"/>
           </a:p>
@@ -3337,193 +3338,804 @@
       </p:grpSpPr>
       <p:sp>
         <p:nvSpPr>
-          <p:cNvPr id="3" name="Rectangle 2"/>
+          <p:cNvPr id="4" name="Прямоугольник 13"/>
           <p:cNvSpPr/>
           <p:nvPr/>
         </p:nvSpPr>
         <p:spPr>
           <a:xfrm>
-            <a:off x="179512" y="260648"/>
-            <a:ext cx="8640960" cy="4401205"/>
+            <a:off x="3429000" y="914400"/>
+            <a:ext cx="1905000" cy="457200"/>
           </a:xfrm>
           <a:prstGeom prst="rect">
             <a:avLst/>
           </a:prstGeom>
         </p:spPr>
+        <p:style>
+          <a:lnRef idx="1">
+            <a:schemeClr val="accent1"/>
+          </a:lnRef>
+          <a:fillRef idx="2">
+            <a:schemeClr val="accent1"/>
+          </a:fillRef>
+          <a:effectRef idx="1">
+            <a:schemeClr val="accent1"/>
+          </a:effectRef>
+          <a:fontRef idx="minor">
+            <a:schemeClr val="dk1"/>
+          </a:fontRef>
+        </p:style>
         <p:txBody>
-          <a:bodyPr wrap="square">
+          <a:bodyPr anchor="ctr"/>
+          <a:lstStyle/>
+          <a:p>
+            <a:pPr algn="ctr" fontAlgn="auto">
+              <a:spcBef>
+                <a:spcPts val="0"/>
+              </a:spcBef>
+              <a:spcAft>
+                <a:spcPts val="0"/>
+              </a:spcAft>
+              <a:defRPr/>
+            </a:pPr>
+            <a:r>
+              <a:rPr lang="ru-RU" dirty="0"/>
+              <a:t>Код</a:t>
+            </a:r>
+          </a:p>
+        </p:txBody>
+      </p:sp>
+      <p:sp>
+        <p:nvSpPr>
+          <p:cNvPr id="5" name="Прямоугольник 14"/>
+          <p:cNvSpPr/>
+          <p:nvPr/>
+        </p:nvSpPr>
+        <p:spPr>
+          <a:xfrm>
+            <a:off x="3048000" y="1981200"/>
+            <a:ext cx="2743200" cy="762000"/>
+          </a:xfrm>
+          <a:prstGeom prst="rect">
+            <a:avLst/>
+          </a:prstGeom>
+        </p:spPr>
+        <p:style>
+          <a:lnRef idx="1">
+            <a:schemeClr val="accent2"/>
+          </a:lnRef>
+          <a:fillRef idx="2">
+            <a:schemeClr val="accent2"/>
+          </a:fillRef>
+          <a:effectRef idx="1">
+            <a:schemeClr val="accent2"/>
+          </a:effectRef>
+          <a:fontRef idx="minor">
+            <a:schemeClr val="dk1"/>
+          </a:fontRef>
+        </p:style>
+        <p:txBody>
+          <a:bodyPr anchor="ctr"/>
+          <a:lstStyle/>
+          <a:p>
+            <a:pPr algn="ctr" fontAlgn="auto">
+              <a:spcBef>
+                <a:spcPts val="0"/>
+              </a:spcBef>
+              <a:spcAft>
+                <a:spcPts val="0"/>
+              </a:spcAft>
+              <a:defRPr/>
+            </a:pPr>
+            <a:r>
+              <a:rPr lang="en-US" dirty="0"/>
+              <a:t>JIT</a:t>
+            </a:r>
+          </a:p>
+          <a:p>
+            <a:pPr algn="ctr" fontAlgn="auto">
+              <a:spcBef>
+                <a:spcPts val="0"/>
+              </a:spcBef>
+              <a:spcAft>
+                <a:spcPts val="0"/>
+              </a:spcAft>
+              <a:defRPr/>
+            </a:pPr>
+            <a:r>
+              <a:rPr lang="en-US" dirty="0"/>
+              <a:t>Just In Time - </a:t>
+            </a:r>
+            <a:r>
+              <a:rPr lang="ru-RU" dirty="0"/>
+              <a:t>компилятор</a:t>
+            </a:r>
+          </a:p>
+        </p:txBody>
+      </p:sp>
+      <p:sp>
+        <p:nvSpPr>
+          <p:cNvPr id="6" name="Прямоугольник 19"/>
+          <p:cNvSpPr/>
+          <p:nvPr/>
+        </p:nvSpPr>
+        <p:spPr>
+          <a:xfrm>
+            <a:off x="1981200" y="3581400"/>
+            <a:ext cx="2286000" cy="2286000"/>
+          </a:xfrm>
+          <a:prstGeom prst="rect">
+            <a:avLst/>
+          </a:prstGeom>
+        </p:spPr>
+        <p:style>
+          <a:lnRef idx="1">
+            <a:schemeClr val="dk1"/>
+          </a:lnRef>
+          <a:fillRef idx="2">
+            <a:schemeClr val="dk1"/>
+          </a:fillRef>
+          <a:effectRef idx="1">
+            <a:schemeClr val="dk1"/>
+          </a:effectRef>
+          <a:fontRef idx="minor">
+            <a:schemeClr val="dk1"/>
+          </a:fontRef>
+        </p:style>
+        <p:txBody>
+          <a:bodyPr anchor="ctr"/>
+          <a:lstStyle/>
+          <a:p>
+            <a:pPr algn="ctr">
+              <a:defRPr/>
+            </a:pPr>
+            <a:r>
+              <a:rPr lang="ru-RU">
+                <a:solidFill>
+                  <a:srgbClr val="000000"/>
+                </a:solidFill>
+              </a:rPr>
+              <a:t>Сборка</a:t>
+            </a:r>
+          </a:p>
+          <a:p>
+            <a:pPr algn="ctr">
+              <a:defRPr/>
+            </a:pPr>
+            <a:r>
+              <a:rPr lang="ru-RU" sz="1600">
+                <a:solidFill>
+                  <a:srgbClr val="000000"/>
+                </a:solidFill>
+              </a:rPr>
+              <a:t>(Исполняемый файл)</a:t>
+            </a:r>
+          </a:p>
+          <a:p>
+            <a:pPr algn="ctr">
+              <a:defRPr/>
+            </a:pPr>
+            <a:endParaRPr lang="ru-RU" sz="1600">
+              <a:solidFill>
+                <a:srgbClr val="000000"/>
+              </a:solidFill>
+            </a:endParaRPr>
+          </a:p>
+          <a:p>
+            <a:pPr algn="ctr">
+              <a:defRPr/>
+            </a:pPr>
+            <a:endParaRPr lang="ru-RU">
+              <a:solidFill>
+                <a:srgbClr val="000000"/>
+              </a:solidFill>
+            </a:endParaRPr>
+          </a:p>
+          <a:p>
+            <a:pPr algn="ctr">
+              <a:defRPr/>
+            </a:pPr>
+            <a:endParaRPr lang="ru-RU">
+              <a:solidFill>
+                <a:srgbClr val="000000"/>
+              </a:solidFill>
+            </a:endParaRPr>
+          </a:p>
+          <a:p>
+            <a:pPr algn="ctr">
+              <a:defRPr/>
+            </a:pPr>
+            <a:endParaRPr lang="ru-RU">
+              <a:solidFill>
+                <a:srgbClr val="000000"/>
+              </a:solidFill>
+            </a:endParaRPr>
+          </a:p>
+          <a:p>
+            <a:pPr algn="ctr">
+              <a:defRPr/>
+            </a:pPr>
+            <a:endParaRPr lang="ru-RU">
+              <a:solidFill>
+                <a:srgbClr val="000000"/>
+              </a:solidFill>
+            </a:endParaRPr>
+          </a:p>
+          <a:p>
+            <a:pPr algn="ctr">
+              <a:defRPr/>
+            </a:pPr>
+            <a:endParaRPr lang="ru-RU">
+              <a:solidFill>
+                <a:srgbClr val="000000"/>
+              </a:solidFill>
+            </a:endParaRPr>
+          </a:p>
+        </p:txBody>
+      </p:sp>
+      <p:sp>
+        <p:nvSpPr>
+          <p:cNvPr id="7" name="Прямоугольник 20"/>
+          <p:cNvSpPr/>
+          <p:nvPr/>
+        </p:nvSpPr>
+        <p:spPr>
+          <a:xfrm>
+            <a:off x="2057400" y="5334000"/>
+            <a:ext cx="2133600" cy="457200"/>
+          </a:xfrm>
+          <a:prstGeom prst="rect">
+            <a:avLst/>
+          </a:prstGeom>
+        </p:spPr>
+        <p:style>
+          <a:lnRef idx="1">
+            <a:schemeClr val="accent1"/>
+          </a:lnRef>
+          <a:fillRef idx="2">
+            <a:schemeClr val="accent1"/>
+          </a:fillRef>
+          <a:effectRef idx="1">
+            <a:schemeClr val="accent1"/>
+          </a:effectRef>
+          <a:fontRef idx="minor">
+            <a:schemeClr val="dk1"/>
+          </a:fontRef>
+        </p:style>
+        <p:txBody>
+          <a:bodyPr anchor="ctr"/>
+          <a:lstStyle/>
+          <a:p>
+            <a:pPr algn="ctr" fontAlgn="auto">
+              <a:spcBef>
+                <a:spcPts val="0"/>
+              </a:spcBef>
+              <a:spcAft>
+                <a:spcPts val="0"/>
+              </a:spcAft>
+              <a:defRPr/>
+            </a:pPr>
+            <a:r>
+              <a:rPr lang="en-US" dirty="0"/>
+              <a:t>CIL - </a:t>
+            </a:r>
+            <a:r>
+              <a:rPr lang="ru-RU" dirty="0"/>
+              <a:t>Код</a:t>
+            </a:r>
+          </a:p>
+        </p:txBody>
+      </p:sp>
+      <p:sp>
+        <p:nvSpPr>
+          <p:cNvPr id="8" name="Прямоугольник 8"/>
+          <p:cNvSpPr/>
+          <p:nvPr/>
+        </p:nvSpPr>
+        <p:spPr>
+          <a:xfrm>
+            <a:off x="2057400" y="4267200"/>
+            <a:ext cx="2133600" cy="457200"/>
+          </a:xfrm>
+          <a:prstGeom prst="rect">
+            <a:avLst/>
+          </a:prstGeom>
+        </p:spPr>
+        <p:style>
+          <a:lnRef idx="1">
+            <a:schemeClr val="accent4"/>
+          </a:lnRef>
+          <a:fillRef idx="2">
+            <a:schemeClr val="accent4"/>
+          </a:fillRef>
+          <a:effectRef idx="1">
+            <a:schemeClr val="accent4"/>
+          </a:effectRef>
+          <a:fontRef idx="minor">
+            <a:schemeClr val="dk1"/>
+          </a:fontRef>
+        </p:style>
+        <p:txBody>
+          <a:bodyPr anchor="ctr"/>
+          <a:lstStyle/>
+          <a:p>
+            <a:pPr algn="ctr" fontAlgn="auto">
+              <a:spcBef>
+                <a:spcPts val="0"/>
+              </a:spcBef>
+              <a:spcAft>
+                <a:spcPts val="0"/>
+              </a:spcAft>
+              <a:defRPr/>
+            </a:pPr>
+            <a:r>
+              <a:rPr lang="ru-RU" dirty="0"/>
+              <a:t>Манифест</a:t>
+            </a:r>
+          </a:p>
+        </p:txBody>
+      </p:sp>
+      <p:sp>
+        <p:nvSpPr>
+          <p:cNvPr id="9" name="Прямоугольник 9"/>
+          <p:cNvSpPr/>
+          <p:nvPr/>
+        </p:nvSpPr>
+        <p:spPr>
+          <a:xfrm>
+            <a:off x="2057400" y="4800600"/>
+            <a:ext cx="2133600" cy="457200"/>
+          </a:xfrm>
+          <a:prstGeom prst="rect">
+            <a:avLst/>
+          </a:prstGeom>
+        </p:spPr>
+        <p:style>
+          <a:lnRef idx="1">
+            <a:schemeClr val="accent3"/>
+          </a:lnRef>
+          <a:fillRef idx="2">
+            <a:schemeClr val="accent3"/>
+          </a:fillRef>
+          <a:effectRef idx="1">
+            <a:schemeClr val="accent3"/>
+          </a:effectRef>
+          <a:fontRef idx="minor">
+            <a:schemeClr val="dk1"/>
+          </a:fontRef>
+        </p:style>
+        <p:txBody>
+          <a:bodyPr anchor="ctr"/>
+          <a:lstStyle/>
+          <a:p>
+            <a:pPr algn="ctr" fontAlgn="auto">
+              <a:spcBef>
+                <a:spcPts val="0"/>
+              </a:spcBef>
+              <a:spcAft>
+                <a:spcPts val="0"/>
+              </a:spcAft>
+              <a:defRPr/>
+            </a:pPr>
+            <a:r>
+              <a:rPr lang="ru-RU" dirty="0"/>
+              <a:t>Метаданные</a:t>
+            </a:r>
+          </a:p>
+        </p:txBody>
+      </p:sp>
+      <p:sp>
+        <p:nvSpPr>
+          <p:cNvPr id="10" name="Прямоугольник 11"/>
+          <p:cNvSpPr/>
+          <p:nvPr/>
+        </p:nvSpPr>
+        <p:spPr>
+          <a:xfrm>
+            <a:off x="4572000" y="3581400"/>
+            <a:ext cx="2286000" cy="1676400"/>
+          </a:xfrm>
+          <a:prstGeom prst="rect">
+            <a:avLst/>
+          </a:prstGeom>
+        </p:spPr>
+        <p:style>
+          <a:lnRef idx="1">
+            <a:schemeClr val="dk1"/>
+          </a:lnRef>
+          <a:fillRef idx="2">
+            <a:schemeClr val="dk1"/>
+          </a:fillRef>
+          <a:effectRef idx="1">
+            <a:schemeClr val="dk1"/>
+          </a:effectRef>
+          <a:fontRef idx="minor">
+            <a:schemeClr val="dk1"/>
+          </a:fontRef>
+        </p:style>
+        <p:txBody>
+          <a:bodyPr anchor="ctr"/>
+          <a:lstStyle/>
+          <a:p>
+            <a:pPr algn="ctr" fontAlgn="auto">
+              <a:spcBef>
+                <a:spcPts val="0"/>
+              </a:spcBef>
+              <a:spcAft>
+                <a:spcPts val="0"/>
+              </a:spcAft>
+              <a:defRPr/>
+            </a:pPr>
+            <a:r>
+              <a:rPr lang="ru-RU" dirty="0"/>
+              <a:t>Сборка</a:t>
+            </a:r>
+          </a:p>
+          <a:p>
+            <a:pPr algn="ctr" fontAlgn="auto">
+              <a:spcBef>
+                <a:spcPts val="0"/>
+              </a:spcBef>
+              <a:spcAft>
+                <a:spcPts val="0"/>
+              </a:spcAft>
+              <a:defRPr/>
+            </a:pPr>
+            <a:r>
+              <a:rPr lang="ru-RU" dirty="0"/>
+              <a:t>(Библиотека .</a:t>
+            </a:r>
+            <a:r>
+              <a:rPr lang="en-US" dirty="0" err="1"/>
+              <a:t>dll</a:t>
+            </a:r>
+            <a:r>
+              <a:rPr lang="ru-RU" dirty="0"/>
+              <a:t>)</a:t>
+            </a:r>
+          </a:p>
+          <a:p>
+            <a:pPr algn="ctr" fontAlgn="auto">
+              <a:spcBef>
+                <a:spcPts val="0"/>
+              </a:spcBef>
+              <a:spcAft>
+                <a:spcPts val="0"/>
+              </a:spcAft>
+              <a:defRPr/>
+            </a:pPr>
+            <a:endParaRPr lang="ru-RU" dirty="0"/>
+          </a:p>
+          <a:p>
+            <a:pPr algn="ctr" fontAlgn="auto">
+              <a:spcBef>
+                <a:spcPts val="0"/>
+              </a:spcBef>
+              <a:spcAft>
+                <a:spcPts val="0"/>
+              </a:spcAft>
+              <a:defRPr/>
+            </a:pPr>
+            <a:endParaRPr lang="ru-RU" dirty="0"/>
+          </a:p>
+          <a:p>
+            <a:pPr algn="ctr" fontAlgn="auto">
+              <a:spcBef>
+                <a:spcPts val="0"/>
+              </a:spcBef>
+              <a:spcAft>
+                <a:spcPts val="0"/>
+              </a:spcAft>
+              <a:defRPr/>
+            </a:pPr>
+            <a:endParaRPr lang="ru-RU" dirty="0"/>
+          </a:p>
+          <a:p>
+            <a:pPr algn="ctr" fontAlgn="auto">
+              <a:spcBef>
+                <a:spcPts val="0"/>
+              </a:spcBef>
+              <a:spcAft>
+                <a:spcPts val="0"/>
+              </a:spcAft>
+              <a:defRPr/>
+            </a:pPr>
+            <a:endParaRPr lang="ru-RU" dirty="0"/>
+          </a:p>
+        </p:txBody>
+      </p:sp>
+      <p:sp>
+        <p:nvSpPr>
+          <p:cNvPr id="11" name="Прямоугольник 12"/>
+          <p:cNvSpPr/>
+          <p:nvPr/>
+        </p:nvSpPr>
+        <p:spPr>
+          <a:xfrm>
+            <a:off x="4648200" y="4724400"/>
+            <a:ext cx="2133600" cy="457200"/>
+          </a:xfrm>
+          <a:prstGeom prst="rect">
+            <a:avLst/>
+          </a:prstGeom>
+        </p:spPr>
+        <p:style>
+          <a:lnRef idx="1">
+            <a:schemeClr val="accent1"/>
+          </a:lnRef>
+          <a:fillRef idx="2">
+            <a:schemeClr val="accent1"/>
+          </a:fillRef>
+          <a:effectRef idx="1">
+            <a:schemeClr val="accent1"/>
+          </a:effectRef>
+          <a:fontRef idx="minor">
+            <a:schemeClr val="dk1"/>
+          </a:fontRef>
+        </p:style>
+        <p:txBody>
+          <a:bodyPr anchor="ctr"/>
+          <a:lstStyle/>
+          <a:p>
+            <a:pPr algn="ctr" fontAlgn="auto">
+              <a:spcBef>
+                <a:spcPts val="0"/>
+              </a:spcBef>
+              <a:spcAft>
+                <a:spcPts val="0"/>
+              </a:spcAft>
+              <a:defRPr/>
+            </a:pPr>
+            <a:r>
+              <a:rPr lang="en-US" dirty="0"/>
+              <a:t>CIL - </a:t>
+            </a:r>
+            <a:r>
+              <a:rPr lang="ru-RU" dirty="0"/>
+              <a:t>Код</a:t>
+            </a:r>
+          </a:p>
+        </p:txBody>
+      </p:sp>
+      <p:sp>
+        <p:nvSpPr>
+          <p:cNvPr id="12" name="Прямоугольник 15"/>
+          <p:cNvSpPr/>
+          <p:nvPr/>
+        </p:nvSpPr>
+        <p:spPr>
+          <a:xfrm>
+            <a:off x="4648200" y="4191000"/>
+            <a:ext cx="2133600" cy="457200"/>
+          </a:xfrm>
+          <a:prstGeom prst="rect">
+            <a:avLst/>
+          </a:prstGeom>
+        </p:spPr>
+        <p:style>
+          <a:lnRef idx="1">
+            <a:schemeClr val="accent3"/>
+          </a:lnRef>
+          <a:fillRef idx="2">
+            <a:schemeClr val="accent3"/>
+          </a:fillRef>
+          <a:effectRef idx="1">
+            <a:schemeClr val="accent3"/>
+          </a:effectRef>
+          <a:fontRef idx="minor">
+            <a:schemeClr val="dk1"/>
+          </a:fontRef>
+        </p:style>
+        <p:txBody>
+          <a:bodyPr anchor="ctr"/>
+          <a:lstStyle/>
+          <a:p>
+            <a:pPr algn="ctr" fontAlgn="auto">
+              <a:spcBef>
+                <a:spcPts val="0"/>
+              </a:spcBef>
+              <a:spcAft>
+                <a:spcPts val="0"/>
+              </a:spcAft>
+              <a:defRPr/>
+            </a:pPr>
+            <a:r>
+              <a:rPr lang="ru-RU" dirty="0"/>
+              <a:t>Метаданные</a:t>
+            </a:r>
+          </a:p>
+        </p:txBody>
+      </p:sp>
+      <p:sp>
+        <p:nvSpPr>
+          <p:cNvPr id="13" name="Стрелка вниз 16"/>
+          <p:cNvSpPr/>
+          <p:nvPr/>
+        </p:nvSpPr>
+        <p:spPr>
+          <a:xfrm>
+            <a:off x="3733800" y="1371600"/>
+            <a:ext cx="1295400" cy="609600"/>
+          </a:xfrm>
+          <a:prstGeom prst="downArrow">
+            <a:avLst>
+              <a:gd name="adj1" fmla="val 48588"/>
+              <a:gd name="adj2" fmla="val 50000"/>
+            </a:avLst>
+          </a:prstGeom>
+        </p:spPr>
+        <p:style>
+          <a:lnRef idx="1">
+            <a:schemeClr val="dk1"/>
+          </a:lnRef>
+          <a:fillRef idx="2">
+            <a:schemeClr val="dk1"/>
+          </a:fillRef>
+          <a:effectRef idx="1">
+            <a:schemeClr val="dk1"/>
+          </a:effectRef>
+          <a:fontRef idx="minor">
+            <a:schemeClr val="dk1"/>
+          </a:fontRef>
+        </p:style>
+        <p:txBody>
+          <a:bodyPr anchor="ctr"/>
+          <a:lstStyle/>
+          <a:p>
+            <a:pPr algn="ctr" fontAlgn="auto">
+              <a:spcBef>
+                <a:spcPts val="0"/>
+              </a:spcBef>
+              <a:spcAft>
+                <a:spcPts val="0"/>
+              </a:spcAft>
+              <a:defRPr/>
+            </a:pPr>
+            <a:endParaRPr lang="ru-RU"/>
+          </a:p>
+        </p:txBody>
+      </p:sp>
+      <p:sp>
+        <p:nvSpPr>
+          <p:cNvPr id="14" name="Стрелка вниз 21"/>
+          <p:cNvSpPr/>
+          <p:nvPr/>
+        </p:nvSpPr>
+        <p:spPr>
+          <a:xfrm>
+            <a:off x="2743200" y="2743200"/>
+            <a:ext cx="1295400" cy="838200"/>
+          </a:xfrm>
+          <a:prstGeom prst="downArrow">
+            <a:avLst>
+              <a:gd name="adj1" fmla="val 48588"/>
+              <a:gd name="adj2" fmla="val 50000"/>
+            </a:avLst>
+          </a:prstGeom>
+        </p:spPr>
+        <p:style>
+          <a:lnRef idx="1">
+            <a:schemeClr val="dk1"/>
+          </a:lnRef>
+          <a:fillRef idx="2">
+            <a:schemeClr val="dk1"/>
+          </a:fillRef>
+          <a:effectRef idx="1">
+            <a:schemeClr val="dk1"/>
+          </a:effectRef>
+          <a:fontRef idx="minor">
+            <a:schemeClr val="dk1"/>
+          </a:fontRef>
+        </p:style>
+        <p:txBody>
+          <a:bodyPr anchor="ctr"/>
+          <a:lstStyle/>
+          <a:p>
+            <a:pPr algn="ctr" fontAlgn="auto">
+              <a:spcBef>
+                <a:spcPts val="0"/>
+              </a:spcBef>
+              <a:spcAft>
+                <a:spcPts val="0"/>
+              </a:spcAft>
+              <a:defRPr/>
+            </a:pPr>
+            <a:endParaRPr lang="ru-RU"/>
+          </a:p>
+        </p:txBody>
+      </p:sp>
+      <p:sp>
+        <p:nvSpPr>
+          <p:cNvPr id="15" name="Стрелка вниз 22"/>
+          <p:cNvSpPr/>
+          <p:nvPr/>
+        </p:nvSpPr>
+        <p:spPr>
+          <a:xfrm>
+            <a:off x="4800600" y="2743200"/>
+            <a:ext cx="1295400" cy="838200"/>
+          </a:xfrm>
+          <a:prstGeom prst="downArrow">
+            <a:avLst>
+              <a:gd name="adj1" fmla="val 48588"/>
+              <a:gd name="adj2" fmla="val 50000"/>
+            </a:avLst>
+          </a:prstGeom>
+        </p:spPr>
+        <p:style>
+          <a:lnRef idx="1">
+            <a:schemeClr val="dk1"/>
+          </a:lnRef>
+          <a:fillRef idx="2">
+            <a:schemeClr val="dk1"/>
+          </a:fillRef>
+          <a:effectRef idx="1">
+            <a:schemeClr val="dk1"/>
+          </a:effectRef>
+          <a:fontRef idx="minor">
+            <a:schemeClr val="dk1"/>
+          </a:fontRef>
+        </p:style>
+        <p:txBody>
+          <a:bodyPr anchor="ctr"/>
+          <a:lstStyle/>
+          <a:p>
+            <a:pPr algn="ctr" fontAlgn="auto">
+              <a:spcBef>
+                <a:spcPts val="0"/>
+              </a:spcBef>
+              <a:spcAft>
+                <a:spcPts val="0"/>
+              </a:spcAft>
+              <a:defRPr/>
+            </a:pPr>
+            <a:endParaRPr lang="ru-RU"/>
+          </a:p>
+        </p:txBody>
+      </p:sp>
+      <p:sp>
+        <p:nvSpPr>
+          <p:cNvPr id="2" name="TextBox 1"/>
+          <p:cNvSpPr txBox="1"/>
+          <p:nvPr/>
+        </p:nvSpPr>
+        <p:spPr>
+          <a:xfrm>
+            <a:off x="2520800" y="252492"/>
+            <a:ext cx="3672408" cy="461665"/>
+          </a:xfrm>
+          <a:prstGeom prst="rect">
+            <a:avLst/>
+          </a:prstGeom>
+          <a:noFill/>
+        </p:spPr>
+        <p:txBody>
+          <a:bodyPr wrap="square" rtlCol="0">
             <a:spAutoFit/>
           </a:bodyPr>
           <a:lstStyle/>
           <a:p>
-            <a:r>
-              <a:rPr lang="ru-RU" sz="2800" dirty="0" smtClean="0">
-                <a:solidFill>
-                  <a:schemeClr val="bg1"/>
-                </a:solidFill>
-              </a:rPr>
-              <a:t>Важность метаданных</a:t>
-            </a:r>
-          </a:p>
-          <a:p>
-            <a:endParaRPr lang="en-US" dirty="0" smtClean="0">
-              <a:solidFill>
-                <a:schemeClr val="bg1"/>
-              </a:solidFill>
-            </a:endParaRPr>
-          </a:p>
-          <a:p>
-            <a:r>
-              <a:rPr lang="en-US" dirty="0" smtClean="0">
-                <a:solidFill>
-                  <a:schemeClr val="bg1"/>
-                </a:solidFill>
-              </a:rPr>
-              <a:t>CLR </a:t>
-            </a:r>
-            <a:r>
-              <a:rPr lang="ru-RU" dirty="0" smtClean="0">
-                <a:solidFill>
-                  <a:schemeClr val="bg1"/>
-                </a:solidFill>
-              </a:rPr>
-              <a:t>использует метаданные</a:t>
-            </a:r>
-            <a:r>
-              <a:rPr lang="en-US" dirty="0" smtClean="0">
-                <a:solidFill>
-                  <a:schemeClr val="bg1"/>
-                </a:solidFill>
-              </a:rPr>
-              <a:t> </a:t>
-            </a:r>
-            <a:r>
-              <a:rPr lang="ru-RU" dirty="0" smtClean="0">
-                <a:solidFill>
-                  <a:schemeClr val="bg1"/>
-                </a:solidFill>
-              </a:rPr>
-              <a:t>во время проверки кода чтобы убедиться что код использует только типо-безопасные операции.</a:t>
-            </a:r>
-          </a:p>
-          <a:p>
-            <a:endParaRPr lang="ru-RU" dirty="0" smtClean="0">
-              <a:solidFill>
-                <a:schemeClr val="bg1"/>
-              </a:solidFill>
-            </a:endParaRPr>
-          </a:p>
-          <a:p>
-            <a:r>
-              <a:rPr lang="ru-RU" dirty="0" smtClean="0">
-                <a:solidFill>
-                  <a:schemeClr val="bg1"/>
-                </a:solidFill>
-              </a:rPr>
-              <a:t>Метаданные позволяют выполнить сериализацию содержимого объекта в набор байтов на одной машине и десериализовать на другой. Создав таким образом точную копию. Используется при передаче данных между доменами приложения и в технологии </a:t>
-            </a:r>
-            <a:r>
-              <a:rPr lang="en-US" dirty="0" smtClean="0">
-                <a:solidFill>
-                  <a:schemeClr val="bg1"/>
-                </a:solidFill>
-              </a:rPr>
-              <a:t>.NET </a:t>
-            </a:r>
-            <a:r>
-              <a:rPr lang="en-US" dirty="0" err="1" smtClean="0">
-                <a:solidFill>
-                  <a:schemeClr val="bg1"/>
-                </a:solidFill>
-              </a:rPr>
-              <a:t>Remoting</a:t>
-            </a:r>
-            <a:r>
-              <a:rPr lang="en-US" dirty="0" smtClean="0">
-                <a:solidFill>
-                  <a:schemeClr val="bg1"/>
-                </a:solidFill>
-              </a:rPr>
-              <a:t> (</a:t>
-            </a:r>
-            <a:r>
-              <a:rPr lang="ru-RU" dirty="0" smtClean="0">
-                <a:solidFill>
-                  <a:schemeClr val="bg1"/>
-                </a:solidFill>
-              </a:rPr>
-              <a:t>практически не используется</a:t>
-            </a:r>
-            <a:r>
-              <a:rPr lang="en-US" dirty="0" smtClean="0">
-                <a:solidFill>
-                  <a:schemeClr val="bg1"/>
-                </a:solidFill>
-              </a:rPr>
-              <a:t>)</a:t>
-            </a:r>
-            <a:r>
-              <a:rPr lang="ru-RU" dirty="0">
-                <a:solidFill>
-                  <a:schemeClr val="bg1"/>
-                </a:solidFill>
-              </a:rPr>
-              <a:t>.</a:t>
-            </a:r>
-            <a:endParaRPr lang="ru-RU" dirty="0" smtClean="0">
-              <a:solidFill>
-                <a:schemeClr val="bg1"/>
-              </a:solidFill>
-            </a:endParaRPr>
-          </a:p>
-          <a:p>
-            <a:endParaRPr lang="ru-RU" dirty="0" smtClean="0">
-              <a:solidFill>
-                <a:schemeClr val="bg1"/>
-              </a:solidFill>
-            </a:endParaRPr>
-          </a:p>
-          <a:p>
-            <a:r>
-              <a:rPr lang="ru-RU" dirty="0" smtClean="0">
-                <a:solidFill>
-                  <a:schemeClr val="bg1"/>
-                </a:solidFill>
-              </a:rPr>
-              <a:t>Метаданные позволяют сборщику мусора отслеживать жизненный цикл объектов. Тип любого объекта определяется через метаданные, и, оттуда же, берется иноформация о полях объекта ссылающиеся на другие объекты.</a:t>
-            </a:r>
-          </a:p>
-          <a:p>
-            <a:endParaRPr lang="ru-RU" dirty="0">
-              <a:solidFill>
-                <a:schemeClr val="bg1"/>
-              </a:solidFill>
-            </a:endParaRPr>
-          </a:p>
-          <a:p>
-            <a:r>
-              <a:rPr lang="ru-RU" dirty="0" smtClean="0">
-                <a:solidFill>
-                  <a:schemeClr val="bg1"/>
-                </a:solidFill>
-              </a:rPr>
-              <a:t>Метаданные доступны на этапе исполнения через механизм «отражения» (</a:t>
-            </a:r>
-            <a:r>
-              <a:rPr lang="en-US" dirty="0" smtClean="0">
-                <a:solidFill>
-                  <a:schemeClr val="bg1"/>
-                </a:solidFill>
-              </a:rPr>
-              <a:t>reflection).</a:t>
-            </a:r>
+            <a:pPr algn="ctr"/>
+            <a:r>
+              <a:rPr lang="ru-RU" sz="2400" dirty="0" smtClean="0">
+                <a:solidFill>
+                  <a:schemeClr val="bg1"/>
+                </a:solidFill>
+              </a:rPr>
+              <a:t>Понятие сборки</a:t>
+            </a:r>
+            <a:endParaRPr lang="en-US" sz="2400" dirty="0">
+              <a:solidFill>
+                <a:schemeClr val="bg1"/>
+              </a:solidFill>
+            </a:endParaRPr>
           </a:p>
         </p:txBody>
       </p:sp>
     </p:spTree>
     <p:extLst>
       <p:ext uri="{BB962C8B-B14F-4D97-AF65-F5344CB8AC3E}">
-        <p14:creationId xmlns:p14="http://schemas.microsoft.com/office/powerpoint/2010/main" val="723374532"/>
+        <p14:creationId xmlns:p14="http://schemas.microsoft.com/office/powerpoint/2010/main" val="669921671"/>
       </p:ext>
     </p:extLst>
   </p:cSld>
@@ -3579,6 +4191,242 @@
         </p:nvSpPr>
         <p:spPr>
           <a:xfrm>
+            <a:off x="179512" y="260648"/>
+            <a:ext cx="8640960" cy="4401205"/>
+          </a:xfrm>
+          <a:prstGeom prst="rect">
+            <a:avLst/>
+          </a:prstGeom>
+        </p:spPr>
+        <p:txBody>
+          <a:bodyPr wrap="square">
+            <a:spAutoFit/>
+          </a:bodyPr>
+          <a:lstStyle/>
+          <a:p>
+            <a:r>
+              <a:rPr lang="ru-RU" sz="2800" dirty="0" smtClean="0">
+                <a:solidFill>
+                  <a:schemeClr val="bg1"/>
+                </a:solidFill>
+              </a:rPr>
+              <a:t>Важность метаданных</a:t>
+            </a:r>
+          </a:p>
+          <a:p>
+            <a:endParaRPr lang="en-US" dirty="0" smtClean="0">
+              <a:solidFill>
+                <a:schemeClr val="bg1"/>
+              </a:solidFill>
+            </a:endParaRPr>
+          </a:p>
+          <a:p>
+            <a:r>
+              <a:rPr lang="en-US" dirty="0" smtClean="0">
+                <a:solidFill>
+                  <a:schemeClr val="bg1"/>
+                </a:solidFill>
+              </a:rPr>
+              <a:t>CLR </a:t>
+            </a:r>
+            <a:r>
+              <a:rPr lang="ru-RU" dirty="0" smtClean="0">
+                <a:solidFill>
+                  <a:schemeClr val="bg1"/>
+                </a:solidFill>
+              </a:rPr>
+              <a:t>использует метаданные</a:t>
+            </a:r>
+            <a:r>
+              <a:rPr lang="en-US" dirty="0" smtClean="0">
+                <a:solidFill>
+                  <a:schemeClr val="bg1"/>
+                </a:solidFill>
+              </a:rPr>
+              <a:t> </a:t>
+            </a:r>
+            <a:r>
+              <a:rPr lang="ru-RU" dirty="0" smtClean="0">
+                <a:solidFill>
+                  <a:schemeClr val="bg1"/>
+                </a:solidFill>
+              </a:rPr>
+              <a:t>во время проверки кода чтобы убедиться что код использует только типо-безопасные операции.</a:t>
+            </a:r>
+          </a:p>
+          <a:p>
+            <a:endParaRPr lang="ru-RU" dirty="0" smtClean="0">
+              <a:solidFill>
+                <a:schemeClr val="bg1"/>
+              </a:solidFill>
+            </a:endParaRPr>
+          </a:p>
+          <a:p>
+            <a:r>
+              <a:rPr lang="ru-RU" dirty="0" smtClean="0">
+                <a:solidFill>
+                  <a:schemeClr val="bg1"/>
+                </a:solidFill>
+              </a:rPr>
+              <a:t>Метаданные позволяют выполнить сериализацию содержимого объекта в набор байтов на одной машине и десериализовать на другой. Создав таким образом точную копию. Используется при передаче данных между доменами приложения и в технологии </a:t>
+            </a:r>
+            <a:r>
+              <a:rPr lang="en-US" dirty="0" smtClean="0">
+                <a:solidFill>
+                  <a:schemeClr val="bg1"/>
+                </a:solidFill>
+              </a:rPr>
+              <a:t>.NET </a:t>
+            </a:r>
+            <a:r>
+              <a:rPr lang="en-US" dirty="0" err="1" smtClean="0">
+                <a:solidFill>
+                  <a:schemeClr val="bg1"/>
+                </a:solidFill>
+              </a:rPr>
+              <a:t>Remoting</a:t>
+            </a:r>
+            <a:r>
+              <a:rPr lang="en-US" dirty="0" smtClean="0">
+                <a:solidFill>
+                  <a:schemeClr val="bg1"/>
+                </a:solidFill>
+              </a:rPr>
+              <a:t> (</a:t>
+            </a:r>
+            <a:r>
+              <a:rPr lang="ru-RU" dirty="0" smtClean="0">
+                <a:solidFill>
+                  <a:schemeClr val="bg1"/>
+                </a:solidFill>
+              </a:rPr>
+              <a:t>практически не используется</a:t>
+            </a:r>
+            <a:r>
+              <a:rPr lang="en-US" dirty="0" smtClean="0">
+                <a:solidFill>
+                  <a:schemeClr val="bg1"/>
+                </a:solidFill>
+              </a:rPr>
+              <a:t>)</a:t>
+            </a:r>
+            <a:r>
+              <a:rPr lang="ru-RU" dirty="0">
+                <a:solidFill>
+                  <a:schemeClr val="bg1"/>
+                </a:solidFill>
+              </a:rPr>
+              <a:t>.</a:t>
+            </a:r>
+            <a:endParaRPr lang="ru-RU" dirty="0" smtClean="0">
+              <a:solidFill>
+                <a:schemeClr val="bg1"/>
+              </a:solidFill>
+            </a:endParaRPr>
+          </a:p>
+          <a:p>
+            <a:endParaRPr lang="ru-RU" dirty="0" smtClean="0">
+              <a:solidFill>
+                <a:schemeClr val="bg1"/>
+              </a:solidFill>
+            </a:endParaRPr>
+          </a:p>
+          <a:p>
+            <a:r>
+              <a:rPr lang="ru-RU" dirty="0" smtClean="0">
+                <a:solidFill>
+                  <a:schemeClr val="bg1"/>
+                </a:solidFill>
+              </a:rPr>
+              <a:t>Метаданные позволяют сборщику мусора отслеживать жизненный цикл объектов. Тип любого объекта определяется через метаданные, и, оттуда же, берется иноформация о полях объекта ссылающиеся на другие объекты.</a:t>
+            </a:r>
+          </a:p>
+          <a:p>
+            <a:endParaRPr lang="ru-RU" dirty="0">
+              <a:solidFill>
+                <a:schemeClr val="bg1"/>
+              </a:solidFill>
+            </a:endParaRPr>
+          </a:p>
+          <a:p>
+            <a:r>
+              <a:rPr lang="ru-RU" dirty="0" smtClean="0">
+                <a:solidFill>
+                  <a:schemeClr val="bg1"/>
+                </a:solidFill>
+              </a:rPr>
+              <a:t>Метаданные доступны на этапе исполнения через механизм «отражения» (</a:t>
+            </a:r>
+            <a:r>
+              <a:rPr lang="en-US" dirty="0" smtClean="0">
+                <a:solidFill>
+                  <a:schemeClr val="bg1"/>
+                </a:solidFill>
+              </a:rPr>
+              <a:t>reflection).</a:t>
+            </a:r>
+          </a:p>
+        </p:txBody>
+      </p:sp>
+    </p:spTree>
+    <p:extLst>
+      <p:ext uri="{BB962C8B-B14F-4D97-AF65-F5344CB8AC3E}">
+        <p14:creationId xmlns:p14="http://schemas.microsoft.com/office/powerpoint/2010/main" val="723374532"/>
+      </p:ext>
+    </p:extLst>
+  </p:cSld>
+  <p:clrMapOvr>
+    <a:masterClrMapping/>
+  </p:clrMapOvr>
+  <p:timing>
+    <p:tnLst>
+      <p:par>
+        <p:cTn id="1" dur="indefinite" restart="never" nodeType="tmRoot"/>
+      </p:par>
+    </p:tnLst>
+  </p:timing>
+</p:sld>
+</file>
+
+<file path=ppt/slides/slide12.xml><?xml version="1.0" encoding="utf-8"?>
+<p:sld xmlns:a="http://schemas.openxmlformats.org/drawingml/2006/main" xmlns:r="http://schemas.openxmlformats.org/officeDocument/2006/relationships" xmlns:p="http://schemas.openxmlformats.org/presentationml/2006/main">
+  <p:cSld>
+    <p:bg>
+      <p:bgPr>
+        <a:blipFill dpi="0" rotWithShape="1">
+          <a:blip r:embed="rId2">
+            <a:lum/>
+          </a:blip>
+          <a:srcRect/>
+          <a:stretch>
+            <a:fillRect/>
+          </a:stretch>
+        </a:blipFill>
+        <a:effectLst/>
+      </p:bgPr>
+    </p:bg>
+    <p:spTree>
+      <p:nvGrpSpPr>
+        <p:cNvPr id="1" name=""/>
+        <p:cNvGrpSpPr/>
+        <p:nvPr/>
+      </p:nvGrpSpPr>
+      <p:grpSpPr>
+        <a:xfrm>
+          <a:off x="0" y="0"/>
+          <a:ext cx="0" cy="0"/>
+          <a:chOff x="0" y="0"/>
+          <a:chExt cx="0" cy="0"/>
+        </a:xfrm>
+      </p:grpSpPr>
+      <p:sp>
+        <p:nvSpPr>
+          <p:cNvPr id="3" name="Rectangle 2"/>
+          <p:cNvSpPr/>
+          <p:nvPr/>
+        </p:nvSpPr>
+        <p:spPr>
+          <a:xfrm>
             <a:off x="251520" y="2708920"/>
             <a:ext cx="8640960" cy="1046440"/>
           </a:xfrm>
@@ -3659,7 +4507,7 @@
 </p:sld>
 </file>
 
-<file path=ppt/slides/slide12.xml><?xml version="1.0" encoding="utf-8"?>
+<file path=ppt/slides/slide13.xml><?xml version="1.0" encoding="utf-8"?>
 <p:sld xmlns:a="http://schemas.openxmlformats.org/drawingml/2006/main" xmlns:r="http://schemas.openxmlformats.org/officeDocument/2006/relationships" xmlns:p="http://schemas.openxmlformats.org/presentationml/2006/main">
   <p:cSld>
     <p:bg>
@@ -3842,7 +4690,7 @@
 </p:sld>
 </file>
 
-<file path=ppt/slides/slide13.xml><?xml version="1.0" encoding="utf-8"?>
+<file path=ppt/slides/slide14.xml><?xml version="1.0" encoding="utf-8"?>
 <p:sld xmlns:a="http://schemas.openxmlformats.org/drawingml/2006/main" xmlns:r="http://schemas.openxmlformats.org/officeDocument/2006/relationships" xmlns:p="http://schemas.openxmlformats.org/presentationml/2006/main">
   <p:cSld>
     <p:bg>
@@ -4506,7 +5354,7 @@
 </p:sld>
 </file>
 
-<file path=ppt/slides/slide14.xml><?xml version="1.0" encoding="utf-8"?>
+<file path=ppt/slides/slide15.xml><?xml version="1.0" encoding="utf-8"?>
 <p:sld xmlns:a="http://schemas.openxmlformats.org/drawingml/2006/main" xmlns:r="http://schemas.openxmlformats.org/officeDocument/2006/relationships" xmlns:p="http://schemas.openxmlformats.org/presentationml/2006/main">
   <p:cSld>
     <p:bg>
@@ -6424,7 +7272,7 @@
 </p:sld>
 </file>
 
-<file path=ppt/slides/slide15.xml><?xml version="1.0" encoding="utf-8"?>
+<file path=ppt/slides/slide16.xml><?xml version="1.0" encoding="utf-8"?>
 <p:sld xmlns:a="http://schemas.openxmlformats.org/drawingml/2006/main" xmlns:r="http://schemas.openxmlformats.org/officeDocument/2006/relationships" xmlns:p="http://schemas.openxmlformats.org/presentationml/2006/main">
   <p:cSld>
     <p:bg>
@@ -11194,7 +12042,7 @@
 </p:sld>
 </file>
 
-<file path=ppt/slides/slide16.xml><?xml version="1.0" encoding="utf-8"?>
+<file path=ppt/slides/slide17.xml><?xml version="1.0" encoding="utf-8"?>
 <p:sld xmlns:a="http://schemas.openxmlformats.org/drawingml/2006/main" xmlns:r="http://schemas.openxmlformats.org/officeDocument/2006/relationships" xmlns:p="http://schemas.openxmlformats.org/presentationml/2006/main">
   <p:cSld>
     <p:bg>
@@ -11572,11 +12420,6 @@
               </a:rPr>
               <a:t>null character)</a:t>
             </a:r>
-            <a:endParaRPr lang="en-US" dirty="0" smtClean="0">
-              <a:solidFill>
-                <a:schemeClr val="bg1"/>
-              </a:solidFill>
-            </a:endParaRPr>
           </a:p>
           <a:p>
             <a:pPr marL="285750" indent="-285750">
@@ -11698,15 +12541,7 @@
                   <a:schemeClr val="bg1"/>
                 </a:solidFill>
               </a:rPr>
-              <a:t>String</a:t>
-            </a:r>
-            <a:r>
-              <a:rPr lang="en-US" dirty="0" err="1" smtClean="0">
-                <a:solidFill>
-                  <a:schemeClr val="bg1"/>
-                </a:solidFill>
-              </a:rPr>
-              <a:t>.Intern</a:t>
+              <a:t>String.Intern</a:t>
             </a:r>
             <a:r>
               <a:rPr lang="en-US" dirty="0" smtClean="0">
@@ -11752,15 +12587,7 @@
                   <a:schemeClr val="bg1"/>
                 </a:solidFill>
               </a:rPr>
-              <a:t>д</a:t>
-            </a:r>
-            <a:r>
-              <a:rPr lang="ru-RU" dirty="0" smtClean="0">
-                <a:solidFill>
-                  <a:schemeClr val="bg1"/>
-                </a:solidFill>
-              </a:rPr>
-              <a:t>ля хранения «секретной» информации (пароли).</a:t>
+              <a:t>для хранения «секретной» информации (пароли).</a:t>
             </a:r>
             <a:endParaRPr lang="en-US" dirty="0" smtClean="0">
               <a:solidFill>
@@ -11801,7 +12628,7 @@
 </p:sld>
 </file>
 
-<file path=ppt/slides/slide17.xml><?xml version="1.0" encoding="utf-8"?>
+<file path=ppt/slides/slide18.xml><?xml version="1.0" encoding="utf-8"?>
 <p:sld xmlns:a="http://schemas.openxmlformats.org/drawingml/2006/main" xmlns:r="http://schemas.openxmlformats.org/officeDocument/2006/relationships" xmlns:p="http://schemas.openxmlformats.org/presentationml/2006/main">
   <p:cSld>
     <p:bg>
@@ -13699,7 +14526,7 @@
 </p:sld>
 </file>
 
-<file path=ppt/slides/slide18.xml><?xml version="1.0" encoding="utf-8"?>
+<file path=ppt/slides/slide19.xml><?xml version="1.0" encoding="utf-8"?>
 <p:sld xmlns:a="http://schemas.openxmlformats.org/drawingml/2006/main" xmlns:r="http://schemas.openxmlformats.org/officeDocument/2006/relationships" xmlns:p="http://schemas.openxmlformats.org/presentationml/2006/main">
   <p:cSld>
     <p:bg>
@@ -14215,7 +15042,438 @@
 </p:sld>
 </file>
 
-<file path=ppt/slides/slide19.xml><?xml version="1.0" encoding="utf-8"?>
+<file path=ppt/slides/slide2.xml><?xml version="1.0" encoding="utf-8"?>
+<p:sld xmlns:a="http://schemas.openxmlformats.org/drawingml/2006/main" xmlns:r="http://schemas.openxmlformats.org/officeDocument/2006/relationships" xmlns:p="http://schemas.openxmlformats.org/presentationml/2006/main">
+  <p:cSld>
+    <p:bg>
+      <p:bgPr>
+        <a:blipFill dpi="0" rotWithShape="1">
+          <a:blip r:embed="rId2">
+            <a:lum/>
+          </a:blip>
+          <a:srcRect/>
+          <a:stretch>
+            <a:fillRect/>
+          </a:stretch>
+        </a:blipFill>
+        <a:effectLst/>
+      </p:bgPr>
+    </p:bg>
+    <p:spTree>
+      <p:nvGrpSpPr>
+        <p:cNvPr id="1" name=""/>
+        <p:cNvGrpSpPr/>
+        <p:nvPr/>
+      </p:nvGrpSpPr>
+      <p:grpSpPr>
+        <a:xfrm>
+          <a:off x="0" y="0"/>
+          <a:ext cx="0" cy="0"/>
+          <a:chOff x="0" y="0"/>
+          <a:chExt cx="0" cy="0"/>
+        </a:xfrm>
+      </p:grpSpPr>
+      <p:sp>
+        <p:nvSpPr>
+          <p:cNvPr id="3" name="Rectangle 2"/>
+          <p:cNvSpPr/>
+          <p:nvPr/>
+        </p:nvSpPr>
+        <p:spPr>
+          <a:xfrm>
+            <a:off x="251520" y="188640"/>
+            <a:ext cx="8640960" cy="4739759"/>
+          </a:xfrm>
+          <a:prstGeom prst="rect">
+            <a:avLst/>
+          </a:prstGeom>
+        </p:spPr>
+        <p:txBody>
+          <a:bodyPr wrap="square">
+            <a:spAutoFit/>
+          </a:bodyPr>
+          <a:lstStyle/>
+          <a:p>
+            <a:pPr lvl="0"/>
+            <a:r>
+              <a:rPr lang="ru-RU" sz="3200" dirty="0" smtClean="0">
+                <a:solidFill>
+                  <a:schemeClr val="bg1"/>
+                </a:solidFill>
+              </a:rPr>
+              <a:t>Литература</a:t>
+            </a:r>
+          </a:p>
+          <a:p>
+            <a:pPr lvl="0"/>
+            <a:endParaRPr lang="en-US" dirty="0" smtClean="0">
+              <a:solidFill>
+                <a:schemeClr val="bg1"/>
+              </a:solidFill>
+            </a:endParaRPr>
+          </a:p>
+          <a:p>
+            <a:pPr marL="285750" lvl="0" indent="-285750">
+              <a:buFont typeface="Arial" pitchFamily="34" charset="0"/>
+              <a:buChar char="•"/>
+            </a:pPr>
+            <a:r>
+              <a:rPr lang="ru-RU" dirty="0" smtClean="0">
+                <a:solidFill>
+                  <a:schemeClr val="bg1"/>
+                </a:solidFill>
+              </a:rPr>
+              <a:t>CLR </a:t>
+            </a:r>
+            <a:r>
+              <a:rPr lang="ru-RU" dirty="0">
+                <a:solidFill>
+                  <a:schemeClr val="bg1"/>
+                </a:solidFill>
+              </a:rPr>
+              <a:t>via C#. Программирование на платформе Microsoft .NET Framework 4.0 на языке C# (CLR via C#, Third Edition)</a:t>
+            </a:r>
+            <a:br>
+              <a:rPr lang="ru-RU" dirty="0">
+                <a:solidFill>
+                  <a:schemeClr val="bg1"/>
+                </a:solidFill>
+              </a:rPr>
+            </a:br>
+            <a:r>
+              <a:rPr lang="ru-RU" dirty="0">
+                <a:solidFill>
+                  <a:schemeClr val="bg1"/>
+                </a:solidFill>
+              </a:rPr>
+              <a:t>Джеффри Рихтер (Jeffrey Richter)</a:t>
+            </a:r>
+            <a:br>
+              <a:rPr lang="ru-RU" dirty="0">
+                <a:solidFill>
+                  <a:schemeClr val="bg1"/>
+                </a:solidFill>
+              </a:rPr>
+            </a:br>
+            <a:r>
+              <a:rPr lang="ru-RU" u="sng" dirty="0">
+                <a:solidFill>
+                  <a:schemeClr val="bg1"/>
+                </a:solidFill>
+              </a:rPr>
+              <a:t>http://</a:t>
+            </a:r>
+            <a:r>
+              <a:rPr lang="ru-RU" u="sng" dirty="0" smtClean="0">
+                <a:solidFill>
+                  <a:schemeClr val="bg1"/>
+                </a:solidFill>
+              </a:rPr>
+              <a:t>oz.by/books/more1028671.html</a:t>
+            </a:r>
+            <a:r>
+              <a:rPr lang="ru-RU" dirty="0">
+                <a:solidFill>
+                  <a:schemeClr val="bg1"/>
+                </a:solidFill>
+              </a:rPr>
+              <a:t/>
+            </a:r>
+            <a:br>
+              <a:rPr lang="ru-RU" dirty="0">
+                <a:solidFill>
+                  <a:schemeClr val="bg1"/>
+                </a:solidFill>
+              </a:rPr>
+            </a:br>
+            <a:r>
+              <a:rPr lang="ru-RU" u="sng" dirty="0">
+                <a:solidFill>
+                  <a:schemeClr val="bg1"/>
+                </a:solidFill>
+                <a:hlinkClick r:id="rId3"/>
+              </a:rPr>
+              <a:t>http</a:t>
+            </a:r>
+            <a:r>
+              <a:rPr lang="ru-RU" u="sng">
+                <a:solidFill>
+                  <a:schemeClr val="bg1"/>
+                </a:solidFill>
+                <a:hlinkClick r:id="rId3"/>
+              </a:rPr>
+              <a:t>://</a:t>
+            </a:r>
+            <a:r>
+              <a:rPr lang="ru-RU" u="sng" smtClean="0">
+                <a:solidFill>
+                  <a:schemeClr val="bg1"/>
+                </a:solidFill>
+                <a:hlinkClick r:id="rId3"/>
+              </a:rPr>
+              <a:t>www.microsoft.com/learning/en/us/book.aspx?ID=13874&amp;Locale=en-us</a:t>
+            </a:r>
+            <a:r>
+              <a:rPr lang="ru-RU" u="sng" dirty="0" smtClean="0">
+                <a:solidFill>
+                  <a:schemeClr val="bg1"/>
+                </a:solidFill>
+              </a:rPr>
+              <a:t/>
+            </a:r>
+            <a:br>
+              <a:rPr lang="ru-RU" u="sng" dirty="0" smtClean="0">
+                <a:solidFill>
+                  <a:schemeClr val="bg1"/>
+                </a:solidFill>
+              </a:rPr>
+            </a:br>
+            <a:endParaRPr lang="ru-RU" u="sng" dirty="0" smtClean="0">
+              <a:solidFill>
+                <a:schemeClr val="bg1"/>
+              </a:solidFill>
+            </a:endParaRPr>
+          </a:p>
+          <a:p>
+            <a:pPr marL="285750" lvl="0" indent="-285750">
+              <a:buFont typeface="Arial" pitchFamily="34" charset="0"/>
+              <a:buChar char="•"/>
+            </a:pPr>
+            <a:r>
+              <a:rPr lang="ru-RU" dirty="0" smtClean="0">
+                <a:solidFill>
+                  <a:schemeClr val="bg1"/>
+                </a:solidFill>
+              </a:rPr>
+              <a:t>Язык </a:t>
+            </a:r>
+            <a:r>
+              <a:rPr lang="ru-RU" dirty="0">
+                <a:solidFill>
+                  <a:schemeClr val="bg1"/>
+                </a:solidFill>
+              </a:rPr>
+              <a:t>программирования C# 2010 и платформа .NET </a:t>
+            </a:r>
+            <a:r>
+              <a:rPr lang="ru-RU" dirty="0" smtClean="0">
+                <a:solidFill>
+                  <a:schemeClr val="bg1"/>
+                </a:solidFill>
+              </a:rPr>
+              <a:t>4.0</a:t>
+            </a:r>
+            <a:br>
+              <a:rPr lang="ru-RU" dirty="0" smtClean="0">
+                <a:solidFill>
+                  <a:schemeClr val="bg1"/>
+                </a:solidFill>
+              </a:rPr>
+            </a:br>
+            <a:r>
+              <a:rPr lang="ru-RU" dirty="0" smtClean="0">
+                <a:solidFill>
+                  <a:schemeClr val="bg1"/>
+                </a:solidFill>
+              </a:rPr>
+              <a:t>Эндрю </a:t>
+            </a:r>
+            <a:r>
+              <a:rPr lang="ru-RU" dirty="0">
+                <a:solidFill>
+                  <a:schemeClr val="bg1"/>
+                </a:solidFill>
+              </a:rPr>
+              <a:t>Троелсен (Andrew </a:t>
+            </a:r>
+            <a:r>
+              <a:rPr lang="ru-RU" dirty="0" smtClean="0">
+                <a:solidFill>
+                  <a:schemeClr val="bg1"/>
+                </a:solidFill>
+              </a:rPr>
+              <a:t>Troelsen)</a:t>
+            </a:r>
+            <a:br>
+              <a:rPr lang="ru-RU" dirty="0" smtClean="0">
+                <a:solidFill>
+                  <a:schemeClr val="bg1"/>
+                </a:solidFill>
+              </a:rPr>
+            </a:br>
+            <a:r>
+              <a:rPr lang="ru-RU" u="sng" dirty="0" smtClean="0">
+                <a:solidFill>
+                  <a:schemeClr val="bg1"/>
+                </a:solidFill>
+              </a:rPr>
+              <a:t>http</a:t>
+            </a:r>
+            <a:r>
+              <a:rPr lang="ru-RU" u="sng" dirty="0">
+                <a:solidFill>
+                  <a:schemeClr val="bg1"/>
+                </a:solidFill>
+              </a:rPr>
+              <a:t>://oz.by/books/more10158206.html</a:t>
+            </a:r>
+            <a:r>
+              <a:rPr lang="ru-RU" dirty="0">
+                <a:solidFill>
+                  <a:schemeClr val="bg1"/>
+                </a:solidFill>
+              </a:rPr>
+              <a:t/>
+            </a:r>
+            <a:br>
+              <a:rPr lang="ru-RU" dirty="0">
+                <a:solidFill>
+                  <a:schemeClr val="bg1"/>
+                </a:solidFill>
+              </a:rPr>
+            </a:br>
+            <a:r>
+              <a:rPr lang="ru-RU" u="sng" dirty="0">
+                <a:solidFill>
+                  <a:schemeClr val="bg1"/>
+                </a:solidFill>
+              </a:rPr>
+              <a:t>http://</a:t>
+            </a:r>
+            <a:r>
+              <a:rPr lang="ru-RU" u="sng" dirty="0" smtClean="0">
+                <a:solidFill>
+                  <a:schemeClr val="bg1"/>
+                </a:solidFill>
+              </a:rPr>
+              <a:t>www.apress.com/9781430225492</a:t>
+            </a:r>
+            <a:br>
+              <a:rPr lang="ru-RU" u="sng" dirty="0" smtClean="0">
+                <a:solidFill>
+                  <a:schemeClr val="bg1"/>
+                </a:solidFill>
+              </a:rPr>
+            </a:br>
+            <a:endParaRPr lang="ru-RU" u="sng" dirty="0" smtClean="0">
+              <a:solidFill>
+                <a:schemeClr val="bg1"/>
+              </a:solidFill>
+            </a:endParaRPr>
+          </a:p>
+          <a:p>
+            <a:pPr marL="285750" lvl="0" indent="-285750">
+              <a:buFont typeface="Arial" pitchFamily="34" charset="0"/>
+              <a:buChar char="•"/>
+            </a:pPr>
+            <a:r>
+              <a:rPr lang="en-US" dirty="0" smtClean="0">
+                <a:solidFill>
+                  <a:schemeClr val="bg1"/>
+                </a:solidFill>
+              </a:rPr>
+              <a:t>C</a:t>
+            </a:r>
+            <a:r>
+              <a:rPr lang="en-US" dirty="0">
+                <a:solidFill>
+                  <a:schemeClr val="bg1"/>
+                </a:solidFill>
+              </a:rPr>
+              <a:t># Language </a:t>
+            </a:r>
+            <a:r>
+              <a:rPr lang="en-US" dirty="0" smtClean="0">
+                <a:solidFill>
+                  <a:schemeClr val="bg1"/>
+                </a:solidFill>
+              </a:rPr>
+              <a:t>Specification</a:t>
+            </a:r>
+            <a:r>
+              <a:rPr lang="ru-RU" dirty="0" smtClean="0">
+                <a:solidFill>
+                  <a:schemeClr val="bg1"/>
+                </a:solidFill>
+              </a:rPr>
+              <a:t/>
+            </a:r>
+            <a:br>
+              <a:rPr lang="ru-RU" dirty="0" smtClean="0">
+                <a:solidFill>
+                  <a:schemeClr val="bg1"/>
+                </a:solidFill>
+              </a:rPr>
+            </a:br>
+            <a:r>
+              <a:rPr lang="en-US" dirty="0" smtClean="0">
+                <a:solidFill>
+                  <a:schemeClr val="bg1"/>
+                </a:solidFill>
+              </a:rPr>
+              <a:t>"C</a:t>
+            </a:r>
+            <a:r>
+              <a:rPr lang="en-US" dirty="0">
+                <a:solidFill>
+                  <a:schemeClr val="bg1"/>
+                </a:solidFill>
+              </a:rPr>
+              <a:t>:\Program Files (x86)\Microsoft Visual Studio 11.0\VC#\Specifications\1033\ </a:t>
+            </a:r>
+            <a:r>
+              <a:rPr lang="en-US" dirty="0" err="1">
+                <a:solidFill>
+                  <a:schemeClr val="bg1"/>
+                </a:solidFill>
+              </a:rPr>
+              <a:t>CSharp</a:t>
+            </a:r>
+            <a:r>
+              <a:rPr lang="en-US" dirty="0">
+                <a:solidFill>
+                  <a:schemeClr val="bg1"/>
+                </a:solidFill>
+              </a:rPr>
+              <a:t> Language Specification.doc </a:t>
+            </a:r>
+            <a:r>
+              <a:rPr lang="en-US" dirty="0" smtClean="0">
+                <a:solidFill>
+                  <a:schemeClr val="bg1"/>
+                </a:solidFill>
+              </a:rPr>
+              <a:t>"</a:t>
+            </a:r>
+            <a:endParaRPr lang="en-US" dirty="0">
+              <a:solidFill>
+                <a:schemeClr val="bg1"/>
+              </a:solidFill>
+            </a:endParaRPr>
+          </a:p>
+        </p:txBody>
+      </p:sp>
+    </p:spTree>
+    <p:extLst>
+      <p:ext uri="{BB962C8B-B14F-4D97-AF65-F5344CB8AC3E}">
+        <p14:creationId xmlns:p14="http://schemas.microsoft.com/office/powerpoint/2010/main" val="3145694776"/>
+      </p:ext>
+    </p:extLst>
+  </p:cSld>
+  <p:clrMapOvr>
+    <a:masterClrMapping/>
+  </p:clrMapOvr>
+  <p:timing>
+    <p:tnLst>
+      <p:par>
+        <p:cTn id="1" dur="indefinite" restart="never" nodeType="tmRoot"/>
+      </p:par>
+    </p:tnLst>
+  </p:timing>
+</p:sld>
+</file>
+
+<file path=ppt/slides/slide20.xml><?xml version="1.0" encoding="utf-8"?>
 <p:sld xmlns:a="http://schemas.openxmlformats.org/drawingml/2006/main" xmlns:r="http://schemas.openxmlformats.org/officeDocument/2006/relationships" xmlns:p="http://schemas.openxmlformats.org/presentationml/2006/main">
   <p:cSld>
     <p:bg>
@@ -15818,438 +17076,7 @@
 </p:sld>
 </file>
 
-<file path=ppt/slides/slide2.xml><?xml version="1.0" encoding="utf-8"?>
-<p:sld xmlns:a="http://schemas.openxmlformats.org/drawingml/2006/main" xmlns:r="http://schemas.openxmlformats.org/officeDocument/2006/relationships" xmlns:p="http://schemas.openxmlformats.org/presentationml/2006/main">
-  <p:cSld>
-    <p:bg>
-      <p:bgPr>
-        <a:blipFill dpi="0" rotWithShape="1">
-          <a:blip r:embed="rId2">
-            <a:lum/>
-          </a:blip>
-          <a:srcRect/>
-          <a:stretch>
-            <a:fillRect/>
-          </a:stretch>
-        </a:blipFill>
-        <a:effectLst/>
-      </p:bgPr>
-    </p:bg>
-    <p:spTree>
-      <p:nvGrpSpPr>
-        <p:cNvPr id="1" name=""/>
-        <p:cNvGrpSpPr/>
-        <p:nvPr/>
-      </p:nvGrpSpPr>
-      <p:grpSpPr>
-        <a:xfrm>
-          <a:off x="0" y="0"/>
-          <a:ext cx="0" cy="0"/>
-          <a:chOff x="0" y="0"/>
-          <a:chExt cx="0" cy="0"/>
-        </a:xfrm>
-      </p:grpSpPr>
-      <p:sp>
-        <p:nvSpPr>
-          <p:cNvPr id="3" name="Rectangle 2"/>
-          <p:cNvSpPr/>
-          <p:nvPr/>
-        </p:nvSpPr>
-        <p:spPr>
-          <a:xfrm>
-            <a:off x="251520" y="188640"/>
-            <a:ext cx="8640960" cy="4739759"/>
-          </a:xfrm>
-          <a:prstGeom prst="rect">
-            <a:avLst/>
-          </a:prstGeom>
-        </p:spPr>
-        <p:txBody>
-          <a:bodyPr wrap="square">
-            <a:spAutoFit/>
-          </a:bodyPr>
-          <a:lstStyle/>
-          <a:p>
-            <a:pPr lvl="0"/>
-            <a:r>
-              <a:rPr lang="ru-RU" sz="3200" dirty="0" smtClean="0">
-                <a:solidFill>
-                  <a:schemeClr val="bg1"/>
-                </a:solidFill>
-              </a:rPr>
-              <a:t>Литература</a:t>
-            </a:r>
-          </a:p>
-          <a:p>
-            <a:pPr lvl="0"/>
-            <a:endParaRPr lang="en-US" dirty="0" smtClean="0">
-              <a:solidFill>
-                <a:schemeClr val="bg1"/>
-              </a:solidFill>
-            </a:endParaRPr>
-          </a:p>
-          <a:p>
-            <a:pPr marL="285750" lvl="0" indent="-285750">
-              <a:buFont typeface="Arial" pitchFamily="34" charset="0"/>
-              <a:buChar char="•"/>
-            </a:pPr>
-            <a:r>
-              <a:rPr lang="ru-RU" dirty="0" smtClean="0">
-                <a:solidFill>
-                  <a:schemeClr val="bg1"/>
-                </a:solidFill>
-              </a:rPr>
-              <a:t>CLR </a:t>
-            </a:r>
-            <a:r>
-              <a:rPr lang="ru-RU" dirty="0">
-                <a:solidFill>
-                  <a:schemeClr val="bg1"/>
-                </a:solidFill>
-              </a:rPr>
-              <a:t>via C#. Программирование на платформе Microsoft .NET Framework 4.0 на языке C# (CLR via C#, Third Edition)</a:t>
-            </a:r>
-            <a:br>
-              <a:rPr lang="ru-RU" dirty="0">
-                <a:solidFill>
-                  <a:schemeClr val="bg1"/>
-                </a:solidFill>
-              </a:rPr>
-            </a:br>
-            <a:r>
-              <a:rPr lang="ru-RU" dirty="0">
-                <a:solidFill>
-                  <a:schemeClr val="bg1"/>
-                </a:solidFill>
-              </a:rPr>
-              <a:t>Джеффри Рихтер (Jeffrey Richter)</a:t>
-            </a:r>
-            <a:br>
-              <a:rPr lang="ru-RU" dirty="0">
-                <a:solidFill>
-                  <a:schemeClr val="bg1"/>
-                </a:solidFill>
-              </a:rPr>
-            </a:br>
-            <a:r>
-              <a:rPr lang="ru-RU" u="sng" dirty="0">
-                <a:solidFill>
-                  <a:schemeClr val="bg1"/>
-                </a:solidFill>
-              </a:rPr>
-              <a:t>http://</a:t>
-            </a:r>
-            <a:r>
-              <a:rPr lang="ru-RU" u="sng" dirty="0" smtClean="0">
-                <a:solidFill>
-                  <a:schemeClr val="bg1"/>
-                </a:solidFill>
-              </a:rPr>
-              <a:t>oz.by/books/more1028671.html</a:t>
-            </a:r>
-            <a:r>
-              <a:rPr lang="ru-RU" dirty="0">
-                <a:solidFill>
-                  <a:schemeClr val="bg1"/>
-                </a:solidFill>
-              </a:rPr>
-              <a:t/>
-            </a:r>
-            <a:br>
-              <a:rPr lang="ru-RU" dirty="0">
-                <a:solidFill>
-                  <a:schemeClr val="bg1"/>
-                </a:solidFill>
-              </a:rPr>
-            </a:br>
-            <a:r>
-              <a:rPr lang="ru-RU" u="sng" dirty="0">
-                <a:solidFill>
-                  <a:schemeClr val="bg1"/>
-                </a:solidFill>
-                <a:hlinkClick r:id="rId3"/>
-              </a:rPr>
-              <a:t>http</a:t>
-            </a:r>
-            <a:r>
-              <a:rPr lang="ru-RU" u="sng">
-                <a:solidFill>
-                  <a:schemeClr val="bg1"/>
-                </a:solidFill>
-                <a:hlinkClick r:id="rId3"/>
-              </a:rPr>
-              <a:t>://</a:t>
-            </a:r>
-            <a:r>
-              <a:rPr lang="ru-RU" u="sng" smtClean="0">
-                <a:solidFill>
-                  <a:schemeClr val="bg1"/>
-                </a:solidFill>
-                <a:hlinkClick r:id="rId3"/>
-              </a:rPr>
-              <a:t>www.microsoft.com/learning/en/us/book.aspx?ID=13874&amp;Locale=en-us</a:t>
-            </a:r>
-            <a:r>
-              <a:rPr lang="ru-RU" u="sng" dirty="0" smtClean="0">
-                <a:solidFill>
-                  <a:schemeClr val="bg1"/>
-                </a:solidFill>
-              </a:rPr>
-              <a:t/>
-            </a:r>
-            <a:br>
-              <a:rPr lang="ru-RU" u="sng" dirty="0" smtClean="0">
-                <a:solidFill>
-                  <a:schemeClr val="bg1"/>
-                </a:solidFill>
-              </a:rPr>
-            </a:br>
-            <a:endParaRPr lang="ru-RU" u="sng" dirty="0" smtClean="0">
-              <a:solidFill>
-                <a:schemeClr val="bg1"/>
-              </a:solidFill>
-            </a:endParaRPr>
-          </a:p>
-          <a:p>
-            <a:pPr marL="285750" lvl="0" indent="-285750">
-              <a:buFont typeface="Arial" pitchFamily="34" charset="0"/>
-              <a:buChar char="•"/>
-            </a:pPr>
-            <a:r>
-              <a:rPr lang="ru-RU" dirty="0" smtClean="0">
-                <a:solidFill>
-                  <a:schemeClr val="bg1"/>
-                </a:solidFill>
-              </a:rPr>
-              <a:t>Язык </a:t>
-            </a:r>
-            <a:r>
-              <a:rPr lang="ru-RU" dirty="0">
-                <a:solidFill>
-                  <a:schemeClr val="bg1"/>
-                </a:solidFill>
-              </a:rPr>
-              <a:t>программирования C# 2010 и платформа .NET </a:t>
-            </a:r>
-            <a:r>
-              <a:rPr lang="ru-RU" dirty="0" smtClean="0">
-                <a:solidFill>
-                  <a:schemeClr val="bg1"/>
-                </a:solidFill>
-              </a:rPr>
-              <a:t>4.0</a:t>
-            </a:r>
-            <a:br>
-              <a:rPr lang="ru-RU" dirty="0" smtClean="0">
-                <a:solidFill>
-                  <a:schemeClr val="bg1"/>
-                </a:solidFill>
-              </a:rPr>
-            </a:br>
-            <a:r>
-              <a:rPr lang="ru-RU" dirty="0" smtClean="0">
-                <a:solidFill>
-                  <a:schemeClr val="bg1"/>
-                </a:solidFill>
-              </a:rPr>
-              <a:t>Эндрю </a:t>
-            </a:r>
-            <a:r>
-              <a:rPr lang="ru-RU" dirty="0">
-                <a:solidFill>
-                  <a:schemeClr val="bg1"/>
-                </a:solidFill>
-              </a:rPr>
-              <a:t>Троелсен (Andrew </a:t>
-            </a:r>
-            <a:r>
-              <a:rPr lang="ru-RU" dirty="0" smtClean="0">
-                <a:solidFill>
-                  <a:schemeClr val="bg1"/>
-                </a:solidFill>
-              </a:rPr>
-              <a:t>Troelsen)</a:t>
-            </a:r>
-            <a:br>
-              <a:rPr lang="ru-RU" dirty="0" smtClean="0">
-                <a:solidFill>
-                  <a:schemeClr val="bg1"/>
-                </a:solidFill>
-              </a:rPr>
-            </a:br>
-            <a:r>
-              <a:rPr lang="ru-RU" u="sng" dirty="0" smtClean="0">
-                <a:solidFill>
-                  <a:schemeClr val="bg1"/>
-                </a:solidFill>
-              </a:rPr>
-              <a:t>http</a:t>
-            </a:r>
-            <a:r>
-              <a:rPr lang="ru-RU" u="sng" dirty="0">
-                <a:solidFill>
-                  <a:schemeClr val="bg1"/>
-                </a:solidFill>
-              </a:rPr>
-              <a:t>://oz.by/books/more10158206.html</a:t>
-            </a:r>
-            <a:r>
-              <a:rPr lang="ru-RU" dirty="0">
-                <a:solidFill>
-                  <a:schemeClr val="bg1"/>
-                </a:solidFill>
-              </a:rPr>
-              <a:t/>
-            </a:r>
-            <a:br>
-              <a:rPr lang="ru-RU" dirty="0">
-                <a:solidFill>
-                  <a:schemeClr val="bg1"/>
-                </a:solidFill>
-              </a:rPr>
-            </a:br>
-            <a:r>
-              <a:rPr lang="ru-RU" u="sng" dirty="0">
-                <a:solidFill>
-                  <a:schemeClr val="bg1"/>
-                </a:solidFill>
-              </a:rPr>
-              <a:t>http://</a:t>
-            </a:r>
-            <a:r>
-              <a:rPr lang="ru-RU" u="sng" dirty="0" smtClean="0">
-                <a:solidFill>
-                  <a:schemeClr val="bg1"/>
-                </a:solidFill>
-              </a:rPr>
-              <a:t>www.apress.com/9781430225492</a:t>
-            </a:r>
-            <a:br>
-              <a:rPr lang="ru-RU" u="sng" dirty="0" smtClean="0">
-                <a:solidFill>
-                  <a:schemeClr val="bg1"/>
-                </a:solidFill>
-              </a:rPr>
-            </a:br>
-            <a:endParaRPr lang="ru-RU" u="sng" dirty="0" smtClean="0">
-              <a:solidFill>
-                <a:schemeClr val="bg1"/>
-              </a:solidFill>
-            </a:endParaRPr>
-          </a:p>
-          <a:p>
-            <a:pPr marL="285750" lvl="0" indent="-285750">
-              <a:buFont typeface="Arial" pitchFamily="34" charset="0"/>
-              <a:buChar char="•"/>
-            </a:pPr>
-            <a:r>
-              <a:rPr lang="en-US" dirty="0" smtClean="0">
-                <a:solidFill>
-                  <a:schemeClr val="bg1"/>
-                </a:solidFill>
-              </a:rPr>
-              <a:t>C</a:t>
-            </a:r>
-            <a:r>
-              <a:rPr lang="en-US" dirty="0">
-                <a:solidFill>
-                  <a:schemeClr val="bg1"/>
-                </a:solidFill>
-              </a:rPr>
-              <a:t># Language </a:t>
-            </a:r>
-            <a:r>
-              <a:rPr lang="en-US" dirty="0" smtClean="0">
-                <a:solidFill>
-                  <a:schemeClr val="bg1"/>
-                </a:solidFill>
-              </a:rPr>
-              <a:t>Specification</a:t>
-            </a:r>
-            <a:r>
-              <a:rPr lang="ru-RU" dirty="0" smtClean="0">
-                <a:solidFill>
-                  <a:schemeClr val="bg1"/>
-                </a:solidFill>
-              </a:rPr>
-              <a:t/>
-            </a:r>
-            <a:br>
-              <a:rPr lang="ru-RU" dirty="0" smtClean="0">
-                <a:solidFill>
-                  <a:schemeClr val="bg1"/>
-                </a:solidFill>
-              </a:rPr>
-            </a:br>
-            <a:r>
-              <a:rPr lang="en-US" dirty="0" smtClean="0">
-                <a:solidFill>
-                  <a:schemeClr val="bg1"/>
-                </a:solidFill>
-              </a:rPr>
-              <a:t>"C</a:t>
-            </a:r>
-            <a:r>
-              <a:rPr lang="en-US" dirty="0">
-                <a:solidFill>
-                  <a:schemeClr val="bg1"/>
-                </a:solidFill>
-              </a:rPr>
-              <a:t>:\Program Files (x86)\Microsoft Visual Studio 11.0\VC#\Specifications\1033\ </a:t>
-            </a:r>
-            <a:r>
-              <a:rPr lang="en-US" dirty="0" err="1">
-                <a:solidFill>
-                  <a:schemeClr val="bg1"/>
-                </a:solidFill>
-              </a:rPr>
-              <a:t>CSharp</a:t>
-            </a:r>
-            <a:r>
-              <a:rPr lang="en-US" dirty="0">
-                <a:solidFill>
-                  <a:schemeClr val="bg1"/>
-                </a:solidFill>
-              </a:rPr>
-              <a:t> Language Specification.doc </a:t>
-            </a:r>
-            <a:r>
-              <a:rPr lang="en-US" dirty="0" smtClean="0">
-                <a:solidFill>
-                  <a:schemeClr val="bg1"/>
-                </a:solidFill>
-              </a:rPr>
-              <a:t>"</a:t>
-            </a:r>
-            <a:endParaRPr lang="en-US" dirty="0">
-              <a:solidFill>
-                <a:schemeClr val="bg1"/>
-              </a:solidFill>
-            </a:endParaRPr>
-          </a:p>
-        </p:txBody>
-      </p:sp>
-    </p:spTree>
-    <p:extLst>
-      <p:ext uri="{BB962C8B-B14F-4D97-AF65-F5344CB8AC3E}">
-        <p14:creationId xmlns:p14="http://schemas.microsoft.com/office/powerpoint/2010/main" val="3145694776"/>
-      </p:ext>
-    </p:extLst>
-  </p:cSld>
-  <p:clrMapOvr>
-    <a:masterClrMapping/>
-  </p:clrMapOvr>
-  <p:timing>
-    <p:tnLst>
-      <p:par>
-        <p:cTn id="1" dur="indefinite" restart="never" nodeType="tmRoot"/>
-      </p:par>
-    </p:tnLst>
-  </p:timing>
-</p:sld>
-</file>
-
-<file path=ppt/slides/slide20.xml><?xml version="1.0" encoding="utf-8"?>
+<file path=ppt/slides/slide21.xml><?xml version="1.0" encoding="utf-8"?>
 <p:sld xmlns:a="http://schemas.openxmlformats.org/drawingml/2006/main" xmlns:r="http://schemas.openxmlformats.org/officeDocument/2006/relationships" xmlns:p="http://schemas.openxmlformats.org/presentationml/2006/main">
   <p:cSld>
     <p:bg>
@@ -17219,7 +18046,7 @@
 </p:sld>
 </file>
 
-<file path=ppt/slides/slide21.xml><?xml version="1.0" encoding="utf-8"?>
+<file path=ppt/slides/slide22.xml><?xml version="1.0" encoding="utf-8"?>
 <p:sld xmlns:a="http://schemas.openxmlformats.org/drawingml/2006/main" xmlns:r="http://schemas.openxmlformats.org/officeDocument/2006/relationships" xmlns:p="http://schemas.openxmlformats.org/presentationml/2006/main">
   <p:cSld>
     <p:bg>
@@ -18326,7 +19153,7 @@
 </p:sld>
 </file>
 
-<file path=ppt/slides/slide22.xml><?xml version="1.0" encoding="utf-8"?>
+<file path=ppt/slides/slide23.xml><?xml version="1.0" encoding="utf-8"?>
 <p:sld xmlns:a="http://schemas.openxmlformats.org/drawingml/2006/main" xmlns:r="http://schemas.openxmlformats.org/officeDocument/2006/relationships" xmlns:p="http://schemas.openxmlformats.org/presentationml/2006/main">
   <p:cSld>
     <p:bg>
@@ -20737,7 +21564,7 @@
 </p:sld>
 </file>
 
-<file path=ppt/slides/slide23.xml><?xml version="1.0" encoding="utf-8"?>
+<file path=ppt/slides/slide24.xml><?xml version="1.0" encoding="utf-8"?>
 <p:sld xmlns:a="http://schemas.openxmlformats.org/drawingml/2006/main" xmlns:r="http://schemas.openxmlformats.org/officeDocument/2006/relationships" xmlns:p="http://schemas.openxmlformats.org/presentationml/2006/main">
   <p:cSld>
     <p:bg>
@@ -21738,7 +22565,7 @@
 </p:sld>
 </file>
 
-<file path=ppt/slides/slide24.xml><?xml version="1.0" encoding="utf-8"?>
+<file path=ppt/slides/slide25.xml><?xml version="1.0" encoding="utf-8"?>
 <p:sld xmlns:a="http://schemas.openxmlformats.org/drawingml/2006/main" xmlns:r="http://schemas.openxmlformats.org/officeDocument/2006/relationships" xmlns:p="http://schemas.openxmlformats.org/presentationml/2006/main">
   <p:cSld>
     <p:bg>
@@ -22007,7 +22834,7 @@
 </p:sld>
 </file>
 
-<file path=ppt/slides/slide25.xml><?xml version="1.0" encoding="utf-8"?>
+<file path=ppt/slides/slide26.xml><?xml version="1.0" encoding="utf-8"?>
 <p:sld xmlns:a="http://schemas.openxmlformats.org/drawingml/2006/main" xmlns:r="http://schemas.openxmlformats.org/officeDocument/2006/relationships" xmlns:p="http://schemas.openxmlformats.org/presentationml/2006/main">
   <p:cSld>
     <p:bg>
@@ -23239,7 +24066,7 @@
 </p:sld>
 </file>
 
-<file path=ppt/slides/slide26.xml><?xml version="1.0" encoding="utf-8"?>
+<file path=ppt/slides/slide27.xml><?xml version="1.0" encoding="utf-8"?>
 <p:sld xmlns:a="http://schemas.openxmlformats.org/drawingml/2006/main" xmlns:r="http://schemas.openxmlformats.org/officeDocument/2006/relationships" xmlns:p="http://schemas.openxmlformats.org/presentationml/2006/main">
   <p:cSld>
     <p:bg>
@@ -24441,7 +25268,7 @@
 </p:sld>
 </file>
 
-<file path=ppt/slides/slide27.xml><?xml version="1.0" encoding="utf-8"?>
+<file path=ppt/slides/slide28.xml><?xml version="1.0" encoding="utf-8"?>
 <p:sld xmlns:a="http://schemas.openxmlformats.org/drawingml/2006/main" xmlns:r="http://schemas.openxmlformats.org/officeDocument/2006/relationships" xmlns:p="http://schemas.openxmlformats.org/presentationml/2006/main">
   <p:cSld>
     <p:bg>
@@ -25507,7 +26334,7 @@
 </p:sld>
 </file>
 
-<file path=ppt/slides/slide28.xml><?xml version="1.0" encoding="utf-8"?>
+<file path=ppt/slides/slide29.xml><?xml version="1.0" encoding="utf-8"?>
 <p:sld xmlns:a="http://schemas.openxmlformats.org/drawingml/2006/main" xmlns:r="http://schemas.openxmlformats.org/officeDocument/2006/relationships" xmlns:p="http://schemas.openxmlformats.org/presentationml/2006/main">
   <p:cSld>
     <p:bg>
@@ -26494,8 +27321,8 @@
         </p:nvSpPr>
         <p:spPr>
           <a:xfrm>
-            <a:off x="251520" y="188640"/>
-            <a:ext cx="8640960" cy="4185761"/>
+            <a:off x="251520" y="3136613"/>
+            <a:ext cx="8640960" cy="584775"/>
           </a:xfrm>
           <a:prstGeom prst="rect">
             <a:avLst/>
@@ -26507,322 +27334,16 @@
           </a:bodyPr>
           <a:lstStyle/>
           <a:p>
-            <a:pPr lvl="0"/>
-            <a:r>
-              <a:rPr lang="en-US" sz="3200" dirty="0" smtClean="0">
-                <a:solidFill>
-                  <a:schemeClr val="bg1"/>
-                </a:solidFill>
-              </a:rPr>
-              <a:t>Visual Studio</a:t>
-            </a:r>
-            <a:endParaRPr lang="ru-RU" sz="3200" dirty="0" smtClean="0">
-              <a:solidFill>
-                <a:schemeClr val="bg1"/>
-              </a:solidFill>
-            </a:endParaRPr>
-          </a:p>
-          <a:p>
-            <a:pPr lvl="0"/>
-            <a:endParaRPr lang="ru-RU" dirty="0" smtClean="0">
-              <a:solidFill>
-                <a:schemeClr val="bg1"/>
-              </a:solidFill>
-            </a:endParaRPr>
-          </a:p>
-          <a:p>
-            <a:r>
-              <a:rPr lang="en-US" dirty="0" smtClean="0">
-                <a:solidFill>
-                  <a:schemeClr val="bg1"/>
-                </a:solidFill>
-              </a:rPr>
-              <a:t>IDE – Integrated Development Environment</a:t>
-            </a:r>
-            <a:endParaRPr lang="ru-RU" dirty="0" smtClean="0">
-              <a:solidFill>
-                <a:schemeClr val="bg1"/>
-              </a:solidFill>
-            </a:endParaRPr>
-          </a:p>
-          <a:p>
-            <a:endParaRPr lang="ru-RU" dirty="0">
-              <a:solidFill>
-                <a:schemeClr val="bg1"/>
-              </a:solidFill>
-            </a:endParaRPr>
-          </a:p>
-          <a:p>
-            <a:r>
-              <a:rPr lang="en-US" dirty="0" smtClean="0">
-                <a:solidFill>
-                  <a:schemeClr val="bg1"/>
-                </a:solidFill>
-              </a:rPr>
-              <a:t>Visual Studio 2010, </a:t>
-            </a:r>
-            <a:r>
-              <a:rPr lang="ru-RU" dirty="0" smtClean="0">
-                <a:solidFill>
-                  <a:schemeClr val="bg1"/>
-                </a:solidFill>
-              </a:rPr>
-              <a:t>скоро </a:t>
-            </a:r>
-            <a:r>
-              <a:rPr lang="ru-RU" dirty="0">
-                <a:solidFill>
-                  <a:schemeClr val="bg1"/>
-                </a:solidFill>
-              </a:rPr>
-              <a:t>выйдет</a:t>
-            </a:r>
-            <a:r>
-              <a:rPr lang="en-US" dirty="0">
-                <a:solidFill>
-                  <a:schemeClr val="bg1"/>
-                </a:solidFill>
-              </a:rPr>
-              <a:t> 2012</a:t>
-            </a:r>
-            <a:br>
-              <a:rPr lang="en-US" dirty="0">
-                <a:solidFill>
-                  <a:schemeClr val="bg1"/>
-                </a:solidFill>
-              </a:rPr>
-            </a:br>
-            <a:r>
-              <a:rPr lang="en-US" u="sng" dirty="0">
-                <a:solidFill>
-                  <a:schemeClr val="bg1"/>
-                </a:solidFill>
-              </a:rPr>
-              <a:t>http://</a:t>
-            </a:r>
-            <a:r>
-              <a:rPr lang="en-US" u="sng" dirty="0" smtClean="0">
-                <a:solidFill>
-                  <a:schemeClr val="bg1"/>
-                </a:solidFill>
-              </a:rPr>
-              <a:t>www.microsoft.com/visualstudio/ru-ru/products/2010-editions/express</a:t>
-            </a:r>
-          </a:p>
-          <a:p>
-            <a:endParaRPr lang="en-US" dirty="0" smtClean="0">
-              <a:solidFill>
-                <a:schemeClr val="bg1"/>
-              </a:solidFill>
-            </a:endParaRPr>
-          </a:p>
-          <a:p>
-            <a:r>
-              <a:rPr lang="ru-RU" dirty="0" smtClean="0">
-                <a:solidFill>
-                  <a:schemeClr val="bg1"/>
-                </a:solidFill>
-              </a:rPr>
-              <a:t>Редакции</a:t>
-            </a:r>
-            <a:r>
-              <a:rPr lang="en-US" dirty="0" smtClean="0">
-                <a:solidFill>
-                  <a:schemeClr val="bg1"/>
-                </a:solidFill>
-              </a:rPr>
-              <a:t>: Express </a:t>
-            </a:r>
-            <a:r>
-              <a:rPr lang="ru-RU" dirty="0">
-                <a:solidFill>
-                  <a:schemeClr val="bg1"/>
-                </a:solidFill>
-              </a:rPr>
-              <a:t>(бесплатная</a:t>
-            </a:r>
-            <a:r>
-              <a:rPr lang="en-US" dirty="0" smtClean="0">
-                <a:solidFill>
-                  <a:schemeClr val="bg1"/>
-                </a:solidFill>
-              </a:rPr>
-              <a:t>), Professional, Premium, Ultimate.</a:t>
-            </a:r>
-            <a:endParaRPr lang="ru-RU" dirty="0">
-              <a:solidFill>
-                <a:schemeClr val="bg1"/>
-              </a:solidFill>
-            </a:endParaRPr>
-          </a:p>
-          <a:p>
-            <a:endParaRPr lang="en-US" dirty="0">
-              <a:solidFill>
-                <a:schemeClr val="bg1"/>
-              </a:solidFill>
-            </a:endParaRPr>
-          </a:p>
-          <a:p>
-            <a:r>
-              <a:rPr lang="ru-RU" dirty="0">
-                <a:solidFill>
-                  <a:schemeClr val="bg1"/>
-                </a:solidFill>
-              </a:rPr>
-              <a:t>Расширения для </a:t>
-            </a:r>
-            <a:r>
-              <a:rPr lang="en-US" dirty="0">
-                <a:solidFill>
-                  <a:schemeClr val="bg1"/>
-                </a:solidFill>
-              </a:rPr>
-              <a:t>V</a:t>
-            </a:r>
-            <a:r>
-              <a:rPr lang="ru-RU" dirty="0">
-                <a:solidFill>
-                  <a:schemeClr val="bg1"/>
-                </a:solidFill>
-              </a:rPr>
-              <a:t>isual </a:t>
-            </a:r>
-            <a:r>
-              <a:rPr lang="en-US" dirty="0">
-                <a:solidFill>
-                  <a:schemeClr val="bg1"/>
-                </a:solidFill>
-              </a:rPr>
-              <a:t>Studio</a:t>
-            </a:r>
-            <a:r>
-              <a:rPr lang="ru-RU" dirty="0">
-                <a:solidFill>
-                  <a:schemeClr val="bg1"/>
-                </a:solidFill>
-              </a:rPr>
-              <a:t/>
-            </a:r>
-            <a:br>
-              <a:rPr lang="ru-RU" dirty="0">
-                <a:solidFill>
-                  <a:schemeClr val="bg1"/>
-                </a:solidFill>
-              </a:rPr>
-            </a:br>
-            <a:r>
-              <a:rPr lang="en-US" u="sng" dirty="0">
-                <a:solidFill>
-                  <a:schemeClr val="bg1"/>
-                </a:solidFill>
-              </a:rPr>
-              <a:t>http</a:t>
-            </a:r>
-            <a:r>
-              <a:rPr lang="ru-RU" u="sng" dirty="0">
-                <a:solidFill>
-                  <a:schemeClr val="bg1"/>
-                </a:solidFill>
-              </a:rPr>
-              <a:t>://</a:t>
-            </a:r>
-            <a:r>
-              <a:rPr lang="en-US" u="sng" dirty="0" err="1">
-                <a:solidFill>
-                  <a:schemeClr val="bg1"/>
-                </a:solidFill>
-              </a:rPr>
-              <a:t>visualstudiogallery</a:t>
-            </a:r>
-            <a:r>
-              <a:rPr lang="ru-RU" u="sng" dirty="0">
-                <a:solidFill>
-                  <a:schemeClr val="bg1"/>
-                </a:solidFill>
-              </a:rPr>
-              <a:t>.</a:t>
-            </a:r>
-            <a:r>
-              <a:rPr lang="en-US" u="sng" dirty="0" err="1">
-                <a:solidFill>
-                  <a:schemeClr val="bg1"/>
-                </a:solidFill>
-              </a:rPr>
-              <a:t>msdn</a:t>
-            </a:r>
-            <a:r>
-              <a:rPr lang="ru-RU" u="sng" dirty="0">
-                <a:solidFill>
-                  <a:schemeClr val="bg1"/>
-                </a:solidFill>
-              </a:rPr>
-              <a:t>.</a:t>
-            </a:r>
-            <a:r>
-              <a:rPr lang="en-US" u="sng" dirty="0" err="1">
-                <a:solidFill>
-                  <a:schemeClr val="bg1"/>
-                </a:solidFill>
-              </a:rPr>
-              <a:t>microsoft</a:t>
-            </a:r>
-            <a:r>
-              <a:rPr lang="ru-RU" u="sng" dirty="0">
-                <a:solidFill>
-                  <a:schemeClr val="bg1"/>
-                </a:solidFill>
-              </a:rPr>
-              <a:t>.</a:t>
-            </a:r>
-            <a:r>
-              <a:rPr lang="en-US" u="sng" dirty="0">
-                <a:solidFill>
-                  <a:schemeClr val="bg1"/>
-                </a:solidFill>
-              </a:rPr>
-              <a:t>com</a:t>
-            </a:r>
-            <a:r>
-              <a:rPr lang="ru-RU" u="sng" dirty="0">
-                <a:solidFill>
-                  <a:schemeClr val="bg1"/>
-                </a:solidFill>
-              </a:rPr>
-              <a:t>/</a:t>
-            </a:r>
-          </a:p>
-          <a:p>
-            <a:endParaRPr lang="en-US" dirty="0">
-              <a:solidFill>
-                <a:schemeClr val="bg1"/>
-              </a:solidFill>
-            </a:endParaRPr>
-          </a:p>
-          <a:p>
-            <a:r>
-              <a:rPr lang="en-US" dirty="0">
-                <a:solidFill>
-                  <a:schemeClr val="bg1"/>
-                </a:solidFill>
-              </a:rPr>
-              <a:t>ReSharper - </a:t>
-            </a:r>
-            <a:r>
-              <a:rPr lang="en-US" u="sng" dirty="0">
-                <a:solidFill>
-                  <a:schemeClr val="bg1"/>
-                </a:solidFill>
-              </a:rPr>
-              <a:t>http://www.jetbrains.com/resharper/</a:t>
-            </a:r>
-            <a:endParaRPr lang="en-US" dirty="0">
-              <a:solidFill>
-                <a:schemeClr val="bg1"/>
-              </a:solidFill>
-            </a:endParaRPr>
-          </a:p>
-          <a:p>
-            <a:endParaRPr lang="en-US" dirty="0" smtClean="0">
+            <a:pPr lvl="0" algn="ctr"/>
+            <a:r>
+              <a:rPr lang="en-US" sz="3200" dirty="0">
+                <a:solidFill>
+                  <a:schemeClr val="bg1"/>
+                </a:solidFill>
+              </a:rPr>
+              <a:t>https://github.com/bazile/Training</a:t>
+            </a:r>
+            <a:endParaRPr lang="en-US" sz="3200" dirty="0" smtClean="0">
               <a:solidFill>
                 <a:schemeClr val="bg1"/>
               </a:solidFill>
@@ -26833,7 +27354,7 @@
     </p:spTree>
     <p:extLst>
       <p:ext uri="{BB962C8B-B14F-4D97-AF65-F5344CB8AC3E}">
-        <p14:creationId xmlns:p14="http://schemas.microsoft.com/office/powerpoint/2010/main" val="2029492004"/>
+        <p14:creationId xmlns:p14="http://schemas.microsoft.com/office/powerpoint/2010/main" val="844996974"/>
       </p:ext>
     </p:extLst>
   </p:cSld>
@@ -26890,7 +27411,7 @@
         <p:spPr>
           <a:xfrm>
             <a:off x="251520" y="188640"/>
-            <a:ext cx="8640960" cy="1138773"/>
+            <a:ext cx="8640960" cy="4185761"/>
           </a:xfrm>
           <a:prstGeom prst="rect">
             <a:avLst/>
@@ -26909,7 +27430,7 @@
                   <a:schemeClr val="bg1"/>
                 </a:solidFill>
               </a:rPr>
-              <a:t>.NET Framework – Managed platform</a:t>
+              <a:t>Visual Studio</a:t>
             </a:r>
             <a:endParaRPr lang="ru-RU" sz="3200" dirty="0" smtClean="0">
               <a:solidFill>
@@ -26926,6 +27447,297 @@
             </a:endParaRPr>
           </a:p>
           <a:p>
+            <a:r>
+              <a:rPr lang="en-US" dirty="0" smtClean="0">
+                <a:solidFill>
+                  <a:schemeClr val="bg1"/>
+                </a:solidFill>
+              </a:rPr>
+              <a:t>IDE – Integrated Development Environment</a:t>
+            </a:r>
+            <a:endParaRPr lang="ru-RU" dirty="0" smtClean="0">
+              <a:solidFill>
+                <a:schemeClr val="bg1"/>
+              </a:solidFill>
+            </a:endParaRPr>
+          </a:p>
+          <a:p>
+            <a:endParaRPr lang="ru-RU" dirty="0">
+              <a:solidFill>
+                <a:schemeClr val="bg1"/>
+              </a:solidFill>
+            </a:endParaRPr>
+          </a:p>
+          <a:p>
+            <a:r>
+              <a:rPr lang="en-US" dirty="0" smtClean="0">
+                <a:solidFill>
+                  <a:schemeClr val="bg1"/>
+                </a:solidFill>
+              </a:rPr>
+              <a:t>Visual Studio 2010, </a:t>
+            </a:r>
+            <a:r>
+              <a:rPr lang="ru-RU" dirty="0" smtClean="0">
+                <a:solidFill>
+                  <a:schemeClr val="bg1"/>
+                </a:solidFill>
+              </a:rPr>
+              <a:t>скоро </a:t>
+            </a:r>
+            <a:r>
+              <a:rPr lang="ru-RU" dirty="0">
+                <a:solidFill>
+                  <a:schemeClr val="bg1"/>
+                </a:solidFill>
+              </a:rPr>
+              <a:t>выйдет</a:t>
+            </a:r>
+            <a:r>
+              <a:rPr lang="en-US" dirty="0">
+                <a:solidFill>
+                  <a:schemeClr val="bg1"/>
+                </a:solidFill>
+              </a:rPr>
+              <a:t> 2012</a:t>
+            </a:r>
+            <a:br>
+              <a:rPr lang="en-US" dirty="0">
+                <a:solidFill>
+                  <a:schemeClr val="bg1"/>
+                </a:solidFill>
+              </a:rPr>
+            </a:br>
+            <a:r>
+              <a:rPr lang="en-US" u="sng" dirty="0">
+                <a:solidFill>
+                  <a:schemeClr val="bg1"/>
+                </a:solidFill>
+              </a:rPr>
+              <a:t>http://</a:t>
+            </a:r>
+            <a:r>
+              <a:rPr lang="en-US" u="sng" dirty="0" smtClean="0">
+                <a:solidFill>
+                  <a:schemeClr val="bg1"/>
+                </a:solidFill>
+              </a:rPr>
+              <a:t>www.microsoft.com/visualstudio/ru-ru/products/2010-editions/express</a:t>
+            </a:r>
+          </a:p>
+          <a:p>
+            <a:endParaRPr lang="en-US" dirty="0" smtClean="0">
+              <a:solidFill>
+                <a:schemeClr val="bg1"/>
+              </a:solidFill>
+            </a:endParaRPr>
+          </a:p>
+          <a:p>
+            <a:r>
+              <a:rPr lang="ru-RU" dirty="0" smtClean="0">
+                <a:solidFill>
+                  <a:schemeClr val="bg1"/>
+                </a:solidFill>
+              </a:rPr>
+              <a:t>Редакции</a:t>
+            </a:r>
+            <a:r>
+              <a:rPr lang="en-US" dirty="0" smtClean="0">
+                <a:solidFill>
+                  <a:schemeClr val="bg1"/>
+                </a:solidFill>
+              </a:rPr>
+              <a:t>: Express </a:t>
+            </a:r>
+            <a:r>
+              <a:rPr lang="ru-RU" dirty="0">
+                <a:solidFill>
+                  <a:schemeClr val="bg1"/>
+                </a:solidFill>
+              </a:rPr>
+              <a:t>(бесплатная</a:t>
+            </a:r>
+            <a:r>
+              <a:rPr lang="en-US" dirty="0" smtClean="0">
+                <a:solidFill>
+                  <a:schemeClr val="bg1"/>
+                </a:solidFill>
+              </a:rPr>
+              <a:t>), Professional, Premium, Ultimate.</a:t>
+            </a:r>
+            <a:endParaRPr lang="ru-RU" dirty="0">
+              <a:solidFill>
+                <a:schemeClr val="bg1"/>
+              </a:solidFill>
+            </a:endParaRPr>
+          </a:p>
+          <a:p>
+            <a:endParaRPr lang="en-US" dirty="0">
+              <a:solidFill>
+                <a:schemeClr val="bg1"/>
+              </a:solidFill>
+            </a:endParaRPr>
+          </a:p>
+          <a:p>
+            <a:r>
+              <a:rPr lang="ru-RU" dirty="0">
+                <a:solidFill>
+                  <a:schemeClr val="bg1"/>
+                </a:solidFill>
+              </a:rPr>
+              <a:t>Расширения для </a:t>
+            </a:r>
+            <a:r>
+              <a:rPr lang="en-US" dirty="0">
+                <a:solidFill>
+                  <a:schemeClr val="bg1"/>
+                </a:solidFill>
+              </a:rPr>
+              <a:t>V</a:t>
+            </a:r>
+            <a:r>
+              <a:rPr lang="ru-RU" dirty="0">
+                <a:solidFill>
+                  <a:schemeClr val="bg1"/>
+                </a:solidFill>
+              </a:rPr>
+              <a:t>isual </a:t>
+            </a:r>
+            <a:r>
+              <a:rPr lang="en-US" dirty="0">
+                <a:solidFill>
+                  <a:schemeClr val="bg1"/>
+                </a:solidFill>
+              </a:rPr>
+              <a:t>Studio</a:t>
+            </a:r>
+            <a:r>
+              <a:rPr lang="ru-RU" dirty="0">
+                <a:solidFill>
+                  <a:schemeClr val="bg1"/>
+                </a:solidFill>
+              </a:rPr>
+              <a:t/>
+            </a:r>
+            <a:br>
+              <a:rPr lang="ru-RU" dirty="0">
+                <a:solidFill>
+                  <a:schemeClr val="bg1"/>
+                </a:solidFill>
+              </a:rPr>
+            </a:br>
+            <a:r>
+              <a:rPr lang="en-US" u="sng" dirty="0">
+                <a:solidFill>
+                  <a:schemeClr val="bg1"/>
+                </a:solidFill>
+              </a:rPr>
+              <a:t>http</a:t>
+            </a:r>
+            <a:r>
+              <a:rPr lang="ru-RU" u="sng" dirty="0">
+                <a:solidFill>
+                  <a:schemeClr val="bg1"/>
+                </a:solidFill>
+              </a:rPr>
+              <a:t>://</a:t>
+            </a:r>
+            <a:r>
+              <a:rPr lang="en-US" u="sng" dirty="0" err="1">
+                <a:solidFill>
+                  <a:schemeClr val="bg1"/>
+                </a:solidFill>
+              </a:rPr>
+              <a:t>visualstudiogallery</a:t>
+            </a:r>
+            <a:r>
+              <a:rPr lang="ru-RU" u="sng" dirty="0">
+                <a:solidFill>
+                  <a:schemeClr val="bg1"/>
+                </a:solidFill>
+              </a:rPr>
+              <a:t>.</a:t>
+            </a:r>
+            <a:r>
+              <a:rPr lang="en-US" u="sng" dirty="0" err="1">
+                <a:solidFill>
+                  <a:schemeClr val="bg1"/>
+                </a:solidFill>
+              </a:rPr>
+              <a:t>msdn</a:t>
+            </a:r>
+            <a:r>
+              <a:rPr lang="ru-RU" u="sng" dirty="0">
+                <a:solidFill>
+                  <a:schemeClr val="bg1"/>
+                </a:solidFill>
+              </a:rPr>
+              <a:t>.</a:t>
+            </a:r>
+            <a:r>
+              <a:rPr lang="en-US" u="sng" dirty="0" err="1">
+                <a:solidFill>
+                  <a:schemeClr val="bg1"/>
+                </a:solidFill>
+              </a:rPr>
+              <a:t>microsoft</a:t>
+            </a:r>
+            <a:r>
+              <a:rPr lang="ru-RU" u="sng" dirty="0">
+                <a:solidFill>
+                  <a:schemeClr val="bg1"/>
+                </a:solidFill>
+              </a:rPr>
+              <a:t>.</a:t>
+            </a:r>
+            <a:r>
+              <a:rPr lang="en-US" u="sng" dirty="0">
+                <a:solidFill>
+                  <a:schemeClr val="bg1"/>
+                </a:solidFill>
+              </a:rPr>
+              <a:t>com</a:t>
+            </a:r>
+            <a:r>
+              <a:rPr lang="ru-RU" u="sng" dirty="0">
+                <a:solidFill>
+                  <a:schemeClr val="bg1"/>
+                </a:solidFill>
+              </a:rPr>
+              <a:t>/</a:t>
+            </a:r>
+          </a:p>
+          <a:p>
+            <a:endParaRPr lang="en-US" dirty="0">
+              <a:solidFill>
+                <a:schemeClr val="bg1"/>
+              </a:solidFill>
+            </a:endParaRPr>
+          </a:p>
+          <a:p>
+            <a:r>
+              <a:rPr lang="en-US" dirty="0">
+                <a:solidFill>
+                  <a:schemeClr val="bg1"/>
+                </a:solidFill>
+              </a:rPr>
+              <a:t>ReSharper - </a:t>
+            </a:r>
+            <a:r>
+              <a:rPr lang="en-US" u="sng" dirty="0">
+                <a:solidFill>
+                  <a:schemeClr val="bg1"/>
+                </a:solidFill>
+              </a:rPr>
+              <a:t>http://www.jetbrains.com/resharper/</a:t>
+            </a:r>
+            <a:endParaRPr lang="en-US" dirty="0">
+              <a:solidFill>
+                <a:schemeClr val="bg1"/>
+              </a:solidFill>
+            </a:endParaRPr>
+          </a:p>
+          <a:p>
             <a:endParaRPr lang="en-US" dirty="0" smtClean="0">
               <a:solidFill>
                 <a:schemeClr val="bg1"/>
@@ -26934,43 +27746,10 @@
           </a:p>
         </p:txBody>
       </p:sp>
-      <p:pic>
-        <p:nvPicPr>
-          <p:cNvPr id="4" name="Picture 3" descr="Managed code within a larger architecture"/>
-          <p:cNvPicPr/>
-          <p:nvPr/>
-        </p:nvPicPr>
-        <p:blipFill>
-          <a:blip r:embed="rId3">
-            <a:extLst>
-              <a:ext uri="{28A0092B-C50C-407E-A947-70E740481C1C}">
-                <a14:useLocalDpi xmlns:a14="http://schemas.microsoft.com/office/drawing/2010/main" val="0"/>
-              </a:ext>
-            </a:extLst>
-          </a:blip>
-          <a:srcRect/>
-          <a:stretch>
-            <a:fillRect/>
-          </a:stretch>
-        </p:blipFill>
-        <p:spPr bwMode="auto">
-          <a:xfrm>
-            <a:off x="2147887" y="1359120"/>
-            <a:ext cx="4848225" cy="4448175"/>
-          </a:xfrm>
-          <a:prstGeom prst="rect">
-            <a:avLst/>
-          </a:prstGeom>
-          <a:noFill/>
-          <a:ln>
-            <a:noFill/>
-          </a:ln>
-        </p:spPr>
-      </p:pic>
     </p:spTree>
     <p:extLst>
       <p:ext uri="{BB962C8B-B14F-4D97-AF65-F5344CB8AC3E}">
-        <p14:creationId xmlns:p14="http://schemas.microsoft.com/office/powerpoint/2010/main" val="1986342191"/>
+        <p14:creationId xmlns:p14="http://schemas.microsoft.com/office/powerpoint/2010/main" val="2029492004"/>
       </p:ext>
     </p:extLst>
   </p:cSld>
@@ -27046,6 +27825,143 @@
                   <a:schemeClr val="bg1"/>
                 </a:solidFill>
               </a:rPr>
+              <a:t>.NET Framework – Managed platform</a:t>
+            </a:r>
+            <a:endParaRPr lang="ru-RU" sz="3200" dirty="0" smtClean="0">
+              <a:solidFill>
+                <a:schemeClr val="bg1"/>
+              </a:solidFill>
+            </a:endParaRPr>
+          </a:p>
+          <a:p>
+            <a:pPr lvl="0"/>
+            <a:endParaRPr lang="ru-RU" dirty="0" smtClean="0">
+              <a:solidFill>
+                <a:schemeClr val="bg1"/>
+              </a:solidFill>
+            </a:endParaRPr>
+          </a:p>
+          <a:p>
+            <a:endParaRPr lang="en-US" dirty="0" smtClean="0">
+              <a:solidFill>
+                <a:schemeClr val="bg1"/>
+              </a:solidFill>
+            </a:endParaRPr>
+          </a:p>
+        </p:txBody>
+      </p:sp>
+      <p:pic>
+        <p:nvPicPr>
+          <p:cNvPr id="4" name="Picture 3" descr="Managed code within a larger architecture"/>
+          <p:cNvPicPr/>
+          <p:nvPr/>
+        </p:nvPicPr>
+        <p:blipFill>
+          <a:blip r:embed="rId3">
+            <a:extLst>
+              <a:ext uri="{28A0092B-C50C-407E-A947-70E740481C1C}">
+                <a14:useLocalDpi xmlns:a14="http://schemas.microsoft.com/office/drawing/2010/main" val="0"/>
+              </a:ext>
+            </a:extLst>
+          </a:blip>
+          <a:srcRect/>
+          <a:stretch>
+            <a:fillRect/>
+          </a:stretch>
+        </p:blipFill>
+        <p:spPr bwMode="auto">
+          <a:xfrm>
+            <a:off x="2147887" y="1359120"/>
+            <a:ext cx="4848225" cy="4448175"/>
+          </a:xfrm>
+          <a:prstGeom prst="rect">
+            <a:avLst/>
+          </a:prstGeom>
+          <a:noFill/>
+          <a:ln>
+            <a:noFill/>
+          </a:ln>
+        </p:spPr>
+      </p:pic>
+    </p:spTree>
+    <p:extLst>
+      <p:ext uri="{BB962C8B-B14F-4D97-AF65-F5344CB8AC3E}">
+        <p14:creationId xmlns:p14="http://schemas.microsoft.com/office/powerpoint/2010/main" val="1986342191"/>
+      </p:ext>
+    </p:extLst>
+  </p:cSld>
+  <p:clrMapOvr>
+    <a:masterClrMapping/>
+  </p:clrMapOvr>
+  <p:timing>
+    <p:tnLst>
+      <p:par>
+        <p:cTn id="1" dur="indefinite" restart="never" nodeType="tmRoot"/>
+      </p:par>
+    </p:tnLst>
+  </p:timing>
+</p:sld>
+</file>
+
+<file path=ppt/slides/slide7.xml><?xml version="1.0" encoding="utf-8"?>
+<p:sld xmlns:a="http://schemas.openxmlformats.org/drawingml/2006/main" xmlns:r="http://schemas.openxmlformats.org/officeDocument/2006/relationships" xmlns:p="http://schemas.openxmlformats.org/presentationml/2006/main">
+  <p:cSld>
+    <p:bg>
+      <p:bgPr>
+        <a:blipFill dpi="0" rotWithShape="1">
+          <a:blip r:embed="rId2">
+            <a:lum/>
+          </a:blip>
+          <a:srcRect/>
+          <a:stretch>
+            <a:fillRect/>
+          </a:stretch>
+        </a:blipFill>
+        <a:effectLst/>
+      </p:bgPr>
+    </p:bg>
+    <p:spTree>
+      <p:nvGrpSpPr>
+        <p:cNvPr id="1" name=""/>
+        <p:cNvGrpSpPr/>
+        <p:nvPr/>
+      </p:nvGrpSpPr>
+      <p:grpSpPr>
+        <a:xfrm>
+          <a:off x="0" y="0"/>
+          <a:ext cx="0" cy="0"/>
+          <a:chOff x="0" y="0"/>
+          <a:chExt cx="0" cy="0"/>
+        </a:xfrm>
+      </p:grpSpPr>
+      <p:sp>
+        <p:nvSpPr>
+          <p:cNvPr id="3" name="Rectangle 2"/>
+          <p:cNvSpPr/>
+          <p:nvPr/>
+        </p:nvSpPr>
+        <p:spPr>
+          <a:xfrm>
+            <a:off x="251520" y="188640"/>
+            <a:ext cx="8640960" cy="1138773"/>
+          </a:xfrm>
+          <a:prstGeom prst="rect">
+            <a:avLst/>
+          </a:prstGeom>
+        </p:spPr>
+        <p:txBody>
+          <a:bodyPr wrap="square">
+            <a:spAutoFit/>
+          </a:bodyPr>
+          <a:lstStyle/>
+          <a:p>
+            <a:pPr lvl="0"/>
+            <a:r>
+              <a:rPr lang="en-US" sz="3200" dirty="0" smtClean="0">
+                <a:solidFill>
+                  <a:schemeClr val="bg1"/>
+                </a:solidFill>
+              </a:rPr>
               <a:t>.NET Framework</a:t>
             </a:r>
             <a:endParaRPr lang="ru-RU" sz="3200" dirty="0" smtClean="0">
@@ -27124,7 +28040,7 @@
 </p:sld>
 </file>
 
-<file path=ppt/slides/slide7.xml><?xml version="1.0" encoding="utf-8"?>
+<file path=ppt/slides/slide8.xml><?xml version="1.0" encoding="utf-8"?>
 <p:sld xmlns:a="http://schemas.openxmlformats.org/drawingml/2006/main" xmlns:r="http://schemas.openxmlformats.org/officeDocument/2006/relationships" xmlns:p="http://schemas.openxmlformats.org/presentationml/2006/main">
   <p:cSld>
     <p:bg>
@@ -27481,7 +28397,7 @@
 </p:sld>
 </file>
 
-<file path=ppt/slides/slide8.xml><?xml version="1.0" encoding="utf-8"?>
+<file path=ppt/slides/slide9.xml><?xml version="1.0" encoding="utf-8"?>
 <p:sld xmlns:a="http://schemas.openxmlformats.org/drawingml/2006/main" xmlns:r="http://schemas.openxmlformats.org/officeDocument/2006/relationships" xmlns:p="http://schemas.openxmlformats.org/presentationml/2006/main">
   <p:cSld>
     <p:bg>
@@ -27568,853 +28484,6 @@
     <p:extLst>
       <p:ext uri="{BB962C8B-B14F-4D97-AF65-F5344CB8AC3E}">
         <p14:creationId xmlns:p14="http://schemas.microsoft.com/office/powerpoint/2010/main" val="3778786220"/>
-      </p:ext>
-    </p:extLst>
-  </p:cSld>
-  <p:clrMapOvr>
-    <a:masterClrMapping/>
-  </p:clrMapOvr>
-  <p:timing>
-    <p:tnLst>
-      <p:par>
-        <p:cTn id="1" dur="indefinite" restart="never" nodeType="tmRoot"/>
-      </p:par>
-    </p:tnLst>
-  </p:timing>
-</p:sld>
-</file>
-
-<file path=ppt/slides/slide9.xml><?xml version="1.0" encoding="utf-8"?>
-<p:sld xmlns:a="http://schemas.openxmlformats.org/drawingml/2006/main" xmlns:r="http://schemas.openxmlformats.org/officeDocument/2006/relationships" xmlns:p="http://schemas.openxmlformats.org/presentationml/2006/main">
-  <p:cSld>
-    <p:bg>
-      <p:bgPr>
-        <a:blipFill dpi="0" rotWithShape="1">
-          <a:blip r:embed="rId2">
-            <a:lum/>
-          </a:blip>
-          <a:srcRect/>
-          <a:stretch>
-            <a:fillRect/>
-          </a:stretch>
-        </a:blipFill>
-        <a:effectLst/>
-      </p:bgPr>
-    </p:bg>
-    <p:spTree>
-      <p:nvGrpSpPr>
-        <p:cNvPr id="1" name=""/>
-        <p:cNvGrpSpPr/>
-        <p:nvPr/>
-      </p:nvGrpSpPr>
-      <p:grpSpPr>
-        <a:xfrm>
-          <a:off x="0" y="0"/>
-          <a:ext cx="0" cy="0"/>
-          <a:chOff x="0" y="0"/>
-          <a:chExt cx="0" cy="0"/>
-        </a:xfrm>
-      </p:grpSpPr>
-      <p:sp>
-        <p:nvSpPr>
-          <p:cNvPr id="4" name="Прямоугольник 13"/>
-          <p:cNvSpPr/>
-          <p:nvPr/>
-        </p:nvSpPr>
-        <p:spPr>
-          <a:xfrm>
-            <a:off x="3429000" y="914400"/>
-            <a:ext cx="1905000" cy="457200"/>
-          </a:xfrm>
-          <a:prstGeom prst="rect">
-            <a:avLst/>
-          </a:prstGeom>
-        </p:spPr>
-        <p:style>
-          <a:lnRef idx="1">
-            <a:schemeClr val="accent1"/>
-          </a:lnRef>
-          <a:fillRef idx="2">
-            <a:schemeClr val="accent1"/>
-          </a:fillRef>
-          <a:effectRef idx="1">
-            <a:schemeClr val="accent1"/>
-          </a:effectRef>
-          <a:fontRef idx="minor">
-            <a:schemeClr val="dk1"/>
-          </a:fontRef>
-        </p:style>
-        <p:txBody>
-          <a:bodyPr anchor="ctr"/>
-          <a:lstStyle/>
-          <a:p>
-            <a:pPr algn="ctr" fontAlgn="auto">
-              <a:spcBef>
-                <a:spcPts val="0"/>
-              </a:spcBef>
-              <a:spcAft>
-                <a:spcPts val="0"/>
-              </a:spcAft>
-              <a:defRPr/>
-            </a:pPr>
-            <a:r>
-              <a:rPr lang="ru-RU" dirty="0"/>
-              <a:t>Код</a:t>
-            </a:r>
-          </a:p>
-        </p:txBody>
-      </p:sp>
-      <p:sp>
-        <p:nvSpPr>
-          <p:cNvPr id="5" name="Прямоугольник 14"/>
-          <p:cNvSpPr/>
-          <p:nvPr/>
-        </p:nvSpPr>
-        <p:spPr>
-          <a:xfrm>
-            <a:off x="3048000" y="1981200"/>
-            <a:ext cx="2743200" cy="762000"/>
-          </a:xfrm>
-          <a:prstGeom prst="rect">
-            <a:avLst/>
-          </a:prstGeom>
-        </p:spPr>
-        <p:style>
-          <a:lnRef idx="1">
-            <a:schemeClr val="accent2"/>
-          </a:lnRef>
-          <a:fillRef idx="2">
-            <a:schemeClr val="accent2"/>
-          </a:fillRef>
-          <a:effectRef idx="1">
-            <a:schemeClr val="accent2"/>
-          </a:effectRef>
-          <a:fontRef idx="minor">
-            <a:schemeClr val="dk1"/>
-          </a:fontRef>
-        </p:style>
-        <p:txBody>
-          <a:bodyPr anchor="ctr"/>
-          <a:lstStyle/>
-          <a:p>
-            <a:pPr algn="ctr" fontAlgn="auto">
-              <a:spcBef>
-                <a:spcPts val="0"/>
-              </a:spcBef>
-              <a:spcAft>
-                <a:spcPts val="0"/>
-              </a:spcAft>
-              <a:defRPr/>
-            </a:pPr>
-            <a:r>
-              <a:rPr lang="en-US" dirty="0"/>
-              <a:t>JIT</a:t>
-            </a:r>
-          </a:p>
-          <a:p>
-            <a:pPr algn="ctr" fontAlgn="auto">
-              <a:spcBef>
-                <a:spcPts val="0"/>
-              </a:spcBef>
-              <a:spcAft>
-                <a:spcPts val="0"/>
-              </a:spcAft>
-              <a:defRPr/>
-            </a:pPr>
-            <a:r>
-              <a:rPr lang="en-US" dirty="0"/>
-              <a:t>Just In Time - </a:t>
-            </a:r>
-            <a:r>
-              <a:rPr lang="ru-RU" dirty="0"/>
-              <a:t>компилятор</a:t>
-            </a:r>
-          </a:p>
-        </p:txBody>
-      </p:sp>
-      <p:sp>
-        <p:nvSpPr>
-          <p:cNvPr id="6" name="Прямоугольник 19"/>
-          <p:cNvSpPr/>
-          <p:nvPr/>
-        </p:nvSpPr>
-        <p:spPr>
-          <a:xfrm>
-            <a:off x="1981200" y="3581400"/>
-            <a:ext cx="2286000" cy="2286000"/>
-          </a:xfrm>
-          <a:prstGeom prst="rect">
-            <a:avLst/>
-          </a:prstGeom>
-        </p:spPr>
-        <p:style>
-          <a:lnRef idx="1">
-            <a:schemeClr val="dk1"/>
-          </a:lnRef>
-          <a:fillRef idx="2">
-            <a:schemeClr val="dk1"/>
-          </a:fillRef>
-          <a:effectRef idx="1">
-            <a:schemeClr val="dk1"/>
-          </a:effectRef>
-          <a:fontRef idx="minor">
-            <a:schemeClr val="dk1"/>
-          </a:fontRef>
-        </p:style>
-        <p:txBody>
-          <a:bodyPr anchor="ctr"/>
-          <a:lstStyle/>
-          <a:p>
-            <a:pPr algn="ctr">
-              <a:defRPr/>
-            </a:pPr>
-            <a:r>
-              <a:rPr lang="ru-RU">
-                <a:solidFill>
-                  <a:srgbClr val="000000"/>
-                </a:solidFill>
-              </a:rPr>
-              <a:t>Сборка</a:t>
-            </a:r>
-          </a:p>
-          <a:p>
-            <a:pPr algn="ctr">
-              <a:defRPr/>
-            </a:pPr>
-            <a:r>
-              <a:rPr lang="ru-RU" sz="1600">
-                <a:solidFill>
-                  <a:srgbClr val="000000"/>
-                </a:solidFill>
-              </a:rPr>
-              <a:t>(Исполняемый файл)</a:t>
-            </a:r>
-          </a:p>
-          <a:p>
-            <a:pPr algn="ctr">
-              <a:defRPr/>
-            </a:pPr>
-            <a:endParaRPr lang="ru-RU" sz="1600">
-              <a:solidFill>
-                <a:srgbClr val="000000"/>
-              </a:solidFill>
-            </a:endParaRPr>
-          </a:p>
-          <a:p>
-            <a:pPr algn="ctr">
-              <a:defRPr/>
-            </a:pPr>
-            <a:endParaRPr lang="ru-RU">
-              <a:solidFill>
-                <a:srgbClr val="000000"/>
-              </a:solidFill>
-            </a:endParaRPr>
-          </a:p>
-          <a:p>
-            <a:pPr algn="ctr">
-              <a:defRPr/>
-            </a:pPr>
-            <a:endParaRPr lang="ru-RU">
-              <a:solidFill>
-                <a:srgbClr val="000000"/>
-              </a:solidFill>
-            </a:endParaRPr>
-          </a:p>
-          <a:p>
-            <a:pPr algn="ctr">
-              <a:defRPr/>
-            </a:pPr>
-            <a:endParaRPr lang="ru-RU">
-              <a:solidFill>
-                <a:srgbClr val="000000"/>
-              </a:solidFill>
-            </a:endParaRPr>
-          </a:p>
-          <a:p>
-            <a:pPr algn="ctr">
-              <a:defRPr/>
-            </a:pPr>
-            <a:endParaRPr lang="ru-RU">
-              <a:solidFill>
-                <a:srgbClr val="000000"/>
-              </a:solidFill>
-            </a:endParaRPr>
-          </a:p>
-          <a:p>
-            <a:pPr algn="ctr">
-              <a:defRPr/>
-            </a:pPr>
-            <a:endParaRPr lang="ru-RU">
-              <a:solidFill>
-                <a:srgbClr val="000000"/>
-              </a:solidFill>
-            </a:endParaRPr>
-          </a:p>
-        </p:txBody>
-      </p:sp>
-      <p:sp>
-        <p:nvSpPr>
-          <p:cNvPr id="7" name="Прямоугольник 20"/>
-          <p:cNvSpPr/>
-          <p:nvPr/>
-        </p:nvSpPr>
-        <p:spPr>
-          <a:xfrm>
-            <a:off x="2057400" y="5334000"/>
-            <a:ext cx="2133600" cy="457200"/>
-          </a:xfrm>
-          <a:prstGeom prst="rect">
-            <a:avLst/>
-          </a:prstGeom>
-        </p:spPr>
-        <p:style>
-          <a:lnRef idx="1">
-            <a:schemeClr val="accent1"/>
-          </a:lnRef>
-          <a:fillRef idx="2">
-            <a:schemeClr val="accent1"/>
-          </a:fillRef>
-          <a:effectRef idx="1">
-            <a:schemeClr val="accent1"/>
-          </a:effectRef>
-          <a:fontRef idx="minor">
-            <a:schemeClr val="dk1"/>
-          </a:fontRef>
-        </p:style>
-        <p:txBody>
-          <a:bodyPr anchor="ctr"/>
-          <a:lstStyle/>
-          <a:p>
-            <a:pPr algn="ctr" fontAlgn="auto">
-              <a:spcBef>
-                <a:spcPts val="0"/>
-              </a:spcBef>
-              <a:spcAft>
-                <a:spcPts val="0"/>
-              </a:spcAft>
-              <a:defRPr/>
-            </a:pPr>
-            <a:r>
-              <a:rPr lang="en-US" dirty="0"/>
-              <a:t>CIL - </a:t>
-            </a:r>
-            <a:r>
-              <a:rPr lang="ru-RU" dirty="0"/>
-              <a:t>Код</a:t>
-            </a:r>
-          </a:p>
-        </p:txBody>
-      </p:sp>
-      <p:sp>
-        <p:nvSpPr>
-          <p:cNvPr id="8" name="Прямоугольник 8"/>
-          <p:cNvSpPr/>
-          <p:nvPr/>
-        </p:nvSpPr>
-        <p:spPr>
-          <a:xfrm>
-            <a:off x="2057400" y="4267200"/>
-            <a:ext cx="2133600" cy="457200"/>
-          </a:xfrm>
-          <a:prstGeom prst="rect">
-            <a:avLst/>
-          </a:prstGeom>
-        </p:spPr>
-        <p:style>
-          <a:lnRef idx="1">
-            <a:schemeClr val="accent4"/>
-          </a:lnRef>
-          <a:fillRef idx="2">
-            <a:schemeClr val="accent4"/>
-          </a:fillRef>
-          <a:effectRef idx="1">
-            <a:schemeClr val="accent4"/>
-          </a:effectRef>
-          <a:fontRef idx="minor">
-            <a:schemeClr val="dk1"/>
-          </a:fontRef>
-        </p:style>
-        <p:txBody>
-          <a:bodyPr anchor="ctr"/>
-          <a:lstStyle/>
-          <a:p>
-            <a:pPr algn="ctr" fontAlgn="auto">
-              <a:spcBef>
-                <a:spcPts val="0"/>
-              </a:spcBef>
-              <a:spcAft>
-                <a:spcPts val="0"/>
-              </a:spcAft>
-              <a:defRPr/>
-            </a:pPr>
-            <a:r>
-              <a:rPr lang="ru-RU" dirty="0"/>
-              <a:t>Манифест</a:t>
-            </a:r>
-          </a:p>
-        </p:txBody>
-      </p:sp>
-      <p:sp>
-        <p:nvSpPr>
-          <p:cNvPr id="9" name="Прямоугольник 9"/>
-          <p:cNvSpPr/>
-          <p:nvPr/>
-        </p:nvSpPr>
-        <p:spPr>
-          <a:xfrm>
-            <a:off x="2057400" y="4800600"/>
-            <a:ext cx="2133600" cy="457200"/>
-          </a:xfrm>
-          <a:prstGeom prst="rect">
-            <a:avLst/>
-          </a:prstGeom>
-        </p:spPr>
-        <p:style>
-          <a:lnRef idx="1">
-            <a:schemeClr val="accent3"/>
-          </a:lnRef>
-          <a:fillRef idx="2">
-            <a:schemeClr val="accent3"/>
-          </a:fillRef>
-          <a:effectRef idx="1">
-            <a:schemeClr val="accent3"/>
-          </a:effectRef>
-          <a:fontRef idx="minor">
-            <a:schemeClr val="dk1"/>
-          </a:fontRef>
-        </p:style>
-        <p:txBody>
-          <a:bodyPr anchor="ctr"/>
-          <a:lstStyle/>
-          <a:p>
-            <a:pPr algn="ctr" fontAlgn="auto">
-              <a:spcBef>
-                <a:spcPts val="0"/>
-              </a:spcBef>
-              <a:spcAft>
-                <a:spcPts val="0"/>
-              </a:spcAft>
-              <a:defRPr/>
-            </a:pPr>
-            <a:r>
-              <a:rPr lang="ru-RU" dirty="0"/>
-              <a:t>Метаданные</a:t>
-            </a:r>
-          </a:p>
-        </p:txBody>
-      </p:sp>
-      <p:sp>
-        <p:nvSpPr>
-          <p:cNvPr id="10" name="Прямоугольник 11"/>
-          <p:cNvSpPr/>
-          <p:nvPr/>
-        </p:nvSpPr>
-        <p:spPr>
-          <a:xfrm>
-            <a:off x="4572000" y="3581400"/>
-            <a:ext cx="2286000" cy="1676400"/>
-          </a:xfrm>
-          <a:prstGeom prst="rect">
-            <a:avLst/>
-          </a:prstGeom>
-        </p:spPr>
-        <p:style>
-          <a:lnRef idx="1">
-            <a:schemeClr val="dk1"/>
-          </a:lnRef>
-          <a:fillRef idx="2">
-            <a:schemeClr val="dk1"/>
-          </a:fillRef>
-          <a:effectRef idx="1">
-            <a:schemeClr val="dk1"/>
-          </a:effectRef>
-          <a:fontRef idx="minor">
-            <a:schemeClr val="dk1"/>
-          </a:fontRef>
-        </p:style>
-        <p:txBody>
-          <a:bodyPr anchor="ctr"/>
-          <a:lstStyle/>
-          <a:p>
-            <a:pPr algn="ctr" fontAlgn="auto">
-              <a:spcBef>
-                <a:spcPts val="0"/>
-              </a:spcBef>
-              <a:spcAft>
-                <a:spcPts val="0"/>
-              </a:spcAft>
-              <a:defRPr/>
-            </a:pPr>
-            <a:r>
-              <a:rPr lang="ru-RU" dirty="0"/>
-              <a:t>Сборка</a:t>
-            </a:r>
-          </a:p>
-          <a:p>
-            <a:pPr algn="ctr" fontAlgn="auto">
-              <a:spcBef>
-                <a:spcPts val="0"/>
-              </a:spcBef>
-              <a:spcAft>
-                <a:spcPts val="0"/>
-              </a:spcAft>
-              <a:defRPr/>
-            </a:pPr>
-            <a:r>
-              <a:rPr lang="ru-RU" dirty="0"/>
-              <a:t>(Библиотека .</a:t>
-            </a:r>
-            <a:r>
-              <a:rPr lang="en-US" dirty="0" err="1"/>
-              <a:t>dll</a:t>
-            </a:r>
-            <a:r>
-              <a:rPr lang="ru-RU" dirty="0"/>
-              <a:t>)</a:t>
-            </a:r>
-          </a:p>
-          <a:p>
-            <a:pPr algn="ctr" fontAlgn="auto">
-              <a:spcBef>
-                <a:spcPts val="0"/>
-              </a:spcBef>
-              <a:spcAft>
-                <a:spcPts val="0"/>
-              </a:spcAft>
-              <a:defRPr/>
-            </a:pPr>
-            <a:endParaRPr lang="ru-RU" dirty="0"/>
-          </a:p>
-          <a:p>
-            <a:pPr algn="ctr" fontAlgn="auto">
-              <a:spcBef>
-                <a:spcPts val="0"/>
-              </a:spcBef>
-              <a:spcAft>
-                <a:spcPts val="0"/>
-              </a:spcAft>
-              <a:defRPr/>
-            </a:pPr>
-            <a:endParaRPr lang="ru-RU" dirty="0"/>
-          </a:p>
-          <a:p>
-            <a:pPr algn="ctr" fontAlgn="auto">
-              <a:spcBef>
-                <a:spcPts val="0"/>
-              </a:spcBef>
-              <a:spcAft>
-                <a:spcPts val="0"/>
-              </a:spcAft>
-              <a:defRPr/>
-            </a:pPr>
-            <a:endParaRPr lang="ru-RU" dirty="0"/>
-          </a:p>
-          <a:p>
-            <a:pPr algn="ctr" fontAlgn="auto">
-              <a:spcBef>
-                <a:spcPts val="0"/>
-              </a:spcBef>
-              <a:spcAft>
-                <a:spcPts val="0"/>
-              </a:spcAft>
-              <a:defRPr/>
-            </a:pPr>
-            <a:endParaRPr lang="ru-RU" dirty="0"/>
-          </a:p>
-        </p:txBody>
-      </p:sp>
-      <p:sp>
-        <p:nvSpPr>
-          <p:cNvPr id="11" name="Прямоугольник 12"/>
-          <p:cNvSpPr/>
-          <p:nvPr/>
-        </p:nvSpPr>
-        <p:spPr>
-          <a:xfrm>
-            <a:off x="4648200" y="4724400"/>
-            <a:ext cx="2133600" cy="457200"/>
-          </a:xfrm>
-          <a:prstGeom prst="rect">
-            <a:avLst/>
-          </a:prstGeom>
-        </p:spPr>
-        <p:style>
-          <a:lnRef idx="1">
-            <a:schemeClr val="accent1"/>
-          </a:lnRef>
-          <a:fillRef idx="2">
-            <a:schemeClr val="accent1"/>
-          </a:fillRef>
-          <a:effectRef idx="1">
-            <a:schemeClr val="accent1"/>
-          </a:effectRef>
-          <a:fontRef idx="minor">
-            <a:schemeClr val="dk1"/>
-          </a:fontRef>
-        </p:style>
-        <p:txBody>
-          <a:bodyPr anchor="ctr"/>
-          <a:lstStyle/>
-          <a:p>
-            <a:pPr algn="ctr" fontAlgn="auto">
-              <a:spcBef>
-                <a:spcPts val="0"/>
-              </a:spcBef>
-              <a:spcAft>
-                <a:spcPts val="0"/>
-              </a:spcAft>
-              <a:defRPr/>
-            </a:pPr>
-            <a:r>
-              <a:rPr lang="en-US" dirty="0"/>
-              <a:t>CIL - </a:t>
-            </a:r>
-            <a:r>
-              <a:rPr lang="ru-RU" dirty="0"/>
-              <a:t>Код</a:t>
-            </a:r>
-          </a:p>
-        </p:txBody>
-      </p:sp>
-      <p:sp>
-        <p:nvSpPr>
-          <p:cNvPr id="12" name="Прямоугольник 15"/>
-          <p:cNvSpPr/>
-          <p:nvPr/>
-        </p:nvSpPr>
-        <p:spPr>
-          <a:xfrm>
-            <a:off x="4648200" y="4191000"/>
-            <a:ext cx="2133600" cy="457200"/>
-          </a:xfrm>
-          <a:prstGeom prst="rect">
-            <a:avLst/>
-          </a:prstGeom>
-        </p:spPr>
-        <p:style>
-          <a:lnRef idx="1">
-            <a:schemeClr val="accent3"/>
-          </a:lnRef>
-          <a:fillRef idx="2">
-            <a:schemeClr val="accent3"/>
-          </a:fillRef>
-          <a:effectRef idx="1">
-            <a:schemeClr val="accent3"/>
-          </a:effectRef>
-          <a:fontRef idx="minor">
-            <a:schemeClr val="dk1"/>
-          </a:fontRef>
-        </p:style>
-        <p:txBody>
-          <a:bodyPr anchor="ctr"/>
-          <a:lstStyle/>
-          <a:p>
-            <a:pPr algn="ctr" fontAlgn="auto">
-              <a:spcBef>
-                <a:spcPts val="0"/>
-              </a:spcBef>
-              <a:spcAft>
-                <a:spcPts val="0"/>
-              </a:spcAft>
-              <a:defRPr/>
-            </a:pPr>
-            <a:r>
-              <a:rPr lang="ru-RU" dirty="0"/>
-              <a:t>Метаданные</a:t>
-            </a:r>
-          </a:p>
-        </p:txBody>
-      </p:sp>
-      <p:sp>
-        <p:nvSpPr>
-          <p:cNvPr id="13" name="Стрелка вниз 16"/>
-          <p:cNvSpPr/>
-          <p:nvPr/>
-        </p:nvSpPr>
-        <p:spPr>
-          <a:xfrm>
-            <a:off x="3733800" y="1371600"/>
-            <a:ext cx="1295400" cy="609600"/>
-          </a:xfrm>
-          <a:prstGeom prst="downArrow">
-            <a:avLst>
-              <a:gd name="adj1" fmla="val 48588"/>
-              <a:gd name="adj2" fmla="val 50000"/>
-            </a:avLst>
-          </a:prstGeom>
-        </p:spPr>
-        <p:style>
-          <a:lnRef idx="1">
-            <a:schemeClr val="dk1"/>
-          </a:lnRef>
-          <a:fillRef idx="2">
-            <a:schemeClr val="dk1"/>
-          </a:fillRef>
-          <a:effectRef idx="1">
-            <a:schemeClr val="dk1"/>
-          </a:effectRef>
-          <a:fontRef idx="minor">
-            <a:schemeClr val="dk1"/>
-          </a:fontRef>
-        </p:style>
-        <p:txBody>
-          <a:bodyPr anchor="ctr"/>
-          <a:lstStyle/>
-          <a:p>
-            <a:pPr algn="ctr" fontAlgn="auto">
-              <a:spcBef>
-                <a:spcPts val="0"/>
-              </a:spcBef>
-              <a:spcAft>
-                <a:spcPts val="0"/>
-              </a:spcAft>
-              <a:defRPr/>
-            </a:pPr>
-            <a:endParaRPr lang="ru-RU"/>
-          </a:p>
-        </p:txBody>
-      </p:sp>
-      <p:sp>
-        <p:nvSpPr>
-          <p:cNvPr id="14" name="Стрелка вниз 21"/>
-          <p:cNvSpPr/>
-          <p:nvPr/>
-        </p:nvSpPr>
-        <p:spPr>
-          <a:xfrm>
-            <a:off x="2743200" y="2743200"/>
-            <a:ext cx="1295400" cy="838200"/>
-          </a:xfrm>
-          <a:prstGeom prst="downArrow">
-            <a:avLst>
-              <a:gd name="adj1" fmla="val 48588"/>
-              <a:gd name="adj2" fmla="val 50000"/>
-            </a:avLst>
-          </a:prstGeom>
-        </p:spPr>
-        <p:style>
-          <a:lnRef idx="1">
-            <a:schemeClr val="dk1"/>
-          </a:lnRef>
-          <a:fillRef idx="2">
-            <a:schemeClr val="dk1"/>
-          </a:fillRef>
-          <a:effectRef idx="1">
-            <a:schemeClr val="dk1"/>
-          </a:effectRef>
-          <a:fontRef idx="minor">
-            <a:schemeClr val="dk1"/>
-          </a:fontRef>
-        </p:style>
-        <p:txBody>
-          <a:bodyPr anchor="ctr"/>
-          <a:lstStyle/>
-          <a:p>
-            <a:pPr algn="ctr" fontAlgn="auto">
-              <a:spcBef>
-                <a:spcPts val="0"/>
-              </a:spcBef>
-              <a:spcAft>
-                <a:spcPts val="0"/>
-              </a:spcAft>
-              <a:defRPr/>
-            </a:pPr>
-            <a:endParaRPr lang="ru-RU"/>
-          </a:p>
-        </p:txBody>
-      </p:sp>
-      <p:sp>
-        <p:nvSpPr>
-          <p:cNvPr id="15" name="Стрелка вниз 22"/>
-          <p:cNvSpPr/>
-          <p:nvPr/>
-        </p:nvSpPr>
-        <p:spPr>
-          <a:xfrm>
-            <a:off x="4800600" y="2743200"/>
-            <a:ext cx="1295400" cy="838200"/>
-          </a:xfrm>
-          <a:prstGeom prst="downArrow">
-            <a:avLst>
-              <a:gd name="adj1" fmla="val 48588"/>
-              <a:gd name="adj2" fmla="val 50000"/>
-            </a:avLst>
-          </a:prstGeom>
-        </p:spPr>
-        <p:style>
-          <a:lnRef idx="1">
-            <a:schemeClr val="dk1"/>
-          </a:lnRef>
-          <a:fillRef idx="2">
-            <a:schemeClr val="dk1"/>
-          </a:fillRef>
-          <a:effectRef idx="1">
-            <a:schemeClr val="dk1"/>
-          </a:effectRef>
-          <a:fontRef idx="minor">
-            <a:schemeClr val="dk1"/>
-          </a:fontRef>
-        </p:style>
-        <p:txBody>
-          <a:bodyPr anchor="ctr"/>
-          <a:lstStyle/>
-          <a:p>
-            <a:pPr algn="ctr" fontAlgn="auto">
-              <a:spcBef>
-                <a:spcPts val="0"/>
-              </a:spcBef>
-              <a:spcAft>
-                <a:spcPts val="0"/>
-              </a:spcAft>
-              <a:defRPr/>
-            </a:pPr>
-            <a:endParaRPr lang="ru-RU"/>
-          </a:p>
-        </p:txBody>
-      </p:sp>
-      <p:sp>
-        <p:nvSpPr>
-          <p:cNvPr id="2" name="TextBox 1"/>
-          <p:cNvSpPr txBox="1"/>
-          <p:nvPr/>
-        </p:nvSpPr>
-        <p:spPr>
-          <a:xfrm>
-            <a:off x="2520800" y="252492"/>
-            <a:ext cx="3672408" cy="461665"/>
-          </a:xfrm>
-          <a:prstGeom prst="rect">
-            <a:avLst/>
-          </a:prstGeom>
-          <a:noFill/>
-        </p:spPr>
-        <p:txBody>
-          <a:bodyPr wrap="square" rtlCol="0">
-            <a:spAutoFit/>
-          </a:bodyPr>
-          <a:lstStyle/>
-          <a:p>
-            <a:pPr algn="ctr"/>
-            <a:r>
-              <a:rPr lang="ru-RU" sz="2400" dirty="0" smtClean="0">
-                <a:solidFill>
-                  <a:schemeClr val="bg1"/>
-                </a:solidFill>
-              </a:rPr>
-              <a:t>Понятие сборки</a:t>
-            </a:r>
-            <a:endParaRPr lang="en-US" sz="2400" dirty="0">
-              <a:solidFill>
-                <a:schemeClr val="bg1"/>
-              </a:solidFill>
-            </a:endParaRPr>
-          </a:p>
-        </p:txBody>
-      </p:sp>
-    </p:spTree>
-    <p:extLst>
-      <p:ext uri="{BB962C8B-B14F-4D97-AF65-F5344CB8AC3E}">
-        <p14:creationId xmlns:p14="http://schemas.microsoft.com/office/powerpoint/2010/main" val="669921671"/>
       </p:ext>
     </p:extLst>
   </p:cSld>

</xml_diff>

<commit_message>
Added presentation #5 (events and delegates). Plus minor changes.
</commit_message>
<xml_diff>
--- a/Presentation/lesson-01.pptx
+++ b/Presentation/lesson-01.pptx
@@ -12730,7 +12730,7 @@
           <p:nvPr>
             <p:extLst>
               <p:ext uri="{D42A27DB-BD31-4B8C-83A1-F6EECF244321}">
-                <p14:modId xmlns:p14="http://schemas.microsoft.com/office/powerpoint/2010/main" val="2491214417"/>
+                <p14:modId xmlns:p14="http://schemas.microsoft.com/office/powerpoint/2010/main" val="2200453012"/>
               </p:ext>
             </p:extLst>
           </p:nvPr>
@@ -13902,9 +13902,35 @@
                           <a:effectLst/>
                           <a:latin typeface="Calibri" pitchFamily="34" charset="0"/>
                         </a:rPr>
-                        <a:t>Удаляет или замет данные в строке</a:t>
+                        <a:t>Удаляет или </a:t>
                       </a:r>
-                      <a:endParaRPr kumimoji="0" lang="be-BY" sz="1800" b="0" i="0" u="none" strike="noStrike" cap="none" normalizeH="0" baseline="0" smtClean="0">
+                      <a:r>
+                        <a:rPr kumimoji="0" lang="ru-RU" sz="1800" b="0" i="0" u="none" strike="noStrike" cap="none" normalizeH="0" baseline="0" smtClean="0">
+                          <a:ln>
+                            <a:noFill/>
+                          </a:ln>
+                          <a:solidFill>
+                            <a:srgbClr val="000000"/>
+                          </a:solidFill>
+                          <a:effectLst/>
+                          <a:latin typeface="Calibri" pitchFamily="34" charset="0"/>
+                        </a:rPr>
+                        <a:t>заменяет </a:t>
+                      </a:r>
+                      <a:r>
+                        <a:rPr kumimoji="0" lang="ru-RU" sz="1800" b="0" i="0" u="none" strike="noStrike" cap="none" normalizeH="0" baseline="0" smtClean="0">
+                          <a:ln>
+                            <a:noFill/>
+                          </a:ln>
+                          <a:solidFill>
+                            <a:srgbClr val="000000"/>
+                          </a:solidFill>
+                          <a:effectLst/>
+                          <a:latin typeface="Calibri" pitchFamily="34" charset="0"/>
+                        </a:rPr>
+                        <a:t>данные в строке</a:t>
+                      </a:r>
+                      <a:endParaRPr kumimoji="0" lang="be-BY" sz="1800" b="0" i="0" u="none" strike="noStrike" cap="none" normalizeH="0" baseline="0" dirty="0" smtClean="0">
                         <a:ln>
                           <a:noFill/>
                         </a:ln>

</xml_diff>

<commit_message>
Added link to vk.com group
</commit_message>
<xml_diff>
--- a/Presentation/lesson-01.pptx
+++ b/Presentation/lesson-01.pptx
@@ -323,7 +323,7 @@
           <a:p>
             <a:fld id="{8E6E6A2A-E9D3-4A0D-B04A-ABDD367A1E08}" type="datetimeFigureOut">
               <a:rPr lang="ru-RU" smtClean="0"/>
-              <a:t>19.10.2012</a:t>
+              <a:t>01.11.2012</a:t>
             </a:fld>
             <a:endParaRPr lang="ru-RU"/>
           </a:p>
@@ -493,7 +493,7 @@
           <a:p>
             <a:fld id="{8E6E6A2A-E9D3-4A0D-B04A-ABDD367A1E08}" type="datetimeFigureOut">
               <a:rPr lang="ru-RU" smtClean="0"/>
-              <a:t>19.10.2012</a:t>
+              <a:t>01.11.2012</a:t>
             </a:fld>
             <a:endParaRPr lang="ru-RU"/>
           </a:p>
@@ -673,7 +673,7 @@
           <a:p>
             <a:fld id="{8E6E6A2A-E9D3-4A0D-B04A-ABDD367A1E08}" type="datetimeFigureOut">
               <a:rPr lang="ru-RU" smtClean="0"/>
-              <a:t>19.10.2012</a:t>
+              <a:t>01.11.2012</a:t>
             </a:fld>
             <a:endParaRPr lang="ru-RU"/>
           </a:p>
@@ -843,7 +843,7 @@
           <a:p>
             <a:fld id="{8E6E6A2A-E9D3-4A0D-B04A-ABDD367A1E08}" type="datetimeFigureOut">
               <a:rPr lang="ru-RU" smtClean="0"/>
-              <a:t>19.10.2012</a:t>
+              <a:t>01.11.2012</a:t>
             </a:fld>
             <a:endParaRPr lang="ru-RU"/>
           </a:p>
@@ -1089,7 +1089,7 @@
           <a:p>
             <a:fld id="{8E6E6A2A-E9D3-4A0D-B04A-ABDD367A1E08}" type="datetimeFigureOut">
               <a:rPr lang="ru-RU" smtClean="0"/>
-              <a:t>19.10.2012</a:t>
+              <a:t>01.11.2012</a:t>
             </a:fld>
             <a:endParaRPr lang="ru-RU"/>
           </a:p>
@@ -1377,7 +1377,7 @@
           <a:p>
             <a:fld id="{8E6E6A2A-E9D3-4A0D-B04A-ABDD367A1E08}" type="datetimeFigureOut">
               <a:rPr lang="ru-RU" smtClean="0"/>
-              <a:t>19.10.2012</a:t>
+              <a:t>01.11.2012</a:t>
             </a:fld>
             <a:endParaRPr lang="ru-RU"/>
           </a:p>
@@ -1799,7 +1799,7 @@
           <a:p>
             <a:fld id="{8E6E6A2A-E9D3-4A0D-B04A-ABDD367A1E08}" type="datetimeFigureOut">
               <a:rPr lang="ru-RU" smtClean="0"/>
-              <a:t>19.10.2012</a:t>
+              <a:t>01.11.2012</a:t>
             </a:fld>
             <a:endParaRPr lang="ru-RU"/>
           </a:p>
@@ -1917,7 +1917,7 @@
           <a:p>
             <a:fld id="{8E6E6A2A-E9D3-4A0D-B04A-ABDD367A1E08}" type="datetimeFigureOut">
               <a:rPr lang="ru-RU" smtClean="0"/>
-              <a:t>19.10.2012</a:t>
+              <a:t>01.11.2012</a:t>
             </a:fld>
             <a:endParaRPr lang="ru-RU"/>
           </a:p>
@@ -2012,7 +2012,7 @@
           <a:p>
             <a:fld id="{8E6E6A2A-E9D3-4A0D-B04A-ABDD367A1E08}" type="datetimeFigureOut">
               <a:rPr lang="ru-RU" smtClean="0"/>
-              <a:t>19.10.2012</a:t>
+              <a:t>01.11.2012</a:t>
             </a:fld>
             <a:endParaRPr lang="ru-RU"/>
           </a:p>
@@ -2289,7 +2289,7 @@
           <a:p>
             <a:fld id="{8E6E6A2A-E9D3-4A0D-B04A-ABDD367A1E08}" type="datetimeFigureOut">
               <a:rPr lang="ru-RU" smtClean="0"/>
-              <a:t>19.10.2012</a:t>
+              <a:t>01.11.2012</a:t>
             </a:fld>
             <a:endParaRPr lang="ru-RU"/>
           </a:p>
@@ -2542,7 +2542,7 @@
           <a:p>
             <a:fld id="{8E6E6A2A-E9D3-4A0D-B04A-ABDD367A1E08}" type="datetimeFigureOut">
               <a:rPr lang="ru-RU" smtClean="0"/>
-              <a:t>19.10.2012</a:t>
+              <a:t>01.11.2012</a:t>
             </a:fld>
             <a:endParaRPr lang="ru-RU"/>
           </a:p>
@@ -2755,7 +2755,7 @@
           <a:p>
             <a:fld id="{8E6E6A2A-E9D3-4A0D-B04A-ABDD367A1E08}" type="datetimeFigureOut">
               <a:rPr lang="ru-RU" smtClean="0"/>
-              <a:t>19.10.2012</a:t>
+              <a:t>01.11.2012</a:t>
             </a:fld>
             <a:endParaRPr lang="ru-RU"/>
           </a:p>
@@ -3293,6 +3293,40 @@
           </a:p>
         </p:txBody>
       </p:sp>
+      <p:sp>
+        <p:nvSpPr>
+          <p:cNvPr id="2" name="TextBox 1"/>
+          <p:cNvSpPr txBox="1"/>
+          <p:nvPr/>
+        </p:nvSpPr>
+        <p:spPr>
+          <a:xfrm>
+            <a:off x="3120449" y="5589240"/>
+            <a:ext cx="2903102" cy="369332"/>
+          </a:xfrm>
+          <a:prstGeom prst="rect">
+            <a:avLst/>
+          </a:prstGeom>
+          <a:noFill/>
+        </p:spPr>
+        <p:txBody>
+          <a:bodyPr wrap="none" rtlCol="0">
+            <a:spAutoFit/>
+          </a:bodyPr>
+          <a:lstStyle/>
+          <a:p>
+            <a:r>
+              <a:rPr lang="en-US" dirty="0">
+                <a:solidFill>
+                  <a:schemeClr val="bg1"/>
+                </a:solidFill>
+              </a:rPr>
+              <a:t>http://vk.com/club33848893</a:t>
+            </a:r>
+            <a:endParaRPr lang="en-US" dirty="0"/>
+          </a:p>
+        </p:txBody>
+      </p:sp>
     </p:spTree>
     <p:extLst>
       <p:ext uri="{BB962C8B-B14F-4D97-AF65-F5344CB8AC3E}">
@@ -7905,11 +7939,11 @@
   <p:clrMapOvr>
     <a:masterClrMapping/>
   </p:clrMapOvr>
-  <mc:AlternateContent xmlns:mc="http://schemas.openxmlformats.org/markup-compatibility/2006">
-    <mc:Choice xmlns:p14="http://schemas.microsoft.com/office/powerpoint/2010/main" Requires="p14">
+  <mc:AlternateContent xmlns:mc="http://schemas.openxmlformats.org/markup-compatibility/2006" xmlns:p14="http://schemas.microsoft.com/office/powerpoint/2010/main">
+    <mc:Choice Requires="p14">
       <p:transition spd="slow" p14:dur="2000"/>
     </mc:Choice>
-    <mc:Fallback>
+    <mc:Fallback xmlns="">
       <p:transition spd="slow"/>
     </mc:Fallback>
   </mc:AlternateContent>
@@ -8149,11 +8183,11 @@
   <p:clrMapOvr>
     <a:masterClrMapping/>
   </p:clrMapOvr>
-  <mc:AlternateContent xmlns:mc="http://schemas.openxmlformats.org/markup-compatibility/2006">
-    <mc:Choice xmlns:p14="http://schemas.microsoft.com/office/powerpoint/2010/main" Requires="p14">
+  <mc:AlternateContent xmlns:mc="http://schemas.openxmlformats.org/markup-compatibility/2006" xmlns:p14="http://schemas.microsoft.com/office/powerpoint/2010/main">
+    <mc:Choice Requires="p14">
       <p:transition spd="slow" p14:dur="2000"/>
     </mc:Choice>
-    <mc:Fallback>
+    <mc:Fallback xmlns="">
       <p:transition spd="slow"/>
     </mc:Fallback>
   </mc:AlternateContent>
@@ -11264,11 +11298,11 @@
   <p:clrMapOvr>
     <a:masterClrMapping/>
   </p:clrMapOvr>
-  <mc:AlternateContent xmlns:mc="http://schemas.openxmlformats.org/markup-compatibility/2006">
-    <mc:Choice xmlns:p14="http://schemas.microsoft.com/office/powerpoint/2010/main" Requires="p14">
+  <mc:AlternateContent xmlns:mc="http://schemas.openxmlformats.org/markup-compatibility/2006" xmlns:p14="http://schemas.microsoft.com/office/powerpoint/2010/main">
+    <mc:Choice Requires="p14">
       <p:transition spd="slow" p14:dur="2000"/>
     </mc:Choice>
-    <mc:Fallback>
+    <mc:Fallback xmlns="">
       <p:transition spd="slow"/>
     </mc:Fallback>
   </mc:AlternateContent>
@@ -31921,23 +31955,7 @@
                   <a:schemeClr val="bg1"/>
                 </a:solidFill>
               </a:rPr>
-              <a:t>Visual </a:t>
-            </a:r>
-            <a:r>
-              <a:rPr lang="en-US" dirty="0" smtClean="0">
-                <a:solidFill>
-                  <a:schemeClr val="bg1"/>
-                </a:solidFill>
-              </a:rPr>
-              <a:t>Studio </a:t>
-            </a:r>
-            <a:r>
-              <a:rPr lang="en-US" dirty="0" smtClean="0">
-                <a:solidFill>
-                  <a:schemeClr val="bg1"/>
-                </a:solidFill>
-              </a:rPr>
-              <a:t>2012</a:t>
+              <a:t>Visual Studio 2012</a:t>
             </a:r>
             <a:r>
               <a:rPr lang="en-US" dirty="0">

</xml_diff>

<commit_message>
Added link to UnconstrainedMelody
</commit_message>
<xml_diff>
--- a/Presentation/lesson-01.pptx
+++ b/Presentation/lesson-01.pptx
@@ -23945,6 +23945,13 @@
   <p:clrMapOvr>
     <a:masterClrMapping/>
   </p:clrMapOvr>
+  <p:timing>
+    <p:tnLst>
+      <p:par>
+        <p:cTn id="1" dur="indefinite" restart="never" nodeType="tmRoot"/>
+      </p:par>
+    </p:tnLst>
+  </p:timing>
 </p:sld>
 </file>
 
@@ -25177,6 +25184,13 @@
   <p:clrMapOvr>
     <a:masterClrMapping/>
   </p:clrMapOvr>
+  <p:timing>
+    <p:tnLst>
+      <p:par>
+        <p:cTn id="1" dur="indefinite" restart="never" nodeType="tmRoot"/>
+      </p:par>
+    </p:tnLst>
+  </p:timing>
 </p:sld>
 </file>
 
@@ -25308,7 +25322,7 @@
         </p:nvSpPr>
         <p:spPr bwMode="auto">
           <a:xfrm>
-            <a:off x="685800" y="2667000"/>
+            <a:off x="685800" y="2492896"/>
             <a:ext cx="7696200" cy="3770313"/>
           </a:xfrm>
           <a:prstGeom prst="rect">
@@ -26015,17 +26029,27 @@
           <a:p>
             <a:pPr eaLnBrk="1" hangingPunct="1"/>
             <a:r>
-              <a:rPr lang="en-US" sz="1400">
-                <a:solidFill>
-                  <a:schemeClr val="bg1"/>
-                </a:solidFill>
-                <a:latin typeface="Courier New" pitchFamily="49" charset="0"/>
-                <a:cs typeface="Courier New" pitchFamily="49" charset="0"/>
-              </a:rPr>
-              <a:t>enum &lt;</a:t>
-            </a:r>
-            <a:r>
-              <a:rPr lang="ru-RU" sz="1400">
+              <a:rPr lang="en-US" sz="1400" dirty="0" err="1">
+                <a:solidFill>
+                  <a:schemeClr val="bg1"/>
+                </a:solidFill>
+                <a:latin typeface="Courier New" pitchFamily="49" charset="0"/>
+                <a:cs typeface="Courier New" pitchFamily="49" charset="0"/>
+              </a:rPr>
+              <a:t>enum</a:t>
+            </a:r>
+            <a:r>
+              <a:rPr lang="en-US" sz="1400" dirty="0">
+                <a:solidFill>
+                  <a:schemeClr val="bg1"/>
+                </a:solidFill>
+                <a:latin typeface="Courier New" pitchFamily="49" charset="0"/>
+                <a:cs typeface="Courier New" pitchFamily="49" charset="0"/>
+              </a:rPr>
+              <a:t> &lt;</a:t>
+            </a:r>
+            <a:r>
+              <a:rPr lang="ru-RU" sz="1400" dirty="0">
                 <a:solidFill>
                   <a:schemeClr val="bg1"/>
                 </a:solidFill>
@@ -26035,7 +26059,7 @@
               <a:t>Имя перечисления</a:t>
             </a:r>
             <a:r>
-              <a:rPr lang="en-US" sz="1400">
+              <a:rPr lang="en-US" sz="1400" dirty="0">
                 <a:solidFill>
                   <a:schemeClr val="bg1"/>
                 </a:solidFill>
@@ -26044,7 +26068,7 @@
               </a:rPr>
               <a:t>&gt;</a:t>
             </a:r>
-            <a:endParaRPr lang="ru-RU" sz="1400">
+            <a:endParaRPr lang="ru-RU" sz="1400" dirty="0">
               <a:solidFill>
                 <a:schemeClr val="bg1"/>
               </a:solidFill>
@@ -26055,7 +26079,7 @@
           <a:p>
             <a:pPr eaLnBrk="1" hangingPunct="1"/>
             <a:r>
-              <a:rPr lang="en-US" sz="1400">
+              <a:rPr lang="en-US" sz="1400" dirty="0">
                 <a:solidFill>
                   <a:schemeClr val="bg1"/>
                 </a:solidFill>
@@ -26068,7 +26092,7 @@
           <a:p>
             <a:pPr eaLnBrk="1" hangingPunct="1"/>
             <a:r>
-              <a:rPr lang="en-US" sz="1400">
+              <a:rPr lang="en-US" sz="1400" dirty="0">
                 <a:solidFill>
                   <a:schemeClr val="bg1"/>
                 </a:solidFill>
@@ -26078,7 +26102,7 @@
               <a:t>    &lt;</a:t>
             </a:r>
             <a:r>
-              <a:rPr lang="ru-RU" sz="1400">
+              <a:rPr lang="ru-RU" sz="1400" dirty="0">
                 <a:solidFill>
                   <a:schemeClr val="bg1"/>
                 </a:solidFill>
@@ -26088,7 +26112,7 @@
               <a:t>Имя 1-го элемента</a:t>
             </a:r>
             <a:r>
-              <a:rPr lang="en-US" sz="1400">
+              <a:rPr lang="en-US" sz="1400" dirty="0">
                 <a:solidFill>
                   <a:schemeClr val="bg1"/>
                 </a:solidFill>
@@ -26098,7 +26122,7 @@
               <a:t>&gt;</a:t>
             </a:r>
             <a:r>
-              <a:rPr lang="ru-RU" sz="1400">
+              <a:rPr lang="ru-RU" sz="1400" dirty="0">
                 <a:solidFill>
                   <a:schemeClr val="bg1"/>
                 </a:solidFill>
@@ -26108,7 +26132,7 @@
               <a:t> = </a:t>
             </a:r>
             <a:r>
-              <a:rPr lang="en-US" sz="1400">
+              <a:rPr lang="en-US" sz="1400" dirty="0">
                 <a:solidFill>
                   <a:schemeClr val="bg1"/>
                 </a:solidFill>
@@ -26118,7 +26142,7 @@
               <a:t>&lt;</a:t>
             </a:r>
             <a:r>
-              <a:rPr lang="ru-RU" sz="1400">
+              <a:rPr lang="ru-RU" sz="1400" dirty="0">
                 <a:solidFill>
                   <a:schemeClr val="bg1"/>
                 </a:solidFill>
@@ -26128,7 +26152,7 @@
               <a:t>Числовое значение</a:t>
             </a:r>
             <a:r>
-              <a:rPr lang="en-US" sz="1400">
+              <a:rPr lang="en-US" sz="1400" dirty="0">
                 <a:solidFill>
                   <a:schemeClr val="bg1"/>
                 </a:solidFill>
@@ -26141,7 +26165,7 @@
           <a:p>
             <a:pPr eaLnBrk="1" hangingPunct="1"/>
             <a:r>
-              <a:rPr lang="en-US" sz="1400">
+              <a:rPr lang="en-US" sz="1400" dirty="0">
                 <a:solidFill>
                   <a:schemeClr val="bg1"/>
                 </a:solidFill>
@@ -26151,7 +26175,7 @@
               <a:t>    &lt;</a:t>
             </a:r>
             <a:r>
-              <a:rPr lang="ru-RU" sz="1400">
+              <a:rPr lang="ru-RU" sz="1400" dirty="0">
                 <a:solidFill>
                   <a:schemeClr val="bg1"/>
                 </a:solidFill>
@@ -26161,7 +26185,7 @@
               <a:t>Имя </a:t>
             </a:r>
             <a:r>
-              <a:rPr lang="en-US" sz="1400">
+              <a:rPr lang="en-US" sz="1400" dirty="0">
                 <a:solidFill>
                   <a:schemeClr val="bg1"/>
                 </a:solidFill>
@@ -26171,7 +26195,7 @@
               <a:t>2</a:t>
             </a:r>
             <a:r>
-              <a:rPr lang="ru-RU" sz="1400">
+              <a:rPr lang="ru-RU" sz="1400" dirty="0">
                 <a:solidFill>
                   <a:schemeClr val="bg1"/>
                 </a:solidFill>
@@ -26181,7 +26205,7 @@
               <a:t>-го элемента</a:t>
             </a:r>
             <a:r>
-              <a:rPr lang="en-US" sz="1400">
+              <a:rPr lang="en-US" sz="1400" dirty="0">
                 <a:solidFill>
                   <a:schemeClr val="bg1"/>
                 </a:solidFill>
@@ -26191,7 +26215,7 @@
               <a:t>&gt;</a:t>
             </a:r>
             <a:r>
-              <a:rPr lang="ru-RU" sz="1400">
+              <a:rPr lang="ru-RU" sz="1400" dirty="0">
                 <a:solidFill>
                   <a:schemeClr val="bg1"/>
                 </a:solidFill>
@@ -26201,7 +26225,7 @@
               <a:t> = </a:t>
             </a:r>
             <a:r>
-              <a:rPr lang="en-US" sz="1400">
+              <a:rPr lang="en-US" sz="1400" dirty="0">
                 <a:solidFill>
                   <a:schemeClr val="bg1"/>
                 </a:solidFill>
@@ -26211,7 +26235,7 @@
               <a:t>&lt;</a:t>
             </a:r>
             <a:r>
-              <a:rPr lang="ru-RU" sz="1400">
+              <a:rPr lang="ru-RU" sz="1400" dirty="0">
                 <a:solidFill>
                   <a:schemeClr val="bg1"/>
                 </a:solidFill>
@@ -26221,7 +26245,7 @@
               <a:t>Числовое значение</a:t>
             </a:r>
             <a:r>
-              <a:rPr lang="en-US" sz="1400">
+              <a:rPr lang="en-US" sz="1400" dirty="0">
                 <a:solidFill>
                   <a:schemeClr val="bg1"/>
                 </a:solidFill>
@@ -26234,7 +26258,7 @@
           <a:p>
             <a:pPr eaLnBrk="1" hangingPunct="1"/>
             <a:r>
-              <a:rPr lang="en-US" sz="1400">
+              <a:rPr lang="en-US" sz="1400" dirty="0">
                 <a:solidFill>
                   <a:schemeClr val="bg1"/>
                 </a:solidFill>
@@ -26247,7 +26271,7 @@
           <a:p>
             <a:pPr eaLnBrk="1" hangingPunct="1"/>
             <a:r>
-              <a:rPr lang="en-US" sz="1400">
+              <a:rPr lang="en-US" sz="1400" dirty="0">
                 <a:solidFill>
                   <a:schemeClr val="bg1"/>
                 </a:solidFill>
@@ -26257,7 +26281,7 @@
               <a:t>    &lt;</a:t>
             </a:r>
             <a:r>
-              <a:rPr lang="ru-RU" sz="1400">
+              <a:rPr lang="ru-RU" sz="1400" dirty="0">
                 <a:solidFill>
                   <a:schemeClr val="bg1"/>
                 </a:solidFill>
@@ -26267,7 +26291,7 @@
               <a:t>Имя </a:t>
             </a:r>
             <a:r>
-              <a:rPr lang="en-US" sz="1400">
+              <a:rPr lang="en-US" sz="1400" dirty="0">
                 <a:solidFill>
                   <a:schemeClr val="bg1"/>
                 </a:solidFill>
@@ -26277,7 +26301,7 @@
               <a:t>n</a:t>
             </a:r>
             <a:r>
-              <a:rPr lang="ru-RU" sz="1400">
+              <a:rPr lang="ru-RU" sz="1400" dirty="0">
                 <a:solidFill>
                   <a:schemeClr val="bg1"/>
                 </a:solidFill>
@@ -26287,7 +26311,7 @@
               <a:t>-го элемента</a:t>
             </a:r>
             <a:r>
-              <a:rPr lang="en-US" sz="1400">
+              <a:rPr lang="en-US" sz="1400" dirty="0">
                 <a:solidFill>
                   <a:schemeClr val="bg1"/>
                 </a:solidFill>
@@ -26297,7 +26321,7 @@
               <a:t>&gt;</a:t>
             </a:r>
             <a:r>
-              <a:rPr lang="ru-RU" sz="1400">
+              <a:rPr lang="ru-RU" sz="1400" dirty="0">
                 <a:solidFill>
                   <a:schemeClr val="bg1"/>
                 </a:solidFill>
@@ -26307,7 +26331,7 @@
               <a:t> = </a:t>
             </a:r>
             <a:r>
-              <a:rPr lang="en-US" sz="1400">
+              <a:rPr lang="en-US" sz="1400" dirty="0">
                 <a:solidFill>
                   <a:schemeClr val="bg1"/>
                 </a:solidFill>
@@ -26317,7 +26341,7 @@
               <a:t>&lt;</a:t>
             </a:r>
             <a:r>
-              <a:rPr lang="ru-RU" sz="1400">
+              <a:rPr lang="ru-RU" sz="1400" dirty="0">
                 <a:solidFill>
                   <a:schemeClr val="bg1"/>
                 </a:solidFill>
@@ -26327,7 +26351,7 @@
               <a:t>Числовое значение</a:t>
             </a:r>
             <a:r>
-              <a:rPr lang="en-US" sz="1400">
+              <a:rPr lang="en-US" sz="1400" dirty="0">
                 <a:solidFill>
                   <a:schemeClr val="bg1"/>
                 </a:solidFill>
@@ -26340,7 +26364,7 @@
           <a:p>
             <a:pPr eaLnBrk="1" hangingPunct="1"/>
             <a:r>
-              <a:rPr lang="en-US" sz="1400">
+              <a:rPr lang="en-US" sz="1400" dirty="0">
                 <a:solidFill>
                   <a:schemeClr val="bg1"/>
                 </a:solidFill>
@@ -26349,7 +26373,7 @@
               </a:rPr>
               <a:t>}</a:t>
             </a:r>
-            <a:endParaRPr lang="ru-RU" sz="1400">
+            <a:endParaRPr lang="ru-RU" sz="1400" dirty="0">
               <a:solidFill>
                 <a:schemeClr val="bg1"/>
               </a:solidFill>
@@ -26359,13 +26383,45 @@
           </a:p>
           <a:p>
             <a:pPr eaLnBrk="1" hangingPunct="1"/>
-            <a:endParaRPr lang="ru-RU" sz="1400">
+            <a:endParaRPr lang="ru-RU" sz="1400" dirty="0">
               <a:solidFill>
                 <a:schemeClr val="bg1"/>
               </a:solidFill>
               <a:latin typeface="Courier New" pitchFamily="49" charset="0"/>
               <a:cs typeface="Courier New" pitchFamily="49" charset="0"/>
             </a:endParaRPr>
+          </a:p>
+        </p:txBody>
+      </p:sp>
+      <p:sp>
+        <p:nvSpPr>
+          <p:cNvPr id="2" name="Rectangle 1"/>
+          <p:cNvSpPr/>
+          <p:nvPr/>
+        </p:nvSpPr>
+        <p:spPr>
+          <a:xfrm>
+            <a:off x="685800" y="6381328"/>
+            <a:ext cx="7696200" cy="369332"/>
+          </a:xfrm>
+          <a:prstGeom prst="rect">
+            <a:avLst/>
+          </a:prstGeom>
+        </p:spPr>
+        <p:txBody>
+          <a:bodyPr wrap="square">
+            <a:spAutoFit/>
+          </a:bodyPr>
+          <a:lstStyle/>
+          <a:p>
+            <a:r>
+              <a:rPr lang="en-US" dirty="0">
+                <a:solidFill>
+                  <a:schemeClr val="bg1"/>
+                </a:solidFill>
+              </a:rPr>
+              <a:t>http://nuget.org/packages/UnconstrainedMelody</a:t>
+            </a:r>
           </a:p>
         </p:txBody>
       </p:sp>
@@ -26379,6 +26435,13 @@
   <p:clrMapOvr>
     <a:masterClrMapping/>
   </p:clrMapOvr>
+  <p:timing>
+    <p:tnLst>
+      <p:par>
+        <p:cTn id="1" dur="indefinite" restart="never" nodeType="tmRoot"/>
+      </p:par>
+    </p:tnLst>
+  </p:timing>
 </p:sld>
 </file>
 
@@ -27445,6 +27508,13 @@
   <p:clrMapOvr>
     <a:masterClrMapping/>
   </p:clrMapOvr>
+  <p:timing>
+    <p:tnLst>
+      <p:par>
+        <p:cTn id="1" dur="indefinite" restart="never" nodeType="tmRoot"/>
+      </p:par>
+    </p:tnLst>
+  </p:timing>
 </p:sld>
 </file>
 
@@ -27952,6 +28022,13 @@
   <p:clrMapOvr>
     <a:masterClrMapping/>
   </p:clrMapOvr>
+  <p:timing>
+    <p:tnLst>
+      <p:par>
+        <p:cTn id="1" dur="indefinite" restart="never" nodeType="tmRoot"/>
+      </p:par>
+    </p:tnLst>
+  </p:timing>
 </p:sld>
 </file>
 

</xml_diff>

<commit_message>
Updated lessson #1 presentation
</commit_message>
<xml_diff>
--- a/Presentation/lesson-01.pptx
+++ b/Presentation/lesson-01.pptx
@@ -28072,7 +28072,7 @@
         <p:spPr>
           <a:xfrm>
             <a:off x="251520" y="188640"/>
-            <a:ext cx="8640960" cy="3077766"/>
+            <a:ext cx="8640960" cy="3631763"/>
           </a:xfrm>
           <a:prstGeom prst="rect">
             <a:avLst/>
@@ -28221,9 +28221,18 @@
                 </a:solidFill>
                 <a:hlinkClick r:id="rId5"/>
               </a:rPr>
-              <a:t>channel9.msdn.com/</a:t>
-            </a:r>
-            <a:endParaRPr lang="ru-RU" u="sng" dirty="0" smtClean="0">
+              <a:t>channel9.msdn.com</a:t>
+            </a:r>
+            <a:r>
+              <a:rPr lang="en-US" u="sng" dirty="0" smtClean="0">
+                <a:solidFill>
+                  <a:schemeClr val="bg1"/>
+                </a:solidFill>
+                <a:hlinkClick r:id="rId5"/>
+              </a:rPr>
+              <a:t>/</a:t>
+            </a:r>
+            <a:endParaRPr lang="en-US" u="sng" dirty="0" smtClean="0">
               <a:solidFill>
                 <a:schemeClr val="bg1"/>
               </a:solidFill>
@@ -28300,62 +28309,38 @@
             </a:endParaRPr>
           </a:p>
           <a:p>
-            <a:endParaRPr lang="ru-RU" dirty="0" smtClean="0">
-              <a:solidFill>
-                <a:schemeClr val="bg1"/>
-              </a:solidFill>
-            </a:endParaRPr>
-          </a:p>
-          <a:p>
-            <a:r>
-              <a:rPr lang="ru-RU" dirty="0" smtClean="0">
-                <a:solidFill>
-                  <a:schemeClr val="bg1"/>
-                </a:solidFill>
-              </a:rPr>
-              <a:t>Форумы:</a:t>
-            </a:r>
-          </a:p>
-          <a:p>
             <a:pPr marL="742950" lvl="1" indent="-285750">
               <a:buFont typeface="Arial" pitchFamily="34" charset="0"/>
               <a:buChar char="•"/>
             </a:pPr>
             <a:r>
-              <a:rPr lang="en-US" dirty="0" smtClean="0">
-                <a:solidFill>
-                  <a:schemeClr val="bg1"/>
-                </a:solidFill>
-              </a:rPr>
-              <a:t>[RUS</a:t>
-            </a:r>
-            <a:r>
-              <a:rPr lang="en-US" dirty="0">
-                <a:solidFill>
-                  <a:schemeClr val="bg1"/>
-                </a:solidFill>
-              </a:rPr>
-              <a:t>] </a:t>
-            </a:r>
-            <a:r>
-              <a:rPr lang="en-US" dirty="0">
+              <a:rPr lang="en-US">
                 <a:solidFill>
                   <a:schemeClr val="bg1"/>
                 </a:solidFill>
                 <a:hlinkClick r:id="rId7"/>
               </a:rPr>
-              <a:t>http://www.rsdn.ru</a:t>
-            </a:r>
-            <a:r>
-              <a:rPr lang="en-US" dirty="0" smtClean="0">
+              <a:t>http://</a:t>
+            </a:r>
+            <a:r>
+              <a:rPr lang="en-US">
                 <a:solidFill>
                   <a:schemeClr val="bg1"/>
                 </a:solidFill>
                 <a:hlinkClick r:id="rId7"/>
               </a:rPr>
+              <a:t>www.techdays.ru</a:t>
+            </a:r>
+            <a:r>
+              <a:rPr lang="en-US" smtClean="0">
+                <a:solidFill>
+                  <a:schemeClr val="bg1"/>
+                </a:solidFill>
+                <a:hlinkClick r:id="rId7"/>
+              </a:rPr>
               <a:t>/</a:t>
             </a:r>
-            <a:endParaRPr lang="ru-RU" dirty="0" smtClean="0">
+            <a:endParaRPr lang="en-US" smtClean="0">
               <a:solidFill>
                 <a:schemeClr val="bg1"/>
               </a:solidFill>
@@ -28366,53 +28351,28 @@
               <a:buFont typeface="Arial" pitchFamily="34" charset="0"/>
               <a:buChar char="•"/>
             </a:pPr>
-            <a:r>
-              <a:rPr lang="en-US" dirty="0">
-                <a:solidFill>
-                  <a:schemeClr val="bg1"/>
-                </a:solidFill>
-              </a:rPr>
-              <a:t>[RUS</a:t>
-            </a:r>
-            <a:r>
-              <a:rPr lang="en-US" dirty="0" smtClean="0">
-                <a:solidFill>
-                  <a:schemeClr val="bg1"/>
-                </a:solidFill>
-              </a:rPr>
-              <a:t>]</a:t>
-            </a:r>
+            <a:endParaRPr lang="en-US" dirty="0" smtClean="0">
+              <a:solidFill>
+                <a:schemeClr val="bg1"/>
+              </a:solidFill>
+            </a:endParaRPr>
+          </a:p>
+          <a:p>
+            <a:endParaRPr lang="ru-RU" dirty="0" smtClean="0">
+              <a:solidFill>
+                <a:schemeClr val="bg1"/>
+              </a:solidFill>
+            </a:endParaRPr>
+          </a:p>
+          <a:p>
             <a:r>
               <a:rPr lang="ru-RU" dirty="0" smtClean="0">
                 <a:solidFill>
                   <a:schemeClr val="bg1"/>
                 </a:solidFill>
               </a:rPr>
-              <a:t> </a:t>
-            </a:r>
-            <a:r>
-              <a:rPr lang="en-US" dirty="0">
-                <a:solidFill>
-                  <a:schemeClr val="bg1"/>
-                </a:solidFill>
-                <a:hlinkClick r:id="rId8"/>
-              </a:rPr>
-              <a:t>www.sql.ru/forum</a:t>
-            </a:r>
-            <a:r>
-              <a:rPr lang="en-US" dirty="0" smtClean="0">
-                <a:solidFill>
-                  <a:schemeClr val="bg1"/>
-                </a:solidFill>
-                <a:hlinkClick r:id="rId8"/>
-              </a:rPr>
-              <a:t>/</a:t>
-            </a:r>
-            <a:endParaRPr lang="en-US" dirty="0" smtClean="0">
-              <a:solidFill>
-                <a:schemeClr val="bg1"/>
-              </a:solidFill>
-            </a:endParaRPr>
+              <a:t>Форумы:</a:t>
+            </a:r>
           </a:p>
           <a:p>
             <a:pPr marL="742950" lvl="1" indent="-285750">
@@ -28420,11 +28380,109 @@
               <a:buChar char="•"/>
             </a:pPr>
             <a:r>
+              <a:rPr lang="en-US" dirty="0" smtClean="0">
+                <a:solidFill>
+                  <a:schemeClr val="bg1"/>
+                </a:solidFill>
+              </a:rPr>
+              <a:t>[RUS</a:t>
+            </a:r>
+            <a:r>
               <a:rPr lang="en-US" dirty="0">
                 <a:solidFill>
                   <a:schemeClr val="bg1"/>
                 </a:solidFill>
               </a:rPr>
+              <a:t>] </a:t>
+            </a:r>
+            <a:r>
+              <a:rPr lang="en-US" dirty="0">
+                <a:solidFill>
+                  <a:schemeClr val="bg1"/>
+                </a:solidFill>
+                <a:hlinkClick r:id="rId8"/>
+              </a:rPr>
+              <a:t>http://www.rsdn.ru</a:t>
+            </a:r>
+            <a:r>
+              <a:rPr lang="en-US" dirty="0" smtClean="0">
+                <a:solidFill>
+                  <a:schemeClr val="bg1"/>
+                </a:solidFill>
+                <a:hlinkClick r:id="rId8"/>
+              </a:rPr>
+              <a:t>/</a:t>
+            </a:r>
+            <a:endParaRPr lang="ru-RU" dirty="0" smtClean="0">
+              <a:solidFill>
+                <a:schemeClr val="bg1"/>
+              </a:solidFill>
+            </a:endParaRPr>
+          </a:p>
+          <a:p>
+            <a:pPr marL="742950" lvl="1" indent="-285750">
+              <a:buFont typeface="Arial" pitchFamily="34" charset="0"/>
+              <a:buChar char="•"/>
+            </a:pPr>
+            <a:r>
+              <a:rPr lang="en-US" dirty="0">
+                <a:solidFill>
+                  <a:schemeClr val="bg1"/>
+                </a:solidFill>
+              </a:rPr>
+              <a:t>[RUS</a:t>
+            </a:r>
+            <a:r>
+              <a:rPr lang="en-US" dirty="0" smtClean="0">
+                <a:solidFill>
+                  <a:schemeClr val="bg1"/>
+                </a:solidFill>
+              </a:rPr>
+              <a:t>]</a:t>
+            </a:r>
+            <a:r>
+              <a:rPr lang="ru-RU" dirty="0" smtClean="0">
+                <a:solidFill>
+                  <a:schemeClr val="bg1"/>
+                </a:solidFill>
+              </a:rPr>
+              <a:t> </a:t>
+            </a:r>
+            <a:r>
+              <a:rPr lang="en-US" dirty="0">
+                <a:solidFill>
+                  <a:schemeClr val="bg1"/>
+                </a:solidFill>
+                <a:hlinkClick r:id="rId9"/>
+              </a:rPr>
+              <a:t>www.sql.ru/forum</a:t>
+            </a:r>
+            <a:r>
+              <a:rPr lang="en-US" dirty="0" smtClean="0">
+                <a:solidFill>
+                  <a:schemeClr val="bg1"/>
+                </a:solidFill>
+                <a:hlinkClick r:id="rId9"/>
+              </a:rPr>
+              <a:t>/</a:t>
+            </a:r>
+            <a:endParaRPr lang="en-US" dirty="0" smtClean="0">
+              <a:solidFill>
+                <a:schemeClr val="bg1"/>
+              </a:solidFill>
+            </a:endParaRPr>
+          </a:p>
+          <a:p>
+            <a:pPr marL="742950" lvl="1" indent="-285750">
+              <a:buFont typeface="Arial" pitchFamily="34" charset="0"/>
+              <a:buChar char="•"/>
+            </a:pPr>
+            <a:r>
+              <a:rPr lang="en-US" dirty="0">
+                <a:solidFill>
+                  <a:schemeClr val="bg1"/>
+                </a:solidFill>
+              </a:rPr>
               <a:t>[ENG] </a:t>
             </a:r>
             <a:r>
@@ -28432,7 +28490,7 @@
                 <a:solidFill>
                   <a:schemeClr val="bg1"/>
                 </a:solidFill>
-                <a:hlinkClick r:id="rId9"/>
+                <a:hlinkClick r:id="rId10"/>
               </a:rPr>
               <a:t>http://stackoverflow.com</a:t>
             </a:r>
@@ -28441,7 +28499,7 @@
                 <a:solidFill>
                   <a:schemeClr val="bg1"/>
                 </a:solidFill>
-                <a:hlinkClick r:id="rId9"/>
+                <a:hlinkClick r:id="rId10"/>
               </a:rPr>
               <a:t>/</a:t>
             </a:r>

</xml_diff>

<commit_message>
Changed presentations #1 & 5. Amended timer task.
</commit_message>
<xml_diff>
--- a/Presentation/lesson-01.pptx
+++ b/Presentation/lesson-01.pptx
@@ -38,7 +38,8 @@
     <p:sldId id="275" r:id="rId32"/>
     <p:sldId id="276" r:id="rId33"/>
     <p:sldId id="277" r:id="rId34"/>
-    <p:sldId id="281" r:id="rId35"/>
+    <p:sldId id="292" r:id="rId35"/>
+    <p:sldId id="281" r:id="rId36"/>
   </p:sldIdLst>
   <p:sldSz cx="9144000" cy="6858000" type="screen4x3"/>
   <p:notesSz cx="6858000" cy="9144000"/>
@@ -321,7 +322,7 @@
           <a:p>
             <a:fld id="{8E6E6A2A-E9D3-4A0D-B04A-ABDD367A1E08}" type="datetimeFigureOut">
               <a:rPr lang="ru-RU" smtClean="0"/>
-              <a:t>06.11.2012</a:t>
+              <a:t>06.12.2012</a:t>
             </a:fld>
             <a:endParaRPr lang="ru-RU"/>
           </a:p>
@@ -491,7 +492,7 @@
           <a:p>
             <a:fld id="{8E6E6A2A-E9D3-4A0D-B04A-ABDD367A1E08}" type="datetimeFigureOut">
               <a:rPr lang="ru-RU" smtClean="0"/>
-              <a:t>06.11.2012</a:t>
+              <a:t>06.12.2012</a:t>
             </a:fld>
             <a:endParaRPr lang="ru-RU"/>
           </a:p>
@@ -671,7 +672,7 @@
           <a:p>
             <a:fld id="{8E6E6A2A-E9D3-4A0D-B04A-ABDD367A1E08}" type="datetimeFigureOut">
               <a:rPr lang="ru-RU" smtClean="0"/>
-              <a:t>06.11.2012</a:t>
+              <a:t>06.12.2012</a:t>
             </a:fld>
             <a:endParaRPr lang="ru-RU"/>
           </a:p>
@@ -841,7 +842,7 @@
           <a:p>
             <a:fld id="{8E6E6A2A-E9D3-4A0D-B04A-ABDD367A1E08}" type="datetimeFigureOut">
               <a:rPr lang="ru-RU" smtClean="0"/>
-              <a:t>06.11.2012</a:t>
+              <a:t>06.12.2012</a:t>
             </a:fld>
             <a:endParaRPr lang="ru-RU"/>
           </a:p>
@@ -1087,7 +1088,7 @@
           <a:p>
             <a:fld id="{8E6E6A2A-E9D3-4A0D-B04A-ABDD367A1E08}" type="datetimeFigureOut">
               <a:rPr lang="ru-RU" smtClean="0"/>
-              <a:t>06.11.2012</a:t>
+              <a:t>06.12.2012</a:t>
             </a:fld>
             <a:endParaRPr lang="ru-RU"/>
           </a:p>
@@ -1375,7 +1376,7 @@
           <a:p>
             <a:fld id="{8E6E6A2A-E9D3-4A0D-B04A-ABDD367A1E08}" type="datetimeFigureOut">
               <a:rPr lang="ru-RU" smtClean="0"/>
-              <a:t>06.11.2012</a:t>
+              <a:t>06.12.2012</a:t>
             </a:fld>
             <a:endParaRPr lang="ru-RU"/>
           </a:p>
@@ -1797,7 +1798,7 @@
           <a:p>
             <a:fld id="{8E6E6A2A-E9D3-4A0D-B04A-ABDD367A1E08}" type="datetimeFigureOut">
               <a:rPr lang="ru-RU" smtClean="0"/>
-              <a:t>06.11.2012</a:t>
+              <a:t>06.12.2012</a:t>
             </a:fld>
             <a:endParaRPr lang="ru-RU"/>
           </a:p>
@@ -1915,7 +1916,7 @@
           <a:p>
             <a:fld id="{8E6E6A2A-E9D3-4A0D-B04A-ABDD367A1E08}" type="datetimeFigureOut">
               <a:rPr lang="ru-RU" smtClean="0"/>
-              <a:t>06.11.2012</a:t>
+              <a:t>06.12.2012</a:t>
             </a:fld>
             <a:endParaRPr lang="ru-RU"/>
           </a:p>
@@ -2010,7 +2011,7 @@
           <a:p>
             <a:fld id="{8E6E6A2A-E9D3-4A0D-B04A-ABDD367A1E08}" type="datetimeFigureOut">
               <a:rPr lang="ru-RU" smtClean="0"/>
-              <a:t>06.11.2012</a:t>
+              <a:t>06.12.2012</a:t>
             </a:fld>
             <a:endParaRPr lang="ru-RU"/>
           </a:p>
@@ -2287,7 +2288,7 @@
           <a:p>
             <a:fld id="{8E6E6A2A-E9D3-4A0D-B04A-ABDD367A1E08}" type="datetimeFigureOut">
               <a:rPr lang="ru-RU" smtClean="0"/>
-              <a:t>06.11.2012</a:t>
+              <a:t>06.12.2012</a:t>
             </a:fld>
             <a:endParaRPr lang="ru-RU"/>
           </a:p>
@@ -2540,7 +2541,7 @@
           <a:p>
             <a:fld id="{8E6E6A2A-E9D3-4A0D-B04A-ABDD367A1E08}" type="datetimeFigureOut">
               <a:rPr lang="ru-RU" smtClean="0"/>
-              <a:t>06.11.2012</a:t>
+              <a:t>06.12.2012</a:t>
             </a:fld>
             <a:endParaRPr lang="ru-RU"/>
           </a:p>
@@ -2753,7 +2754,7 @@
           <a:p>
             <a:fld id="{8E6E6A2A-E9D3-4A0D-B04A-ABDD367A1E08}" type="datetimeFigureOut">
               <a:rPr lang="ru-RU" smtClean="0"/>
-              <a:t>06.11.2012</a:t>
+              <a:t>06.12.2012</a:t>
             </a:fld>
             <a:endParaRPr lang="ru-RU"/>
           </a:p>
@@ -27551,6 +27552,362 @@
       </p:grpSpPr>
       <p:sp>
         <p:nvSpPr>
+          <p:cNvPr id="18434" name="Прямоугольник 6"/>
+          <p:cNvSpPr>
+            <a:spLocks noChangeArrowheads="1"/>
+          </p:cNvSpPr>
+          <p:nvPr/>
+        </p:nvSpPr>
+        <p:spPr bwMode="auto">
+          <a:xfrm>
+            <a:off x="609600" y="152400"/>
+            <a:ext cx="7924800" cy="461963"/>
+          </a:xfrm>
+          <a:prstGeom prst="rect">
+            <a:avLst/>
+          </a:prstGeom>
+          <a:noFill/>
+          <a:ln>
+            <a:noFill/>
+          </a:ln>
+          <a:extLst>
+            <a:ext uri="{909E8E84-426E-40DD-AFC4-6F175D3DCCD1}">
+              <a14:hiddenFill xmlns:a14="http://schemas.microsoft.com/office/drawing/2010/main">
+                <a:solidFill>
+                  <a:srgbClr val="FFFFFF"/>
+                </a:solidFill>
+              </a14:hiddenFill>
+            </a:ext>
+            <a:ext uri="{91240B29-F687-4F45-9708-019B960494DF}">
+              <a14:hiddenLine xmlns:a14="http://schemas.microsoft.com/office/drawing/2010/main" w="9525">
+                <a:solidFill>
+                  <a:srgbClr val="000000"/>
+                </a:solidFill>
+                <a:miter lim="800000"/>
+                <a:headEnd/>
+                <a:tailEnd/>
+              </a14:hiddenLine>
+            </a:ext>
+          </a:extLst>
+        </p:spPr>
+        <p:txBody>
+          <a:bodyPr>
+            <a:spAutoFit/>
+          </a:bodyPr>
+          <a:lstStyle/>
+          <a:p>
+            <a:pPr algn="ctr" eaLnBrk="0" hangingPunct="0">
+              <a:tabLst>
+                <a:tab pos="457200" algn="l"/>
+              </a:tabLst>
+            </a:pPr>
+            <a:r>
+              <a:rPr lang="ru-RU" sz="2400" dirty="0" smtClean="0">
+                <a:solidFill>
+                  <a:schemeClr val="bg1"/>
+                </a:solidFill>
+                <a:cs typeface="Times New Roman" pitchFamily="18" charset="0"/>
+              </a:rPr>
+              <a:t>Комментарии</a:t>
+            </a:r>
+            <a:endParaRPr lang="ru-RU" sz="2400" b="1" dirty="0">
+              <a:solidFill>
+                <a:schemeClr val="bg1"/>
+              </a:solidFill>
+              <a:cs typeface="Times New Roman" pitchFamily="18" charset="0"/>
+            </a:endParaRPr>
+          </a:p>
+        </p:txBody>
+      </p:sp>
+      <p:sp>
+        <p:nvSpPr>
+          <p:cNvPr id="2" name="TextBox 1"/>
+          <p:cNvSpPr txBox="1"/>
+          <p:nvPr/>
+        </p:nvSpPr>
+        <p:spPr>
+          <a:xfrm>
+            <a:off x="107504" y="1114336"/>
+            <a:ext cx="8784976" cy="3046988"/>
+          </a:xfrm>
+          <a:prstGeom prst="rect">
+            <a:avLst/>
+          </a:prstGeom>
+          <a:noFill/>
+        </p:spPr>
+        <p:txBody>
+          <a:bodyPr wrap="square" rtlCol="0">
+            <a:spAutoFit/>
+          </a:bodyPr>
+          <a:lstStyle/>
+          <a:p>
+            <a:r>
+              <a:rPr lang="ru-RU" sz="2400" dirty="0" smtClean="0">
+                <a:solidFill>
+                  <a:schemeClr val="bg1"/>
+                </a:solidFill>
+              </a:rPr>
+              <a:t>Комментарий это поясняющий текст внутри программы. Данный текст полностью игнорируется компилятором. Язык </a:t>
+            </a:r>
+            <a:r>
+              <a:rPr lang="en-US" sz="2400" dirty="0" smtClean="0">
+                <a:solidFill>
+                  <a:schemeClr val="bg1"/>
+                </a:solidFill>
+              </a:rPr>
+              <a:t>C# </a:t>
+            </a:r>
+            <a:r>
+              <a:rPr lang="ru-RU" sz="2400" dirty="0" smtClean="0">
+                <a:solidFill>
+                  <a:schemeClr val="bg1"/>
+                </a:solidFill>
+              </a:rPr>
+              <a:t>поддерживает три типа комментариев:</a:t>
+            </a:r>
+          </a:p>
+          <a:p>
+            <a:endParaRPr lang="ru-RU" sz="2400" dirty="0">
+              <a:solidFill>
+                <a:schemeClr val="bg1"/>
+              </a:solidFill>
+            </a:endParaRPr>
+          </a:p>
+          <a:p>
+            <a:pPr marL="342900" indent="-342900">
+              <a:buFont typeface="+mj-lt"/>
+              <a:buAutoNum type="arabicPeriod"/>
+            </a:pPr>
+            <a:r>
+              <a:rPr lang="ru-RU" sz="2400" dirty="0" smtClean="0">
+                <a:solidFill>
+                  <a:schemeClr val="bg1"/>
+                </a:solidFill>
+              </a:rPr>
+              <a:t>Строчный</a:t>
+            </a:r>
+            <a:r>
+              <a:rPr lang="en-US" sz="2400" dirty="0" smtClean="0">
+                <a:solidFill>
+                  <a:schemeClr val="bg1"/>
+                </a:solidFill>
+              </a:rPr>
+              <a:t>. </a:t>
+            </a:r>
+            <a:r>
+              <a:rPr lang="ru-RU" sz="2400" dirty="0" smtClean="0">
+                <a:solidFill>
+                  <a:schemeClr val="bg1"/>
+                </a:solidFill>
+              </a:rPr>
+              <a:t>Действует до конца строки</a:t>
+            </a:r>
+            <a:r>
+              <a:rPr lang="en-US" sz="2400" dirty="0" smtClean="0">
+                <a:solidFill>
+                  <a:schemeClr val="bg1"/>
+                </a:solidFill>
+              </a:rPr>
+              <a:t>. </a:t>
+            </a:r>
+            <a:r>
+              <a:rPr lang="en-US" sz="2400" dirty="0" smtClean="0">
+                <a:solidFill>
+                  <a:srgbClr val="FFFF00"/>
+                </a:solidFill>
+              </a:rPr>
+              <a:t>//</a:t>
+            </a:r>
+            <a:r>
+              <a:rPr lang="en-US" sz="2400" dirty="0" smtClean="0">
+                <a:solidFill>
+                  <a:schemeClr val="bg1"/>
+                </a:solidFill>
+              </a:rPr>
+              <a:t> </a:t>
+            </a:r>
+            <a:r>
+              <a:rPr lang="ru-RU" sz="2400" dirty="0" smtClean="0">
+                <a:solidFill>
+                  <a:srgbClr val="FFC000"/>
+                </a:solidFill>
+              </a:rPr>
+              <a:t>текст комментария</a:t>
+            </a:r>
+          </a:p>
+          <a:p>
+            <a:pPr marL="342900" indent="-342900">
+              <a:buFont typeface="+mj-lt"/>
+              <a:buAutoNum type="arabicPeriod"/>
+            </a:pPr>
+            <a:r>
+              <a:rPr lang="ru-RU" sz="2400" dirty="0" smtClean="0">
+                <a:solidFill>
+                  <a:schemeClr val="bg1"/>
+                </a:solidFill>
+              </a:rPr>
+              <a:t>Блочный </a:t>
+            </a:r>
+            <a:r>
+              <a:rPr lang="en-US" sz="2400" dirty="0" smtClean="0">
+                <a:solidFill>
+                  <a:srgbClr val="FFFF00"/>
+                </a:solidFill>
+              </a:rPr>
+              <a:t>/*</a:t>
+            </a:r>
+            <a:r>
+              <a:rPr lang="en-US" sz="2400" dirty="0" smtClean="0">
+                <a:solidFill>
+                  <a:schemeClr val="bg1"/>
+                </a:solidFill>
+              </a:rPr>
+              <a:t> </a:t>
+            </a:r>
+            <a:r>
+              <a:rPr lang="ru-RU" sz="2400" dirty="0" smtClean="0">
+                <a:solidFill>
+                  <a:srgbClr val="FFC000"/>
+                </a:solidFill>
+              </a:rPr>
+              <a:t>текст комментария</a:t>
+            </a:r>
+            <a:r>
+              <a:rPr lang="ru-RU" sz="2400" dirty="0" smtClean="0">
+                <a:solidFill>
+                  <a:schemeClr val="bg1"/>
+                </a:solidFill>
+              </a:rPr>
+              <a:t> </a:t>
+            </a:r>
+            <a:r>
+              <a:rPr lang="en-US" sz="2400" dirty="0" smtClean="0">
+                <a:solidFill>
+                  <a:srgbClr val="FFFF00"/>
+                </a:solidFill>
+              </a:rPr>
+              <a:t>*/</a:t>
+            </a:r>
+            <a:endParaRPr lang="ru-RU" sz="2400" dirty="0" smtClean="0">
+              <a:solidFill>
+                <a:srgbClr val="FFFF00"/>
+              </a:solidFill>
+            </a:endParaRPr>
+          </a:p>
+          <a:p>
+            <a:pPr marL="342900" indent="-342900">
+              <a:buFont typeface="+mj-lt"/>
+              <a:buAutoNum type="arabicPeriod"/>
+            </a:pPr>
+            <a:r>
+              <a:rPr lang="en-US" sz="2400" dirty="0" smtClean="0">
+                <a:solidFill>
+                  <a:schemeClr val="bg1"/>
+                </a:solidFill>
+              </a:rPr>
+              <a:t>XML </a:t>
+            </a:r>
+            <a:r>
+              <a:rPr lang="ru-RU" sz="2400" dirty="0" smtClean="0">
+                <a:solidFill>
+                  <a:schemeClr val="bg1"/>
+                </a:solidFill>
+              </a:rPr>
+              <a:t>комментарии </a:t>
+            </a:r>
+            <a:r>
+              <a:rPr lang="en-US" sz="2400" dirty="0" smtClean="0">
+                <a:solidFill>
+                  <a:srgbClr val="FFFF00"/>
+                </a:solidFill>
+              </a:rPr>
+              <a:t>///</a:t>
+            </a:r>
+          </a:p>
+          <a:p>
+            <a:pPr marL="800100" lvl="1" indent="-342900">
+              <a:buFont typeface="Arial" pitchFamily="34" charset="0"/>
+              <a:buChar char="•"/>
+            </a:pPr>
+            <a:r>
+              <a:rPr lang="en-US" sz="2400" dirty="0">
+                <a:solidFill>
+                  <a:schemeClr val="bg1"/>
+                </a:solidFill>
+                <a:hlinkClick r:id="rId3"/>
+              </a:rPr>
+              <a:t>http://</a:t>
+            </a:r>
+            <a:r>
+              <a:rPr lang="en-US" sz="2400" dirty="0" smtClean="0">
+                <a:solidFill>
+                  <a:schemeClr val="bg1"/>
+                </a:solidFill>
+                <a:hlinkClick r:id="rId3"/>
+              </a:rPr>
+              <a:t>msdn.microsoft.com/en-us/library/b2s063f7.aspx</a:t>
+            </a:r>
+            <a:endParaRPr lang="en-US" sz="2400" dirty="0">
+              <a:solidFill>
+                <a:schemeClr val="bg1"/>
+              </a:solidFill>
+            </a:endParaRPr>
+          </a:p>
+        </p:txBody>
+      </p:sp>
+    </p:spTree>
+    <p:extLst>
+      <p:ext uri="{BB962C8B-B14F-4D97-AF65-F5344CB8AC3E}">
+        <p14:creationId xmlns:p14="http://schemas.microsoft.com/office/powerpoint/2010/main" val="3210553376"/>
+      </p:ext>
+    </p:extLst>
+  </p:cSld>
+  <p:clrMapOvr>
+    <a:masterClrMapping/>
+  </p:clrMapOvr>
+  <p:timing>
+    <p:tnLst>
+      <p:par>
+        <p:cTn id="1" dur="indefinite" restart="never" nodeType="tmRoot"/>
+      </p:par>
+    </p:tnLst>
+  </p:timing>
+</p:sld>
+</file>
+
+<file path=ppt/slides/slide35.xml><?xml version="1.0" encoding="utf-8"?>
+<p:sld xmlns:a="http://schemas.openxmlformats.org/drawingml/2006/main" xmlns:r="http://schemas.openxmlformats.org/officeDocument/2006/relationships" xmlns:p="http://schemas.openxmlformats.org/presentationml/2006/main">
+  <p:cSld>
+    <p:bg>
+      <p:bgPr>
+        <a:blipFill dpi="0" rotWithShape="1">
+          <a:blip r:embed="rId2">
+            <a:lum/>
+          </a:blip>
+          <a:srcRect/>
+          <a:stretch>
+            <a:fillRect/>
+          </a:stretch>
+        </a:blipFill>
+        <a:effectLst/>
+      </p:bgPr>
+    </p:bg>
+    <p:spTree>
+      <p:nvGrpSpPr>
+        <p:cNvPr id="1" name=""/>
+        <p:cNvGrpSpPr/>
+        <p:nvPr/>
+      </p:nvGrpSpPr>
+      <p:grpSpPr>
+        <a:xfrm>
+          <a:off x="0" y="0"/>
+          <a:ext cx="0" cy="0"/>
+          <a:chOff x="0" y="0"/>
+          <a:chExt cx="0" cy="0"/>
+        </a:xfrm>
+      </p:grpSpPr>
+      <p:sp>
+        <p:nvSpPr>
           <p:cNvPr id="22530" name="Прямоугольник 6"/>
           <p:cNvSpPr>
             <a:spLocks noChangeArrowheads="1"/>
@@ -28221,16 +28578,7 @@
                 </a:solidFill>
                 <a:hlinkClick r:id="rId5"/>
               </a:rPr>
-              <a:t>channel9.msdn.com</a:t>
-            </a:r>
-            <a:r>
-              <a:rPr lang="en-US" u="sng" dirty="0" smtClean="0">
-                <a:solidFill>
-                  <a:schemeClr val="bg1"/>
-                </a:solidFill>
-                <a:hlinkClick r:id="rId5"/>
-              </a:rPr>
-              <a:t>/</a:t>
+              <a:t>channel9.msdn.com/</a:t>
             </a:r>
             <a:endParaRPr lang="en-US" u="sng" dirty="0" smtClean="0">
               <a:solidFill>
@@ -28320,16 +28668,7 @@
                 </a:solidFill>
                 <a:hlinkClick r:id="rId7"/>
               </a:rPr>
-              <a:t>http://</a:t>
-            </a:r>
-            <a:r>
-              <a:rPr lang="en-US">
-                <a:solidFill>
-                  <a:schemeClr val="bg1"/>
-                </a:solidFill>
-                <a:hlinkClick r:id="rId7"/>
-              </a:rPr>
-              <a:t>www.techdays.ru</a:t>
+              <a:t>http://www.techdays.ru</a:t>
             </a:r>
             <a:r>
               <a:rPr lang="en-US" smtClean="0">

</xml_diff>

<commit_message>
Updated links in lesson #1
</commit_message>
<xml_diff>
--- a/Presentation/lesson-01.pptx
+++ b/Presentation/lesson-01.pptx
@@ -322,7 +322,7 @@
           <a:p>
             <a:fld id="{8E6E6A2A-E9D3-4A0D-B04A-ABDD367A1E08}" type="datetimeFigureOut">
               <a:rPr lang="ru-RU" smtClean="0"/>
-              <a:t>06.12.2012</a:t>
+              <a:t>28.12.2012</a:t>
             </a:fld>
             <a:endParaRPr lang="ru-RU"/>
           </a:p>
@@ -492,7 +492,7 @@
           <a:p>
             <a:fld id="{8E6E6A2A-E9D3-4A0D-B04A-ABDD367A1E08}" type="datetimeFigureOut">
               <a:rPr lang="ru-RU" smtClean="0"/>
-              <a:t>06.12.2012</a:t>
+              <a:t>28.12.2012</a:t>
             </a:fld>
             <a:endParaRPr lang="ru-RU"/>
           </a:p>
@@ -672,7 +672,7 @@
           <a:p>
             <a:fld id="{8E6E6A2A-E9D3-4A0D-B04A-ABDD367A1E08}" type="datetimeFigureOut">
               <a:rPr lang="ru-RU" smtClean="0"/>
-              <a:t>06.12.2012</a:t>
+              <a:t>28.12.2012</a:t>
             </a:fld>
             <a:endParaRPr lang="ru-RU"/>
           </a:p>
@@ -842,7 +842,7 @@
           <a:p>
             <a:fld id="{8E6E6A2A-E9D3-4A0D-B04A-ABDD367A1E08}" type="datetimeFigureOut">
               <a:rPr lang="ru-RU" smtClean="0"/>
-              <a:t>06.12.2012</a:t>
+              <a:t>28.12.2012</a:t>
             </a:fld>
             <a:endParaRPr lang="ru-RU"/>
           </a:p>
@@ -1088,7 +1088,7 @@
           <a:p>
             <a:fld id="{8E6E6A2A-E9D3-4A0D-B04A-ABDD367A1E08}" type="datetimeFigureOut">
               <a:rPr lang="ru-RU" smtClean="0"/>
-              <a:t>06.12.2012</a:t>
+              <a:t>28.12.2012</a:t>
             </a:fld>
             <a:endParaRPr lang="ru-RU"/>
           </a:p>
@@ -1376,7 +1376,7 @@
           <a:p>
             <a:fld id="{8E6E6A2A-E9D3-4A0D-B04A-ABDD367A1E08}" type="datetimeFigureOut">
               <a:rPr lang="ru-RU" smtClean="0"/>
-              <a:t>06.12.2012</a:t>
+              <a:t>28.12.2012</a:t>
             </a:fld>
             <a:endParaRPr lang="ru-RU"/>
           </a:p>
@@ -1798,7 +1798,7 @@
           <a:p>
             <a:fld id="{8E6E6A2A-E9D3-4A0D-B04A-ABDD367A1E08}" type="datetimeFigureOut">
               <a:rPr lang="ru-RU" smtClean="0"/>
-              <a:t>06.12.2012</a:t>
+              <a:t>28.12.2012</a:t>
             </a:fld>
             <a:endParaRPr lang="ru-RU"/>
           </a:p>
@@ -1916,7 +1916,7 @@
           <a:p>
             <a:fld id="{8E6E6A2A-E9D3-4A0D-B04A-ABDD367A1E08}" type="datetimeFigureOut">
               <a:rPr lang="ru-RU" smtClean="0"/>
-              <a:t>06.12.2012</a:t>
+              <a:t>28.12.2012</a:t>
             </a:fld>
             <a:endParaRPr lang="ru-RU"/>
           </a:p>
@@ -2011,7 +2011,7 @@
           <a:p>
             <a:fld id="{8E6E6A2A-E9D3-4A0D-B04A-ABDD367A1E08}" type="datetimeFigureOut">
               <a:rPr lang="ru-RU" smtClean="0"/>
-              <a:t>06.12.2012</a:t>
+              <a:t>28.12.2012</a:t>
             </a:fld>
             <a:endParaRPr lang="ru-RU"/>
           </a:p>
@@ -2288,7 +2288,7 @@
           <a:p>
             <a:fld id="{8E6E6A2A-E9D3-4A0D-B04A-ABDD367A1E08}" type="datetimeFigureOut">
               <a:rPr lang="ru-RU" smtClean="0"/>
-              <a:t>06.12.2012</a:t>
+              <a:t>28.12.2012</a:t>
             </a:fld>
             <a:endParaRPr lang="ru-RU"/>
           </a:p>
@@ -2541,7 +2541,7 @@
           <a:p>
             <a:fld id="{8E6E6A2A-E9D3-4A0D-B04A-ABDD367A1E08}" type="datetimeFigureOut">
               <a:rPr lang="ru-RU" smtClean="0"/>
-              <a:t>06.12.2012</a:t>
+              <a:t>28.12.2012</a:t>
             </a:fld>
             <a:endParaRPr lang="ru-RU"/>
           </a:p>
@@ -2754,7 +2754,7 @@
           <a:p>
             <a:fld id="{8E6E6A2A-E9D3-4A0D-B04A-ABDD367A1E08}" type="datetimeFigureOut">
               <a:rPr lang="ru-RU" smtClean="0"/>
-              <a:t>06.12.2012</a:t>
+              <a:t>28.12.2012</a:t>
             </a:fld>
             <a:endParaRPr lang="ru-RU"/>
           </a:p>
@@ -28429,7 +28429,7 @@
         <p:spPr>
           <a:xfrm>
             <a:off x="251520" y="188640"/>
-            <a:ext cx="8640960" cy="3631763"/>
+            <a:ext cx="8640960" cy="5293757"/>
           </a:xfrm>
           <a:prstGeom prst="rect">
             <a:avLst/>
@@ -28592,63 +28592,31 @@
               <a:buChar char="•"/>
             </a:pPr>
             <a:r>
-              <a:rPr lang="ru-RU" dirty="0" smtClean="0">
-                <a:solidFill>
-                  <a:schemeClr val="bg1"/>
-                </a:solidFill>
-              </a:rPr>
-              <a:t>С</a:t>
-            </a:r>
-            <a:r>
               <a:rPr lang="en-US" dirty="0" smtClean="0">
                 <a:solidFill>
                   <a:schemeClr val="bg1"/>
                 </a:solidFill>
-              </a:rPr>
-              <a:t># Little Wonders</a:t>
-            </a:r>
-            <a:r>
-              <a:rPr lang="ru-RU" dirty="0" smtClean="0">
-                <a:solidFill>
-                  <a:schemeClr val="bg1"/>
-                </a:solidFill>
-              </a:rPr>
-              <a:t> -</a:t>
+                <a:hlinkClick r:id="rId6"/>
+              </a:rPr>
+              <a:t>http</a:t>
+            </a:r>
+            <a:r>
+              <a:rPr lang="en-US" dirty="0">
+                <a:solidFill>
+                  <a:schemeClr val="bg1"/>
+                </a:solidFill>
+                <a:hlinkClick r:id="rId6"/>
+              </a:rPr>
+              <a:t>://www.techdays.ru</a:t>
             </a:r>
             <a:r>
               <a:rPr lang="en-US" dirty="0" smtClean="0">
                 <a:solidFill>
                   <a:schemeClr val="bg1"/>
                 </a:solidFill>
-              </a:rPr>
-              <a:t> </a:t>
-            </a:r>
-            <a:r>
-              <a:rPr lang="en-US" dirty="0" smtClean="0">
-                <a:solidFill>
-                  <a:schemeClr val="bg1"/>
-                </a:solidFill>
                 <a:hlinkClick r:id="rId6"/>
               </a:rPr>
-              <a:t>http</a:t>
-            </a:r>
-            <a:r>
-              <a:rPr lang="en-US" dirty="0">
-                <a:solidFill>
-                  <a:schemeClr val="bg1"/>
-                </a:solidFill>
-                <a:hlinkClick r:id="rId6"/>
-              </a:rPr>
-              <a:t>://</a:t>
-            </a:r>
-            <a:r>
-              <a:rPr lang="en-US" dirty="0" smtClean="0">
-                <a:solidFill>
-                  <a:schemeClr val="bg1"/>
-                </a:solidFill>
-                <a:hlinkClick r:id="rId6"/>
-              </a:rPr>
-              <a:t>blackrabbitcoder.net/category/11989.aspx</a:t>
+              <a:t>/</a:t>
             </a:r>
             <a:endParaRPr lang="en-US" dirty="0" smtClean="0">
               <a:solidFill>
@@ -28661,57 +28629,74 @@
               <a:buFont typeface="Arial" pitchFamily="34" charset="0"/>
               <a:buChar char="•"/>
             </a:pPr>
-            <a:r>
-              <a:rPr lang="en-US">
-                <a:solidFill>
-                  <a:schemeClr val="bg1"/>
-                </a:solidFill>
-                <a:hlinkClick r:id="rId7"/>
-              </a:rPr>
-              <a:t>http://www.techdays.ru</a:t>
-            </a:r>
-            <a:r>
-              <a:rPr lang="en-US" smtClean="0">
-                <a:solidFill>
-                  <a:schemeClr val="bg1"/>
-                </a:solidFill>
-                <a:hlinkClick r:id="rId7"/>
-              </a:rPr>
-              <a:t>/</a:t>
-            </a:r>
-            <a:endParaRPr lang="en-US" smtClean="0">
-              <a:solidFill>
-                <a:schemeClr val="bg1"/>
-              </a:solidFill>
-            </a:endParaRPr>
+            <a:endParaRPr lang="en-US" dirty="0" smtClean="0">
+              <a:solidFill>
+                <a:schemeClr val="bg1"/>
+              </a:solidFill>
+            </a:endParaRPr>
+          </a:p>
+          <a:p>
+            <a:r>
+              <a:rPr lang="ru-RU" dirty="0" smtClean="0">
+                <a:solidFill>
+                  <a:schemeClr val="bg1"/>
+                </a:solidFill>
+              </a:rPr>
+              <a:t>Форумы</a:t>
+            </a:r>
+            <a:r>
+              <a:rPr lang="ru-RU" dirty="0" smtClean="0">
+                <a:solidFill>
+                  <a:schemeClr val="bg1"/>
+                </a:solidFill>
+              </a:rPr>
+              <a:t>:</a:t>
+            </a:r>
           </a:p>
           <a:p>
             <a:pPr marL="742950" lvl="1" indent="-285750">
               <a:buFont typeface="Arial" pitchFamily="34" charset="0"/>
               <a:buChar char="•"/>
             </a:pPr>
-            <a:endParaRPr lang="en-US" dirty="0" smtClean="0">
-              <a:solidFill>
-                <a:schemeClr val="bg1"/>
-              </a:solidFill>
-            </a:endParaRPr>
-          </a:p>
-          <a:p>
+            <a:r>
+              <a:rPr lang="en-US" dirty="0" smtClean="0">
+                <a:solidFill>
+                  <a:schemeClr val="bg1"/>
+                </a:solidFill>
+              </a:rPr>
+              <a:t>[RUS</a:t>
+            </a:r>
+            <a:r>
+              <a:rPr lang="en-US" dirty="0">
+                <a:solidFill>
+                  <a:schemeClr val="bg1"/>
+                </a:solidFill>
+              </a:rPr>
+              <a:t>] </a:t>
+            </a:r>
+            <a:r>
+              <a:rPr lang="en-US" dirty="0">
+                <a:solidFill>
+                  <a:schemeClr val="bg1"/>
+                </a:solidFill>
+                <a:hlinkClick r:id="rId7"/>
+              </a:rPr>
+              <a:t>http://www.rsdn.ru</a:t>
+            </a:r>
+            <a:r>
+              <a:rPr lang="en-US" dirty="0" smtClean="0">
+                <a:solidFill>
+                  <a:schemeClr val="bg1"/>
+                </a:solidFill>
+                <a:hlinkClick r:id="rId7"/>
+              </a:rPr>
+              <a:t>/</a:t>
+            </a:r>
             <a:endParaRPr lang="ru-RU" dirty="0" smtClean="0">
               <a:solidFill>
                 <a:schemeClr val="bg1"/>
               </a:solidFill>
             </a:endParaRPr>
-          </a:p>
-          <a:p>
-            <a:r>
-              <a:rPr lang="ru-RU" dirty="0" smtClean="0">
-                <a:solidFill>
-                  <a:schemeClr val="bg1"/>
-                </a:solidFill>
-              </a:rPr>
-              <a:t>Форумы:</a:t>
-            </a:r>
           </a:p>
           <a:p>
             <a:pPr marL="742950" lvl="1" indent="-285750">
@@ -28719,29 +28704,37 @@
               <a:buChar char="•"/>
             </a:pPr>
             <a:r>
+              <a:rPr lang="en-US" dirty="0">
+                <a:solidFill>
+                  <a:schemeClr val="bg1"/>
+                </a:solidFill>
+              </a:rPr>
+              <a:t>[RUS</a:t>
+            </a:r>
+            <a:r>
               <a:rPr lang="en-US" dirty="0" smtClean="0">
                 <a:solidFill>
                   <a:schemeClr val="bg1"/>
                 </a:solidFill>
               </a:rPr>
-              <a:t>[RUS</a:t>
+              <a:t>]</a:t>
+            </a:r>
+            <a:r>
+              <a:rPr lang="ru-RU" dirty="0" smtClean="0">
+                <a:solidFill>
+                  <a:schemeClr val="bg1"/>
+                </a:solidFill>
+              </a:rPr>
+              <a:t> </a:t>
             </a:r>
             <a:r>
               <a:rPr lang="en-US" dirty="0">
                 <a:solidFill>
                   <a:schemeClr val="bg1"/>
                 </a:solidFill>
-              </a:rPr>
-              <a:t>] </a:t>
-            </a:r>
-            <a:r>
-              <a:rPr lang="en-US" dirty="0">
-                <a:solidFill>
-                  <a:schemeClr val="bg1"/>
-                </a:solidFill>
                 <a:hlinkClick r:id="rId8"/>
               </a:rPr>
-              <a:t>http://www.rsdn.ru</a:t>
+              <a:t>www.sql.ru/forum</a:t>
             </a:r>
             <a:r>
               <a:rPr lang="en-US" dirty="0" smtClean="0">
@@ -28752,7 +28745,7 @@
               </a:rPr>
               <a:t>/</a:t>
             </a:r>
-            <a:endParaRPr lang="ru-RU" dirty="0" smtClean="0">
+            <a:endParaRPr lang="en-US" dirty="0" smtClean="0">
               <a:solidFill>
                 <a:schemeClr val="bg1"/>
               </a:solidFill>
@@ -28769,43 +28762,27 @@
                   <a:schemeClr val="bg1"/>
                 </a:solidFill>
               </a:rPr>
-              <a:t>[RUS</a:t>
+              <a:t>[ENG] </a:t>
+            </a:r>
+            <a:r>
+              <a:rPr lang="en-US" dirty="0">
+                <a:solidFill>
+                  <a:schemeClr val="bg1"/>
+                </a:solidFill>
+                <a:hlinkClick r:id="rId9"/>
+              </a:rPr>
+              <a:t>http://stackoverflow.com</a:t>
             </a:r>
             <a:r>
               <a:rPr lang="en-US" dirty="0" smtClean="0">
                 <a:solidFill>
                   <a:schemeClr val="bg1"/>
                 </a:solidFill>
-              </a:rPr>
-              <a:t>]</a:t>
-            </a:r>
-            <a:r>
-              <a:rPr lang="ru-RU" dirty="0" smtClean="0">
-                <a:solidFill>
-                  <a:schemeClr val="bg1"/>
-                </a:solidFill>
-              </a:rPr>
-              <a:t> </a:t>
-            </a:r>
-            <a:r>
-              <a:rPr lang="en-US" dirty="0">
-                <a:solidFill>
-                  <a:schemeClr val="bg1"/>
-                </a:solidFill>
                 <a:hlinkClick r:id="rId9"/>
               </a:rPr>
-              <a:t>www.sql.ru/forum</a:t>
-            </a:r>
-            <a:r>
-              <a:rPr lang="en-US" dirty="0" smtClean="0">
-                <a:solidFill>
-                  <a:schemeClr val="bg1"/>
-                </a:solidFill>
-                <a:hlinkClick r:id="rId9"/>
-              </a:rPr>
               <a:t>/</a:t>
             </a:r>
-            <a:endParaRPr lang="en-US" dirty="0" smtClean="0">
+            <a:endParaRPr lang="en-US" dirty="0">
               <a:solidFill>
                 <a:schemeClr val="bg1"/>
               </a:solidFill>
@@ -28816,13 +28793,50 @@
               <a:buFont typeface="Arial" pitchFamily="34" charset="0"/>
               <a:buChar char="•"/>
             </a:pPr>
+            <a:endParaRPr lang="en-US" dirty="0">
+              <a:solidFill>
+                <a:schemeClr val="bg1"/>
+              </a:solidFill>
+            </a:endParaRPr>
+          </a:p>
+          <a:p>
+            <a:r>
+              <a:rPr lang="ru-RU" dirty="0" smtClean="0">
+                <a:solidFill>
+                  <a:schemeClr val="bg1"/>
+                </a:solidFill>
+              </a:rPr>
+              <a:t>Блоги</a:t>
+            </a:r>
+          </a:p>
+          <a:p>
+            <a:pPr marL="742950" lvl="1" indent="-285750">
+              <a:buFont typeface="Arial" pitchFamily="34" charset="0"/>
+              <a:buChar char="•"/>
+            </a:pPr>
             <a:r>
               <a:rPr lang="en-US" dirty="0">
                 <a:solidFill>
                   <a:schemeClr val="bg1"/>
                 </a:solidFill>
               </a:rPr>
-              <a:t>[ENG] </a:t>
+              <a:t>.NET Framework </a:t>
+            </a:r>
+            <a:r>
+              <a:rPr lang="en-US" dirty="0" smtClean="0">
+                <a:solidFill>
+                  <a:schemeClr val="bg1"/>
+                </a:solidFill>
+              </a:rPr>
+              <a:t>Blog</a:t>
+            </a:r>
+            <a:r>
+              <a:rPr lang="ru-RU" dirty="0" smtClean="0">
+                <a:solidFill>
+                  <a:schemeClr val="bg1"/>
+                </a:solidFill>
+              </a:rPr>
+              <a:t>: </a:t>
             </a:r>
             <a:r>
               <a:rPr lang="en-US" dirty="0">
@@ -28831,7 +28845,7 @@
                 </a:solidFill>
                 <a:hlinkClick r:id="rId10"/>
               </a:rPr>
-              <a:t>http://stackoverflow.com</a:t>
+              <a:t>http://blogs.msdn.com/b/dotnet</a:t>
             </a:r>
             <a:r>
               <a:rPr lang="en-US" dirty="0" smtClean="0">
@@ -28842,6 +28856,236 @@
               </a:rPr>
               <a:t>/</a:t>
             </a:r>
+            <a:endParaRPr lang="ru-RU" dirty="0" smtClean="0">
+              <a:solidFill>
+                <a:schemeClr val="bg1"/>
+              </a:solidFill>
+            </a:endParaRPr>
+          </a:p>
+          <a:p>
+            <a:pPr marL="742950" lvl="1" indent="-285750">
+              <a:buFont typeface="Arial" pitchFamily="34" charset="0"/>
+              <a:buChar char="•"/>
+            </a:pPr>
+            <a:r>
+              <a:rPr lang="en-US" dirty="0" smtClean="0">
+                <a:solidFill>
+                  <a:schemeClr val="bg1"/>
+                </a:solidFill>
+              </a:rPr>
+              <a:t>Base </a:t>
+            </a:r>
+            <a:r>
+              <a:rPr lang="en-US" dirty="0">
+                <a:solidFill>
+                  <a:schemeClr val="bg1"/>
+                </a:solidFill>
+              </a:rPr>
+              <a:t>Class Library (BCL) </a:t>
+            </a:r>
+            <a:r>
+              <a:rPr lang="en-US" dirty="0" smtClean="0">
+                <a:solidFill>
+                  <a:schemeClr val="bg1"/>
+                </a:solidFill>
+              </a:rPr>
+              <a:t>Blog</a:t>
+            </a:r>
+            <a:r>
+              <a:rPr lang="ru-RU" dirty="0" smtClean="0">
+                <a:solidFill>
+                  <a:schemeClr val="bg1"/>
+                </a:solidFill>
+              </a:rPr>
+              <a:t>: </a:t>
+            </a:r>
+            <a:r>
+              <a:rPr lang="en-US" dirty="0">
+                <a:solidFill>
+                  <a:schemeClr val="bg1"/>
+                </a:solidFill>
+                <a:hlinkClick r:id="rId11"/>
+              </a:rPr>
+              <a:t>http://blogs.msdn.com/b/bclteam</a:t>
+            </a:r>
+            <a:r>
+              <a:rPr lang="en-US" dirty="0" smtClean="0">
+                <a:solidFill>
+                  <a:schemeClr val="bg1"/>
+                </a:solidFill>
+                <a:hlinkClick r:id="rId11"/>
+              </a:rPr>
+              <a:t>/</a:t>
+            </a:r>
+            <a:endParaRPr lang="ru-RU" dirty="0" smtClean="0">
+              <a:solidFill>
+                <a:schemeClr val="bg1"/>
+              </a:solidFill>
+            </a:endParaRPr>
+          </a:p>
+          <a:p>
+            <a:pPr marL="742950" lvl="1" indent="-285750">
+              <a:buFont typeface="Arial" pitchFamily="34" charset="0"/>
+              <a:buChar char="•"/>
+            </a:pPr>
+            <a:r>
+              <a:rPr lang="en-US" dirty="0" smtClean="0">
+                <a:solidFill>
+                  <a:schemeClr val="bg1"/>
+                </a:solidFill>
+              </a:rPr>
+              <a:t>ADO.NET Blog</a:t>
+            </a:r>
+            <a:r>
+              <a:rPr lang="ru-RU" dirty="0" smtClean="0">
+                <a:solidFill>
+                  <a:schemeClr val="bg1"/>
+                </a:solidFill>
+              </a:rPr>
+              <a:t>: </a:t>
+            </a:r>
+            <a:r>
+              <a:rPr lang="en-US" dirty="0">
+                <a:solidFill>
+                  <a:schemeClr val="bg1"/>
+                </a:solidFill>
+                <a:hlinkClick r:id="rId12"/>
+              </a:rPr>
+              <a:t>http://blogs.msdn.com/b/adonet</a:t>
+            </a:r>
+            <a:r>
+              <a:rPr lang="en-US" dirty="0" smtClean="0">
+                <a:solidFill>
+                  <a:schemeClr val="bg1"/>
+                </a:solidFill>
+                <a:hlinkClick r:id="rId12"/>
+              </a:rPr>
+              <a:t>/</a:t>
+            </a:r>
+            <a:endParaRPr lang="ru-RU" dirty="0" smtClean="0">
+              <a:solidFill>
+                <a:schemeClr val="bg1"/>
+              </a:solidFill>
+            </a:endParaRPr>
+          </a:p>
+          <a:p>
+            <a:pPr marL="742950" lvl="1" indent="-285750">
+              <a:buFont typeface="Arial" pitchFamily="34" charset="0"/>
+              <a:buChar char="•"/>
+            </a:pPr>
+            <a:r>
+              <a:rPr lang="en-US" dirty="0" smtClean="0">
+                <a:solidFill>
+                  <a:schemeClr val="bg1"/>
+                </a:solidFill>
+              </a:rPr>
+              <a:t>Parallel </a:t>
+            </a:r>
+            <a:r>
+              <a:rPr lang="en-US" dirty="0">
+                <a:solidFill>
+                  <a:schemeClr val="bg1"/>
+                </a:solidFill>
+              </a:rPr>
+              <a:t>Programming with .</a:t>
+            </a:r>
+            <a:r>
+              <a:rPr lang="en-US" dirty="0" smtClean="0">
+                <a:solidFill>
+                  <a:schemeClr val="bg1"/>
+                </a:solidFill>
+              </a:rPr>
+              <a:t>NET</a:t>
+            </a:r>
+            <a:r>
+              <a:rPr lang="ru-RU" dirty="0" smtClean="0">
+                <a:solidFill>
+                  <a:schemeClr val="bg1"/>
+                </a:solidFill>
+              </a:rPr>
+              <a:t>: </a:t>
+            </a:r>
+            <a:r>
+              <a:rPr lang="en-US" dirty="0">
+                <a:solidFill>
+                  <a:schemeClr val="bg1"/>
+                </a:solidFill>
+                <a:hlinkClick r:id="rId13"/>
+              </a:rPr>
+              <a:t>http://blogs.msdn.com/b/pfxteam</a:t>
+            </a:r>
+            <a:r>
+              <a:rPr lang="en-US" dirty="0" smtClean="0">
+                <a:solidFill>
+                  <a:schemeClr val="bg1"/>
+                </a:solidFill>
+                <a:hlinkClick r:id="rId13"/>
+              </a:rPr>
+              <a:t>/</a:t>
+            </a:r>
+            <a:endParaRPr lang="ru-RU" dirty="0" smtClean="0">
+              <a:solidFill>
+                <a:schemeClr val="bg1"/>
+              </a:solidFill>
+            </a:endParaRPr>
+          </a:p>
+          <a:p>
+            <a:pPr marL="742950" lvl="1" indent="-285750">
+              <a:buFont typeface="Arial" pitchFamily="34" charset="0"/>
+              <a:buChar char="•"/>
+            </a:pPr>
+            <a:r>
+              <a:rPr lang="ru-RU" dirty="0">
+                <a:solidFill>
+                  <a:schemeClr val="bg1"/>
+                </a:solidFill>
+              </a:rPr>
+              <a:t>С</a:t>
+            </a:r>
+            <a:r>
+              <a:rPr lang="en-US" dirty="0">
+                <a:solidFill>
+                  <a:schemeClr val="bg1"/>
+                </a:solidFill>
+              </a:rPr>
+              <a:t># Little Wonders</a:t>
+            </a:r>
+            <a:r>
+              <a:rPr lang="ru-RU" dirty="0">
+                <a:solidFill>
+                  <a:schemeClr val="bg1"/>
+                </a:solidFill>
+              </a:rPr>
+              <a:t> -</a:t>
+            </a:r>
+            <a:r>
+              <a:rPr lang="en-US" dirty="0">
+                <a:solidFill>
+                  <a:schemeClr val="bg1"/>
+                </a:solidFill>
+              </a:rPr>
+              <a:t> </a:t>
+            </a:r>
+            <a:r>
+              <a:rPr lang="en-US" dirty="0">
+                <a:solidFill>
+                  <a:schemeClr val="bg1"/>
+                </a:solidFill>
+                <a:hlinkClick r:id="rId14"/>
+              </a:rPr>
+              <a:t>http://blackrabbitcoder.net/category/11989.aspx</a:t>
+            </a:r>
+            <a:endParaRPr lang="ru-RU" dirty="0" smtClean="0">
+              <a:solidFill>
+                <a:schemeClr val="bg1"/>
+              </a:solidFill>
+            </a:endParaRPr>
+          </a:p>
+          <a:p>
+            <a:pPr marL="742950" lvl="1" indent="-285750">
+              <a:buFont typeface="Arial" pitchFamily="34" charset="0"/>
+              <a:buChar char="•"/>
+            </a:pPr>
             <a:endParaRPr lang="en-US" dirty="0">
               <a:solidFill>
                 <a:schemeClr val="bg1"/>

</xml_diff>

<commit_message>
Added non-use scenario for .NET
</commit_message>
<xml_diff>
--- a/Presentation/lesson-01.pptx
+++ b/Presentation/lesson-01.pptx
@@ -325,7 +325,7 @@
           <a:p>
             <a:fld id="{8E6E6A2A-E9D3-4A0D-B04A-ABDD367A1E08}" type="datetimeFigureOut">
               <a:rPr lang="ru-RU" smtClean="0"/>
-              <a:t>14.02.2013</a:t>
+              <a:t>25.02.2013</a:t>
             </a:fld>
             <a:endParaRPr lang="ru-RU"/>
           </a:p>
@@ -495,7 +495,7 @@
           <a:p>
             <a:fld id="{8E6E6A2A-E9D3-4A0D-B04A-ABDD367A1E08}" type="datetimeFigureOut">
               <a:rPr lang="ru-RU" smtClean="0"/>
-              <a:t>14.02.2013</a:t>
+              <a:t>25.02.2013</a:t>
             </a:fld>
             <a:endParaRPr lang="ru-RU"/>
           </a:p>
@@ -675,7 +675,7 @@
           <a:p>
             <a:fld id="{8E6E6A2A-E9D3-4A0D-B04A-ABDD367A1E08}" type="datetimeFigureOut">
               <a:rPr lang="ru-RU" smtClean="0"/>
-              <a:t>14.02.2013</a:t>
+              <a:t>25.02.2013</a:t>
             </a:fld>
             <a:endParaRPr lang="ru-RU"/>
           </a:p>
@@ -2060,7 +2060,7 @@
           <a:p>
             <a:fld id="{8E6E6A2A-E9D3-4A0D-B04A-ABDD367A1E08}" type="datetimeFigureOut">
               <a:rPr lang="ru-RU" smtClean="0"/>
-              <a:t>14.02.2013</a:t>
+              <a:t>25.02.2013</a:t>
             </a:fld>
             <a:endParaRPr lang="ru-RU"/>
           </a:p>
@@ -2933,7 +2933,7 @@
                 </a:solidFill>
               </a:rPr>
               <a:pPr/>
-              <a:t>14.02.2013</a:t>
+              <a:t>25.02.2013</a:t>
             </a:fld>
             <a:endParaRPr lang="ru-RU">
               <a:solidFill>
@@ -3204,7 +3204,7 @@
           <a:p>
             <a:fld id="{8E6E6A2A-E9D3-4A0D-B04A-ABDD367A1E08}" type="datetimeFigureOut">
               <a:rPr lang="ru-RU" smtClean="0"/>
-              <a:t>14.02.2013</a:t>
+              <a:t>25.02.2013</a:t>
             </a:fld>
             <a:endParaRPr lang="ru-RU"/>
           </a:p>
@@ -3492,7 +3492,7 @@
           <a:p>
             <a:fld id="{8E6E6A2A-E9D3-4A0D-B04A-ABDD367A1E08}" type="datetimeFigureOut">
               <a:rPr lang="ru-RU" smtClean="0"/>
-              <a:t>14.02.2013</a:t>
+              <a:t>25.02.2013</a:t>
             </a:fld>
             <a:endParaRPr lang="ru-RU"/>
           </a:p>
@@ -3914,7 +3914,7 @@
           <a:p>
             <a:fld id="{8E6E6A2A-E9D3-4A0D-B04A-ABDD367A1E08}" type="datetimeFigureOut">
               <a:rPr lang="ru-RU" smtClean="0"/>
-              <a:t>14.02.2013</a:t>
+              <a:t>25.02.2013</a:t>
             </a:fld>
             <a:endParaRPr lang="ru-RU"/>
           </a:p>
@@ -4032,7 +4032,7 @@
           <a:p>
             <a:fld id="{8E6E6A2A-E9D3-4A0D-B04A-ABDD367A1E08}" type="datetimeFigureOut">
               <a:rPr lang="ru-RU" smtClean="0"/>
-              <a:t>14.02.2013</a:t>
+              <a:t>25.02.2013</a:t>
             </a:fld>
             <a:endParaRPr lang="ru-RU"/>
           </a:p>
@@ -4127,7 +4127,7 @@
           <a:p>
             <a:fld id="{8E6E6A2A-E9D3-4A0D-B04A-ABDD367A1E08}" type="datetimeFigureOut">
               <a:rPr lang="ru-RU" smtClean="0"/>
-              <a:t>14.02.2013</a:t>
+              <a:t>25.02.2013</a:t>
             </a:fld>
             <a:endParaRPr lang="ru-RU"/>
           </a:p>
@@ -4404,7 +4404,7 @@
           <a:p>
             <a:fld id="{8E6E6A2A-E9D3-4A0D-B04A-ABDD367A1E08}" type="datetimeFigureOut">
               <a:rPr lang="ru-RU" smtClean="0"/>
-              <a:t>14.02.2013</a:t>
+              <a:t>25.02.2013</a:t>
             </a:fld>
             <a:endParaRPr lang="ru-RU"/>
           </a:p>
@@ -4657,7 +4657,7 @@
           <a:p>
             <a:fld id="{8E6E6A2A-E9D3-4A0D-B04A-ABDD367A1E08}" type="datetimeFigureOut">
               <a:rPr lang="ru-RU" smtClean="0"/>
-              <a:t>14.02.2013</a:t>
+              <a:t>25.02.2013</a:t>
             </a:fld>
             <a:endParaRPr lang="ru-RU"/>
           </a:p>
@@ -4870,7 +4870,7 @@
           <a:p>
             <a:fld id="{8E6E6A2A-E9D3-4A0D-B04A-ABDD367A1E08}" type="datetimeFigureOut">
               <a:rPr lang="ru-RU" smtClean="0"/>
-              <a:t>14.02.2013</a:t>
+              <a:t>25.02.2013</a:t>
             </a:fld>
             <a:endParaRPr lang="ru-RU"/>
           </a:p>
@@ -5396,7 +5396,7 @@
                 </a:solidFill>
               </a:rPr>
               <a:pPr/>
-              <a:t>14.02.2013</a:t>
+              <a:t>25.02.2013</a:t>
             </a:fld>
             <a:endParaRPr lang="ru-RU">
               <a:solidFill>
@@ -9061,15 +9061,7 @@
                   <a:schemeClr val="bg1"/>
                 </a:solidFill>
               </a:rPr>
-              <a:t>.NET </a:t>
-            </a:r>
-            <a:r>
-              <a:rPr lang="en-US" sz="3200" dirty="0" smtClean="0">
-                <a:solidFill>
-                  <a:schemeClr val="bg1"/>
-                </a:solidFill>
-              </a:rPr>
-              <a:t>Framework: </a:t>
+              <a:t>.NET Framework: </a:t>
             </a:r>
             <a:r>
               <a:rPr lang="ru-RU" sz="3200" dirty="0" smtClean="0">
@@ -9079,11 +9071,6 @@
               </a:rPr>
               <a:t>Составные части</a:t>
             </a:r>
-            <a:endParaRPr lang="ru-RU" sz="3200" dirty="0" smtClean="0">
-              <a:solidFill>
-                <a:schemeClr val="bg1"/>
-              </a:solidFill>
-            </a:endParaRPr>
           </a:p>
           <a:p>
             <a:pPr lvl="0"/>
@@ -36647,15 +36634,7 @@
                   <a:schemeClr val="bg1"/>
                 </a:solidFill>
               </a:rPr>
-              <a:t>.NET </a:t>
-            </a:r>
-            <a:r>
-              <a:rPr lang="en-US" sz="4400" dirty="0" smtClean="0">
-                <a:solidFill>
-                  <a:schemeClr val="bg1"/>
-                </a:solidFill>
-              </a:rPr>
-              <a:t>Framework</a:t>
+              <a:t>.NET Framework</a:t>
             </a:r>
             <a:endParaRPr lang="en-US" sz="4400" dirty="0">
               <a:solidFill>
@@ -36674,7 +36653,7 @@
         <p:spPr>
           <a:xfrm>
             <a:off x="251520" y="1052736"/>
-            <a:ext cx="8640960" cy="3416320"/>
+            <a:ext cx="8640960" cy="3693319"/>
           </a:xfrm>
           <a:prstGeom prst="rect">
             <a:avLst/>
@@ -36904,13 +36883,68 @@
                   <a:schemeClr val="bg1"/>
                 </a:solidFill>
               </a:rPr>
+              <a:t>Не рекомендуется для написания </a:t>
+            </a:r>
+            <a:r>
+              <a:rPr lang="en-US" dirty="0" smtClean="0">
+                <a:solidFill>
+                  <a:schemeClr val="bg1"/>
+                </a:solidFill>
+              </a:rPr>
+              <a:t>in-process shell </a:t>
+            </a:r>
+            <a:r>
+              <a:rPr lang="ru-RU" dirty="0" smtClean="0">
+                <a:solidFill>
+                  <a:schemeClr val="bg1"/>
+                </a:solidFill>
+              </a:rPr>
+              <a:t>расширений</a:t>
+            </a:r>
+            <a:r>
+              <a:rPr lang="en-US" dirty="0" smtClean="0">
+                <a:solidFill>
+                  <a:schemeClr val="bg1"/>
+                </a:solidFill>
+              </a:rPr>
+              <a:t> (via </a:t>
+            </a:r>
+            <a:r>
+              <a:rPr lang="en-US" dirty="0" err="1" smtClean="0">
+                <a:solidFill>
+                  <a:schemeClr val="bg1"/>
+                </a:solidFill>
+                <a:hlinkClick r:id="rId3"/>
+              </a:rPr>
+              <a:t>oldnewthing</a:t>
+            </a:r>
+            <a:r>
+              <a:rPr lang="en-US" dirty="0" smtClean="0">
+                <a:solidFill>
+                  <a:schemeClr val="bg1"/>
+                </a:solidFill>
+              </a:rPr>
+              <a:t>)</a:t>
+            </a:r>
+            <a:endParaRPr lang="en-US" dirty="0" smtClean="0">
+              <a:solidFill>
+                <a:schemeClr val="bg1"/>
+              </a:solidFill>
+            </a:endParaRPr>
+          </a:p>
+          <a:p>
+            <a:pPr marL="285750" indent="-285750">
+              <a:buFont typeface="Arial" pitchFamily="34" charset="0"/>
+              <a:buChar char="•"/>
+            </a:pPr>
+            <a:r>
+              <a:rPr lang="ru-RU" dirty="0" smtClean="0">
+                <a:solidFill>
+                  <a:schemeClr val="bg1"/>
+                </a:solidFill>
+              </a:rPr>
               <a:t>Не подходит для систем жесткого реального времени</a:t>
             </a:r>
-            <a:endParaRPr lang="ru-RU" dirty="0" smtClean="0">
-              <a:solidFill>
-                <a:schemeClr val="bg1"/>
-              </a:solidFill>
-            </a:endParaRPr>
           </a:p>
           <a:p>
             <a:pPr marL="285750" indent="-285750">

</xml_diff>

<commit_message>
Added string escapes and integer literals
</commit_message>
<xml_diff>
--- a/Presentation/lesson-01.pptx
+++ b/Presentation/lesson-01.pptx
@@ -321,7 +321,7 @@
             <a:fld id="{8E6E6A2A-E9D3-4A0D-B04A-ABDD367A1E08}" type="datetimeFigureOut">
               <a:rPr lang="ru-RU" smtClean="0"/>
               <a:pPr/>
-              <a:t>04.10.2013</a:t>
+              <a:t>19.10.2013</a:t>
             </a:fld>
             <a:endParaRPr lang="ru-RU"/>
           </a:p>
@@ -493,7 +493,7 @@
             <a:fld id="{8E6E6A2A-E9D3-4A0D-B04A-ABDD367A1E08}" type="datetimeFigureOut">
               <a:rPr lang="ru-RU" smtClean="0"/>
               <a:pPr/>
-              <a:t>04.10.2013</a:t>
+              <a:t>19.10.2013</a:t>
             </a:fld>
             <a:endParaRPr lang="ru-RU"/>
           </a:p>
@@ -675,7 +675,7 @@
             <a:fld id="{8E6E6A2A-E9D3-4A0D-B04A-ABDD367A1E08}" type="datetimeFigureOut">
               <a:rPr lang="ru-RU" smtClean="0"/>
               <a:pPr/>
-              <a:t>04.10.2013</a:t>
+              <a:t>19.10.2013</a:t>
             </a:fld>
             <a:endParaRPr lang="ru-RU"/>
           </a:p>
@@ -2062,7 +2062,7 @@
             <a:fld id="{8E6E6A2A-E9D3-4A0D-B04A-ABDD367A1E08}" type="datetimeFigureOut">
               <a:rPr lang="ru-RU" smtClean="0"/>
               <a:pPr/>
-              <a:t>04.10.2013</a:t>
+              <a:t>19.10.2013</a:t>
             </a:fld>
             <a:endParaRPr lang="ru-RU"/>
           </a:p>
@@ -2936,7 +2936,7 @@
                 </a:solidFill>
               </a:rPr>
               <a:pPr/>
-              <a:t>04.10.2013</a:t>
+              <a:t>19.10.2013</a:t>
             </a:fld>
             <a:endParaRPr lang="ru-RU">
               <a:solidFill>
@@ -3208,7 +3208,7 @@
             <a:fld id="{8E6E6A2A-E9D3-4A0D-B04A-ABDD367A1E08}" type="datetimeFigureOut">
               <a:rPr lang="ru-RU" smtClean="0"/>
               <a:pPr/>
-              <a:t>04.10.2013</a:t>
+              <a:t>19.10.2013</a:t>
             </a:fld>
             <a:endParaRPr lang="ru-RU"/>
           </a:p>
@@ -3498,7 +3498,7 @@
             <a:fld id="{8E6E6A2A-E9D3-4A0D-B04A-ABDD367A1E08}" type="datetimeFigureOut">
               <a:rPr lang="ru-RU" smtClean="0"/>
               <a:pPr/>
-              <a:t>04.10.2013</a:t>
+              <a:t>19.10.2013</a:t>
             </a:fld>
             <a:endParaRPr lang="ru-RU"/>
           </a:p>
@@ -3922,7 +3922,7 @@
             <a:fld id="{8E6E6A2A-E9D3-4A0D-B04A-ABDD367A1E08}" type="datetimeFigureOut">
               <a:rPr lang="ru-RU" smtClean="0"/>
               <a:pPr/>
-              <a:t>04.10.2013</a:t>
+              <a:t>19.10.2013</a:t>
             </a:fld>
             <a:endParaRPr lang="ru-RU"/>
           </a:p>
@@ -4042,7 +4042,7 @@
             <a:fld id="{8E6E6A2A-E9D3-4A0D-B04A-ABDD367A1E08}" type="datetimeFigureOut">
               <a:rPr lang="ru-RU" smtClean="0"/>
               <a:pPr/>
-              <a:t>04.10.2013</a:t>
+              <a:t>19.10.2013</a:t>
             </a:fld>
             <a:endParaRPr lang="ru-RU"/>
           </a:p>
@@ -4139,7 +4139,7 @@
             <a:fld id="{8E6E6A2A-E9D3-4A0D-B04A-ABDD367A1E08}" type="datetimeFigureOut">
               <a:rPr lang="ru-RU" smtClean="0"/>
               <a:pPr/>
-              <a:t>04.10.2013</a:t>
+              <a:t>19.10.2013</a:t>
             </a:fld>
             <a:endParaRPr lang="ru-RU"/>
           </a:p>
@@ -4418,7 +4418,7 @@
             <a:fld id="{8E6E6A2A-E9D3-4A0D-B04A-ABDD367A1E08}" type="datetimeFigureOut">
               <a:rPr lang="ru-RU" smtClean="0"/>
               <a:pPr/>
-              <a:t>04.10.2013</a:t>
+              <a:t>19.10.2013</a:t>
             </a:fld>
             <a:endParaRPr lang="ru-RU"/>
           </a:p>
@@ -4673,7 +4673,7 @@
             <a:fld id="{8E6E6A2A-E9D3-4A0D-B04A-ABDD367A1E08}" type="datetimeFigureOut">
               <a:rPr lang="ru-RU" smtClean="0"/>
               <a:pPr/>
-              <a:t>04.10.2013</a:t>
+              <a:t>19.10.2013</a:t>
             </a:fld>
             <a:endParaRPr lang="ru-RU"/>
           </a:p>
@@ -4888,7 +4888,7 @@
             <a:fld id="{8E6E6A2A-E9D3-4A0D-B04A-ABDD367A1E08}" type="datetimeFigureOut">
               <a:rPr lang="ru-RU" smtClean="0"/>
               <a:pPr/>
-              <a:t>04.10.2013</a:t>
+              <a:t>19.10.2013</a:t>
             </a:fld>
             <a:endParaRPr lang="ru-RU"/>
           </a:p>
@@ -5415,7 +5415,7 @@
                 </a:solidFill>
               </a:rPr>
               <a:pPr/>
-              <a:t>04.10.2013</a:t>
+              <a:t>19.10.2013</a:t>
             </a:fld>
             <a:endParaRPr lang="ru-RU">
               <a:solidFill>
@@ -14778,7 +14778,7 @@
         <p:spPr/>
         <p:txBody>
           <a:bodyPr>
-            <a:normAutofit fontScale="85000" lnSpcReduction="20000"/>
+            <a:normAutofit fontScale="70000" lnSpcReduction="20000"/>
           </a:bodyPr>
           <a:lstStyle/>
           <a:p>
@@ -14999,8 +14999,123 @@
                   <a:schemeClr val="bg1"/>
                 </a:solidFill>
               </a:rPr>
-              <a:t>., число в 16 системе</a:t>
-            </a:r>
+              <a:t>., число в 16 </a:t>
+            </a:r>
+            <a:r>
+              <a:rPr lang="ru-RU" dirty="0" smtClean="0">
+                <a:solidFill>
+                  <a:schemeClr val="bg1"/>
+                </a:solidFill>
+              </a:rPr>
+              <a:t>системе</a:t>
+            </a:r>
+          </a:p>
+          <a:p>
+            <a:pPr lvl="1"/>
+            <a:r>
+              <a:rPr lang="ru-RU" dirty="0" smtClean="0">
+                <a:solidFill>
+                  <a:schemeClr val="bg1"/>
+                </a:solidFill>
+              </a:rPr>
+              <a:t>1</a:t>
+            </a:r>
+            <a:r>
+              <a:rPr lang="en-US" dirty="0" smtClean="0">
+                <a:solidFill>
+                  <a:schemeClr val="bg1"/>
+                </a:solidFill>
+              </a:rPr>
+              <a:t>u, </a:t>
+            </a:r>
+            <a:r>
+              <a:rPr lang="ru-RU" dirty="0" smtClean="0">
+                <a:solidFill>
+                  <a:schemeClr val="bg1"/>
+                </a:solidFill>
+              </a:rPr>
+              <a:t>беззнаковое целое (</a:t>
+            </a:r>
+            <a:r>
+              <a:rPr lang="en-US" dirty="0" err="1" smtClean="0">
+                <a:solidFill>
+                  <a:schemeClr val="bg1"/>
+                </a:solidFill>
+              </a:rPr>
+              <a:t>uint</a:t>
+            </a:r>
+            <a:r>
+              <a:rPr lang="en-US" dirty="0" smtClean="0">
+                <a:solidFill>
+                  <a:schemeClr val="bg1"/>
+                </a:solidFill>
+              </a:rPr>
+              <a:t>)</a:t>
+            </a:r>
+          </a:p>
+          <a:p>
+            <a:pPr lvl="1"/>
+            <a:r>
+              <a:rPr lang="en-US" dirty="0" smtClean="0">
+                <a:solidFill>
+                  <a:schemeClr val="bg1"/>
+                </a:solidFill>
+              </a:rPr>
+              <a:t>1ul,</a:t>
+            </a:r>
+            <a:r>
+              <a:rPr lang="ru-RU" dirty="0" smtClean="0">
+                <a:solidFill>
+                  <a:schemeClr val="bg1"/>
+                </a:solidFill>
+              </a:rPr>
+              <a:t> </a:t>
+            </a:r>
+            <a:r>
+              <a:rPr lang="ru-RU" dirty="0">
+                <a:solidFill>
+                  <a:schemeClr val="bg1"/>
+                </a:solidFill>
+              </a:rPr>
+              <a:t>беззнаковое </a:t>
+            </a:r>
+            <a:r>
+              <a:rPr lang="ru-RU" dirty="0" smtClean="0">
+                <a:solidFill>
+                  <a:schemeClr val="bg1"/>
+                </a:solidFill>
+              </a:rPr>
+              <a:t>длинное целое </a:t>
+            </a:r>
+            <a:r>
+              <a:rPr lang="ru-RU" dirty="0">
+                <a:solidFill>
+                  <a:schemeClr val="bg1"/>
+                </a:solidFill>
+              </a:rPr>
+              <a:t>(</a:t>
+            </a:r>
+            <a:r>
+              <a:rPr lang="en-US" dirty="0" err="1" smtClean="0">
+                <a:solidFill>
+                  <a:schemeClr val="bg1"/>
+                </a:solidFill>
+              </a:rPr>
+              <a:t>ulong</a:t>
+            </a:r>
+            <a:r>
+              <a:rPr lang="en-US" dirty="0" smtClean="0">
+                <a:solidFill>
+                  <a:schemeClr val="bg1"/>
+                </a:solidFill>
+              </a:rPr>
+              <a:t>)</a:t>
+            </a:r>
+            <a:endParaRPr lang="ru-RU" dirty="0" smtClean="0">
+              <a:solidFill>
+                <a:schemeClr val="bg1"/>
+              </a:solidFill>
+            </a:endParaRPr>
           </a:p>
           <a:p>
             <a:r>
@@ -15571,8 +15686,8 @@
         </p:nvSpPr>
         <p:spPr>
           <a:xfrm>
-            <a:off x="611560" y="692696"/>
-            <a:ext cx="7992888" cy="5786199"/>
+            <a:off x="395536" y="692696"/>
+            <a:ext cx="8208912" cy="5786199"/>
           </a:xfrm>
           <a:prstGeom prst="rect">
             <a:avLst/>
@@ -15793,11 +15908,43 @@
               <a:buChar char="•"/>
             </a:pPr>
             <a:r>
+              <a:rPr lang="en-US" dirty="0" smtClean="0">
+                <a:solidFill>
+                  <a:schemeClr val="bg1"/>
+                </a:solidFill>
+              </a:rPr>
+              <a:t>Escape </a:t>
+            </a:r>
+            <a:r>
               <a:rPr lang="ru-RU" dirty="0" smtClean="0">
                 <a:solidFill>
                   <a:schemeClr val="bg1"/>
                 </a:solidFill>
               </a:rPr>
+              <a:t>символы</a:t>
+            </a:r>
+            <a:r>
+              <a:rPr lang="ru-RU" dirty="0" smtClean="0">
+                <a:solidFill>
+                  <a:schemeClr val="bg1"/>
+                </a:solidFill>
+              </a:rPr>
+              <a:t> </a:t>
+            </a:r>
+            <a:r>
+              <a:rPr lang="en-US" dirty="0" smtClean="0">
+                <a:solidFill>
+                  <a:schemeClr val="bg1"/>
+                </a:solidFill>
+              </a:rPr>
+              <a:t>\’, \”, \\, \0, </a:t>
+            </a:r>
+            <a:r>
+              <a:rPr lang="ru-RU" dirty="0" smtClean="0">
+                <a:solidFill>
+                  <a:schemeClr val="bg1"/>
+                </a:solidFill>
+              </a:rPr>
               <a:t>\</a:t>
             </a:r>
             <a:r>
@@ -15806,7 +15953,47 @@
                   <a:schemeClr val="bg1"/>
                 </a:solidFill>
               </a:rPr>
-              <a:t>n, \r, \t, \</a:t>
+              <a:t>a, \b,</a:t>
+            </a:r>
+            <a:r>
+              <a:rPr lang="ru-RU" dirty="0" smtClean="0">
+                <a:solidFill>
+                  <a:schemeClr val="bg1"/>
+                </a:solidFill>
+              </a:rPr>
+              <a:t> </a:t>
+            </a:r>
+            <a:r>
+              <a:rPr lang="en-US" dirty="0" smtClean="0">
+                <a:solidFill>
+                  <a:schemeClr val="bg1"/>
+                </a:solidFill>
+              </a:rPr>
+              <a:t>\f,</a:t>
+            </a:r>
+            <a:r>
+              <a:rPr lang="ru-RU" dirty="0" smtClean="0">
+                <a:solidFill>
+                  <a:schemeClr val="bg1"/>
+                </a:solidFill>
+              </a:rPr>
+              <a:t> \</a:t>
+            </a:r>
+            <a:r>
+              <a:rPr lang="en-US" dirty="0" smtClean="0">
+                <a:solidFill>
+                  <a:schemeClr val="bg1"/>
+                </a:solidFill>
+              </a:rPr>
+              <a:t>n, \r, \t, </a:t>
+            </a:r>
+            <a:r>
+              <a:rPr lang="en-US" dirty="0" smtClean="0">
+                <a:solidFill>
+                  <a:schemeClr val="bg1"/>
+                </a:solidFill>
+              </a:rPr>
+              <a:t>\v, \</a:t>
             </a:r>
             <a:r>
               <a:rPr lang="en-US" dirty="0" err="1" smtClean="0">
@@ -15815,6 +16002,46 @@
                 </a:solidFill>
               </a:rPr>
               <a:t>uXXXX</a:t>
+            </a:r>
+            <a:r>
+              <a:rPr lang="en-US" dirty="0" smtClean="0">
+                <a:solidFill>
+                  <a:schemeClr val="bg1"/>
+                </a:solidFill>
+              </a:rPr>
+              <a:t>,\</a:t>
+            </a:r>
+            <a:r>
+              <a:rPr lang="en-US" dirty="0" err="1">
+                <a:solidFill>
+                  <a:schemeClr val="bg1"/>
+                </a:solidFill>
+              </a:rPr>
+              <a:t>xn</a:t>
+            </a:r>
+            <a:r>
+              <a:rPr lang="en-US" dirty="0">
+                <a:solidFill>
+                  <a:schemeClr val="bg1"/>
+                </a:solidFill>
+              </a:rPr>
+              <a:t>[n][n][</a:t>
+            </a:r>
+            <a:r>
+              <a:rPr lang="en-US" dirty="0" smtClean="0">
+                <a:solidFill>
+                  <a:schemeClr val="bg1"/>
+                </a:solidFill>
+              </a:rPr>
+              <a:t>n],\</a:t>
+            </a:r>
+            <a:r>
+              <a:rPr lang="en-US" dirty="0" err="1" smtClean="0">
+                <a:solidFill>
+                  <a:schemeClr val="bg1"/>
+                </a:solidFill>
+              </a:rPr>
+              <a:t>Uxxxxxxxx</a:t>
             </a:r>
             <a:endParaRPr lang="en-US" dirty="0" smtClean="0">
               <a:solidFill>
@@ -15900,7 +16127,15 @@
                   <a:schemeClr val="bg1"/>
                 </a:solidFill>
               </a:rPr>
-              <a:t>Осторожно с \0 (</a:t>
+              <a:t>Будьте ссторожны </a:t>
+            </a:r>
+            <a:r>
+              <a:rPr lang="ru-RU" dirty="0" smtClean="0">
+                <a:solidFill>
+                  <a:schemeClr val="bg1"/>
+                </a:solidFill>
+              </a:rPr>
+              <a:t>с \0 (</a:t>
             </a:r>
             <a:r>
               <a:rPr lang="en-US" dirty="0" smtClean="0">

</xml_diff>

<commit_message>
Info about break and continue keywords
</commit_message>
<xml_diff>
--- a/Presentation/lesson-01.pptx
+++ b/Presentation/lesson-01.pptx
@@ -31,13 +31,14 @@
     <p:sldId id="270" r:id="rId25"/>
     <p:sldId id="271" r:id="rId26"/>
     <p:sldId id="272" r:id="rId27"/>
-    <p:sldId id="273" r:id="rId28"/>
-    <p:sldId id="274" r:id="rId29"/>
-    <p:sldId id="275" r:id="rId30"/>
-    <p:sldId id="276" r:id="rId31"/>
-    <p:sldId id="277" r:id="rId32"/>
-    <p:sldId id="292" r:id="rId33"/>
-    <p:sldId id="281" r:id="rId34"/>
+    <p:sldId id="300" r:id="rId28"/>
+    <p:sldId id="273" r:id="rId29"/>
+    <p:sldId id="274" r:id="rId30"/>
+    <p:sldId id="275" r:id="rId31"/>
+    <p:sldId id="276" r:id="rId32"/>
+    <p:sldId id="277" r:id="rId33"/>
+    <p:sldId id="292" r:id="rId34"/>
+    <p:sldId id="281" r:id="rId35"/>
   </p:sldIdLst>
   <p:sldSz cx="9144000" cy="6858000" type="screen4x3"/>
   <p:notesSz cx="6858000" cy="9144000"/>
@@ -321,7 +322,7 @@
             <a:fld id="{8E6E6A2A-E9D3-4A0D-B04A-ABDD367A1E08}" type="datetimeFigureOut">
               <a:rPr lang="ru-RU" smtClean="0"/>
               <a:pPr/>
-              <a:t>19.10.2013</a:t>
+              <a:t>27.10.2013</a:t>
             </a:fld>
             <a:endParaRPr lang="ru-RU"/>
           </a:p>
@@ -493,7 +494,7 @@
             <a:fld id="{8E6E6A2A-E9D3-4A0D-B04A-ABDD367A1E08}" type="datetimeFigureOut">
               <a:rPr lang="ru-RU" smtClean="0"/>
               <a:pPr/>
-              <a:t>19.10.2013</a:t>
+              <a:t>27.10.2013</a:t>
             </a:fld>
             <a:endParaRPr lang="ru-RU"/>
           </a:p>
@@ -675,7 +676,7 @@
             <a:fld id="{8E6E6A2A-E9D3-4A0D-B04A-ABDD367A1E08}" type="datetimeFigureOut">
               <a:rPr lang="ru-RU" smtClean="0"/>
               <a:pPr/>
-              <a:t>19.10.2013</a:t>
+              <a:t>27.10.2013</a:t>
             </a:fld>
             <a:endParaRPr lang="ru-RU"/>
           </a:p>
@@ -2062,7 +2063,7 @@
             <a:fld id="{8E6E6A2A-E9D3-4A0D-B04A-ABDD367A1E08}" type="datetimeFigureOut">
               <a:rPr lang="ru-RU" smtClean="0"/>
               <a:pPr/>
-              <a:t>19.10.2013</a:t>
+              <a:t>27.10.2013</a:t>
             </a:fld>
             <a:endParaRPr lang="ru-RU"/>
           </a:p>
@@ -2936,7 +2937,7 @@
                 </a:solidFill>
               </a:rPr>
               <a:pPr/>
-              <a:t>19.10.2013</a:t>
+              <a:t>27.10.2013</a:t>
             </a:fld>
             <a:endParaRPr lang="ru-RU">
               <a:solidFill>
@@ -3208,7 +3209,7 @@
             <a:fld id="{8E6E6A2A-E9D3-4A0D-B04A-ABDD367A1E08}" type="datetimeFigureOut">
               <a:rPr lang="ru-RU" smtClean="0"/>
               <a:pPr/>
-              <a:t>19.10.2013</a:t>
+              <a:t>27.10.2013</a:t>
             </a:fld>
             <a:endParaRPr lang="ru-RU"/>
           </a:p>
@@ -3498,7 +3499,7 @@
             <a:fld id="{8E6E6A2A-E9D3-4A0D-B04A-ABDD367A1E08}" type="datetimeFigureOut">
               <a:rPr lang="ru-RU" smtClean="0"/>
               <a:pPr/>
-              <a:t>19.10.2013</a:t>
+              <a:t>27.10.2013</a:t>
             </a:fld>
             <a:endParaRPr lang="ru-RU"/>
           </a:p>
@@ -3922,7 +3923,7 @@
             <a:fld id="{8E6E6A2A-E9D3-4A0D-B04A-ABDD367A1E08}" type="datetimeFigureOut">
               <a:rPr lang="ru-RU" smtClean="0"/>
               <a:pPr/>
-              <a:t>19.10.2013</a:t>
+              <a:t>27.10.2013</a:t>
             </a:fld>
             <a:endParaRPr lang="ru-RU"/>
           </a:p>
@@ -4042,7 +4043,7 @@
             <a:fld id="{8E6E6A2A-E9D3-4A0D-B04A-ABDD367A1E08}" type="datetimeFigureOut">
               <a:rPr lang="ru-RU" smtClean="0"/>
               <a:pPr/>
-              <a:t>19.10.2013</a:t>
+              <a:t>27.10.2013</a:t>
             </a:fld>
             <a:endParaRPr lang="ru-RU"/>
           </a:p>
@@ -4139,7 +4140,7 @@
             <a:fld id="{8E6E6A2A-E9D3-4A0D-B04A-ABDD367A1E08}" type="datetimeFigureOut">
               <a:rPr lang="ru-RU" smtClean="0"/>
               <a:pPr/>
-              <a:t>19.10.2013</a:t>
+              <a:t>27.10.2013</a:t>
             </a:fld>
             <a:endParaRPr lang="ru-RU"/>
           </a:p>
@@ -4418,7 +4419,7 @@
             <a:fld id="{8E6E6A2A-E9D3-4A0D-B04A-ABDD367A1E08}" type="datetimeFigureOut">
               <a:rPr lang="ru-RU" smtClean="0"/>
               <a:pPr/>
-              <a:t>19.10.2013</a:t>
+              <a:t>27.10.2013</a:t>
             </a:fld>
             <a:endParaRPr lang="ru-RU"/>
           </a:p>
@@ -4673,7 +4674,7 @@
             <a:fld id="{8E6E6A2A-E9D3-4A0D-B04A-ABDD367A1E08}" type="datetimeFigureOut">
               <a:rPr lang="ru-RU" smtClean="0"/>
               <a:pPr/>
-              <a:t>19.10.2013</a:t>
+              <a:t>27.10.2013</a:t>
             </a:fld>
             <a:endParaRPr lang="ru-RU"/>
           </a:p>
@@ -4888,7 +4889,7 @@
             <a:fld id="{8E6E6A2A-E9D3-4A0D-B04A-ABDD367A1E08}" type="datetimeFigureOut">
               <a:rPr lang="ru-RU" smtClean="0"/>
               <a:pPr/>
-              <a:t>19.10.2013</a:t>
+              <a:t>27.10.2013</a:t>
             </a:fld>
             <a:endParaRPr lang="ru-RU"/>
           </a:p>
@@ -5415,7 +5416,7 @@
                 </a:solidFill>
               </a:rPr>
               <a:pPr/>
-              <a:t>19.10.2013</a:t>
+              <a:t>27.10.2013</a:t>
             </a:fld>
             <a:endParaRPr lang="ru-RU">
               <a:solidFill>
@@ -14999,15 +15000,7 @@
                   <a:schemeClr val="bg1"/>
                 </a:solidFill>
               </a:rPr>
-              <a:t>., число в 16 </a:t>
-            </a:r>
-            <a:r>
-              <a:rPr lang="ru-RU" dirty="0" smtClean="0">
-                <a:solidFill>
-                  <a:schemeClr val="bg1"/>
-                </a:solidFill>
-              </a:rPr>
-              <a:t>системе</a:t>
+              <a:t>., число в 16 системе</a:t>
             </a:r>
           </a:p>
           <a:p>
@@ -15921,7 +15914,15 @@
                   <a:schemeClr val="bg1"/>
                 </a:solidFill>
               </a:rPr>
-              <a:t>символы</a:t>
+              <a:t>символы </a:t>
+            </a:r>
+            <a:r>
+              <a:rPr lang="en-US" dirty="0" smtClean="0">
+                <a:solidFill>
+                  <a:schemeClr val="bg1"/>
+                </a:solidFill>
+              </a:rPr>
+              <a:t>\’, \”, \\, \0, </a:t>
             </a:r>
             <a:r>
               <a:rPr lang="ru-RU" dirty="0" smtClean="0">
@@ -15929,6 +15930,22 @@
                   <a:schemeClr val="bg1"/>
                 </a:solidFill>
               </a:rPr>
+              <a:t>\</a:t>
+            </a:r>
+            <a:r>
+              <a:rPr lang="en-US" dirty="0" smtClean="0">
+                <a:solidFill>
+                  <a:schemeClr val="bg1"/>
+                </a:solidFill>
+              </a:rPr>
+              <a:t>a, \b,</a:t>
+            </a:r>
+            <a:r>
+              <a:rPr lang="ru-RU" dirty="0" smtClean="0">
+                <a:solidFill>
+                  <a:schemeClr val="bg1"/>
+                </a:solidFill>
+              </a:rPr>
               <a:t> </a:t>
             </a:r>
             <a:r>
@@ -15937,7 +15954,7 @@
                   <a:schemeClr val="bg1"/>
                 </a:solidFill>
               </a:rPr>
-              <a:t>\’, \”, \\, \0, </a:t>
+              <a:t>\f,</a:t>
             </a:r>
             <a:r>
               <a:rPr lang="ru-RU" dirty="0" smtClean="0">
@@ -15945,7 +15962,7 @@
                   <a:schemeClr val="bg1"/>
                 </a:solidFill>
               </a:rPr>
-              <a:t>\</a:t>
+              <a:t> \</a:t>
             </a:r>
             <a:r>
               <a:rPr lang="en-US" dirty="0" smtClean="0">
@@ -15953,47 +15970,7 @@
                   <a:schemeClr val="bg1"/>
                 </a:solidFill>
               </a:rPr>
-              <a:t>a, \b,</a:t>
-            </a:r>
-            <a:r>
-              <a:rPr lang="ru-RU" dirty="0" smtClean="0">
-                <a:solidFill>
-                  <a:schemeClr val="bg1"/>
-                </a:solidFill>
-              </a:rPr>
-              <a:t> </a:t>
-            </a:r>
-            <a:r>
-              <a:rPr lang="en-US" dirty="0" smtClean="0">
-                <a:solidFill>
-                  <a:schemeClr val="bg1"/>
-                </a:solidFill>
-              </a:rPr>
-              <a:t>\f,</a:t>
-            </a:r>
-            <a:r>
-              <a:rPr lang="ru-RU" dirty="0" smtClean="0">
-                <a:solidFill>
-                  <a:schemeClr val="bg1"/>
-                </a:solidFill>
-              </a:rPr>
-              <a:t> \</a:t>
-            </a:r>
-            <a:r>
-              <a:rPr lang="en-US" dirty="0" smtClean="0">
-                <a:solidFill>
-                  <a:schemeClr val="bg1"/>
-                </a:solidFill>
-              </a:rPr>
-              <a:t>n, \r, \t, </a:t>
-            </a:r>
-            <a:r>
-              <a:rPr lang="en-US" dirty="0" smtClean="0">
-                <a:solidFill>
-                  <a:schemeClr val="bg1"/>
-                </a:solidFill>
-              </a:rPr>
-              <a:t>\v, \</a:t>
+              <a:t>n, \r, \t, \v, \</a:t>
             </a:r>
             <a:r>
               <a:rPr lang="en-US" dirty="0" err="1" smtClean="0">
@@ -16127,15 +16104,7 @@
                   <a:schemeClr val="bg1"/>
                 </a:solidFill>
               </a:rPr>
-              <a:t>Будьте ссторожны </a:t>
-            </a:r>
-            <a:r>
-              <a:rPr lang="ru-RU" dirty="0" smtClean="0">
-                <a:solidFill>
-                  <a:schemeClr val="bg1"/>
-                </a:solidFill>
-              </a:rPr>
-              <a:t>с \0 (</a:t>
+              <a:t>Будьте ссторожны с \0 (</a:t>
             </a:r>
             <a:r>
               <a:rPr lang="en-US" dirty="0" smtClean="0">
@@ -25183,6 +25152,289 @@
       </p:grpSpPr>
       <p:sp>
         <p:nvSpPr>
+          <p:cNvPr id="13314" name="Прямоугольник 6"/>
+          <p:cNvSpPr>
+            <a:spLocks noChangeArrowheads="1"/>
+          </p:cNvSpPr>
+          <p:nvPr/>
+        </p:nvSpPr>
+        <p:spPr bwMode="auto">
+          <a:xfrm>
+            <a:off x="609600" y="152400"/>
+            <a:ext cx="7924800" cy="461963"/>
+          </a:xfrm>
+          <a:prstGeom prst="rect">
+            <a:avLst/>
+          </a:prstGeom>
+          <a:noFill/>
+          <a:ln>
+            <a:noFill/>
+          </a:ln>
+          <a:extLst>
+            <a:ext uri="{909E8E84-426E-40DD-AFC4-6F175D3DCCD1}">
+              <a14:hiddenFill xmlns:a14="http://schemas.microsoft.com/office/drawing/2010/main">
+                <a:solidFill>
+                  <a:srgbClr val="FFFFFF"/>
+                </a:solidFill>
+              </a14:hiddenFill>
+            </a:ext>
+            <a:ext uri="{91240B29-F687-4F45-9708-019B960494DF}">
+              <a14:hiddenLine xmlns:a14="http://schemas.microsoft.com/office/drawing/2010/main" w="9525">
+                <a:solidFill>
+                  <a:srgbClr val="000000"/>
+                </a:solidFill>
+                <a:miter lim="800000"/>
+                <a:headEnd/>
+                <a:tailEnd/>
+              </a14:hiddenLine>
+            </a:ext>
+          </a:extLst>
+        </p:spPr>
+        <p:txBody>
+          <a:bodyPr>
+            <a:spAutoFit/>
+          </a:bodyPr>
+          <a:lstStyle/>
+          <a:p>
+            <a:pPr algn="ctr" eaLnBrk="0" hangingPunct="0">
+              <a:tabLst>
+                <a:tab pos="457200" algn="l"/>
+              </a:tabLst>
+            </a:pPr>
+            <a:r>
+              <a:rPr lang="ru-RU" sz="2400" dirty="0">
+                <a:solidFill>
+                  <a:schemeClr val="bg1"/>
+                </a:solidFill>
+                <a:cs typeface="Times New Roman" pitchFamily="18" charset="0"/>
+              </a:rPr>
+              <a:t>Циклы. </a:t>
+            </a:r>
+            <a:r>
+              <a:rPr lang="ru-RU" sz="2400" dirty="0" smtClean="0">
+                <a:solidFill>
+                  <a:schemeClr val="bg1"/>
+                </a:solidFill>
+                <a:cs typeface="Times New Roman" pitchFamily="18" charset="0"/>
+              </a:rPr>
+              <a:t>Ключевые слова </a:t>
+            </a:r>
+            <a:r>
+              <a:rPr lang="en-US" sz="2400" dirty="0" smtClean="0">
+                <a:solidFill>
+                  <a:schemeClr val="bg1"/>
+                </a:solidFill>
+                <a:cs typeface="Times New Roman" pitchFamily="18" charset="0"/>
+              </a:rPr>
+              <a:t>break </a:t>
+            </a:r>
+            <a:r>
+              <a:rPr lang="ru-RU" sz="2400" dirty="0" smtClean="0">
+                <a:solidFill>
+                  <a:schemeClr val="bg1"/>
+                </a:solidFill>
+                <a:cs typeface="Times New Roman" pitchFamily="18" charset="0"/>
+              </a:rPr>
+              <a:t>и </a:t>
+            </a:r>
+            <a:r>
+              <a:rPr lang="en-US" sz="2400" dirty="0" smtClean="0">
+                <a:solidFill>
+                  <a:schemeClr val="bg1"/>
+                </a:solidFill>
+                <a:cs typeface="Times New Roman" pitchFamily="18" charset="0"/>
+              </a:rPr>
+              <a:t>continue.</a:t>
+            </a:r>
+            <a:endParaRPr lang="ru-RU" sz="2400" dirty="0">
+              <a:solidFill>
+                <a:schemeClr val="bg1"/>
+              </a:solidFill>
+            </a:endParaRPr>
+          </a:p>
+        </p:txBody>
+      </p:sp>
+      <p:sp>
+        <p:nvSpPr>
+          <p:cNvPr id="2" name="TextBox 1"/>
+          <p:cNvSpPr txBox="1"/>
+          <p:nvPr/>
+        </p:nvSpPr>
+        <p:spPr>
+          <a:xfrm>
+            <a:off x="251520" y="764704"/>
+            <a:ext cx="8712968" cy="2031325"/>
+          </a:xfrm>
+          <a:prstGeom prst="rect">
+            <a:avLst/>
+          </a:prstGeom>
+          <a:noFill/>
+        </p:spPr>
+        <p:txBody>
+          <a:bodyPr wrap="square" rtlCol="0">
+            <a:spAutoFit/>
+          </a:bodyPr>
+          <a:lstStyle/>
+          <a:p>
+            <a:r>
+              <a:rPr lang="ru-RU" dirty="0" smtClean="0">
+                <a:solidFill>
+                  <a:schemeClr val="bg1"/>
+                </a:solidFill>
+              </a:rPr>
+              <a:t>Ключевое слово </a:t>
+            </a:r>
+            <a:r>
+              <a:rPr lang="en-US" dirty="0" smtClean="0">
+                <a:solidFill>
+                  <a:schemeClr val="bg1"/>
+                </a:solidFill>
+              </a:rPr>
+              <a:t>break </a:t>
+            </a:r>
+            <a:r>
+              <a:rPr lang="ru-RU" dirty="0" smtClean="0">
+                <a:solidFill>
+                  <a:schemeClr val="bg1"/>
+                </a:solidFill>
+              </a:rPr>
+              <a:t>прерывает выполнение текущего цикла и передает управление на первый оператор после него. В случае вложенных циклов команда </a:t>
+            </a:r>
+            <a:r>
+              <a:rPr lang="en-US" dirty="0" smtClean="0">
+                <a:solidFill>
+                  <a:schemeClr val="bg1"/>
+                </a:solidFill>
+              </a:rPr>
+              <a:t>break </a:t>
+            </a:r>
+            <a:r>
+              <a:rPr lang="ru-RU" dirty="0" smtClean="0">
+                <a:solidFill>
+                  <a:schemeClr val="bg1"/>
+                </a:solidFill>
+              </a:rPr>
+              <a:t>прервет выполнение только того цикла внутри которого она указана.</a:t>
+            </a:r>
+          </a:p>
+          <a:p>
+            <a:endParaRPr lang="ru-RU" dirty="0">
+              <a:solidFill>
+                <a:schemeClr val="bg1"/>
+              </a:solidFill>
+            </a:endParaRPr>
+          </a:p>
+          <a:p>
+            <a:r>
+              <a:rPr lang="ru-RU" dirty="0" smtClean="0">
+                <a:solidFill>
+                  <a:schemeClr val="bg1"/>
+                </a:solidFill>
+              </a:rPr>
+              <a:t>Ключевое слово </a:t>
+            </a:r>
+            <a:r>
+              <a:rPr lang="en-US" dirty="0" smtClean="0">
+                <a:solidFill>
+                  <a:schemeClr val="bg1"/>
+                </a:solidFill>
+              </a:rPr>
+              <a:t>continue </a:t>
+            </a:r>
+            <a:r>
+              <a:rPr lang="ru-RU" dirty="0" smtClean="0">
+                <a:solidFill>
+                  <a:schemeClr val="bg1"/>
+                </a:solidFill>
+              </a:rPr>
+              <a:t>передает управление  в начало цикла начиная новую итерацию. При это в цикле </a:t>
+            </a:r>
+            <a:r>
+              <a:rPr lang="en-US" dirty="0" smtClean="0">
+                <a:solidFill>
+                  <a:schemeClr val="bg1"/>
+                </a:solidFill>
+              </a:rPr>
+              <a:t>while </a:t>
+            </a:r>
+            <a:r>
+              <a:rPr lang="ru-RU" dirty="0" smtClean="0">
+                <a:solidFill>
+                  <a:schemeClr val="bg1"/>
+                </a:solidFill>
+              </a:rPr>
+              <a:t>заного проверяется условие, а в цикле </a:t>
+            </a:r>
+            <a:r>
+              <a:rPr lang="en-US" dirty="0" smtClean="0">
+                <a:solidFill>
+                  <a:schemeClr val="bg1"/>
+                </a:solidFill>
+              </a:rPr>
+              <a:t>for </a:t>
+            </a:r>
+            <a:r>
+              <a:rPr lang="ru-RU" dirty="0" smtClean="0">
+                <a:solidFill>
+                  <a:schemeClr val="bg1"/>
+                </a:solidFill>
+              </a:rPr>
+              <a:t>выполняется итератор цикла и проверяется условие.</a:t>
+            </a:r>
+            <a:endParaRPr lang="ru-RU" dirty="0">
+              <a:solidFill>
+                <a:schemeClr val="bg1"/>
+              </a:solidFill>
+            </a:endParaRPr>
+          </a:p>
+        </p:txBody>
+      </p:sp>
+    </p:spTree>
+    <p:extLst>
+      <p:ext uri="{BB962C8B-B14F-4D97-AF65-F5344CB8AC3E}">
+        <p14:creationId xmlns:p14="http://schemas.microsoft.com/office/powerpoint/2010/main" val="1959459316"/>
+      </p:ext>
+    </p:extLst>
+  </p:cSld>
+  <p:clrMapOvr>
+    <a:masterClrMapping/>
+  </p:clrMapOvr>
+</p:sld>
+</file>
+
+<file path=ppt/slides/slide27.xml><?xml version="1.0" encoding="utf-8"?>
+<p:sld xmlns:a="http://schemas.openxmlformats.org/drawingml/2006/main" xmlns:r="http://schemas.openxmlformats.org/officeDocument/2006/relationships" xmlns:p="http://schemas.openxmlformats.org/presentationml/2006/main">
+  <p:cSld>
+    <p:bg>
+      <p:bgPr>
+        <a:blipFill dpi="0" rotWithShape="1">
+          <a:blip r:embed="rId2">
+            <a:lum/>
+          </a:blip>
+          <a:srcRect/>
+          <a:stretch>
+            <a:fillRect/>
+          </a:stretch>
+        </a:blipFill>
+        <a:effectLst/>
+      </p:bgPr>
+    </p:bg>
+    <p:spTree>
+      <p:nvGrpSpPr>
+        <p:cNvPr id="1" name=""/>
+        <p:cNvGrpSpPr/>
+        <p:nvPr/>
+      </p:nvGrpSpPr>
+      <p:grpSpPr>
+        <a:xfrm>
+          <a:off x="0" y="0"/>
+          <a:ext cx="0" cy="0"/>
+          <a:chOff x="0" y="0"/>
+          <a:chExt cx="0" cy="0"/>
+        </a:xfrm>
+      </p:grpSpPr>
+      <p:sp>
+        <p:nvSpPr>
           <p:cNvPr id="14338" name="Прямоугольник 6"/>
           <p:cNvSpPr>
             <a:spLocks noChangeArrowheads="1"/>
@@ -26151,7 +26403,7 @@
 </p:sld>
 </file>
 
-<file path=ppt/slides/slide27.xml><?xml version="1.0" encoding="utf-8"?>
+<file path=ppt/slides/slide28.xml><?xml version="1.0" encoding="utf-8"?>
 <p:sld xmlns:a="http://schemas.openxmlformats.org/drawingml/2006/main" xmlns:r="http://schemas.openxmlformats.org/officeDocument/2006/relationships" xmlns:p="http://schemas.openxmlformats.org/presentationml/2006/main">
   <p:cSld>
     <p:bg>
@@ -26427,7 +26679,7 @@
 </p:sld>
 </file>
 
-<file path=ppt/slides/slide28.xml><?xml version="1.0" encoding="utf-8"?>
+<file path=ppt/slides/slide29.xml><?xml version="1.0" encoding="utf-8"?>
 <p:sld xmlns:a="http://schemas.openxmlformats.org/drawingml/2006/main" xmlns:r="http://schemas.openxmlformats.org/officeDocument/2006/relationships" xmlns:p="http://schemas.openxmlformats.org/presentationml/2006/main">
   <p:cSld>
     <p:bg>
@@ -27650,1257 +27902,6 @@
     <p:extLst>
       <p:ext uri="{BB962C8B-B14F-4D97-AF65-F5344CB8AC3E}">
         <p14:creationId xmlns:p14="http://schemas.microsoft.com/office/powerpoint/2010/main" val="4148512763"/>
-      </p:ext>
-    </p:extLst>
-  </p:cSld>
-  <p:clrMapOvr>
-    <a:masterClrMapping/>
-  </p:clrMapOvr>
-  <p:timing>
-    <p:tnLst>
-      <p:par>
-        <p:cTn id="1" dur="indefinite" restart="never" nodeType="tmRoot"/>
-      </p:par>
-    </p:tnLst>
-  </p:timing>
-</p:sld>
-</file>
-
-<file path=ppt/slides/slide29.xml><?xml version="1.0" encoding="utf-8"?>
-<p:sld xmlns:a="http://schemas.openxmlformats.org/drawingml/2006/main" xmlns:r="http://schemas.openxmlformats.org/officeDocument/2006/relationships" xmlns:p="http://schemas.openxmlformats.org/presentationml/2006/main">
-  <p:cSld>
-    <p:bg>
-      <p:bgPr>
-        <a:blipFill dpi="0" rotWithShape="1">
-          <a:blip r:embed="rId2">
-            <a:lum/>
-          </a:blip>
-          <a:srcRect/>
-          <a:stretch>
-            <a:fillRect/>
-          </a:stretch>
-        </a:blipFill>
-        <a:effectLst/>
-      </p:bgPr>
-    </p:bg>
-    <p:spTree>
-      <p:nvGrpSpPr>
-        <p:cNvPr id="1" name=""/>
-        <p:cNvGrpSpPr/>
-        <p:nvPr/>
-      </p:nvGrpSpPr>
-      <p:grpSpPr>
-        <a:xfrm>
-          <a:off x="0" y="0"/>
-          <a:ext cx="0" cy="0"/>
-          <a:chOff x="0" y="0"/>
-          <a:chExt cx="0" cy="0"/>
-        </a:xfrm>
-      </p:grpSpPr>
-      <p:sp>
-        <p:nvSpPr>
-          <p:cNvPr id="17410" name="Прямоугольник 6"/>
-          <p:cNvSpPr>
-            <a:spLocks noChangeArrowheads="1"/>
-          </p:cNvSpPr>
-          <p:nvPr/>
-        </p:nvSpPr>
-        <p:spPr bwMode="auto">
-          <a:xfrm>
-            <a:off x="609600" y="152400"/>
-            <a:ext cx="7924800" cy="461963"/>
-          </a:xfrm>
-          <a:prstGeom prst="rect">
-            <a:avLst/>
-          </a:prstGeom>
-          <a:noFill/>
-          <a:ln>
-            <a:noFill/>
-          </a:ln>
-          <a:extLst>
-            <a:ext uri="{909E8E84-426E-40DD-AFC4-6F175D3DCCD1}">
-              <a14:hiddenFill xmlns:a14="http://schemas.microsoft.com/office/drawing/2010/main">
-                <a:solidFill>
-                  <a:srgbClr val="FFFFFF"/>
-                </a:solidFill>
-              </a14:hiddenFill>
-            </a:ext>
-            <a:ext uri="{91240B29-F687-4F45-9708-019B960494DF}">
-              <a14:hiddenLine xmlns:a14="http://schemas.microsoft.com/office/drawing/2010/main" w="9525">
-                <a:solidFill>
-                  <a:srgbClr val="000000"/>
-                </a:solidFill>
-                <a:miter lim="800000"/>
-                <a:headEnd/>
-                <a:tailEnd/>
-              </a14:hiddenLine>
-            </a:ext>
-          </a:extLst>
-        </p:spPr>
-        <p:txBody>
-          <a:bodyPr>
-            <a:spAutoFit/>
-          </a:bodyPr>
-          <a:lstStyle/>
-          <a:p>
-            <a:pPr algn="ctr" eaLnBrk="0" hangingPunct="0">
-              <a:tabLst>
-                <a:tab pos="457200" algn="l"/>
-              </a:tabLst>
-            </a:pPr>
-            <a:r>
-              <a:rPr lang="ru-RU" sz="2400" dirty="0">
-                <a:solidFill>
-                  <a:schemeClr val="bg1"/>
-                </a:solidFill>
-                <a:cs typeface="Times New Roman" pitchFamily="18" charset="0"/>
-              </a:rPr>
-              <a:t>Перечисления </a:t>
-            </a:r>
-            <a:r>
-              <a:rPr lang="en-US" sz="2400" b="1" dirty="0" err="1">
-                <a:solidFill>
-                  <a:schemeClr val="bg1"/>
-                </a:solidFill>
-                <a:cs typeface="Times New Roman" pitchFamily="18" charset="0"/>
-              </a:rPr>
-              <a:t>enum</a:t>
-            </a:r>
-            <a:r>
-              <a:rPr lang="en-US" sz="2400" b="1" dirty="0">
-                <a:solidFill>
-                  <a:schemeClr val="bg1"/>
-                </a:solidFill>
-                <a:cs typeface="Times New Roman" pitchFamily="18" charset="0"/>
-              </a:rPr>
-              <a:t>.</a:t>
-            </a:r>
-            <a:endParaRPr lang="ru-RU" sz="2400" b="1" dirty="0">
-              <a:solidFill>
-                <a:schemeClr val="bg1"/>
-              </a:solidFill>
-              <a:cs typeface="Times New Roman" pitchFamily="18" charset="0"/>
-            </a:endParaRPr>
-          </a:p>
-        </p:txBody>
-      </p:sp>
-      <p:sp>
-        <p:nvSpPr>
-          <p:cNvPr id="12294" name="Rectangle 6"/>
-          <p:cNvSpPr>
-            <a:spLocks noChangeArrowheads="1"/>
-          </p:cNvSpPr>
-          <p:nvPr/>
-        </p:nvSpPr>
-        <p:spPr bwMode="auto">
-          <a:xfrm>
-            <a:off x="685800" y="2492896"/>
-            <a:ext cx="7696200" cy="3770313"/>
-          </a:xfrm>
-          <a:prstGeom prst="rect">
-            <a:avLst/>
-          </a:prstGeom>
-          <a:noFill/>
-          <a:ln w="9525">
-            <a:solidFill>
-              <a:schemeClr val="bg1">
-                <a:lumMod val="65000"/>
-              </a:schemeClr>
-            </a:solidFill>
-            <a:miter lim="800000"/>
-            <a:headEnd/>
-            <a:tailEnd/>
-          </a:ln>
-          <a:effectLst/>
-        </p:spPr>
-        <p:txBody>
-          <a:bodyPr anchor="ctr">
-            <a:spAutoFit/>
-          </a:bodyPr>
-          <a:lstStyle/>
-          <a:p>
-            <a:pPr eaLnBrk="0" hangingPunct="0">
-              <a:defRPr/>
-            </a:pPr>
-            <a:r>
-              <a:rPr lang="be-BY" sz="1000" dirty="0">
-                <a:solidFill>
-                  <a:schemeClr val="bg1"/>
-                </a:solidFill>
-                <a:latin typeface="Courier New" pitchFamily="49" charset="0"/>
-                <a:ea typeface="Calibri" pitchFamily="34" charset="0"/>
-                <a:cs typeface="Courier New" pitchFamily="49" charset="0"/>
-              </a:rPr>
-              <a:t>    enum Cars</a:t>
-            </a:r>
-            <a:endParaRPr lang="be-BY" sz="900" dirty="0">
-              <a:solidFill>
-                <a:schemeClr val="bg1"/>
-              </a:solidFill>
-              <a:latin typeface="Arial" pitchFamily="34" charset="0"/>
-            </a:endParaRPr>
-          </a:p>
-          <a:p>
-            <a:pPr eaLnBrk="0" hangingPunct="0">
-              <a:defRPr/>
-            </a:pPr>
-            <a:r>
-              <a:rPr lang="be-BY" sz="1000" dirty="0">
-                <a:solidFill>
-                  <a:schemeClr val="bg1"/>
-                </a:solidFill>
-                <a:latin typeface="Courier New" pitchFamily="49" charset="0"/>
-                <a:ea typeface="Calibri" pitchFamily="34" charset="0"/>
-                <a:cs typeface="Courier New" pitchFamily="49" charset="0"/>
-              </a:rPr>
-              <a:t>    {</a:t>
-            </a:r>
-            <a:endParaRPr lang="be-BY" sz="900" dirty="0">
-              <a:solidFill>
-                <a:schemeClr val="bg1"/>
-              </a:solidFill>
-              <a:latin typeface="Arial" pitchFamily="34" charset="0"/>
-            </a:endParaRPr>
-          </a:p>
-          <a:p>
-            <a:pPr eaLnBrk="0" hangingPunct="0">
-              <a:defRPr/>
-            </a:pPr>
-            <a:r>
-              <a:rPr lang="be-BY" sz="1000" dirty="0">
-                <a:solidFill>
-                  <a:schemeClr val="bg1"/>
-                </a:solidFill>
-                <a:latin typeface="Courier New" pitchFamily="49" charset="0"/>
-                <a:ea typeface="Calibri" pitchFamily="34" charset="0"/>
-                <a:cs typeface="Courier New" pitchFamily="49" charset="0"/>
-              </a:rPr>
-              <a:t>        Mersedes = 0,</a:t>
-            </a:r>
-            <a:endParaRPr lang="be-BY" sz="900" dirty="0">
-              <a:solidFill>
-                <a:schemeClr val="bg1"/>
-              </a:solidFill>
-              <a:latin typeface="Arial" pitchFamily="34" charset="0"/>
-            </a:endParaRPr>
-          </a:p>
-          <a:p>
-            <a:pPr eaLnBrk="0" hangingPunct="0">
-              <a:defRPr/>
-            </a:pPr>
-            <a:r>
-              <a:rPr lang="be-BY" sz="1000" dirty="0">
-                <a:solidFill>
-                  <a:schemeClr val="bg1"/>
-                </a:solidFill>
-                <a:latin typeface="Courier New" pitchFamily="49" charset="0"/>
-                <a:ea typeface="Calibri" pitchFamily="34" charset="0"/>
-                <a:cs typeface="Courier New" pitchFamily="49" charset="0"/>
-              </a:rPr>
-              <a:t>        Porsche = 5,</a:t>
-            </a:r>
-            <a:endParaRPr lang="be-BY" sz="900" dirty="0">
-              <a:solidFill>
-                <a:schemeClr val="bg1"/>
-              </a:solidFill>
-              <a:latin typeface="Arial" pitchFamily="34" charset="0"/>
-            </a:endParaRPr>
-          </a:p>
-          <a:p>
-            <a:pPr eaLnBrk="0" hangingPunct="0">
-              <a:defRPr/>
-            </a:pPr>
-            <a:r>
-              <a:rPr lang="be-BY" sz="1000" dirty="0">
-                <a:solidFill>
-                  <a:schemeClr val="bg1"/>
-                </a:solidFill>
-                <a:latin typeface="Courier New" pitchFamily="49" charset="0"/>
-                <a:ea typeface="Calibri" pitchFamily="34" charset="0"/>
-                <a:cs typeface="Courier New" pitchFamily="49" charset="0"/>
-              </a:rPr>
-              <a:t>        BMW = 100,</a:t>
-            </a:r>
-            <a:endParaRPr lang="be-BY" sz="900" dirty="0">
-              <a:solidFill>
-                <a:schemeClr val="bg1"/>
-              </a:solidFill>
-              <a:latin typeface="Arial" pitchFamily="34" charset="0"/>
-            </a:endParaRPr>
-          </a:p>
-          <a:p>
-            <a:pPr eaLnBrk="0" hangingPunct="0">
-              <a:defRPr/>
-            </a:pPr>
-            <a:r>
-              <a:rPr lang="be-BY" sz="1000" dirty="0">
-                <a:solidFill>
-                  <a:schemeClr val="bg1"/>
-                </a:solidFill>
-                <a:latin typeface="Courier New" pitchFamily="49" charset="0"/>
-                <a:ea typeface="Calibri" pitchFamily="34" charset="0"/>
-                <a:cs typeface="Courier New" pitchFamily="49" charset="0"/>
-              </a:rPr>
-              <a:t>        Lamborgini = 140,</a:t>
-            </a:r>
-            <a:endParaRPr lang="be-BY" sz="900" dirty="0">
-              <a:solidFill>
-                <a:schemeClr val="bg1"/>
-              </a:solidFill>
-              <a:latin typeface="Arial" pitchFamily="34" charset="0"/>
-            </a:endParaRPr>
-          </a:p>
-          <a:p>
-            <a:pPr eaLnBrk="0" hangingPunct="0">
-              <a:defRPr/>
-            </a:pPr>
-            <a:r>
-              <a:rPr lang="be-BY" sz="1000" dirty="0">
-                <a:solidFill>
-                  <a:schemeClr val="bg1"/>
-                </a:solidFill>
-                <a:latin typeface="Courier New" pitchFamily="49" charset="0"/>
-                <a:ea typeface="Calibri" pitchFamily="34" charset="0"/>
-                <a:cs typeface="Courier New" pitchFamily="49" charset="0"/>
-              </a:rPr>
-              <a:t>        Ferrari = 500</a:t>
-            </a:r>
-            <a:endParaRPr lang="be-BY" sz="900" dirty="0">
-              <a:solidFill>
-                <a:schemeClr val="bg1"/>
-              </a:solidFill>
-              <a:latin typeface="Arial" pitchFamily="34" charset="0"/>
-            </a:endParaRPr>
-          </a:p>
-          <a:p>
-            <a:pPr eaLnBrk="0" hangingPunct="0">
-              <a:defRPr/>
-            </a:pPr>
-            <a:r>
-              <a:rPr lang="be-BY" sz="1000" dirty="0">
-                <a:solidFill>
-                  <a:schemeClr val="bg1"/>
-                </a:solidFill>
-                <a:latin typeface="Courier New" pitchFamily="49" charset="0"/>
-                <a:ea typeface="Calibri" pitchFamily="34" charset="0"/>
-                <a:cs typeface="Courier New" pitchFamily="49" charset="0"/>
-              </a:rPr>
-              <a:t>    }</a:t>
-            </a:r>
-            <a:endParaRPr lang="en-US" sz="1000" dirty="0">
-              <a:solidFill>
-                <a:schemeClr val="bg1"/>
-              </a:solidFill>
-              <a:latin typeface="Courier New" pitchFamily="49" charset="0"/>
-              <a:ea typeface="Calibri" pitchFamily="34" charset="0"/>
-              <a:cs typeface="Courier New" pitchFamily="49" charset="0"/>
-            </a:endParaRPr>
-          </a:p>
-          <a:p>
-            <a:pPr eaLnBrk="0" hangingPunct="0">
-              <a:defRPr/>
-            </a:pPr>
-            <a:endParaRPr lang="be-BY" sz="900" dirty="0">
-              <a:solidFill>
-                <a:schemeClr val="bg1"/>
-              </a:solidFill>
-              <a:latin typeface="Arial" pitchFamily="34" charset="0"/>
-            </a:endParaRPr>
-          </a:p>
-          <a:p>
-            <a:pPr eaLnBrk="0" hangingPunct="0">
-              <a:defRPr/>
-            </a:pPr>
-            <a:r>
-              <a:rPr lang="be-BY" sz="1000" dirty="0">
-                <a:solidFill>
-                  <a:schemeClr val="bg1"/>
-                </a:solidFill>
-                <a:latin typeface="Courier New" pitchFamily="49" charset="0"/>
-                <a:ea typeface="Calibri" pitchFamily="34" charset="0"/>
-                <a:cs typeface="Courier New" pitchFamily="49" charset="0"/>
-              </a:rPr>
-              <a:t>    class Program</a:t>
-            </a:r>
-            <a:endParaRPr lang="be-BY" sz="900" dirty="0">
-              <a:solidFill>
-                <a:schemeClr val="bg1"/>
-              </a:solidFill>
-              <a:latin typeface="Arial" pitchFamily="34" charset="0"/>
-            </a:endParaRPr>
-          </a:p>
-          <a:p>
-            <a:pPr eaLnBrk="0" hangingPunct="0">
-              <a:defRPr/>
-            </a:pPr>
-            <a:r>
-              <a:rPr lang="be-BY" sz="1000" dirty="0">
-                <a:solidFill>
-                  <a:schemeClr val="bg1"/>
-                </a:solidFill>
-                <a:latin typeface="Courier New" pitchFamily="49" charset="0"/>
-                <a:ea typeface="Calibri" pitchFamily="34" charset="0"/>
-                <a:cs typeface="Courier New" pitchFamily="49" charset="0"/>
-              </a:rPr>
-              <a:t>    {</a:t>
-            </a:r>
-            <a:endParaRPr lang="be-BY" sz="900" dirty="0">
-              <a:solidFill>
-                <a:schemeClr val="bg1"/>
-              </a:solidFill>
-              <a:latin typeface="Arial" pitchFamily="34" charset="0"/>
-            </a:endParaRPr>
-          </a:p>
-          <a:p>
-            <a:pPr eaLnBrk="0" hangingPunct="0">
-              <a:defRPr/>
-            </a:pPr>
-            <a:r>
-              <a:rPr lang="be-BY" sz="1000" dirty="0">
-                <a:solidFill>
-                  <a:schemeClr val="bg1"/>
-                </a:solidFill>
-                <a:latin typeface="Courier New" pitchFamily="49" charset="0"/>
-                <a:ea typeface="Calibri" pitchFamily="34" charset="0"/>
-                <a:cs typeface="Courier New" pitchFamily="49" charset="0"/>
-              </a:rPr>
-              <a:t>        static void Main(string[] args)</a:t>
-            </a:r>
-            <a:endParaRPr lang="be-BY" sz="900" dirty="0">
-              <a:solidFill>
-                <a:schemeClr val="bg1"/>
-              </a:solidFill>
-              <a:latin typeface="Arial" pitchFamily="34" charset="0"/>
-            </a:endParaRPr>
-          </a:p>
-          <a:p>
-            <a:pPr eaLnBrk="0" hangingPunct="0">
-              <a:defRPr/>
-            </a:pPr>
-            <a:r>
-              <a:rPr lang="be-BY" sz="1000" dirty="0">
-                <a:solidFill>
-                  <a:schemeClr val="bg1"/>
-                </a:solidFill>
-                <a:latin typeface="Courier New" pitchFamily="49" charset="0"/>
-                <a:ea typeface="Calibri" pitchFamily="34" charset="0"/>
-                <a:cs typeface="Courier New" pitchFamily="49" charset="0"/>
-              </a:rPr>
-              <a:t>        {</a:t>
-            </a:r>
-            <a:endParaRPr lang="be-BY" sz="900" dirty="0">
-              <a:solidFill>
-                <a:schemeClr val="bg1"/>
-              </a:solidFill>
-              <a:latin typeface="Arial" pitchFamily="34" charset="0"/>
-            </a:endParaRPr>
-          </a:p>
-          <a:p>
-            <a:pPr eaLnBrk="0" hangingPunct="0">
-              <a:defRPr/>
-            </a:pPr>
-            <a:r>
-              <a:rPr lang="be-BY" sz="1000" dirty="0">
-                <a:solidFill>
-                  <a:schemeClr val="bg1"/>
-                </a:solidFill>
-                <a:latin typeface="Courier New" pitchFamily="49" charset="0"/>
-                <a:ea typeface="Calibri" pitchFamily="34" charset="0"/>
-                <a:cs typeface="Courier New" pitchFamily="49" charset="0"/>
-              </a:rPr>
-              <a:t>            Cars car1 = Cars.Mersedes, car2 = (Cars)140;</a:t>
-            </a:r>
-            <a:endParaRPr lang="be-BY" sz="900" dirty="0">
-              <a:solidFill>
-                <a:schemeClr val="bg1"/>
-              </a:solidFill>
-              <a:latin typeface="Arial" pitchFamily="34" charset="0"/>
-            </a:endParaRPr>
-          </a:p>
-          <a:p>
-            <a:pPr eaLnBrk="0" hangingPunct="0">
-              <a:defRPr/>
-            </a:pPr>
-            <a:r>
-              <a:rPr lang="be-BY" sz="1000" dirty="0">
-                <a:solidFill>
-                  <a:schemeClr val="bg1"/>
-                </a:solidFill>
-                <a:latin typeface="Courier New" pitchFamily="49" charset="0"/>
-                <a:ea typeface="Calibri" pitchFamily="34" charset="0"/>
-                <a:cs typeface="Courier New" pitchFamily="49" charset="0"/>
-              </a:rPr>
-              <a:t>            Console.WriteLine("{0}, {1}", car1, car2);</a:t>
-            </a:r>
-            <a:endParaRPr lang="be-BY" sz="900" dirty="0">
-              <a:solidFill>
-                <a:schemeClr val="bg1"/>
-              </a:solidFill>
-              <a:latin typeface="Arial" pitchFamily="34" charset="0"/>
-            </a:endParaRPr>
-          </a:p>
-          <a:p>
-            <a:pPr eaLnBrk="0" hangingPunct="0">
-              <a:defRPr/>
-            </a:pPr>
-            <a:r>
-              <a:rPr lang="be-BY" sz="1000" dirty="0">
-                <a:solidFill>
-                  <a:schemeClr val="bg1"/>
-                </a:solidFill>
-                <a:latin typeface="Courier New" pitchFamily="49" charset="0"/>
-                <a:ea typeface="Calibri" pitchFamily="34" charset="0"/>
-                <a:cs typeface="Courier New" pitchFamily="49" charset="0"/>
-              </a:rPr>
-              <a:t>            </a:t>
-            </a:r>
-            <a:endParaRPr lang="en-US" sz="1000" dirty="0">
-              <a:solidFill>
-                <a:schemeClr val="bg1"/>
-              </a:solidFill>
-              <a:latin typeface="Courier New" pitchFamily="49" charset="0"/>
-              <a:ea typeface="Calibri" pitchFamily="34" charset="0"/>
-              <a:cs typeface="Courier New" pitchFamily="49" charset="0"/>
-            </a:endParaRPr>
-          </a:p>
-          <a:p>
-            <a:pPr eaLnBrk="0" hangingPunct="0">
-              <a:defRPr/>
-            </a:pPr>
-            <a:r>
-              <a:rPr lang="en-US" sz="1000" dirty="0">
-                <a:solidFill>
-                  <a:schemeClr val="bg1"/>
-                </a:solidFill>
-                <a:latin typeface="Courier New" pitchFamily="49" charset="0"/>
-                <a:ea typeface="Calibri" pitchFamily="34" charset="0"/>
-                <a:cs typeface="Courier New" pitchFamily="49" charset="0"/>
-              </a:rPr>
-              <a:t>	</a:t>
-            </a:r>
-            <a:r>
-              <a:rPr lang="be-BY" sz="1000" dirty="0">
-                <a:solidFill>
-                  <a:schemeClr val="bg1"/>
-                </a:solidFill>
-                <a:latin typeface="Courier New" pitchFamily="49" charset="0"/>
-                <a:ea typeface="Calibri" pitchFamily="34" charset="0"/>
-                <a:cs typeface="Courier New" pitchFamily="49" charset="0"/>
-              </a:rPr>
-              <a:t>if (car2 == Cars.BMW)</a:t>
-            </a:r>
-            <a:endParaRPr lang="be-BY" sz="900" dirty="0">
-              <a:solidFill>
-                <a:schemeClr val="bg1"/>
-              </a:solidFill>
-              <a:latin typeface="Arial" pitchFamily="34" charset="0"/>
-            </a:endParaRPr>
-          </a:p>
-          <a:p>
-            <a:pPr eaLnBrk="0" hangingPunct="0">
-              <a:defRPr/>
-            </a:pPr>
-            <a:r>
-              <a:rPr lang="be-BY" sz="1000" dirty="0">
-                <a:solidFill>
-                  <a:schemeClr val="bg1"/>
-                </a:solidFill>
-                <a:latin typeface="Courier New" pitchFamily="49" charset="0"/>
-                <a:ea typeface="Calibri" pitchFamily="34" charset="0"/>
-                <a:cs typeface="Courier New" pitchFamily="49" charset="0"/>
-              </a:rPr>
-              <a:t>                Console.WriteLine("Now Car2 is BMW");</a:t>
-            </a:r>
-            <a:endParaRPr lang="be-BY" sz="900" dirty="0">
-              <a:solidFill>
-                <a:schemeClr val="bg1"/>
-              </a:solidFill>
-              <a:latin typeface="Arial" pitchFamily="34" charset="0"/>
-            </a:endParaRPr>
-          </a:p>
-          <a:p>
-            <a:pPr eaLnBrk="0" hangingPunct="0">
-              <a:defRPr/>
-            </a:pPr>
-            <a:r>
-              <a:rPr lang="be-BY" sz="1000" dirty="0">
-                <a:solidFill>
-                  <a:schemeClr val="bg1"/>
-                </a:solidFill>
-                <a:latin typeface="Courier New" pitchFamily="49" charset="0"/>
-                <a:ea typeface="Calibri" pitchFamily="34" charset="0"/>
-                <a:cs typeface="Courier New" pitchFamily="49" charset="0"/>
-              </a:rPr>
-              <a:t>            else if (car2 == Cars.Lamborgini</a:t>
-            </a:r>
-            <a:r>
-              <a:rPr lang="en-US" sz="1000" dirty="0">
-                <a:solidFill>
-                  <a:schemeClr val="bg1"/>
-                </a:solidFill>
-                <a:latin typeface="Courier New" pitchFamily="49" charset="0"/>
-                <a:ea typeface="Calibri" pitchFamily="34" charset="0"/>
-                <a:cs typeface="Courier New" pitchFamily="49" charset="0"/>
-              </a:rPr>
-              <a:t>)</a:t>
-            </a:r>
-            <a:endParaRPr lang="be-BY" sz="900" dirty="0">
-              <a:solidFill>
-                <a:schemeClr val="bg1"/>
-              </a:solidFill>
-              <a:latin typeface="Arial" pitchFamily="34" charset="0"/>
-            </a:endParaRPr>
-          </a:p>
-          <a:p>
-            <a:pPr eaLnBrk="0" hangingPunct="0">
-              <a:defRPr/>
-            </a:pPr>
-            <a:r>
-              <a:rPr lang="be-BY" sz="1000" dirty="0">
-                <a:solidFill>
-                  <a:schemeClr val="bg1"/>
-                </a:solidFill>
-                <a:latin typeface="Courier New" pitchFamily="49" charset="0"/>
-                <a:ea typeface="Calibri" pitchFamily="34" charset="0"/>
-                <a:cs typeface="Courier New" pitchFamily="49" charset="0"/>
-              </a:rPr>
-              <a:t>                Console.WriteLine("Now Car2 is Lamborgini");</a:t>
-            </a:r>
-            <a:endParaRPr lang="be-BY" sz="900" dirty="0">
-              <a:solidFill>
-                <a:schemeClr val="bg1"/>
-              </a:solidFill>
-              <a:latin typeface="Arial" pitchFamily="34" charset="0"/>
-            </a:endParaRPr>
-          </a:p>
-          <a:p>
-            <a:pPr eaLnBrk="0" hangingPunct="0">
-              <a:defRPr/>
-            </a:pPr>
-            <a:r>
-              <a:rPr lang="be-BY" sz="1000" dirty="0">
-                <a:solidFill>
-                  <a:schemeClr val="bg1"/>
-                </a:solidFill>
-                <a:latin typeface="Courier New" pitchFamily="49" charset="0"/>
-                <a:ea typeface="Calibri" pitchFamily="34" charset="0"/>
-                <a:cs typeface="Courier New" pitchFamily="49" charset="0"/>
-              </a:rPr>
-              <a:t>            else</a:t>
-            </a:r>
-            <a:endParaRPr lang="be-BY" sz="900" dirty="0">
-              <a:solidFill>
-                <a:schemeClr val="bg1"/>
-              </a:solidFill>
-              <a:latin typeface="Arial" pitchFamily="34" charset="0"/>
-            </a:endParaRPr>
-          </a:p>
-          <a:p>
-            <a:pPr eaLnBrk="0" hangingPunct="0">
-              <a:defRPr/>
-            </a:pPr>
-            <a:r>
-              <a:rPr lang="be-BY" sz="1000" dirty="0">
-                <a:solidFill>
-                  <a:schemeClr val="bg1"/>
-                </a:solidFill>
-                <a:latin typeface="Courier New" pitchFamily="49" charset="0"/>
-                <a:ea typeface="Calibri" pitchFamily="34" charset="0"/>
-                <a:cs typeface="Courier New" pitchFamily="49" charset="0"/>
-              </a:rPr>
-              <a:t>                Console.WriteLine("Now Car2 is unknown");</a:t>
-            </a:r>
-            <a:endParaRPr lang="be-BY" sz="900" dirty="0">
-              <a:solidFill>
-                <a:schemeClr val="bg1"/>
-              </a:solidFill>
-              <a:latin typeface="Arial" pitchFamily="34" charset="0"/>
-            </a:endParaRPr>
-          </a:p>
-          <a:p>
-            <a:pPr eaLnBrk="0" hangingPunct="0">
-              <a:defRPr/>
-            </a:pPr>
-            <a:r>
-              <a:rPr lang="be-BY" sz="1000" dirty="0">
-                <a:solidFill>
-                  <a:schemeClr val="bg1"/>
-                </a:solidFill>
-                <a:latin typeface="Courier New" pitchFamily="49" charset="0"/>
-                <a:ea typeface="Calibri" pitchFamily="34" charset="0"/>
-                <a:cs typeface="Courier New" pitchFamily="49" charset="0"/>
-              </a:rPr>
-              <a:t>        }</a:t>
-            </a:r>
-            <a:endParaRPr lang="be-BY" sz="900" dirty="0">
-              <a:solidFill>
-                <a:schemeClr val="bg1"/>
-              </a:solidFill>
-              <a:latin typeface="Arial" pitchFamily="34" charset="0"/>
-            </a:endParaRPr>
-          </a:p>
-          <a:p>
-            <a:pPr eaLnBrk="0" hangingPunct="0">
-              <a:defRPr/>
-            </a:pPr>
-            <a:r>
-              <a:rPr lang="be-BY" sz="1000" dirty="0">
-                <a:solidFill>
-                  <a:schemeClr val="bg1"/>
-                </a:solidFill>
-                <a:latin typeface="Courier New" pitchFamily="49" charset="0"/>
-                <a:ea typeface="Calibri" pitchFamily="34" charset="0"/>
-                <a:cs typeface="Courier New" pitchFamily="49" charset="0"/>
-              </a:rPr>
-              <a:t>    }</a:t>
-            </a:r>
-            <a:endParaRPr lang="be-BY" dirty="0">
-              <a:solidFill>
-                <a:schemeClr val="bg1"/>
-              </a:solidFill>
-              <a:latin typeface="Calibri" pitchFamily="34" charset="0"/>
-            </a:endParaRPr>
-          </a:p>
-        </p:txBody>
-      </p:sp>
-      <p:sp>
-        <p:nvSpPr>
-          <p:cNvPr id="17412" name="Подзаголовок 2"/>
-          <p:cNvSpPr txBox="1">
-            <a:spLocks/>
-          </p:cNvSpPr>
-          <p:nvPr/>
-        </p:nvSpPr>
-        <p:spPr bwMode="auto">
-          <a:xfrm>
-            <a:off x="685800" y="762000"/>
-            <a:ext cx="7696200" cy="1600200"/>
-          </a:xfrm>
-          <a:prstGeom prst="rect">
-            <a:avLst/>
-          </a:prstGeom>
-          <a:noFill/>
-          <a:ln w="9525">
-            <a:solidFill>
-              <a:srgbClr val="FF0000"/>
-            </a:solidFill>
-            <a:miter lim="800000"/>
-            <a:headEnd/>
-            <a:tailEnd/>
-          </a:ln>
-          <a:extLst>
-            <a:ext uri="{909E8E84-426E-40DD-AFC4-6F175D3DCCD1}">
-              <a14:hiddenFill xmlns:a14="http://schemas.microsoft.com/office/drawing/2010/main">
-                <a:solidFill>
-                  <a:srgbClr val="FFFFFF"/>
-                </a:solidFill>
-              </a14:hiddenFill>
-            </a:ext>
-          </a:extLst>
-        </p:spPr>
-        <p:txBody>
-          <a:bodyPr/>
-          <a:lstStyle>
-            <a:lvl1pPr eaLnBrk="0" hangingPunct="0">
-              <a:defRPr>
-                <a:solidFill>
-                  <a:schemeClr val="tx1"/>
-                </a:solidFill>
-                <a:latin typeface="Arial" charset="0"/>
-              </a:defRPr>
-            </a:lvl1pPr>
-            <a:lvl2pPr marL="742950" indent="-285750" eaLnBrk="0" hangingPunct="0">
-              <a:defRPr>
-                <a:solidFill>
-                  <a:schemeClr val="tx1"/>
-                </a:solidFill>
-                <a:latin typeface="Arial" charset="0"/>
-              </a:defRPr>
-            </a:lvl2pPr>
-            <a:lvl3pPr marL="1143000" indent="-228600" eaLnBrk="0" hangingPunct="0">
-              <a:defRPr>
-                <a:solidFill>
-                  <a:schemeClr val="tx1"/>
-                </a:solidFill>
-                <a:latin typeface="Arial" charset="0"/>
-              </a:defRPr>
-            </a:lvl3pPr>
-            <a:lvl4pPr marL="1600200" indent="-228600" eaLnBrk="0" hangingPunct="0">
-              <a:defRPr>
-                <a:solidFill>
-                  <a:schemeClr val="tx1"/>
-                </a:solidFill>
-                <a:latin typeface="Arial" charset="0"/>
-              </a:defRPr>
-            </a:lvl4pPr>
-            <a:lvl5pPr marL="2057400" indent="-228600" eaLnBrk="0" hangingPunct="0">
-              <a:defRPr>
-                <a:solidFill>
-                  <a:schemeClr val="tx1"/>
-                </a:solidFill>
-                <a:latin typeface="Arial" charset="0"/>
-              </a:defRPr>
-            </a:lvl5pPr>
-            <a:lvl6pPr marL="2514600" indent="-228600" eaLnBrk="0" fontAlgn="base" hangingPunct="0">
-              <a:spcBef>
-                <a:spcPct val="0"/>
-              </a:spcBef>
-              <a:spcAft>
-                <a:spcPct val="0"/>
-              </a:spcAft>
-              <a:defRPr>
-                <a:solidFill>
-                  <a:schemeClr val="tx1"/>
-                </a:solidFill>
-                <a:latin typeface="Arial" charset="0"/>
-              </a:defRPr>
-            </a:lvl6pPr>
-            <a:lvl7pPr marL="2971800" indent="-228600" eaLnBrk="0" fontAlgn="base" hangingPunct="0">
-              <a:spcBef>
-                <a:spcPct val="0"/>
-              </a:spcBef>
-              <a:spcAft>
-                <a:spcPct val="0"/>
-              </a:spcAft>
-              <a:defRPr>
-                <a:solidFill>
-                  <a:schemeClr val="tx1"/>
-                </a:solidFill>
-                <a:latin typeface="Arial" charset="0"/>
-              </a:defRPr>
-            </a:lvl7pPr>
-            <a:lvl8pPr marL="3429000" indent="-228600" eaLnBrk="0" fontAlgn="base" hangingPunct="0">
-              <a:spcBef>
-                <a:spcPct val="0"/>
-              </a:spcBef>
-              <a:spcAft>
-                <a:spcPct val="0"/>
-              </a:spcAft>
-              <a:defRPr>
-                <a:solidFill>
-                  <a:schemeClr val="tx1"/>
-                </a:solidFill>
-                <a:latin typeface="Arial" charset="0"/>
-              </a:defRPr>
-            </a:lvl8pPr>
-            <a:lvl9pPr marL="3886200" indent="-228600" eaLnBrk="0" fontAlgn="base" hangingPunct="0">
-              <a:spcBef>
-                <a:spcPct val="0"/>
-              </a:spcBef>
-              <a:spcAft>
-                <a:spcPct val="0"/>
-              </a:spcAft>
-              <a:defRPr>
-                <a:solidFill>
-                  <a:schemeClr val="tx1"/>
-                </a:solidFill>
-                <a:latin typeface="Arial" charset="0"/>
-              </a:defRPr>
-            </a:lvl9pPr>
-          </a:lstStyle>
-          <a:p>
-            <a:pPr eaLnBrk="1" hangingPunct="1"/>
-            <a:r>
-              <a:rPr lang="en-US" sz="1400" dirty="0" err="1">
-                <a:solidFill>
-                  <a:schemeClr val="bg1"/>
-                </a:solidFill>
-                <a:latin typeface="Courier New" pitchFamily="49" charset="0"/>
-                <a:cs typeface="Courier New" pitchFamily="49" charset="0"/>
-              </a:rPr>
-              <a:t>enum</a:t>
-            </a:r>
-            <a:r>
-              <a:rPr lang="en-US" sz="1400" dirty="0">
-                <a:solidFill>
-                  <a:schemeClr val="bg1"/>
-                </a:solidFill>
-                <a:latin typeface="Courier New" pitchFamily="49" charset="0"/>
-                <a:cs typeface="Courier New" pitchFamily="49" charset="0"/>
-              </a:rPr>
-              <a:t> &lt;</a:t>
-            </a:r>
-            <a:r>
-              <a:rPr lang="ru-RU" sz="1400" dirty="0">
-                <a:solidFill>
-                  <a:schemeClr val="bg1"/>
-                </a:solidFill>
-                <a:latin typeface="Courier New" pitchFamily="49" charset="0"/>
-                <a:cs typeface="Courier New" pitchFamily="49" charset="0"/>
-              </a:rPr>
-              <a:t>Имя перечисления</a:t>
-            </a:r>
-            <a:r>
-              <a:rPr lang="en-US" sz="1400" dirty="0">
-                <a:solidFill>
-                  <a:schemeClr val="bg1"/>
-                </a:solidFill>
-                <a:latin typeface="Courier New" pitchFamily="49" charset="0"/>
-                <a:cs typeface="Courier New" pitchFamily="49" charset="0"/>
-              </a:rPr>
-              <a:t>&gt;</a:t>
-            </a:r>
-            <a:endParaRPr lang="ru-RU" sz="1400" dirty="0">
-              <a:solidFill>
-                <a:schemeClr val="bg1"/>
-              </a:solidFill>
-              <a:latin typeface="Courier New" pitchFamily="49" charset="0"/>
-              <a:cs typeface="Courier New" pitchFamily="49" charset="0"/>
-            </a:endParaRPr>
-          </a:p>
-          <a:p>
-            <a:pPr eaLnBrk="1" hangingPunct="1"/>
-            <a:r>
-              <a:rPr lang="en-US" sz="1400" dirty="0">
-                <a:solidFill>
-                  <a:schemeClr val="bg1"/>
-                </a:solidFill>
-                <a:latin typeface="Courier New" pitchFamily="49" charset="0"/>
-                <a:cs typeface="Courier New" pitchFamily="49" charset="0"/>
-              </a:rPr>
-              <a:t>{</a:t>
-            </a:r>
-          </a:p>
-          <a:p>
-            <a:pPr eaLnBrk="1" hangingPunct="1"/>
-            <a:r>
-              <a:rPr lang="en-US" sz="1400" dirty="0">
-                <a:solidFill>
-                  <a:schemeClr val="bg1"/>
-                </a:solidFill>
-                <a:latin typeface="Courier New" pitchFamily="49" charset="0"/>
-                <a:cs typeface="Courier New" pitchFamily="49" charset="0"/>
-              </a:rPr>
-              <a:t>    &lt;</a:t>
-            </a:r>
-            <a:r>
-              <a:rPr lang="ru-RU" sz="1400" dirty="0">
-                <a:solidFill>
-                  <a:schemeClr val="bg1"/>
-                </a:solidFill>
-                <a:latin typeface="Courier New" pitchFamily="49" charset="0"/>
-                <a:cs typeface="Courier New" pitchFamily="49" charset="0"/>
-              </a:rPr>
-              <a:t>Имя 1-го элемента</a:t>
-            </a:r>
-            <a:r>
-              <a:rPr lang="en-US" sz="1400" dirty="0">
-                <a:solidFill>
-                  <a:schemeClr val="bg1"/>
-                </a:solidFill>
-                <a:latin typeface="Courier New" pitchFamily="49" charset="0"/>
-                <a:cs typeface="Courier New" pitchFamily="49" charset="0"/>
-              </a:rPr>
-              <a:t>&gt;</a:t>
-            </a:r>
-            <a:r>
-              <a:rPr lang="ru-RU" sz="1400" dirty="0">
-                <a:solidFill>
-                  <a:schemeClr val="bg1"/>
-                </a:solidFill>
-                <a:latin typeface="Courier New" pitchFamily="49" charset="0"/>
-                <a:cs typeface="Courier New" pitchFamily="49" charset="0"/>
-              </a:rPr>
-              <a:t> = </a:t>
-            </a:r>
-            <a:r>
-              <a:rPr lang="en-US" sz="1400" dirty="0">
-                <a:solidFill>
-                  <a:schemeClr val="bg1"/>
-                </a:solidFill>
-                <a:latin typeface="Courier New" pitchFamily="49" charset="0"/>
-                <a:cs typeface="Courier New" pitchFamily="49" charset="0"/>
-              </a:rPr>
-              <a:t>&lt;</a:t>
-            </a:r>
-            <a:r>
-              <a:rPr lang="ru-RU" sz="1400" dirty="0">
-                <a:solidFill>
-                  <a:schemeClr val="bg1"/>
-                </a:solidFill>
-                <a:latin typeface="Courier New" pitchFamily="49" charset="0"/>
-                <a:cs typeface="Courier New" pitchFamily="49" charset="0"/>
-              </a:rPr>
-              <a:t>Числовое значение</a:t>
-            </a:r>
-            <a:r>
-              <a:rPr lang="en-US" sz="1400" dirty="0">
-                <a:solidFill>
-                  <a:schemeClr val="bg1"/>
-                </a:solidFill>
-                <a:latin typeface="Courier New" pitchFamily="49" charset="0"/>
-                <a:cs typeface="Courier New" pitchFamily="49" charset="0"/>
-              </a:rPr>
-              <a:t>&gt;,</a:t>
-            </a:r>
-          </a:p>
-          <a:p>
-            <a:pPr eaLnBrk="1" hangingPunct="1"/>
-            <a:r>
-              <a:rPr lang="en-US" sz="1400" dirty="0">
-                <a:solidFill>
-                  <a:schemeClr val="bg1"/>
-                </a:solidFill>
-                <a:latin typeface="Courier New" pitchFamily="49" charset="0"/>
-                <a:cs typeface="Courier New" pitchFamily="49" charset="0"/>
-              </a:rPr>
-              <a:t>    &lt;</a:t>
-            </a:r>
-            <a:r>
-              <a:rPr lang="ru-RU" sz="1400" dirty="0">
-                <a:solidFill>
-                  <a:schemeClr val="bg1"/>
-                </a:solidFill>
-                <a:latin typeface="Courier New" pitchFamily="49" charset="0"/>
-                <a:cs typeface="Courier New" pitchFamily="49" charset="0"/>
-              </a:rPr>
-              <a:t>Имя </a:t>
-            </a:r>
-            <a:r>
-              <a:rPr lang="en-US" sz="1400" dirty="0">
-                <a:solidFill>
-                  <a:schemeClr val="bg1"/>
-                </a:solidFill>
-                <a:latin typeface="Courier New" pitchFamily="49" charset="0"/>
-                <a:cs typeface="Courier New" pitchFamily="49" charset="0"/>
-              </a:rPr>
-              <a:t>2</a:t>
-            </a:r>
-            <a:r>
-              <a:rPr lang="ru-RU" sz="1400" dirty="0">
-                <a:solidFill>
-                  <a:schemeClr val="bg1"/>
-                </a:solidFill>
-                <a:latin typeface="Courier New" pitchFamily="49" charset="0"/>
-                <a:cs typeface="Courier New" pitchFamily="49" charset="0"/>
-              </a:rPr>
-              <a:t>-го элемента</a:t>
-            </a:r>
-            <a:r>
-              <a:rPr lang="en-US" sz="1400" dirty="0">
-                <a:solidFill>
-                  <a:schemeClr val="bg1"/>
-                </a:solidFill>
-                <a:latin typeface="Courier New" pitchFamily="49" charset="0"/>
-                <a:cs typeface="Courier New" pitchFamily="49" charset="0"/>
-              </a:rPr>
-              <a:t>&gt;</a:t>
-            </a:r>
-            <a:r>
-              <a:rPr lang="ru-RU" sz="1400" dirty="0">
-                <a:solidFill>
-                  <a:schemeClr val="bg1"/>
-                </a:solidFill>
-                <a:latin typeface="Courier New" pitchFamily="49" charset="0"/>
-                <a:cs typeface="Courier New" pitchFamily="49" charset="0"/>
-              </a:rPr>
-              <a:t> = </a:t>
-            </a:r>
-            <a:r>
-              <a:rPr lang="en-US" sz="1400" dirty="0">
-                <a:solidFill>
-                  <a:schemeClr val="bg1"/>
-                </a:solidFill>
-                <a:latin typeface="Courier New" pitchFamily="49" charset="0"/>
-                <a:cs typeface="Courier New" pitchFamily="49" charset="0"/>
-              </a:rPr>
-              <a:t>&lt;</a:t>
-            </a:r>
-            <a:r>
-              <a:rPr lang="ru-RU" sz="1400" dirty="0">
-                <a:solidFill>
-                  <a:schemeClr val="bg1"/>
-                </a:solidFill>
-                <a:latin typeface="Courier New" pitchFamily="49" charset="0"/>
-                <a:cs typeface="Courier New" pitchFamily="49" charset="0"/>
-              </a:rPr>
-              <a:t>Числовое значение</a:t>
-            </a:r>
-            <a:r>
-              <a:rPr lang="en-US" sz="1400" dirty="0">
-                <a:solidFill>
-                  <a:schemeClr val="bg1"/>
-                </a:solidFill>
-                <a:latin typeface="Courier New" pitchFamily="49" charset="0"/>
-                <a:cs typeface="Courier New" pitchFamily="49" charset="0"/>
-              </a:rPr>
-              <a:t>&gt;,</a:t>
-            </a:r>
-          </a:p>
-          <a:p>
-            <a:pPr eaLnBrk="1" hangingPunct="1"/>
-            <a:r>
-              <a:rPr lang="en-US" sz="1400" dirty="0">
-                <a:solidFill>
-                  <a:schemeClr val="bg1"/>
-                </a:solidFill>
-                <a:latin typeface="Courier New" pitchFamily="49" charset="0"/>
-                <a:cs typeface="Courier New" pitchFamily="49" charset="0"/>
-              </a:rPr>
-              <a:t>    . . .</a:t>
-            </a:r>
-          </a:p>
-          <a:p>
-            <a:pPr eaLnBrk="1" hangingPunct="1"/>
-            <a:r>
-              <a:rPr lang="en-US" sz="1400" dirty="0">
-                <a:solidFill>
-                  <a:schemeClr val="bg1"/>
-                </a:solidFill>
-                <a:latin typeface="Courier New" pitchFamily="49" charset="0"/>
-                <a:cs typeface="Courier New" pitchFamily="49" charset="0"/>
-              </a:rPr>
-              <a:t>    &lt;</a:t>
-            </a:r>
-            <a:r>
-              <a:rPr lang="ru-RU" sz="1400" dirty="0">
-                <a:solidFill>
-                  <a:schemeClr val="bg1"/>
-                </a:solidFill>
-                <a:latin typeface="Courier New" pitchFamily="49" charset="0"/>
-                <a:cs typeface="Courier New" pitchFamily="49" charset="0"/>
-              </a:rPr>
-              <a:t>Имя </a:t>
-            </a:r>
-            <a:r>
-              <a:rPr lang="en-US" sz="1400" dirty="0">
-                <a:solidFill>
-                  <a:schemeClr val="bg1"/>
-                </a:solidFill>
-                <a:latin typeface="Courier New" pitchFamily="49" charset="0"/>
-                <a:cs typeface="Courier New" pitchFamily="49" charset="0"/>
-              </a:rPr>
-              <a:t>n</a:t>
-            </a:r>
-            <a:r>
-              <a:rPr lang="ru-RU" sz="1400" dirty="0">
-                <a:solidFill>
-                  <a:schemeClr val="bg1"/>
-                </a:solidFill>
-                <a:latin typeface="Courier New" pitchFamily="49" charset="0"/>
-                <a:cs typeface="Courier New" pitchFamily="49" charset="0"/>
-              </a:rPr>
-              <a:t>-го элемента</a:t>
-            </a:r>
-            <a:r>
-              <a:rPr lang="en-US" sz="1400" dirty="0">
-                <a:solidFill>
-                  <a:schemeClr val="bg1"/>
-                </a:solidFill>
-                <a:latin typeface="Courier New" pitchFamily="49" charset="0"/>
-                <a:cs typeface="Courier New" pitchFamily="49" charset="0"/>
-              </a:rPr>
-              <a:t>&gt;</a:t>
-            </a:r>
-            <a:r>
-              <a:rPr lang="ru-RU" sz="1400" dirty="0">
-                <a:solidFill>
-                  <a:schemeClr val="bg1"/>
-                </a:solidFill>
-                <a:latin typeface="Courier New" pitchFamily="49" charset="0"/>
-                <a:cs typeface="Courier New" pitchFamily="49" charset="0"/>
-              </a:rPr>
-              <a:t> = </a:t>
-            </a:r>
-            <a:r>
-              <a:rPr lang="en-US" sz="1400" dirty="0">
-                <a:solidFill>
-                  <a:schemeClr val="bg1"/>
-                </a:solidFill>
-                <a:latin typeface="Courier New" pitchFamily="49" charset="0"/>
-                <a:cs typeface="Courier New" pitchFamily="49" charset="0"/>
-              </a:rPr>
-              <a:t>&lt;</a:t>
-            </a:r>
-            <a:r>
-              <a:rPr lang="ru-RU" sz="1400" dirty="0">
-                <a:solidFill>
-                  <a:schemeClr val="bg1"/>
-                </a:solidFill>
-                <a:latin typeface="Courier New" pitchFamily="49" charset="0"/>
-                <a:cs typeface="Courier New" pitchFamily="49" charset="0"/>
-              </a:rPr>
-              <a:t>Числовое значение</a:t>
-            </a:r>
-            <a:r>
-              <a:rPr lang="en-US" sz="1400" dirty="0">
-                <a:solidFill>
-                  <a:schemeClr val="bg1"/>
-                </a:solidFill>
-                <a:latin typeface="Courier New" pitchFamily="49" charset="0"/>
-                <a:cs typeface="Courier New" pitchFamily="49" charset="0"/>
-              </a:rPr>
-              <a:t>&gt;</a:t>
-            </a:r>
-          </a:p>
-          <a:p>
-            <a:pPr eaLnBrk="1" hangingPunct="1"/>
-            <a:r>
-              <a:rPr lang="en-US" sz="1400" dirty="0">
-                <a:solidFill>
-                  <a:schemeClr val="bg1"/>
-                </a:solidFill>
-                <a:latin typeface="Courier New" pitchFamily="49" charset="0"/>
-                <a:cs typeface="Courier New" pitchFamily="49" charset="0"/>
-              </a:rPr>
-              <a:t>}</a:t>
-            </a:r>
-            <a:endParaRPr lang="ru-RU" sz="1400" dirty="0">
-              <a:solidFill>
-                <a:schemeClr val="bg1"/>
-              </a:solidFill>
-              <a:latin typeface="Courier New" pitchFamily="49" charset="0"/>
-              <a:cs typeface="Courier New" pitchFamily="49" charset="0"/>
-            </a:endParaRPr>
-          </a:p>
-          <a:p>
-            <a:pPr eaLnBrk="1" hangingPunct="1"/>
-            <a:endParaRPr lang="ru-RU" sz="1400" dirty="0">
-              <a:solidFill>
-                <a:schemeClr val="bg1"/>
-              </a:solidFill>
-              <a:latin typeface="Courier New" pitchFamily="49" charset="0"/>
-              <a:cs typeface="Courier New" pitchFamily="49" charset="0"/>
-            </a:endParaRPr>
-          </a:p>
-        </p:txBody>
-      </p:sp>
-      <p:sp>
-        <p:nvSpPr>
-          <p:cNvPr id="2" name="Rectangle 1"/>
-          <p:cNvSpPr/>
-          <p:nvPr/>
-        </p:nvSpPr>
-        <p:spPr>
-          <a:xfrm>
-            <a:off x="685800" y="6381328"/>
-            <a:ext cx="7696200" cy="369332"/>
-          </a:xfrm>
-          <a:prstGeom prst="rect">
-            <a:avLst/>
-          </a:prstGeom>
-        </p:spPr>
-        <p:txBody>
-          <a:bodyPr wrap="square">
-            <a:spAutoFit/>
-          </a:bodyPr>
-          <a:lstStyle/>
-          <a:p>
-            <a:r>
-              <a:rPr lang="en-US" dirty="0">
-                <a:solidFill>
-                  <a:schemeClr val="bg1"/>
-                </a:solidFill>
-              </a:rPr>
-              <a:t>http://nuget.org/packages/UnconstrainedMelody</a:t>
-            </a:r>
-          </a:p>
-        </p:txBody>
-      </p:sp>
-    </p:spTree>
-    <p:extLst>
-      <p:ext uri="{BB962C8B-B14F-4D97-AF65-F5344CB8AC3E}">
-        <p14:creationId xmlns:p14="http://schemas.microsoft.com/office/powerpoint/2010/main" val="3737252040"/>
       </p:ext>
     </p:extLst>
   </p:cSld>
@@ -29526,7 +28527,7 @@
       </p:grpSpPr>
       <p:sp>
         <p:nvSpPr>
-          <p:cNvPr id="18434" name="Прямоугольник 6"/>
+          <p:cNvPr id="17410" name="Прямоугольник 6"/>
           <p:cNvSpPr>
             <a:spLocks noChangeArrowheads="1"/>
           </p:cNvSpPr>
@@ -29582,7 +28583,7 @@
                 </a:solidFill>
                 <a:cs typeface="Times New Roman" pitchFamily="18" charset="0"/>
               </a:rPr>
-              <a:t>Структуры </a:t>
+              <a:t>Перечисления </a:t>
             </a:r>
             <a:r>
               <a:rPr lang="en-US" sz="2400" b="1" dirty="0" err="1">
@@ -29591,7 +28592,7 @@
                 </a:solidFill>
                 <a:cs typeface="Times New Roman" pitchFamily="18" charset="0"/>
               </a:rPr>
-              <a:t>struct</a:t>
+              <a:t>enum</a:t>
             </a:r>
             <a:r>
               <a:rPr lang="en-US" sz="2400" b="1" dirty="0">
@@ -29613,277 +28614,7 @@
       </p:sp>
       <p:sp>
         <p:nvSpPr>
-          <p:cNvPr id="18435" name="Подзаголовок 2"/>
-          <p:cNvSpPr txBox="1">
-            <a:spLocks/>
-          </p:cNvSpPr>
-          <p:nvPr/>
-        </p:nvSpPr>
-        <p:spPr bwMode="auto">
-          <a:xfrm>
-            <a:off x="685800" y="762000"/>
-            <a:ext cx="7696200" cy="990600"/>
-          </a:xfrm>
-          <a:prstGeom prst="rect">
-            <a:avLst/>
-          </a:prstGeom>
-          <a:noFill/>
-          <a:ln w="9525">
-            <a:solidFill>
-              <a:srgbClr val="FF0000"/>
-            </a:solidFill>
-            <a:miter lim="800000"/>
-            <a:headEnd/>
-            <a:tailEnd/>
-          </a:ln>
-          <a:extLst>
-            <a:ext uri="{909E8E84-426E-40DD-AFC4-6F175D3DCCD1}">
-              <a14:hiddenFill xmlns:a14="http://schemas.microsoft.com/office/drawing/2010/main">
-                <a:solidFill>
-                  <a:srgbClr val="FFFFFF"/>
-                </a:solidFill>
-              </a14:hiddenFill>
-            </a:ext>
-          </a:extLst>
-        </p:spPr>
-        <p:txBody>
-          <a:bodyPr/>
-          <a:lstStyle>
-            <a:lvl1pPr eaLnBrk="0" hangingPunct="0">
-              <a:defRPr>
-                <a:solidFill>
-                  <a:schemeClr val="tx1"/>
-                </a:solidFill>
-                <a:latin typeface="Arial" charset="0"/>
-              </a:defRPr>
-            </a:lvl1pPr>
-            <a:lvl2pPr marL="742950" indent="-285750" eaLnBrk="0" hangingPunct="0">
-              <a:defRPr>
-                <a:solidFill>
-                  <a:schemeClr val="tx1"/>
-                </a:solidFill>
-                <a:latin typeface="Arial" charset="0"/>
-              </a:defRPr>
-            </a:lvl2pPr>
-            <a:lvl3pPr marL="1143000" indent="-228600" eaLnBrk="0" hangingPunct="0">
-              <a:defRPr>
-                <a:solidFill>
-                  <a:schemeClr val="tx1"/>
-                </a:solidFill>
-                <a:latin typeface="Arial" charset="0"/>
-              </a:defRPr>
-            </a:lvl3pPr>
-            <a:lvl4pPr marL="1600200" indent="-228600" eaLnBrk="0" hangingPunct="0">
-              <a:defRPr>
-                <a:solidFill>
-                  <a:schemeClr val="tx1"/>
-                </a:solidFill>
-                <a:latin typeface="Arial" charset="0"/>
-              </a:defRPr>
-            </a:lvl4pPr>
-            <a:lvl5pPr marL="2057400" indent="-228600" eaLnBrk="0" hangingPunct="0">
-              <a:defRPr>
-                <a:solidFill>
-                  <a:schemeClr val="tx1"/>
-                </a:solidFill>
-                <a:latin typeface="Arial" charset="0"/>
-              </a:defRPr>
-            </a:lvl5pPr>
-            <a:lvl6pPr marL="2514600" indent="-228600" eaLnBrk="0" fontAlgn="base" hangingPunct="0">
-              <a:spcBef>
-                <a:spcPct val="0"/>
-              </a:spcBef>
-              <a:spcAft>
-                <a:spcPct val="0"/>
-              </a:spcAft>
-              <a:defRPr>
-                <a:solidFill>
-                  <a:schemeClr val="tx1"/>
-                </a:solidFill>
-                <a:latin typeface="Arial" charset="0"/>
-              </a:defRPr>
-            </a:lvl6pPr>
-            <a:lvl7pPr marL="2971800" indent="-228600" eaLnBrk="0" fontAlgn="base" hangingPunct="0">
-              <a:spcBef>
-                <a:spcPct val="0"/>
-              </a:spcBef>
-              <a:spcAft>
-                <a:spcPct val="0"/>
-              </a:spcAft>
-              <a:defRPr>
-                <a:solidFill>
-                  <a:schemeClr val="tx1"/>
-                </a:solidFill>
-                <a:latin typeface="Arial" charset="0"/>
-              </a:defRPr>
-            </a:lvl7pPr>
-            <a:lvl8pPr marL="3429000" indent="-228600" eaLnBrk="0" fontAlgn="base" hangingPunct="0">
-              <a:spcBef>
-                <a:spcPct val="0"/>
-              </a:spcBef>
-              <a:spcAft>
-                <a:spcPct val="0"/>
-              </a:spcAft>
-              <a:defRPr>
-                <a:solidFill>
-                  <a:schemeClr val="tx1"/>
-                </a:solidFill>
-                <a:latin typeface="Arial" charset="0"/>
-              </a:defRPr>
-            </a:lvl8pPr>
-            <a:lvl9pPr marL="3886200" indent="-228600" eaLnBrk="0" fontAlgn="base" hangingPunct="0">
-              <a:spcBef>
-                <a:spcPct val="0"/>
-              </a:spcBef>
-              <a:spcAft>
-                <a:spcPct val="0"/>
-              </a:spcAft>
-              <a:defRPr>
-                <a:solidFill>
-                  <a:schemeClr val="tx1"/>
-                </a:solidFill>
-                <a:latin typeface="Arial" charset="0"/>
-              </a:defRPr>
-            </a:lvl9pPr>
-          </a:lstStyle>
-          <a:p>
-            <a:pPr eaLnBrk="1" hangingPunct="1"/>
-            <a:r>
-              <a:rPr lang="en-US" sz="1400">
-                <a:solidFill>
-                  <a:schemeClr val="bg1"/>
-                </a:solidFill>
-                <a:latin typeface="Courier New" pitchFamily="49" charset="0"/>
-                <a:cs typeface="Courier New" pitchFamily="49" charset="0"/>
-              </a:rPr>
-              <a:t>struct &lt;</a:t>
-            </a:r>
-            <a:r>
-              <a:rPr lang="ru-RU" sz="1400">
-                <a:solidFill>
-                  <a:schemeClr val="bg1"/>
-                </a:solidFill>
-                <a:latin typeface="Courier New" pitchFamily="49" charset="0"/>
-                <a:cs typeface="Courier New" pitchFamily="49" charset="0"/>
-              </a:rPr>
-              <a:t>Имя структуры</a:t>
-            </a:r>
-            <a:r>
-              <a:rPr lang="en-US" sz="1400">
-                <a:solidFill>
-                  <a:schemeClr val="bg1"/>
-                </a:solidFill>
-                <a:latin typeface="Courier New" pitchFamily="49" charset="0"/>
-                <a:cs typeface="Courier New" pitchFamily="49" charset="0"/>
-              </a:rPr>
-              <a:t>&gt;</a:t>
-            </a:r>
-            <a:endParaRPr lang="ru-RU" sz="1400">
-              <a:solidFill>
-                <a:schemeClr val="bg1"/>
-              </a:solidFill>
-              <a:latin typeface="Courier New" pitchFamily="49" charset="0"/>
-              <a:cs typeface="Courier New" pitchFamily="49" charset="0"/>
-            </a:endParaRPr>
-          </a:p>
-          <a:p>
-            <a:pPr eaLnBrk="1" hangingPunct="1"/>
-            <a:r>
-              <a:rPr lang="en-US" sz="1400">
-                <a:solidFill>
-                  <a:schemeClr val="bg1"/>
-                </a:solidFill>
-                <a:latin typeface="Courier New" pitchFamily="49" charset="0"/>
-                <a:cs typeface="Courier New" pitchFamily="49" charset="0"/>
-              </a:rPr>
-              <a:t>{</a:t>
-            </a:r>
-          </a:p>
-          <a:p>
-            <a:pPr eaLnBrk="1" hangingPunct="1"/>
-            <a:r>
-              <a:rPr lang="ru-RU" sz="1400">
-                <a:solidFill>
-                  <a:schemeClr val="bg1"/>
-                </a:solidFill>
-                <a:latin typeface="Courier New" pitchFamily="49" charset="0"/>
-                <a:cs typeface="Courier New" pitchFamily="49" charset="0"/>
-              </a:rPr>
-              <a:t>	</a:t>
-            </a:r>
-            <a:r>
-              <a:rPr lang="en-US" sz="1400">
-                <a:solidFill>
-                  <a:schemeClr val="bg1"/>
-                </a:solidFill>
-                <a:latin typeface="Courier New" pitchFamily="49" charset="0"/>
-                <a:cs typeface="Courier New" pitchFamily="49" charset="0"/>
-              </a:rPr>
-              <a:t>&lt;</a:t>
-            </a:r>
-            <a:r>
-              <a:rPr lang="ru-RU" sz="1400">
-                <a:solidFill>
-                  <a:schemeClr val="bg1"/>
-                </a:solidFill>
-                <a:latin typeface="Courier New" pitchFamily="49" charset="0"/>
-                <a:cs typeface="Courier New" pitchFamily="49" charset="0"/>
-              </a:rPr>
-              <a:t>элементы структуры</a:t>
-            </a:r>
-            <a:r>
-              <a:rPr lang="en-US" sz="1400">
-                <a:solidFill>
-                  <a:schemeClr val="bg1"/>
-                </a:solidFill>
-                <a:latin typeface="Courier New" pitchFamily="49" charset="0"/>
-                <a:cs typeface="Courier New" pitchFamily="49" charset="0"/>
-              </a:rPr>
-              <a:t>&gt;</a:t>
-            </a:r>
-            <a:endParaRPr lang="ru-RU" sz="1400">
-              <a:solidFill>
-                <a:schemeClr val="bg1"/>
-              </a:solidFill>
-              <a:latin typeface="Courier New" pitchFamily="49" charset="0"/>
-              <a:cs typeface="Courier New" pitchFamily="49" charset="0"/>
-            </a:endParaRPr>
-          </a:p>
-          <a:p>
-            <a:pPr eaLnBrk="1" hangingPunct="1"/>
-            <a:r>
-              <a:rPr lang="en-US" sz="1400">
-                <a:solidFill>
-                  <a:schemeClr val="bg1"/>
-                </a:solidFill>
-                <a:latin typeface="Courier New" pitchFamily="49" charset="0"/>
-                <a:cs typeface="Courier New" pitchFamily="49" charset="0"/>
-              </a:rPr>
-              <a:t>}</a:t>
-            </a:r>
-            <a:endParaRPr lang="ru-RU" sz="1400">
-              <a:solidFill>
-                <a:schemeClr val="bg1"/>
-              </a:solidFill>
-              <a:latin typeface="Courier New" pitchFamily="49" charset="0"/>
-              <a:cs typeface="Courier New" pitchFamily="49" charset="0"/>
-            </a:endParaRPr>
-          </a:p>
-          <a:p>
-            <a:pPr eaLnBrk="1" hangingPunct="1"/>
-            <a:endParaRPr lang="ru-RU" sz="1400">
-              <a:solidFill>
-                <a:schemeClr val="bg1"/>
-              </a:solidFill>
-              <a:latin typeface="Courier New" pitchFamily="49" charset="0"/>
-              <a:cs typeface="Courier New" pitchFamily="49" charset="0"/>
-            </a:endParaRPr>
-          </a:p>
-        </p:txBody>
-      </p:sp>
-      <p:sp>
-        <p:nvSpPr>
-          <p:cNvPr id="151553" name="Rectangle 1"/>
+          <p:cNvPr id="12294" name="Rectangle 6"/>
           <p:cNvSpPr>
             <a:spLocks noChangeArrowheads="1"/>
           </p:cNvSpPr>
@@ -29891,8 +28622,8 @@
         </p:nvSpPr>
         <p:spPr bwMode="auto">
           <a:xfrm>
-            <a:off x="685800" y="2057400"/>
-            <a:ext cx="7696200" cy="4554538"/>
+            <a:off x="685800" y="2492896"/>
+            <a:ext cx="7696200" cy="3770313"/>
           </a:xfrm>
           <a:prstGeom prst="rect">
             <a:avLst/>
@@ -29928,7 +28659,7 @@
                 <a:ea typeface="Calibri" pitchFamily="34" charset="0"/>
                 <a:cs typeface="Courier New" pitchFamily="49" charset="0"/>
               </a:rPr>
-              <a:t>    struct Point</a:t>
+              <a:t>    enum Cars</a:t>
             </a:r>
             <a:endParaRPr lang="be-BY" sz="900" dirty="0">
               <a:solidFill>
@@ -29972,7 +28703,7 @@
                 <a:ea typeface="Calibri" pitchFamily="34" charset="0"/>
                 <a:cs typeface="Courier New" pitchFamily="49" charset="0"/>
               </a:rPr>
-              <a:t>        public int x, y;</a:t>
+              <a:t>        Mersedes = 0,</a:t>
             </a:r>
             <a:endParaRPr lang="be-BY" sz="900" dirty="0">
               <a:solidFill>
@@ -29994,7 +28725,7 @@
                 <a:ea typeface="Calibri" pitchFamily="34" charset="0"/>
                 <a:cs typeface="Courier New" pitchFamily="49" charset="0"/>
               </a:rPr>
-              <a:t>        public Point(int X, int Y)</a:t>
+              <a:t>        Porsche = 5,</a:t>
             </a:r>
             <a:endParaRPr lang="be-BY" sz="900" dirty="0">
               <a:solidFill>
@@ -30016,7 +28747,7 @@
                 <a:ea typeface="Calibri" pitchFamily="34" charset="0"/>
                 <a:cs typeface="Courier New" pitchFamily="49" charset="0"/>
               </a:rPr>
-              <a:t>        {</a:t>
+              <a:t>        BMW = 100,</a:t>
             </a:r>
             <a:endParaRPr lang="be-BY" sz="900" dirty="0">
               <a:solidFill>
@@ -30038,7 +28769,7 @@
                 <a:ea typeface="Calibri" pitchFamily="34" charset="0"/>
                 <a:cs typeface="Courier New" pitchFamily="49" charset="0"/>
               </a:rPr>
-              <a:t>            x = X;</a:t>
+              <a:t>        Lamborgini = 140,</a:t>
             </a:r>
             <a:endParaRPr lang="be-BY" sz="900" dirty="0">
               <a:solidFill>
@@ -30060,227 +28791,7 @@
                 <a:ea typeface="Calibri" pitchFamily="34" charset="0"/>
                 <a:cs typeface="Courier New" pitchFamily="49" charset="0"/>
               </a:rPr>
-              <a:t>            y = Y;</a:t>
-            </a:r>
-            <a:endParaRPr lang="be-BY" sz="900" dirty="0">
-              <a:solidFill>
-                <a:schemeClr val="bg1"/>
-              </a:solidFill>
-              <a:latin typeface="Arial" pitchFamily="34" charset="0"/>
-            </a:endParaRPr>
-          </a:p>
-          <a:p>
-            <a:pPr eaLnBrk="0" hangingPunct="0">
-              <a:defRPr/>
-            </a:pPr>
-            <a:r>
-              <a:rPr lang="be-BY" sz="1000" dirty="0">
-                <a:solidFill>
-                  <a:schemeClr val="bg1"/>
-                </a:solidFill>
-                <a:latin typeface="Courier New" pitchFamily="49" charset="0"/>
-                <a:ea typeface="Calibri" pitchFamily="34" charset="0"/>
-                <a:cs typeface="Courier New" pitchFamily="49" charset="0"/>
-              </a:rPr>
-              <a:t>        }</a:t>
-            </a:r>
-            <a:endParaRPr lang="be-BY" sz="900" dirty="0">
-              <a:solidFill>
-                <a:schemeClr val="bg1"/>
-              </a:solidFill>
-              <a:latin typeface="Arial" pitchFamily="34" charset="0"/>
-            </a:endParaRPr>
-          </a:p>
-          <a:p>
-            <a:pPr eaLnBrk="0" hangingPunct="0">
-              <a:defRPr/>
-            </a:pPr>
-            <a:r>
-              <a:rPr lang="be-BY" sz="1000" dirty="0">
-                <a:solidFill>
-                  <a:schemeClr val="bg1"/>
-                </a:solidFill>
-                <a:latin typeface="Courier New" pitchFamily="49" charset="0"/>
-                <a:ea typeface="Calibri" pitchFamily="34" charset="0"/>
-                <a:cs typeface="Courier New" pitchFamily="49" charset="0"/>
-              </a:rPr>
-              <a:t>        public void AddValue(int val)</a:t>
-            </a:r>
-            <a:endParaRPr lang="be-BY" sz="900" dirty="0">
-              <a:solidFill>
-                <a:schemeClr val="bg1"/>
-              </a:solidFill>
-              <a:latin typeface="Arial" pitchFamily="34" charset="0"/>
-            </a:endParaRPr>
-          </a:p>
-          <a:p>
-            <a:pPr eaLnBrk="0" hangingPunct="0">
-              <a:defRPr/>
-            </a:pPr>
-            <a:r>
-              <a:rPr lang="be-BY" sz="1000" dirty="0">
-                <a:solidFill>
-                  <a:schemeClr val="bg1"/>
-                </a:solidFill>
-                <a:latin typeface="Courier New" pitchFamily="49" charset="0"/>
-                <a:ea typeface="Calibri" pitchFamily="34" charset="0"/>
-                <a:cs typeface="Courier New" pitchFamily="49" charset="0"/>
-              </a:rPr>
-              <a:t>        {</a:t>
-            </a:r>
-            <a:endParaRPr lang="be-BY" sz="900" dirty="0">
-              <a:solidFill>
-                <a:schemeClr val="bg1"/>
-              </a:solidFill>
-              <a:latin typeface="Arial" pitchFamily="34" charset="0"/>
-            </a:endParaRPr>
-          </a:p>
-          <a:p>
-            <a:pPr eaLnBrk="0" hangingPunct="0">
-              <a:defRPr/>
-            </a:pPr>
-            <a:r>
-              <a:rPr lang="be-BY" sz="1000" dirty="0">
-                <a:solidFill>
-                  <a:schemeClr val="bg1"/>
-                </a:solidFill>
-                <a:latin typeface="Courier New" pitchFamily="49" charset="0"/>
-                <a:ea typeface="Calibri" pitchFamily="34" charset="0"/>
-                <a:cs typeface="Courier New" pitchFamily="49" charset="0"/>
-              </a:rPr>
-              <a:t>            x += val;</a:t>
-            </a:r>
-            <a:endParaRPr lang="be-BY" sz="900" dirty="0">
-              <a:solidFill>
-                <a:schemeClr val="bg1"/>
-              </a:solidFill>
-              <a:latin typeface="Arial" pitchFamily="34" charset="0"/>
-            </a:endParaRPr>
-          </a:p>
-          <a:p>
-            <a:pPr eaLnBrk="0" hangingPunct="0">
-              <a:defRPr/>
-            </a:pPr>
-            <a:r>
-              <a:rPr lang="be-BY" sz="1000" dirty="0">
-                <a:solidFill>
-                  <a:schemeClr val="bg1"/>
-                </a:solidFill>
-                <a:latin typeface="Courier New" pitchFamily="49" charset="0"/>
-                <a:ea typeface="Calibri" pitchFamily="34" charset="0"/>
-                <a:cs typeface="Courier New" pitchFamily="49" charset="0"/>
-              </a:rPr>
-              <a:t>            y += val;</a:t>
-            </a:r>
-            <a:endParaRPr lang="be-BY" sz="900" dirty="0">
-              <a:solidFill>
-                <a:schemeClr val="bg1"/>
-              </a:solidFill>
-              <a:latin typeface="Arial" pitchFamily="34" charset="0"/>
-            </a:endParaRPr>
-          </a:p>
-          <a:p>
-            <a:pPr eaLnBrk="0" hangingPunct="0">
-              <a:defRPr/>
-            </a:pPr>
-            <a:r>
-              <a:rPr lang="be-BY" sz="1000" dirty="0">
-                <a:solidFill>
-                  <a:schemeClr val="bg1"/>
-                </a:solidFill>
-                <a:latin typeface="Courier New" pitchFamily="49" charset="0"/>
-                <a:ea typeface="Calibri" pitchFamily="34" charset="0"/>
-                <a:cs typeface="Courier New" pitchFamily="49" charset="0"/>
-              </a:rPr>
-              <a:t>        }</a:t>
-            </a:r>
-            <a:endParaRPr lang="be-BY" sz="900" dirty="0">
-              <a:solidFill>
-                <a:schemeClr val="bg1"/>
-              </a:solidFill>
-              <a:latin typeface="Arial" pitchFamily="34" charset="0"/>
-            </a:endParaRPr>
-          </a:p>
-          <a:p>
-            <a:pPr eaLnBrk="0" hangingPunct="0">
-              <a:defRPr/>
-            </a:pPr>
-            <a:r>
-              <a:rPr lang="be-BY" sz="1000" dirty="0">
-                <a:solidFill>
-                  <a:schemeClr val="bg1"/>
-                </a:solidFill>
-                <a:latin typeface="Courier New" pitchFamily="49" charset="0"/>
-                <a:ea typeface="Calibri" pitchFamily="34" charset="0"/>
-                <a:cs typeface="Courier New" pitchFamily="49" charset="0"/>
-              </a:rPr>
-              <a:t>        public void Write()</a:t>
-            </a:r>
-            <a:endParaRPr lang="be-BY" sz="900" dirty="0">
-              <a:solidFill>
-                <a:schemeClr val="bg1"/>
-              </a:solidFill>
-              <a:latin typeface="Arial" pitchFamily="34" charset="0"/>
-            </a:endParaRPr>
-          </a:p>
-          <a:p>
-            <a:pPr eaLnBrk="0" hangingPunct="0">
-              <a:defRPr/>
-            </a:pPr>
-            <a:r>
-              <a:rPr lang="be-BY" sz="1000" dirty="0">
-                <a:solidFill>
-                  <a:schemeClr val="bg1"/>
-                </a:solidFill>
-                <a:latin typeface="Courier New" pitchFamily="49" charset="0"/>
-                <a:ea typeface="Calibri" pitchFamily="34" charset="0"/>
-                <a:cs typeface="Courier New" pitchFamily="49" charset="0"/>
-              </a:rPr>
-              <a:t>        {</a:t>
-            </a:r>
-            <a:endParaRPr lang="be-BY" sz="900" dirty="0">
-              <a:solidFill>
-                <a:schemeClr val="bg1"/>
-              </a:solidFill>
-              <a:latin typeface="Arial" pitchFamily="34" charset="0"/>
-            </a:endParaRPr>
-          </a:p>
-          <a:p>
-            <a:pPr eaLnBrk="0" hangingPunct="0">
-              <a:defRPr/>
-            </a:pPr>
-            <a:r>
-              <a:rPr lang="be-BY" sz="1000" dirty="0">
-                <a:solidFill>
-                  <a:schemeClr val="bg1"/>
-                </a:solidFill>
-                <a:latin typeface="Courier New" pitchFamily="49" charset="0"/>
-                <a:ea typeface="Calibri" pitchFamily="34" charset="0"/>
-                <a:cs typeface="Courier New" pitchFamily="49" charset="0"/>
-              </a:rPr>
-              <a:t>            Console.WriteLine("x={0}, y={1}", x, y);</a:t>
-            </a:r>
-            <a:endParaRPr lang="be-BY" sz="900" dirty="0">
-              <a:solidFill>
-                <a:schemeClr val="bg1"/>
-              </a:solidFill>
-              <a:latin typeface="Arial" pitchFamily="34" charset="0"/>
-            </a:endParaRPr>
-          </a:p>
-          <a:p>
-            <a:pPr eaLnBrk="0" hangingPunct="0">
-              <a:defRPr/>
-            </a:pPr>
-            <a:r>
-              <a:rPr lang="be-BY" sz="1000" dirty="0">
-                <a:solidFill>
-                  <a:schemeClr val="bg1"/>
-                </a:solidFill>
-                <a:latin typeface="Courier New" pitchFamily="49" charset="0"/>
-                <a:ea typeface="Calibri" pitchFamily="34" charset="0"/>
-                <a:cs typeface="Courier New" pitchFamily="49" charset="0"/>
-              </a:rPr>
-              <a:t>        }</a:t>
+              <a:t>        Ferrari = 500</a:t>
             </a:r>
             <a:endParaRPr lang="be-BY" sz="900" dirty="0">
               <a:solidFill>
@@ -30425,7 +28936,7 @@
                 <a:ea typeface="Calibri" pitchFamily="34" charset="0"/>
                 <a:cs typeface="Courier New" pitchFamily="49" charset="0"/>
               </a:rPr>
-              <a:t>            Point pt1 = new Point(4,3);</a:t>
+              <a:t>            Cars car1 = Cars.Mersedes, car2 = (Cars)140;</a:t>
             </a:r>
             <a:endParaRPr lang="be-BY" sz="900" dirty="0">
               <a:solidFill>
@@ -30447,7 +28958,7 @@
                 <a:ea typeface="Calibri" pitchFamily="34" charset="0"/>
                 <a:cs typeface="Courier New" pitchFamily="49" charset="0"/>
               </a:rPr>
-              <a:t>            pt1.x = 1;</a:t>
+              <a:t>            Console.WriteLine("{0}, {1}", car1, car2);</a:t>
             </a:r>
             <a:endParaRPr lang="be-BY" sz="900" dirty="0">
               <a:solidFill>
@@ -30469,13 +28980,15 @@
                 <a:ea typeface="Calibri" pitchFamily="34" charset="0"/>
                 <a:cs typeface="Courier New" pitchFamily="49" charset="0"/>
               </a:rPr>
-              <a:t>            pt1.y = 5;</a:t>
-            </a:r>
-            <a:endParaRPr lang="be-BY" sz="900" dirty="0">
-              <a:solidFill>
-                <a:schemeClr val="bg1"/>
-              </a:solidFill>
-              <a:latin typeface="Arial" pitchFamily="34" charset="0"/>
+              <a:t>            </a:t>
+            </a:r>
+            <a:endParaRPr lang="en-US" sz="1000" dirty="0">
+              <a:solidFill>
+                <a:schemeClr val="bg1"/>
+              </a:solidFill>
+              <a:latin typeface="Courier New" pitchFamily="49" charset="0"/>
+              <a:ea typeface="Calibri" pitchFamily="34" charset="0"/>
+              <a:cs typeface="Courier New" pitchFamily="49" charset="0"/>
             </a:endParaRPr>
           </a:p>
           <a:p>
@@ -30483,6 +28996,17 @@
               <a:defRPr/>
             </a:pPr>
             <a:r>
+              <a:rPr lang="en-US" sz="1000" dirty="0">
+                <a:solidFill>
+                  <a:schemeClr val="bg1"/>
+                </a:solidFill>
+                <a:latin typeface="Courier New" pitchFamily="49" charset="0"/>
+                <a:ea typeface="Calibri" pitchFamily="34" charset="0"/>
+                <a:cs typeface="Courier New" pitchFamily="49" charset="0"/>
+              </a:rPr>
+              <a:t>	</a:t>
+            </a:r>
+            <a:r>
               <a:rPr lang="be-BY" sz="1000" dirty="0">
                 <a:solidFill>
                   <a:schemeClr val="bg1"/>
@@ -30491,7 +29015,7 @@
                 <a:ea typeface="Calibri" pitchFamily="34" charset="0"/>
                 <a:cs typeface="Courier New" pitchFamily="49" charset="0"/>
               </a:rPr>
-              <a:t>            pt1.Write();</a:t>
+              <a:t>if (car2 == Cars.BMW)</a:t>
             </a:r>
             <a:endParaRPr lang="be-BY" sz="900" dirty="0">
               <a:solidFill>
@@ -30513,7 +29037,7 @@
                 <a:ea typeface="Calibri" pitchFamily="34" charset="0"/>
                 <a:cs typeface="Courier New" pitchFamily="49" charset="0"/>
               </a:rPr>
-              <a:t>        }</a:t>
+              <a:t>                Console.WriteLine("Now Car2 is BMW");</a:t>
             </a:r>
             <a:endParaRPr lang="be-BY" sz="900" dirty="0">
               <a:solidFill>
@@ -30535,6 +29059,127 @@
                 <a:ea typeface="Calibri" pitchFamily="34" charset="0"/>
                 <a:cs typeface="Courier New" pitchFamily="49" charset="0"/>
               </a:rPr>
+              <a:t>            else if (car2 == Cars.Lamborgini</a:t>
+            </a:r>
+            <a:r>
+              <a:rPr lang="en-US" sz="1000" dirty="0">
+                <a:solidFill>
+                  <a:schemeClr val="bg1"/>
+                </a:solidFill>
+                <a:latin typeface="Courier New" pitchFamily="49" charset="0"/>
+                <a:ea typeface="Calibri" pitchFamily="34" charset="0"/>
+                <a:cs typeface="Courier New" pitchFamily="49" charset="0"/>
+              </a:rPr>
+              <a:t>)</a:t>
+            </a:r>
+            <a:endParaRPr lang="be-BY" sz="900" dirty="0">
+              <a:solidFill>
+                <a:schemeClr val="bg1"/>
+              </a:solidFill>
+              <a:latin typeface="Arial" pitchFamily="34" charset="0"/>
+            </a:endParaRPr>
+          </a:p>
+          <a:p>
+            <a:pPr eaLnBrk="0" hangingPunct="0">
+              <a:defRPr/>
+            </a:pPr>
+            <a:r>
+              <a:rPr lang="be-BY" sz="1000" dirty="0">
+                <a:solidFill>
+                  <a:schemeClr val="bg1"/>
+                </a:solidFill>
+                <a:latin typeface="Courier New" pitchFamily="49" charset="0"/>
+                <a:ea typeface="Calibri" pitchFamily="34" charset="0"/>
+                <a:cs typeface="Courier New" pitchFamily="49" charset="0"/>
+              </a:rPr>
+              <a:t>                Console.WriteLine("Now Car2 is Lamborgini");</a:t>
+            </a:r>
+            <a:endParaRPr lang="be-BY" sz="900" dirty="0">
+              <a:solidFill>
+                <a:schemeClr val="bg1"/>
+              </a:solidFill>
+              <a:latin typeface="Arial" pitchFamily="34" charset="0"/>
+            </a:endParaRPr>
+          </a:p>
+          <a:p>
+            <a:pPr eaLnBrk="0" hangingPunct="0">
+              <a:defRPr/>
+            </a:pPr>
+            <a:r>
+              <a:rPr lang="be-BY" sz="1000" dirty="0">
+                <a:solidFill>
+                  <a:schemeClr val="bg1"/>
+                </a:solidFill>
+                <a:latin typeface="Courier New" pitchFamily="49" charset="0"/>
+                <a:ea typeface="Calibri" pitchFamily="34" charset="0"/>
+                <a:cs typeface="Courier New" pitchFamily="49" charset="0"/>
+              </a:rPr>
+              <a:t>            else</a:t>
+            </a:r>
+            <a:endParaRPr lang="be-BY" sz="900" dirty="0">
+              <a:solidFill>
+                <a:schemeClr val="bg1"/>
+              </a:solidFill>
+              <a:latin typeface="Arial" pitchFamily="34" charset="0"/>
+            </a:endParaRPr>
+          </a:p>
+          <a:p>
+            <a:pPr eaLnBrk="0" hangingPunct="0">
+              <a:defRPr/>
+            </a:pPr>
+            <a:r>
+              <a:rPr lang="be-BY" sz="1000" dirty="0">
+                <a:solidFill>
+                  <a:schemeClr val="bg1"/>
+                </a:solidFill>
+                <a:latin typeface="Courier New" pitchFamily="49" charset="0"/>
+                <a:ea typeface="Calibri" pitchFamily="34" charset="0"/>
+                <a:cs typeface="Courier New" pitchFamily="49" charset="0"/>
+              </a:rPr>
+              <a:t>                Console.WriteLine("Now Car2 is unknown");</a:t>
+            </a:r>
+            <a:endParaRPr lang="be-BY" sz="900" dirty="0">
+              <a:solidFill>
+                <a:schemeClr val="bg1"/>
+              </a:solidFill>
+              <a:latin typeface="Arial" pitchFamily="34" charset="0"/>
+            </a:endParaRPr>
+          </a:p>
+          <a:p>
+            <a:pPr eaLnBrk="0" hangingPunct="0">
+              <a:defRPr/>
+            </a:pPr>
+            <a:r>
+              <a:rPr lang="be-BY" sz="1000" dirty="0">
+                <a:solidFill>
+                  <a:schemeClr val="bg1"/>
+                </a:solidFill>
+                <a:latin typeface="Courier New" pitchFamily="49" charset="0"/>
+                <a:ea typeface="Calibri" pitchFamily="34" charset="0"/>
+                <a:cs typeface="Courier New" pitchFamily="49" charset="0"/>
+              </a:rPr>
+              <a:t>        }</a:t>
+            </a:r>
+            <a:endParaRPr lang="be-BY" sz="900" dirty="0">
+              <a:solidFill>
+                <a:schemeClr val="bg1"/>
+              </a:solidFill>
+              <a:latin typeface="Arial" pitchFamily="34" charset="0"/>
+            </a:endParaRPr>
+          </a:p>
+          <a:p>
+            <a:pPr eaLnBrk="0" hangingPunct="0">
+              <a:defRPr/>
+            </a:pPr>
+            <a:r>
+              <a:rPr lang="be-BY" sz="1000" dirty="0">
+                <a:solidFill>
+                  <a:schemeClr val="bg1"/>
+                </a:solidFill>
+                <a:latin typeface="Courier New" pitchFamily="49" charset="0"/>
+                <a:ea typeface="Calibri" pitchFamily="34" charset="0"/>
+                <a:cs typeface="Courier New" pitchFamily="49" charset="0"/>
+              </a:rPr>
               <a:t>    }</a:t>
             </a:r>
             <a:endParaRPr lang="be-BY" dirty="0">
@@ -30543,13 +29188,547 @@
               </a:solidFill>
               <a:latin typeface="Calibri" pitchFamily="34" charset="0"/>
             </a:endParaRPr>
+          </a:p>
+        </p:txBody>
+      </p:sp>
+      <p:sp>
+        <p:nvSpPr>
+          <p:cNvPr id="17412" name="Подзаголовок 2"/>
+          <p:cNvSpPr txBox="1">
+            <a:spLocks/>
+          </p:cNvSpPr>
+          <p:nvPr/>
+        </p:nvSpPr>
+        <p:spPr bwMode="auto">
+          <a:xfrm>
+            <a:off x="685800" y="762000"/>
+            <a:ext cx="7696200" cy="1600200"/>
+          </a:xfrm>
+          <a:prstGeom prst="rect">
+            <a:avLst/>
+          </a:prstGeom>
+          <a:noFill/>
+          <a:ln w="9525">
+            <a:solidFill>
+              <a:srgbClr val="FF0000"/>
+            </a:solidFill>
+            <a:miter lim="800000"/>
+            <a:headEnd/>
+            <a:tailEnd/>
+          </a:ln>
+          <a:extLst>
+            <a:ext uri="{909E8E84-426E-40DD-AFC4-6F175D3DCCD1}">
+              <a14:hiddenFill xmlns:a14="http://schemas.microsoft.com/office/drawing/2010/main">
+                <a:solidFill>
+                  <a:srgbClr val="FFFFFF"/>
+                </a:solidFill>
+              </a14:hiddenFill>
+            </a:ext>
+          </a:extLst>
+        </p:spPr>
+        <p:txBody>
+          <a:bodyPr/>
+          <a:lstStyle>
+            <a:lvl1pPr eaLnBrk="0" hangingPunct="0">
+              <a:defRPr>
+                <a:solidFill>
+                  <a:schemeClr val="tx1"/>
+                </a:solidFill>
+                <a:latin typeface="Arial" charset="0"/>
+              </a:defRPr>
+            </a:lvl1pPr>
+            <a:lvl2pPr marL="742950" indent="-285750" eaLnBrk="0" hangingPunct="0">
+              <a:defRPr>
+                <a:solidFill>
+                  <a:schemeClr val="tx1"/>
+                </a:solidFill>
+                <a:latin typeface="Arial" charset="0"/>
+              </a:defRPr>
+            </a:lvl2pPr>
+            <a:lvl3pPr marL="1143000" indent="-228600" eaLnBrk="0" hangingPunct="0">
+              <a:defRPr>
+                <a:solidFill>
+                  <a:schemeClr val="tx1"/>
+                </a:solidFill>
+                <a:latin typeface="Arial" charset="0"/>
+              </a:defRPr>
+            </a:lvl3pPr>
+            <a:lvl4pPr marL="1600200" indent="-228600" eaLnBrk="0" hangingPunct="0">
+              <a:defRPr>
+                <a:solidFill>
+                  <a:schemeClr val="tx1"/>
+                </a:solidFill>
+                <a:latin typeface="Arial" charset="0"/>
+              </a:defRPr>
+            </a:lvl4pPr>
+            <a:lvl5pPr marL="2057400" indent="-228600" eaLnBrk="0" hangingPunct="0">
+              <a:defRPr>
+                <a:solidFill>
+                  <a:schemeClr val="tx1"/>
+                </a:solidFill>
+                <a:latin typeface="Arial" charset="0"/>
+              </a:defRPr>
+            </a:lvl5pPr>
+            <a:lvl6pPr marL="2514600" indent="-228600" eaLnBrk="0" fontAlgn="base" hangingPunct="0">
+              <a:spcBef>
+                <a:spcPct val="0"/>
+              </a:spcBef>
+              <a:spcAft>
+                <a:spcPct val="0"/>
+              </a:spcAft>
+              <a:defRPr>
+                <a:solidFill>
+                  <a:schemeClr val="tx1"/>
+                </a:solidFill>
+                <a:latin typeface="Arial" charset="0"/>
+              </a:defRPr>
+            </a:lvl6pPr>
+            <a:lvl7pPr marL="2971800" indent="-228600" eaLnBrk="0" fontAlgn="base" hangingPunct="0">
+              <a:spcBef>
+                <a:spcPct val="0"/>
+              </a:spcBef>
+              <a:spcAft>
+                <a:spcPct val="0"/>
+              </a:spcAft>
+              <a:defRPr>
+                <a:solidFill>
+                  <a:schemeClr val="tx1"/>
+                </a:solidFill>
+                <a:latin typeface="Arial" charset="0"/>
+              </a:defRPr>
+            </a:lvl7pPr>
+            <a:lvl8pPr marL="3429000" indent="-228600" eaLnBrk="0" fontAlgn="base" hangingPunct="0">
+              <a:spcBef>
+                <a:spcPct val="0"/>
+              </a:spcBef>
+              <a:spcAft>
+                <a:spcPct val="0"/>
+              </a:spcAft>
+              <a:defRPr>
+                <a:solidFill>
+                  <a:schemeClr val="tx1"/>
+                </a:solidFill>
+                <a:latin typeface="Arial" charset="0"/>
+              </a:defRPr>
+            </a:lvl8pPr>
+            <a:lvl9pPr marL="3886200" indent="-228600" eaLnBrk="0" fontAlgn="base" hangingPunct="0">
+              <a:spcBef>
+                <a:spcPct val="0"/>
+              </a:spcBef>
+              <a:spcAft>
+                <a:spcPct val="0"/>
+              </a:spcAft>
+              <a:defRPr>
+                <a:solidFill>
+                  <a:schemeClr val="tx1"/>
+                </a:solidFill>
+                <a:latin typeface="Arial" charset="0"/>
+              </a:defRPr>
+            </a:lvl9pPr>
+          </a:lstStyle>
+          <a:p>
+            <a:pPr eaLnBrk="1" hangingPunct="1"/>
+            <a:r>
+              <a:rPr lang="en-US" sz="1400" dirty="0" err="1">
+                <a:solidFill>
+                  <a:schemeClr val="bg1"/>
+                </a:solidFill>
+                <a:latin typeface="Courier New" pitchFamily="49" charset="0"/>
+                <a:cs typeface="Courier New" pitchFamily="49" charset="0"/>
+              </a:rPr>
+              <a:t>enum</a:t>
+            </a:r>
+            <a:r>
+              <a:rPr lang="en-US" sz="1400" dirty="0">
+                <a:solidFill>
+                  <a:schemeClr val="bg1"/>
+                </a:solidFill>
+                <a:latin typeface="Courier New" pitchFamily="49" charset="0"/>
+                <a:cs typeface="Courier New" pitchFamily="49" charset="0"/>
+              </a:rPr>
+              <a:t> &lt;</a:t>
+            </a:r>
+            <a:r>
+              <a:rPr lang="ru-RU" sz="1400" dirty="0">
+                <a:solidFill>
+                  <a:schemeClr val="bg1"/>
+                </a:solidFill>
+                <a:latin typeface="Courier New" pitchFamily="49" charset="0"/>
+                <a:cs typeface="Courier New" pitchFamily="49" charset="0"/>
+              </a:rPr>
+              <a:t>Имя перечисления</a:t>
+            </a:r>
+            <a:r>
+              <a:rPr lang="en-US" sz="1400" dirty="0">
+                <a:solidFill>
+                  <a:schemeClr val="bg1"/>
+                </a:solidFill>
+                <a:latin typeface="Courier New" pitchFamily="49" charset="0"/>
+                <a:cs typeface="Courier New" pitchFamily="49" charset="0"/>
+              </a:rPr>
+              <a:t>&gt;</a:t>
+            </a:r>
+            <a:endParaRPr lang="ru-RU" sz="1400" dirty="0">
+              <a:solidFill>
+                <a:schemeClr val="bg1"/>
+              </a:solidFill>
+              <a:latin typeface="Courier New" pitchFamily="49" charset="0"/>
+              <a:cs typeface="Courier New" pitchFamily="49" charset="0"/>
+            </a:endParaRPr>
+          </a:p>
+          <a:p>
+            <a:pPr eaLnBrk="1" hangingPunct="1"/>
+            <a:r>
+              <a:rPr lang="en-US" sz="1400" dirty="0">
+                <a:solidFill>
+                  <a:schemeClr val="bg1"/>
+                </a:solidFill>
+                <a:latin typeface="Courier New" pitchFamily="49" charset="0"/>
+                <a:cs typeface="Courier New" pitchFamily="49" charset="0"/>
+              </a:rPr>
+              <a:t>{</a:t>
+            </a:r>
+          </a:p>
+          <a:p>
+            <a:pPr eaLnBrk="1" hangingPunct="1"/>
+            <a:r>
+              <a:rPr lang="en-US" sz="1400" dirty="0">
+                <a:solidFill>
+                  <a:schemeClr val="bg1"/>
+                </a:solidFill>
+                <a:latin typeface="Courier New" pitchFamily="49" charset="0"/>
+                <a:cs typeface="Courier New" pitchFamily="49" charset="0"/>
+              </a:rPr>
+              <a:t>    &lt;</a:t>
+            </a:r>
+            <a:r>
+              <a:rPr lang="ru-RU" sz="1400" dirty="0">
+                <a:solidFill>
+                  <a:schemeClr val="bg1"/>
+                </a:solidFill>
+                <a:latin typeface="Courier New" pitchFamily="49" charset="0"/>
+                <a:cs typeface="Courier New" pitchFamily="49" charset="0"/>
+              </a:rPr>
+              <a:t>Имя 1-го элемента</a:t>
+            </a:r>
+            <a:r>
+              <a:rPr lang="en-US" sz="1400" dirty="0">
+                <a:solidFill>
+                  <a:schemeClr val="bg1"/>
+                </a:solidFill>
+                <a:latin typeface="Courier New" pitchFamily="49" charset="0"/>
+                <a:cs typeface="Courier New" pitchFamily="49" charset="0"/>
+              </a:rPr>
+              <a:t>&gt;</a:t>
+            </a:r>
+            <a:r>
+              <a:rPr lang="ru-RU" sz="1400" dirty="0">
+                <a:solidFill>
+                  <a:schemeClr val="bg1"/>
+                </a:solidFill>
+                <a:latin typeface="Courier New" pitchFamily="49" charset="0"/>
+                <a:cs typeface="Courier New" pitchFamily="49" charset="0"/>
+              </a:rPr>
+              <a:t> = </a:t>
+            </a:r>
+            <a:r>
+              <a:rPr lang="en-US" sz="1400" dirty="0">
+                <a:solidFill>
+                  <a:schemeClr val="bg1"/>
+                </a:solidFill>
+                <a:latin typeface="Courier New" pitchFamily="49" charset="0"/>
+                <a:cs typeface="Courier New" pitchFamily="49" charset="0"/>
+              </a:rPr>
+              <a:t>&lt;</a:t>
+            </a:r>
+            <a:r>
+              <a:rPr lang="ru-RU" sz="1400" dirty="0">
+                <a:solidFill>
+                  <a:schemeClr val="bg1"/>
+                </a:solidFill>
+                <a:latin typeface="Courier New" pitchFamily="49" charset="0"/>
+                <a:cs typeface="Courier New" pitchFamily="49" charset="0"/>
+              </a:rPr>
+              <a:t>Числовое значение</a:t>
+            </a:r>
+            <a:r>
+              <a:rPr lang="en-US" sz="1400" dirty="0">
+                <a:solidFill>
+                  <a:schemeClr val="bg1"/>
+                </a:solidFill>
+                <a:latin typeface="Courier New" pitchFamily="49" charset="0"/>
+                <a:cs typeface="Courier New" pitchFamily="49" charset="0"/>
+              </a:rPr>
+              <a:t>&gt;,</a:t>
+            </a:r>
+          </a:p>
+          <a:p>
+            <a:pPr eaLnBrk="1" hangingPunct="1"/>
+            <a:r>
+              <a:rPr lang="en-US" sz="1400" dirty="0">
+                <a:solidFill>
+                  <a:schemeClr val="bg1"/>
+                </a:solidFill>
+                <a:latin typeface="Courier New" pitchFamily="49" charset="0"/>
+                <a:cs typeface="Courier New" pitchFamily="49" charset="0"/>
+              </a:rPr>
+              <a:t>    &lt;</a:t>
+            </a:r>
+            <a:r>
+              <a:rPr lang="ru-RU" sz="1400" dirty="0">
+                <a:solidFill>
+                  <a:schemeClr val="bg1"/>
+                </a:solidFill>
+                <a:latin typeface="Courier New" pitchFamily="49" charset="0"/>
+                <a:cs typeface="Courier New" pitchFamily="49" charset="0"/>
+              </a:rPr>
+              <a:t>Имя </a:t>
+            </a:r>
+            <a:r>
+              <a:rPr lang="en-US" sz="1400" dirty="0">
+                <a:solidFill>
+                  <a:schemeClr val="bg1"/>
+                </a:solidFill>
+                <a:latin typeface="Courier New" pitchFamily="49" charset="0"/>
+                <a:cs typeface="Courier New" pitchFamily="49" charset="0"/>
+              </a:rPr>
+              <a:t>2</a:t>
+            </a:r>
+            <a:r>
+              <a:rPr lang="ru-RU" sz="1400" dirty="0">
+                <a:solidFill>
+                  <a:schemeClr val="bg1"/>
+                </a:solidFill>
+                <a:latin typeface="Courier New" pitchFamily="49" charset="0"/>
+                <a:cs typeface="Courier New" pitchFamily="49" charset="0"/>
+              </a:rPr>
+              <a:t>-го элемента</a:t>
+            </a:r>
+            <a:r>
+              <a:rPr lang="en-US" sz="1400" dirty="0">
+                <a:solidFill>
+                  <a:schemeClr val="bg1"/>
+                </a:solidFill>
+                <a:latin typeface="Courier New" pitchFamily="49" charset="0"/>
+                <a:cs typeface="Courier New" pitchFamily="49" charset="0"/>
+              </a:rPr>
+              <a:t>&gt;</a:t>
+            </a:r>
+            <a:r>
+              <a:rPr lang="ru-RU" sz="1400" dirty="0">
+                <a:solidFill>
+                  <a:schemeClr val="bg1"/>
+                </a:solidFill>
+                <a:latin typeface="Courier New" pitchFamily="49" charset="0"/>
+                <a:cs typeface="Courier New" pitchFamily="49" charset="0"/>
+              </a:rPr>
+              <a:t> = </a:t>
+            </a:r>
+            <a:r>
+              <a:rPr lang="en-US" sz="1400" dirty="0">
+                <a:solidFill>
+                  <a:schemeClr val="bg1"/>
+                </a:solidFill>
+                <a:latin typeface="Courier New" pitchFamily="49" charset="0"/>
+                <a:cs typeface="Courier New" pitchFamily="49" charset="0"/>
+              </a:rPr>
+              <a:t>&lt;</a:t>
+            </a:r>
+            <a:r>
+              <a:rPr lang="ru-RU" sz="1400" dirty="0">
+                <a:solidFill>
+                  <a:schemeClr val="bg1"/>
+                </a:solidFill>
+                <a:latin typeface="Courier New" pitchFamily="49" charset="0"/>
+                <a:cs typeface="Courier New" pitchFamily="49" charset="0"/>
+              </a:rPr>
+              <a:t>Числовое значение</a:t>
+            </a:r>
+            <a:r>
+              <a:rPr lang="en-US" sz="1400" dirty="0">
+                <a:solidFill>
+                  <a:schemeClr val="bg1"/>
+                </a:solidFill>
+                <a:latin typeface="Courier New" pitchFamily="49" charset="0"/>
+                <a:cs typeface="Courier New" pitchFamily="49" charset="0"/>
+              </a:rPr>
+              <a:t>&gt;,</a:t>
+            </a:r>
+          </a:p>
+          <a:p>
+            <a:pPr eaLnBrk="1" hangingPunct="1"/>
+            <a:r>
+              <a:rPr lang="en-US" sz="1400" dirty="0">
+                <a:solidFill>
+                  <a:schemeClr val="bg1"/>
+                </a:solidFill>
+                <a:latin typeface="Courier New" pitchFamily="49" charset="0"/>
+                <a:cs typeface="Courier New" pitchFamily="49" charset="0"/>
+              </a:rPr>
+              <a:t>    . . .</a:t>
+            </a:r>
+          </a:p>
+          <a:p>
+            <a:pPr eaLnBrk="1" hangingPunct="1"/>
+            <a:r>
+              <a:rPr lang="en-US" sz="1400" dirty="0">
+                <a:solidFill>
+                  <a:schemeClr val="bg1"/>
+                </a:solidFill>
+                <a:latin typeface="Courier New" pitchFamily="49" charset="0"/>
+                <a:cs typeface="Courier New" pitchFamily="49" charset="0"/>
+              </a:rPr>
+              <a:t>    &lt;</a:t>
+            </a:r>
+            <a:r>
+              <a:rPr lang="ru-RU" sz="1400" dirty="0">
+                <a:solidFill>
+                  <a:schemeClr val="bg1"/>
+                </a:solidFill>
+                <a:latin typeface="Courier New" pitchFamily="49" charset="0"/>
+                <a:cs typeface="Courier New" pitchFamily="49" charset="0"/>
+              </a:rPr>
+              <a:t>Имя </a:t>
+            </a:r>
+            <a:r>
+              <a:rPr lang="en-US" sz="1400" dirty="0">
+                <a:solidFill>
+                  <a:schemeClr val="bg1"/>
+                </a:solidFill>
+                <a:latin typeface="Courier New" pitchFamily="49" charset="0"/>
+                <a:cs typeface="Courier New" pitchFamily="49" charset="0"/>
+              </a:rPr>
+              <a:t>n</a:t>
+            </a:r>
+            <a:r>
+              <a:rPr lang="ru-RU" sz="1400" dirty="0">
+                <a:solidFill>
+                  <a:schemeClr val="bg1"/>
+                </a:solidFill>
+                <a:latin typeface="Courier New" pitchFamily="49" charset="0"/>
+                <a:cs typeface="Courier New" pitchFamily="49" charset="0"/>
+              </a:rPr>
+              <a:t>-го элемента</a:t>
+            </a:r>
+            <a:r>
+              <a:rPr lang="en-US" sz="1400" dirty="0">
+                <a:solidFill>
+                  <a:schemeClr val="bg1"/>
+                </a:solidFill>
+                <a:latin typeface="Courier New" pitchFamily="49" charset="0"/>
+                <a:cs typeface="Courier New" pitchFamily="49" charset="0"/>
+              </a:rPr>
+              <a:t>&gt;</a:t>
+            </a:r>
+            <a:r>
+              <a:rPr lang="ru-RU" sz="1400" dirty="0">
+                <a:solidFill>
+                  <a:schemeClr val="bg1"/>
+                </a:solidFill>
+                <a:latin typeface="Courier New" pitchFamily="49" charset="0"/>
+                <a:cs typeface="Courier New" pitchFamily="49" charset="0"/>
+              </a:rPr>
+              <a:t> = </a:t>
+            </a:r>
+            <a:r>
+              <a:rPr lang="en-US" sz="1400" dirty="0">
+                <a:solidFill>
+                  <a:schemeClr val="bg1"/>
+                </a:solidFill>
+                <a:latin typeface="Courier New" pitchFamily="49" charset="0"/>
+                <a:cs typeface="Courier New" pitchFamily="49" charset="0"/>
+              </a:rPr>
+              <a:t>&lt;</a:t>
+            </a:r>
+            <a:r>
+              <a:rPr lang="ru-RU" sz="1400" dirty="0">
+                <a:solidFill>
+                  <a:schemeClr val="bg1"/>
+                </a:solidFill>
+                <a:latin typeface="Courier New" pitchFamily="49" charset="0"/>
+                <a:cs typeface="Courier New" pitchFamily="49" charset="0"/>
+              </a:rPr>
+              <a:t>Числовое значение</a:t>
+            </a:r>
+            <a:r>
+              <a:rPr lang="en-US" sz="1400" dirty="0">
+                <a:solidFill>
+                  <a:schemeClr val="bg1"/>
+                </a:solidFill>
+                <a:latin typeface="Courier New" pitchFamily="49" charset="0"/>
+                <a:cs typeface="Courier New" pitchFamily="49" charset="0"/>
+              </a:rPr>
+              <a:t>&gt;</a:t>
+            </a:r>
+          </a:p>
+          <a:p>
+            <a:pPr eaLnBrk="1" hangingPunct="1"/>
+            <a:r>
+              <a:rPr lang="en-US" sz="1400" dirty="0">
+                <a:solidFill>
+                  <a:schemeClr val="bg1"/>
+                </a:solidFill>
+                <a:latin typeface="Courier New" pitchFamily="49" charset="0"/>
+                <a:cs typeface="Courier New" pitchFamily="49" charset="0"/>
+              </a:rPr>
+              <a:t>}</a:t>
+            </a:r>
+            <a:endParaRPr lang="ru-RU" sz="1400" dirty="0">
+              <a:solidFill>
+                <a:schemeClr val="bg1"/>
+              </a:solidFill>
+              <a:latin typeface="Courier New" pitchFamily="49" charset="0"/>
+              <a:cs typeface="Courier New" pitchFamily="49" charset="0"/>
+            </a:endParaRPr>
+          </a:p>
+          <a:p>
+            <a:pPr eaLnBrk="1" hangingPunct="1"/>
+            <a:endParaRPr lang="ru-RU" sz="1400" dirty="0">
+              <a:solidFill>
+                <a:schemeClr val="bg1"/>
+              </a:solidFill>
+              <a:latin typeface="Courier New" pitchFamily="49" charset="0"/>
+              <a:cs typeface="Courier New" pitchFamily="49" charset="0"/>
+            </a:endParaRPr>
+          </a:p>
+        </p:txBody>
+      </p:sp>
+      <p:sp>
+        <p:nvSpPr>
+          <p:cNvPr id="2" name="Rectangle 1"/>
+          <p:cNvSpPr/>
+          <p:nvPr/>
+        </p:nvSpPr>
+        <p:spPr>
+          <a:xfrm>
+            <a:off x="685800" y="6381328"/>
+            <a:ext cx="7696200" cy="369332"/>
+          </a:xfrm>
+          <a:prstGeom prst="rect">
+            <a:avLst/>
+          </a:prstGeom>
+        </p:spPr>
+        <p:txBody>
+          <a:bodyPr wrap="square">
+            <a:spAutoFit/>
+          </a:bodyPr>
+          <a:lstStyle/>
+          <a:p>
+            <a:r>
+              <a:rPr lang="en-US" dirty="0">
+                <a:solidFill>
+                  <a:schemeClr val="bg1"/>
+                </a:solidFill>
+              </a:rPr>
+              <a:t>http://nuget.org/packages/UnconstrainedMelody</a:t>
+            </a:r>
           </a:p>
         </p:txBody>
       </p:sp>
     </p:spTree>
     <p:extLst>
       <p:ext uri="{BB962C8B-B14F-4D97-AF65-F5344CB8AC3E}">
-        <p14:creationId xmlns:p14="http://schemas.microsoft.com/office/powerpoint/2010/main" val="401800113"/>
+        <p14:creationId xmlns:p14="http://schemas.microsoft.com/office/powerpoint/2010/main" val="3737252040"/>
       </p:ext>
     </p:extLst>
   </p:cSld>
@@ -30649,6 +29828,1079 @@
               </a:tabLst>
             </a:pPr>
             <a:r>
+              <a:rPr lang="ru-RU" sz="2400" dirty="0">
+                <a:solidFill>
+                  <a:schemeClr val="bg1"/>
+                </a:solidFill>
+                <a:cs typeface="Times New Roman" pitchFamily="18" charset="0"/>
+              </a:rPr>
+              <a:t>Структуры </a:t>
+            </a:r>
+            <a:r>
+              <a:rPr lang="en-US" sz="2400" b="1" dirty="0" err="1">
+                <a:solidFill>
+                  <a:schemeClr val="bg1"/>
+                </a:solidFill>
+                <a:cs typeface="Times New Roman" pitchFamily="18" charset="0"/>
+              </a:rPr>
+              <a:t>struct</a:t>
+            </a:r>
+            <a:r>
+              <a:rPr lang="en-US" sz="2400" b="1" dirty="0">
+                <a:solidFill>
+                  <a:schemeClr val="bg1"/>
+                </a:solidFill>
+                <a:cs typeface="Times New Roman" pitchFamily="18" charset="0"/>
+              </a:rPr>
+              <a:t>.</a:t>
+            </a:r>
+            <a:endParaRPr lang="ru-RU" sz="2400" b="1" dirty="0">
+              <a:solidFill>
+                <a:schemeClr val="bg1"/>
+              </a:solidFill>
+              <a:cs typeface="Times New Roman" pitchFamily="18" charset="0"/>
+            </a:endParaRPr>
+          </a:p>
+        </p:txBody>
+      </p:sp>
+      <p:sp>
+        <p:nvSpPr>
+          <p:cNvPr id="18435" name="Подзаголовок 2"/>
+          <p:cNvSpPr txBox="1">
+            <a:spLocks/>
+          </p:cNvSpPr>
+          <p:nvPr/>
+        </p:nvSpPr>
+        <p:spPr bwMode="auto">
+          <a:xfrm>
+            <a:off x="685800" y="762000"/>
+            <a:ext cx="7696200" cy="990600"/>
+          </a:xfrm>
+          <a:prstGeom prst="rect">
+            <a:avLst/>
+          </a:prstGeom>
+          <a:noFill/>
+          <a:ln w="9525">
+            <a:solidFill>
+              <a:srgbClr val="FF0000"/>
+            </a:solidFill>
+            <a:miter lim="800000"/>
+            <a:headEnd/>
+            <a:tailEnd/>
+          </a:ln>
+          <a:extLst>
+            <a:ext uri="{909E8E84-426E-40DD-AFC4-6F175D3DCCD1}">
+              <a14:hiddenFill xmlns:a14="http://schemas.microsoft.com/office/drawing/2010/main">
+                <a:solidFill>
+                  <a:srgbClr val="FFFFFF"/>
+                </a:solidFill>
+              </a14:hiddenFill>
+            </a:ext>
+          </a:extLst>
+        </p:spPr>
+        <p:txBody>
+          <a:bodyPr/>
+          <a:lstStyle>
+            <a:lvl1pPr eaLnBrk="0" hangingPunct="0">
+              <a:defRPr>
+                <a:solidFill>
+                  <a:schemeClr val="tx1"/>
+                </a:solidFill>
+                <a:latin typeface="Arial" charset="0"/>
+              </a:defRPr>
+            </a:lvl1pPr>
+            <a:lvl2pPr marL="742950" indent="-285750" eaLnBrk="0" hangingPunct="0">
+              <a:defRPr>
+                <a:solidFill>
+                  <a:schemeClr val="tx1"/>
+                </a:solidFill>
+                <a:latin typeface="Arial" charset="0"/>
+              </a:defRPr>
+            </a:lvl2pPr>
+            <a:lvl3pPr marL="1143000" indent="-228600" eaLnBrk="0" hangingPunct="0">
+              <a:defRPr>
+                <a:solidFill>
+                  <a:schemeClr val="tx1"/>
+                </a:solidFill>
+                <a:latin typeface="Arial" charset="0"/>
+              </a:defRPr>
+            </a:lvl3pPr>
+            <a:lvl4pPr marL="1600200" indent="-228600" eaLnBrk="0" hangingPunct="0">
+              <a:defRPr>
+                <a:solidFill>
+                  <a:schemeClr val="tx1"/>
+                </a:solidFill>
+                <a:latin typeface="Arial" charset="0"/>
+              </a:defRPr>
+            </a:lvl4pPr>
+            <a:lvl5pPr marL="2057400" indent="-228600" eaLnBrk="0" hangingPunct="0">
+              <a:defRPr>
+                <a:solidFill>
+                  <a:schemeClr val="tx1"/>
+                </a:solidFill>
+                <a:latin typeface="Arial" charset="0"/>
+              </a:defRPr>
+            </a:lvl5pPr>
+            <a:lvl6pPr marL="2514600" indent="-228600" eaLnBrk="0" fontAlgn="base" hangingPunct="0">
+              <a:spcBef>
+                <a:spcPct val="0"/>
+              </a:spcBef>
+              <a:spcAft>
+                <a:spcPct val="0"/>
+              </a:spcAft>
+              <a:defRPr>
+                <a:solidFill>
+                  <a:schemeClr val="tx1"/>
+                </a:solidFill>
+                <a:latin typeface="Arial" charset="0"/>
+              </a:defRPr>
+            </a:lvl6pPr>
+            <a:lvl7pPr marL="2971800" indent="-228600" eaLnBrk="0" fontAlgn="base" hangingPunct="0">
+              <a:spcBef>
+                <a:spcPct val="0"/>
+              </a:spcBef>
+              <a:spcAft>
+                <a:spcPct val="0"/>
+              </a:spcAft>
+              <a:defRPr>
+                <a:solidFill>
+                  <a:schemeClr val="tx1"/>
+                </a:solidFill>
+                <a:latin typeface="Arial" charset="0"/>
+              </a:defRPr>
+            </a:lvl7pPr>
+            <a:lvl8pPr marL="3429000" indent="-228600" eaLnBrk="0" fontAlgn="base" hangingPunct="0">
+              <a:spcBef>
+                <a:spcPct val="0"/>
+              </a:spcBef>
+              <a:spcAft>
+                <a:spcPct val="0"/>
+              </a:spcAft>
+              <a:defRPr>
+                <a:solidFill>
+                  <a:schemeClr val="tx1"/>
+                </a:solidFill>
+                <a:latin typeface="Arial" charset="0"/>
+              </a:defRPr>
+            </a:lvl8pPr>
+            <a:lvl9pPr marL="3886200" indent="-228600" eaLnBrk="0" fontAlgn="base" hangingPunct="0">
+              <a:spcBef>
+                <a:spcPct val="0"/>
+              </a:spcBef>
+              <a:spcAft>
+                <a:spcPct val="0"/>
+              </a:spcAft>
+              <a:defRPr>
+                <a:solidFill>
+                  <a:schemeClr val="tx1"/>
+                </a:solidFill>
+                <a:latin typeface="Arial" charset="0"/>
+              </a:defRPr>
+            </a:lvl9pPr>
+          </a:lstStyle>
+          <a:p>
+            <a:pPr eaLnBrk="1" hangingPunct="1"/>
+            <a:r>
+              <a:rPr lang="en-US" sz="1400">
+                <a:solidFill>
+                  <a:schemeClr val="bg1"/>
+                </a:solidFill>
+                <a:latin typeface="Courier New" pitchFamily="49" charset="0"/>
+                <a:cs typeface="Courier New" pitchFamily="49" charset="0"/>
+              </a:rPr>
+              <a:t>struct &lt;</a:t>
+            </a:r>
+            <a:r>
+              <a:rPr lang="ru-RU" sz="1400">
+                <a:solidFill>
+                  <a:schemeClr val="bg1"/>
+                </a:solidFill>
+                <a:latin typeface="Courier New" pitchFamily="49" charset="0"/>
+                <a:cs typeface="Courier New" pitchFamily="49" charset="0"/>
+              </a:rPr>
+              <a:t>Имя структуры</a:t>
+            </a:r>
+            <a:r>
+              <a:rPr lang="en-US" sz="1400">
+                <a:solidFill>
+                  <a:schemeClr val="bg1"/>
+                </a:solidFill>
+                <a:latin typeface="Courier New" pitchFamily="49" charset="0"/>
+                <a:cs typeface="Courier New" pitchFamily="49" charset="0"/>
+              </a:rPr>
+              <a:t>&gt;</a:t>
+            </a:r>
+            <a:endParaRPr lang="ru-RU" sz="1400">
+              <a:solidFill>
+                <a:schemeClr val="bg1"/>
+              </a:solidFill>
+              <a:latin typeface="Courier New" pitchFamily="49" charset="0"/>
+              <a:cs typeface="Courier New" pitchFamily="49" charset="0"/>
+            </a:endParaRPr>
+          </a:p>
+          <a:p>
+            <a:pPr eaLnBrk="1" hangingPunct="1"/>
+            <a:r>
+              <a:rPr lang="en-US" sz="1400">
+                <a:solidFill>
+                  <a:schemeClr val="bg1"/>
+                </a:solidFill>
+                <a:latin typeface="Courier New" pitchFamily="49" charset="0"/>
+                <a:cs typeface="Courier New" pitchFamily="49" charset="0"/>
+              </a:rPr>
+              <a:t>{</a:t>
+            </a:r>
+          </a:p>
+          <a:p>
+            <a:pPr eaLnBrk="1" hangingPunct="1"/>
+            <a:r>
+              <a:rPr lang="ru-RU" sz="1400">
+                <a:solidFill>
+                  <a:schemeClr val="bg1"/>
+                </a:solidFill>
+                <a:latin typeface="Courier New" pitchFamily="49" charset="0"/>
+                <a:cs typeface="Courier New" pitchFamily="49" charset="0"/>
+              </a:rPr>
+              <a:t>	</a:t>
+            </a:r>
+            <a:r>
+              <a:rPr lang="en-US" sz="1400">
+                <a:solidFill>
+                  <a:schemeClr val="bg1"/>
+                </a:solidFill>
+                <a:latin typeface="Courier New" pitchFamily="49" charset="0"/>
+                <a:cs typeface="Courier New" pitchFamily="49" charset="0"/>
+              </a:rPr>
+              <a:t>&lt;</a:t>
+            </a:r>
+            <a:r>
+              <a:rPr lang="ru-RU" sz="1400">
+                <a:solidFill>
+                  <a:schemeClr val="bg1"/>
+                </a:solidFill>
+                <a:latin typeface="Courier New" pitchFamily="49" charset="0"/>
+                <a:cs typeface="Courier New" pitchFamily="49" charset="0"/>
+              </a:rPr>
+              <a:t>элементы структуры</a:t>
+            </a:r>
+            <a:r>
+              <a:rPr lang="en-US" sz="1400">
+                <a:solidFill>
+                  <a:schemeClr val="bg1"/>
+                </a:solidFill>
+                <a:latin typeface="Courier New" pitchFamily="49" charset="0"/>
+                <a:cs typeface="Courier New" pitchFamily="49" charset="0"/>
+              </a:rPr>
+              <a:t>&gt;</a:t>
+            </a:r>
+            <a:endParaRPr lang="ru-RU" sz="1400">
+              <a:solidFill>
+                <a:schemeClr val="bg1"/>
+              </a:solidFill>
+              <a:latin typeface="Courier New" pitchFamily="49" charset="0"/>
+              <a:cs typeface="Courier New" pitchFamily="49" charset="0"/>
+            </a:endParaRPr>
+          </a:p>
+          <a:p>
+            <a:pPr eaLnBrk="1" hangingPunct="1"/>
+            <a:r>
+              <a:rPr lang="en-US" sz="1400">
+                <a:solidFill>
+                  <a:schemeClr val="bg1"/>
+                </a:solidFill>
+                <a:latin typeface="Courier New" pitchFamily="49" charset="0"/>
+                <a:cs typeface="Courier New" pitchFamily="49" charset="0"/>
+              </a:rPr>
+              <a:t>}</a:t>
+            </a:r>
+            <a:endParaRPr lang="ru-RU" sz="1400">
+              <a:solidFill>
+                <a:schemeClr val="bg1"/>
+              </a:solidFill>
+              <a:latin typeface="Courier New" pitchFamily="49" charset="0"/>
+              <a:cs typeface="Courier New" pitchFamily="49" charset="0"/>
+            </a:endParaRPr>
+          </a:p>
+          <a:p>
+            <a:pPr eaLnBrk="1" hangingPunct="1"/>
+            <a:endParaRPr lang="ru-RU" sz="1400">
+              <a:solidFill>
+                <a:schemeClr val="bg1"/>
+              </a:solidFill>
+              <a:latin typeface="Courier New" pitchFamily="49" charset="0"/>
+              <a:cs typeface="Courier New" pitchFamily="49" charset="0"/>
+            </a:endParaRPr>
+          </a:p>
+        </p:txBody>
+      </p:sp>
+      <p:sp>
+        <p:nvSpPr>
+          <p:cNvPr id="151553" name="Rectangle 1"/>
+          <p:cNvSpPr>
+            <a:spLocks noChangeArrowheads="1"/>
+          </p:cNvSpPr>
+          <p:nvPr/>
+        </p:nvSpPr>
+        <p:spPr bwMode="auto">
+          <a:xfrm>
+            <a:off x="685800" y="2057400"/>
+            <a:ext cx="7696200" cy="4554538"/>
+          </a:xfrm>
+          <a:prstGeom prst="rect">
+            <a:avLst/>
+          </a:prstGeom>
+          <a:noFill/>
+          <a:ln w="9525">
+            <a:solidFill>
+              <a:schemeClr val="bg1">
+                <a:lumMod val="65000"/>
+              </a:schemeClr>
+            </a:solidFill>
+            <a:miter lim="800000"/>
+            <a:headEnd/>
+            <a:tailEnd/>
+          </a:ln>
+          <a:effectLst/>
+        </p:spPr>
+        <p:txBody>
+          <a:bodyPr anchor="ctr">
+            <a:spAutoFit/>
+          </a:bodyPr>
+          <a:lstStyle/>
+          <a:p>
+            <a:pPr eaLnBrk="0" hangingPunct="0">
+              <a:defRPr/>
+            </a:pPr>
+            <a:r>
+              <a:rPr lang="be-BY" sz="1000" dirty="0">
+                <a:solidFill>
+                  <a:schemeClr val="bg1"/>
+                </a:solidFill>
+                <a:latin typeface="Courier New" pitchFamily="49" charset="0"/>
+                <a:ea typeface="Calibri" pitchFamily="34" charset="0"/>
+                <a:cs typeface="Courier New" pitchFamily="49" charset="0"/>
+              </a:rPr>
+              <a:t>    struct Point</a:t>
+            </a:r>
+            <a:endParaRPr lang="be-BY" sz="900" dirty="0">
+              <a:solidFill>
+                <a:schemeClr val="bg1"/>
+              </a:solidFill>
+              <a:latin typeface="Arial" pitchFamily="34" charset="0"/>
+            </a:endParaRPr>
+          </a:p>
+          <a:p>
+            <a:pPr eaLnBrk="0" hangingPunct="0">
+              <a:defRPr/>
+            </a:pPr>
+            <a:r>
+              <a:rPr lang="be-BY" sz="1000" dirty="0">
+                <a:solidFill>
+                  <a:schemeClr val="bg1"/>
+                </a:solidFill>
+                <a:latin typeface="Courier New" pitchFamily="49" charset="0"/>
+                <a:ea typeface="Calibri" pitchFamily="34" charset="0"/>
+                <a:cs typeface="Courier New" pitchFamily="49" charset="0"/>
+              </a:rPr>
+              <a:t>    {</a:t>
+            </a:r>
+            <a:endParaRPr lang="be-BY" sz="900" dirty="0">
+              <a:solidFill>
+                <a:schemeClr val="bg1"/>
+              </a:solidFill>
+              <a:latin typeface="Arial" pitchFamily="34" charset="0"/>
+            </a:endParaRPr>
+          </a:p>
+          <a:p>
+            <a:pPr eaLnBrk="0" hangingPunct="0">
+              <a:defRPr/>
+            </a:pPr>
+            <a:r>
+              <a:rPr lang="be-BY" sz="1000" dirty="0">
+                <a:solidFill>
+                  <a:schemeClr val="bg1"/>
+                </a:solidFill>
+                <a:latin typeface="Courier New" pitchFamily="49" charset="0"/>
+                <a:ea typeface="Calibri" pitchFamily="34" charset="0"/>
+                <a:cs typeface="Courier New" pitchFamily="49" charset="0"/>
+              </a:rPr>
+              <a:t>        public int x, y;</a:t>
+            </a:r>
+            <a:endParaRPr lang="be-BY" sz="900" dirty="0">
+              <a:solidFill>
+                <a:schemeClr val="bg1"/>
+              </a:solidFill>
+              <a:latin typeface="Arial" pitchFamily="34" charset="0"/>
+            </a:endParaRPr>
+          </a:p>
+          <a:p>
+            <a:pPr eaLnBrk="0" hangingPunct="0">
+              <a:defRPr/>
+            </a:pPr>
+            <a:r>
+              <a:rPr lang="be-BY" sz="1000" dirty="0">
+                <a:solidFill>
+                  <a:schemeClr val="bg1"/>
+                </a:solidFill>
+                <a:latin typeface="Courier New" pitchFamily="49" charset="0"/>
+                <a:ea typeface="Calibri" pitchFamily="34" charset="0"/>
+                <a:cs typeface="Courier New" pitchFamily="49" charset="0"/>
+              </a:rPr>
+              <a:t>        public Point(int X, int Y)</a:t>
+            </a:r>
+            <a:endParaRPr lang="be-BY" sz="900" dirty="0">
+              <a:solidFill>
+                <a:schemeClr val="bg1"/>
+              </a:solidFill>
+              <a:latin typeface="Arial" pitchFamily="34" charset="0"/>
+            </a:endParaRPr>
+          </a:p>
+          <a:p>
+            <a:pPr eaLnBrk="0" hangingPunct="0">
+              <a:defRPr/>
+            </a:pPr>
+            <a:r>
+              <a:rPr lang="be-BY" sz="1000" dirty="0">
+                <a:solidFill>
+                  <a:schemeClr val="bg1"/>
+                </a:solidFill>
+                <a:latin typeface="Courier New" pitchFamily="49" charset="0"/>
+                <a:ea typeface="Calibri" pitchFamily="34" charset="0"/>
+                <a:cs typeface="Courier New" pitchFamily="49" charset="0"/>
+              </a:rPr>
+              <a:t>        {</a:t>
+            </a:r>
+            <a:endParaRPr lang="be-BY" sz="900" dirty="0">
+              <a:solidFill>
+                <a:schemeClr val="bg1"/>
+              </a:solidFill>
+              <a:latin typeface="Arial" pitchFamily="34" charset="0"/>
+            </a:endParaRPr>
+          </a:p>
+          <a:p>
+            <a:pPr eaLnBrk="0" hangingPunct="0">
+              <a:defRPr/>
+            </a:pPr>
+            <a:r>
+              <a:rPr lang="be-BY" sz="1000" dirty="0">
+                <a:solidFill>
+                  <a:schemeClr val="bg1"/>
+                </a:solidFill>
+                <a:latin typeface="Courier New" pitchFamily="49" charset="0"/>
+                <a:ea typeface="Calibri" pitchFamily="34" charset="0"/>
+                <a:cs typeface="Courier New" pitchFamily="49" charset="0"/>
+              </a:rPr>
+              <a:t>            x = X;</a:t>
+            </a:r>
+            <a:endParaRPr lang="be-BY" sz="900" dirty="0">
+              <a:solidFill>
+                <a:schemeClr val="bg1"/>
+              </a:solidFill>
+              <a:latin typeface="Arial" pitchFamily="34" charset="0"/>
+            </a:endParaRPr>
+          </a:p>
+          <a:p>
+            <a:pPr eaLnBrk="0" hangingPunct="0">
+              <a:defRPr/>
+            </a:pPr>
+            <a:r>
+              <a:rPr lang="be-BY" sz="1000" dirty="0">
+                <a:solidFill>
+                  <a:schemeClr val="bg1"/>
+                </a:solidFill>
+                <a:latin typeface="Courier New" pitchFamily="49" charset="0"/>
+                <a:ea typeface="Calibri" pitchFamily="34" charset="0"/>
+                <a:cs typeface="Courier New" pitchFamily="49" charset="0"/>
+              </a:rPr>
+              <a:t>            y = Y;</a:t>
+            </a:r>
+            <a:endParaRPr lang="be-BY" sz="900" dirty="0">
+              <a:solidFill>
+                <a:schemeClr val="bg1"/>
+              </a:solidFill>
+              <a:latin typeface="Arial" pitchFamily="34" charset="0"/>
+            </a:endParaRPr>
+          </a:p>
+          <a:p>
+            <a:pPr eaLnBrk="0" hangingPunct="0">
+              <a:defRPr/>
+            </a:pPr>
+            <a:r>
+              <a:rPr lang="be-BY" sz="1000" dirty="0">
+                <a:solidFill>
+                  <a:schemeClr val="bg1"/>
+                </a:solidFill>
+                <a:latin typeface="Courier New" pitchFamily="49" charset="0"/>
+                <a:ea typeface="Calibri" pitchFamily="34" charset="0"/>
+                <a:cs typeface="Courier New" pitchFamily="49" charset="0"/>
+              </a:rPr>
+              <a:t>        }</a:t>
+            </a:r>
+            <a:endParaRPr lang="be-BY" sz="900" dirty="0">
+              <a:solidFill>
+                <a:schemeClr val="bg1"/>
+              </a:solidFill>
+              <a:latin typeface="Arial" pitchFamily="34" charset="0"/>
+            </a:endParaRPr>
+          </a:p>
+          <a:p>
+            <a:pPr eaLnBrk="0" hangingPunct="0">
+              <a:defRPr/>
+            </a:pPr>
+            <a:r>
+              <a:rPr lang="be-BY" sz="1000" dirty="0">
+                <a:solidFill>
+                  <a:schemeClr val="bg1"/>
+                </a:solidFill>
+                <a:latin typeface="Courier New" pitchFamily="49" charset="0"/>
+                <a:ea typeface="Calibri" pitchFamily="34" charset="0"/>
+                <a:cs typeface="Courier New" pitchFamily="49" charset="0"/>
+              </a:rPr>
+              <a:t>        public void AddValue(int val)</a:t>
+            </a:r>
+            <a:endParaRPr lang="be-BY" sz="900" dirty="0">
+              <a:solidFill>
+                <a:schemeClr val="bg1"/>
+              </a:solidFill>
+              <a:latin typeface="Arial" pitchFamily="34" charset="0"/>
+            </a:endParaRPr>
+          </a:p>
+          <a:p>
+            <a:pPr eaLnBrk="0" hangingPunct="0">
+              <a:defRPr/>
+            </a:pPr>
+            <a:r>
+              <a:rPr lang="be-BY" sz="1000" dirty="0">
+                <a:solidFill>
+                  <a:schemeClr val="bg1"/>
+                </a:solidFill>
+                <a:latin typeface="Courier New" pitchFamily="49" charset="0"/>
+                <a:ea typeface="Calibri" pitchFamily="34" charset="0"/>
+                <a:cs typeface="Courier New" pitchFamily="49" charset="0"/>
+              </a:rPr>
+              <a:t>        {</a:t>
+            </a:r>
+            <a:endParaRPr lang="be-BY" sz="900" dirty="0">
+              <a:solidFill>
+                <a:schemeClr val="bg1"/>
+              </a:solidFill>
+              <a:latin typeface="Arial" pitchFamily="34" charset="0"/>
+            </a:endParaRPr>
+          </a:p>
+          <a:p>
+            <a:pPr eaLnBrk="0" hangingPunct="0">
+              <a:defRPr/>
+            </a:pPr>
+            <a:r>
+              <a:rPr lang="be-BY" sz="1000" dirty="0">
+                <a:solidFill>
+                  <a:schemeClr val="bg1"/>
+                </a:solidFill>
+                <a:latin typeface="Courier New" pitchFamily="49" charset="0"/>
+                <a:ea typeface="Calibri" pitchFamily="34" charset="0"/>
+                <a:cs typeface="Courier New" pitchFamily="49" charset="0"/>
+              </a:rPr>
+              <a:t>            x += val;</a:t>
+            </a:r>
+            <a:endParaRPr lang="be-BY" sz="900" dirty="0">
+              <a:solidFill>
+                <a:schemeClr val="bg1"/>
+              </a:solidFill>
+              <a:latin typeface="Arial" pitchFamily="34" charset="0"/>
+            </a:endParaRPr>
+          </a:p>
+          <a:p>
+            <a:pPr eaLnBrk="0" hangingPunct="0">
+              <a:defRPr/>
+            </a:pPr>
+            <a:r>
+              <a:rPr lang="be-BY" sz="1000" dirty="0">
+                <a:solidFill>
+                  <a:schemeClr val="bg1"/>
+                </a:solidFill>
+                <a:latin typeface="Courier New" pitchFamily="49" charset="0"/>
+                <a:ea typeface="Calibri" pitchFamily="34" charset="0"/>
+                <a:cs typeface="Courier New" pitchFamily="49" charset="0"/>
+              </a:rPr>
+              <a:t>            y += val;</a:t>
+            </a:r>
+            <a:endParaRPr lang="be-BY" sz="900" dirty="0">
+              <a:solidFill>
+                <a:schemeClr val="bg1"/>
+              </a:solidFill>
+              <a:latin typeface="Arial" pitchFamily="34" charset="0"/>
+            </a:endParaRPr>
+          </a:p>
+          <a:p>
+            <a:pPr eaLnBrk="0" hangingPunct="0">
+              <a:defRPr/>
+            </a:pPr>
+            <a:r>
+              <a:rPr lang="be-BY" sz="1000" dirty="0">
+                <a:solidFill>
+                  <a:schemeClr val="bg1"/>
+                </a:solidFill>
+                <a:latin typeface="Courier New" pitchFamily="49" charset="0"/>
+                <a:ea typeface="Calibri" pitchFamily="34" charset="0"/>
+                <a:cs typeface="Courier New" pitchFamily="49" charset="0"/>
+              </a:rPr>
+              <a:t>        }</a:t>
+            </a:r>
+            <a:endParaRPr lang="be-BY" sz="900" dirty="0">
+              <a:solidFill>
+                <a:schemeClr val="bg1"/>
+              </a:solidFill>
+              <a:latin typeface="Arial" pitchFamily="34" charset="0"/>
+            </a:endParaRPr>
+          </a:p>
+          <a:p>
+            <a:pPr eaLnBrk="0" hangingPunct="0">
+              <a:defRPr/>
+            </a:pPr>
+            <a:r>
+              <a:rPr lang="be-BY" sz="1000" dirty="0">
+                <a:solidFill>
+                  <a:schemeClr val="bg1"/>
+                </a:solidFill>
+                <a:latin typeface="Courier New" pitchFamily="49" charset="0"/>
+                <a:ea typeface="Calibri" pitchFamily="34" charset="0"/>
+                <a:cs typeface="Courier New" pitchFamily="49" charset="0"/>
+              </a:rPr>
+              <a:t>        public void Write()</a:t>
+            </a:r>
+            <a:endParaRPr lang="be-BY" sz="900" dirty="0">
+              <a:solidFill>
+                <a:schemeClr val="bg1"/>
+              </a:solidFill>
+              <a:latin typeface="Arial" pitchFamily="34" charset="0"/>
+            </a:endParaRPr>
+          </a:p>
+          <a:p>
+            <a:pPr eaLnBrk="0" hangingPunct="0">
+              <a:defRPr/>
+            </a:pPr>
+            <a:r>
+              <a:rPr lang="be-BY" sz="1000" dirty="0">
+                <a:solidFill>
+                  <a:schemeClr val="bg1"/>
+                </a:solidFill>
+                <a:latin typeface="Courier New" pitchFamily="49" charset="0"/>
+                <a:ea typeface="Calibri" pitchFamily="34" charset="0"/>
+                <a:cs typeface="Courier New" pitchFamily="49" charset="0"/>
+              </a:rPr>
+              <a:t>        {</a:t>
+            </a:r>
+            <a:endParaRPr lang="be-BY" sz="900" dirty="0">
+              <a:solidFill>
+                <a:schemeClr val="bg1"/>
+              </a:solidFill>
+              <a:latin typeface="Arial" pitchFamily="34" charset="0"/>
+            </a:endParaRPr>
+          </a:p>
+          <a:p>
+            <a:pPr eaLnBrk="0" hangingPunct="0">
+              <a:defRPr/>
+            </a:pPr>
+            <a:r>
+              <a:rPr lang="be-BY" sz="1000" dirty="0">
+                <a:solidFill>
+                  <a:schemeClr val="bg1"/>
+                </a:solidFill>
+                <a:latin typeface="Courier New" pitchFamily="49" charset="0"/>
+                <a:ea typeface="Calibri" pitchFamily="34" charset="0"/>
+                <a:cs typeface="Courier New" pitchFamily="49" charset="0"/>
+              </a:rPr>
+              <a:t>            Console.WriteLine("x={0}, y={1}", x, y);</a:t>
+            </a:r>
+            <a:endParaRPr lang="be-BY" sz="900" dirty="0">
+              <a:solidFill>
+                <a:schemeClr val="bg1"/>
+              </a:solidFill>
+              <a:latin typeface="Arial" pitchFamily="34" charset="0"/>
+            </a:endParaRPr>
+          </a:p>
+          <a:p>
+            <a:pPr eaLnBrk="0" hangingPunct="0">
+              <a:defRPr/>
+            </a:pPr>
+            <a:r>
+              <a:rPr lang="be-BY" sz="1000" dirty="0">
+                <a:solidFill>
+                  <a:schemeClr val="bg1"/>
+                </a:solidFill>
+                <a:latin typeface="Courier New" pitchFamily="49" charset="0"/>
+                <a:ea typeface="Calibri" pitchFamily="34" charset="0"/>
+                <a:cs typeface="Courier New" pitchFamily="49" charset="0"/>
+              </a:rPr>
+              <a:t>        }</a:t>
+            </a:r>
+            <a:endParaRPr lang="be-BY" sz="900" dirty="0">
+              <a:solidFill>
+                <a:schemeClr val="bg1"/>
+              </a:solidFill>
+              <a:latin typeface="Arial" pitchFamily="34" charset="0"/>
+            </a:endParaRPr>
+          </a:p>
+          <a:p>
+            <a:pPr eaLnBrk="0" hangingPunct="0">
+              <a:defRPr/>
+            </a:pPr>
+            <a:r>
+              <a:rPr lang="be-BY" sz="1000" dirty="0">
+                <a:solidFill>
+                  <a:schemeClr val="bg1"/>
+                </a:solidFill>
+                <a:latin typeface="Courier New" pitchFamily="49" charset="0"/>
+                <a:ea typeface="Calibri" pitchFamily="34" charset="0"/>
+                <a:cs typeface="Courier New" pitchFamily="49" charset="0"/>
+              </a:rPr>
+              <a:t>    }</a:t>
+            </a:r>
+            <a:endParaRPr lang="en-US" sz="1000" dirty="0">
+              <a:solidFill>
+                <a:schemeClr val="bg1"/>
+              </a:solidFill>
+              <a:latin typeface="Courier New" pitchFamily="49" charset="0"/>
+              <a:ea typeface="Calibri" pitchFamily="34" charset="0"/>
+              <a:cs typeface="Courier New" pitchFamily="49" charset="0"/>
+            </a:endParaRPr>
+          </a:p>
+          <a:p>
+            <a:pPr eaLnBrk="0" hangingPunct="0">
+              <a:defRPr/>
+            </a:pPr>
+            <a:endParaRPr lang="be-BY" sz="900" dirty="0">
+              <a:solidFill>
+                <a:schemeClr val="bg1"/>
+              </a:solidFill>
+              <a:latin typeface="Arial" pitchFamily="34" charset="0"/>
+            </a:endParaRPr>
+          </a:p>
+          <a:p>
+            <a:pPr eaLnBrk="0" hangingPunct="0">
+              <a:defRPr/>
+            </a:pPr>
+            <a:r>
+              <a:rPr lang="be-BY" sz="1000" dirty="0">
+                <a:solidFill>
+                  <a:schemeClr val="bg1"/>
+                </a:solidFill>
+                <a:latin typeface="Courier New" pitchFamily="49" charset="0"/>
+                <a:ea typeface="Calibri" pitchFamily="34" charset="0"/>
+                <a:cs typeface="Courier New" pitchFamily="49" charset="0"/>
+              </a:rPr>
+              <a:t>    class Program</a:t>
+            </a:r>
+            <a:endParaRPr lang="be-BY" sz="900" dirty="0">
+              <a:solidFill>
+                <a:schemeClr val="bg1"/>
+              </a:solidFill>
+              <a:latin typeface="Arial" pitchFamily="34" charset="0"/>
+            </a:endParaRPr>
+          </a:p>
+          <a:p>
+            <a:pPr eaLnBrk="0" hangingPunct="0">
+              <a:defRPr/>
+            </a:pPr>
+            <a:r>
+              <a:rPr lang="be-BY" sz="1000" dirty="0">
+                <a:solidFill>
+                  <a:schemeClr val="bg1"/>
+                </a:solidFill>
+                <a:latin typeface="Courier New" pitchFamily="49" charset="0"/>
+                <a:ea typeface="Calibri" pitchFamily="34" charset="0"/>
+                <a:cs typeface="Courier New" pitchFamily="49" charset="0"/>
+              </a:rPr>
+              <a:t>    {</a:t>
+            </a:r>
+            <a:endParaRPr lang="be-BY" sz="900" dirty="0">
+              <a:solidFill>
+                <a:schemeClr val="bg1"/>
+              </a:solidFill>
+              <a:latin typeface="Arial" pitchFamily="34" charset="0"/>
+            </a:endParaRPr>
+          </a:p>
+          <a:p>
+            <a:pPr eaLnBrk="0" hangingPunct="0">
+              <a:defRPr/>
+            </a:pPr>
+            <a:r>
+              <a:rPr lang="be-BY" sz="1000" dirty="0">
+                <a:solidFill>
+                  <a:schemeClr val="bg1"/>
+                </a:solidFill>
+                <a:latin typeface="Courier New" pitchFamily="49" charset="0"/>
+                <a:ea typeface="Calibri" pitchFamily="34" charset="0"/>
+                <a:cs typeface="Courier New" pitchFamily="49" charset="0"/>
+              </a:rPr>
+              <a:t>        static void Main(string[] args)</a:t>
+            </a:r>
+            <a:endParaRPr lang="be-BY" sz="900" dirty="0">
+              <a:solidFill>
+                <a:schemeClr val="bg1"/>
+              </a:solidFill>
+              <a:latin typeface="Arial" pitchFamily="34" charset="0"/>
+            </a:endParaRPr>
+          </a:p>
+          <a:p>
+            <a:pPr eaLnBrk="0" hangingPunct="0">
+              <a:defRPr/>
+            </a:pPr>
+            <a:r>
+              <a:rPr lang="be-BY" sz="1000" dirty="0">
+                <a:solidFill>
+                  <a:schemeClr val="bg1"/>
+                </a:solidFill>
+                <a:latin typeface="Courier New" pitchFamily="49" charset="0"/>
+                <a:ea typeface="Calibri" pitchFamily="34" charset="0"/>
+                <a:cs typeface="Courier New" pitchFamily="49" charset="0"/>
+              </a:rPr>
+              <a:t>        {</a:t>
+            </a:r>
+            <a:endParaRPr lang="be-BY" sz="900" dirty="0">
+              <a:solidFill>
+                <a:schemeClr val="bg1"/>
+              </a:solidFill>
+              <a:latin typeface="Arial" pitchFamily="34" charset="0"/>
+            </a:endParaRPr>
+          </a:p>
+          <a:p>
+            <a:pPr eaLnBrk="0" hangingPunct="0">
+              <a:defRPr/>
+            </a:pPr>
+            <a:r>
+              <a:rPr lang="be-BY" sz="1000" dirty="0">
+                <a:solidFill>
+                  <a:schemeClr val="bg1"/>
+                </a:solidFill>
+                <a:latin typeface="Courier New" pitchFamily="49" charset="0"/>
+                <a:ea typeface="Calibri" pitchFamily="34" charset="0"/>
+                <a:cs typeface="Courier New" pitchFamily="49" charset="0"/>
+              </a:rPr>
+              <a:t>            Point pt1 = new Point(4,3);</a:t>
+            </a:r>
+            <a:endParaRPr lang="be-BY" sz="900" dirty="0">
+              <a:solidFill>
+                <a:schemeClr val="bg1"/>
+              </a:solidFill>
+              <a:latin typeface="Arial" pitchFamily="34" charset="0"/>
+            </a:endParaRPr>
+          </a:p>
+          <a:p>
+            <a:pPr eaLnBrk="0" hangingPunct="0">
+              <a:defRPr/>
+            </a:pPr>
+            <a:r>
+              <a:rPr lang="be-BY" sz="1000" dirty="0">
+                <a:solidFill>
+                  <a:schemeClr val="bg1"/>
+                </a:solidFill>
+                <a:latin typeface="Courier New" pitchFamily="49" charset="0"/>
+                <a:ea typeface="Calibri" pitchFamily="34" charset="0"/>
+                <a:cs typeface="Courier New" pitchFamily="49" charset="0"/>
+              </a:rPr>
+              <a:t>            pt1.x = 1;</a:t>
+            </a:r>
+            <a:endParaRPr lang="be-BY" sz="900" dirty="0">
+              <a:solidFill>
+                <a:schemeClr val="bg1"/>
+              </a:solidFill>
+              <a:latin typeface="Arial" pitchFamily="34" charset="0"/>
+            </a:endParaRPr>
+          </a:p>
+          <a:p>
+            <a:pPr eaLnBrk="0" hangingPunct="0">
+              <a:defRPr/>
+            </a:pPr>
+            <a:r>
+              <a:rPr lang="be-BY" sz="1000" dirty="0">
+                <a:solidFill>
+                  <a:schemeClr val="bg1"/>
+                </a:solidFill>
+                <a:latin typeface="Courier New" pitchFamily="49" charset="0"/>
+                <a:ea typeface="Calibri" pitchFamily="34" charset="0"/>
+                <a:cs typeface="Courier New" pitchFamily="49" charset="0"/>
+              </a:rPr>
+              <a:t>            pt1.y = 5;</a:t>
+            </a:r>
+            <a:endParaRPr lang="be-BY" sz="900" dirty="0">
+              <a:solidFill>
+                <a:schemeClr val="bg1"/>
+              </a:solidFill>
+              <a:latin typeface="Arial" pitchFamily="34" charset="0"/>
+            </a:endParaRPr>
+          </a:p>
+          <a:p>
+            <a:pPr eaLnBrk="0" hangingPunct="0">
+              <a:defRPr/>
+            </a:pPr>
+            <a:r>
+              <a:rPr lang="be-BY" sz="1000" dirty="0">
+                <a:solidFill>
+                  <a:schemeClr val="bg1"/>
+                </a:solidFill>
+                <a:latin typeface="Courier New" pitchFamily="49" charset="0"/>
+                <a:ea typeface="Calibri" pitchFamily="34" charset="0"/>
+                <a:cs typeface="Courier New" pitchFamily="49" charset="0"/>
+              </a:rPr>
+              <a:t>            pt1.Write();</a:t>
+            </a:r>
+            <a:endParaRPr lang="be-BY" sz="900" dirty="0">
+              <a:solidFill>
+                <a:schemeClr val="bg1"/>
+              </a:solidFill>
+              <a:latin typeface="Arial" pitchFamily="34" charset="0"/>
+            </a:endParaRPr>
+          </a:p>
+          <a:p>
+            <a:pPr eaLnBrk="0" hangingPunct="0">
+              <a:defRPr/>
+            </a:pPr>
+            <a:r>
+              <a:rPr lang="be-BY" sz="1000" dirty="0">
+                <a:solidFill>
+                  <a:schemeClr val="bg1"/>
+                </a:solidFill>
+                <a:latin typeface="Courier New" pitchFamily="49" charset="0"/>
+                <a:ea typeface="Calibri" pitchFamily="34" charset="0"/>
+                <a:cs typeface="Courier New" pitchFamily="49" charset="0"/>
+              </a:rPr>
+              <a:t>        }</a:t>
+            </a:r>
+            <a:endParaRPr lang="be-BY" sz="900" dirty="0">
+              <a:solidFill>
+                <a:schemeClr val="bg1"/>
+              </a:solidFill>
+              <a:latin typeface="Arial" pitchFamily="34" charset="0"/>
+            </a:endParaRPr>
+          </a:p>
+          <a:p>
+            <a:pPr eaLnBrk="0" hangingPunct="0">
+              <a:defRPr/>
+            </a:pPr>
+            <a:r>
+              <a:rPr lang="be-BY" sz="1000" dirty="0">
+                <a:solidFill>
+                  <a:schemeClr val="bg1"/>
+                </a:solidFill>
+                <a:latin typeface="Courier New" pitchFamily="49" charset="0"/>
+                <a:ea typeface="Calibri" pitchFamily="34" charset="0"/>
+                <a:cs typeface="Courier New" pitchFamily="49" charset="0"/>
+              </a:rPr>
+              <a:t>    }</a:t>
+            </a:r>
+            <a:endParaRPr lang="be-BY" dirty="0">
+              <a:solidFill>
+                <a:schemeClr val="bg1"/>
+              </a:solidFill>
+              <a:latin typeface="Calibri" pitchFamily="34" charset="0"/>
+            </a:endParaRPr>
+          </a:p>
+        </p:txBody>
+      </p:sp>
+    </p:spTree>
+    <p:extLst>
+      <p:ext uri="{BB962C8B-B14F-4D97-AF65-F5344CB8AC3E}">
+        <p14:creationId xmlns:p14="http://schemas.microsoft.com/office/powerpoint/2010/main" val="401800113"/>
+      </p:ext>
+    </p:extLst>
+  </p:cSld>
+  <p:clrMapOvr>
+    <a:masterClrMapping/>
+  </p:clrMapOvr>
+  <p:timing>
+    <p:tnLst>
+      <p:par>
+        <p:cTn id="1" dur="indefinite" restart="never" nodeType="tmRoot"/>
+      </p:par>
+    </p:tnLst>
+  </p:timing>
+</p:sld>
+</file>
+
+<file path=ppt/slides/slide32.xml><?xml version="1.0" encoding="utf-8"?>
+<p:sld xmlns:a="http://schemas.openxmlformats.org/drawingml/2006/main" xmlns:r="http://schemas.openxmlformats.org/officeDocument/2006/relationships" xmlns:p="http://schemas.openxmlformats.org/presentationml/2006/main">
+  <p:cSld>
+    <p:bg>
+      <p:bgPr>
+        <a:blipFill dpi="0" rotWithShape="1">
+          <a:blip r:embed="rId2">
+            <a:lum/>
+          </a:blip>
+          <a:srcRect/>
+          <a:stretch>
+            <a:fillRect/>
+          </a:stretch>
+        </a:blipFill>
+        <a:effectLst/>
+      </p:bgPr>
+    </p:bg>
+    <p:spTree>
+      <p:nvGrpSpPr>
+        <p:cNvPr id="1" name=""/>
+        <p:cNvGrpSpPr/>
+        <p:nvPr/>
+      </p:nvGrpSpPr>
+      <p:grpSpPr>
+        <a:xfrm>
+          <a:off x="0" y="0"/>
+          <a:ext cx="0" cy="0"/>
+          <a:chOff x="0" y="0"/>
+          <a:chExt cx="0" cy="0"/>
+        </a:xfrm>
+      </p:grpSpPr>
+      <p:sp>
+        <p:nvSpPr>
+          <p:cNvPr id="18434" name="Прямоугольник 6"/>
+          <p:cNvSpPr>
+            <a:spLocks noChangeArrowheads="1"/>
+          </p:cNvSpPr>
+          <p:nvPr/>
+        </p:nvSpPr>
+        <p:spPr bwMode="auto">
+          <a:xfrm>
+            <a:off x="609600" y="152400"/>
+            <a:ext cx="7924800" cy="461963"/>
+          </a:xfrm>
+          <a:prstGeom prst="rect">
+            <a:avLst/>
+          </a:prstGeom>
+          <a:noFill/>
+          <a:ln>
+            <a:noFill/>
+          </a:ln>
+          <a:extLst>
+            <a:ext uri="{909E8E84-426E-40DD-AFC4-6F175D3DCCD1}">
+              <a14:hiddenFill xmlns:a14="http://schemas.microsoft.com/office/drawing/2010/main">
+                <a:solidFill>
+                  <a:srgbClr val="FFFFFF"/>
+                </a:solidFill>
+              </a14:hiddenFill>
+            </a:ext>
+            <a:ext uri="{91240B29-F687-4F45-9708-019B960494DF}">
+              <a14:hiddenLine xmlns:a14="http://schemas.microsoft.com/office/drawing/2010/main" w="9525">
+                <a:solidFill>
+                  <a:srgbClr val="000000"/>
+                </a:solidFill>
+                <a:miter lim="800000"/>
+                <a:headEnd/>
+                <a:tailEnd/>
+              </a14:hiddenLine>
+            </a:ext>
+          </a:extLst>
+        </p:spPr>
+        <p:txBody>
+          <a:bodyPr>
+            <a:spAutoFit/>
+          </a:bodyPr>
+          <a:lstStyle/>
+          <a:p>
+            <a:pPr algn="ctr" eaLnBrk="0" hangingPunct="0">
+              <a:tabLst>
+                <a:tab pos="457200" algn="l"/>
+              </a:tabLst>
+            </a:pPr>
+            <a:r>
               <a:rPr lang="ru-RU" sz="2400" dirty="0" smtClean="0">
                 <a:solidFill>
                   <a:schemeClr val="bg1"/>
@@ -30968,7 +31220,7 @@
 </p:sld>
 </file>
 
-<file path=ppt/slides/slide32.xml><?xml version="1.0" encoding="utf-8"?>
+<file path=ppt/slides/slide33.xml><?xml version="1.0" encoding="utf-8"?>
 <p:sld xmlns:a="http://schemas.openxmlformats.org/drawingml/2006/main" xmlns:r="http://schemas.openxmlformats.org/officeDocument/2006/relationships" xmlns:p="http://schemas.openxmlformats.org/presentationml/2006/main">
   <p:cSld>
     <p:bg>

</xml_diff>

<commit_message>
Updated first lesson and XML presentations
Added namespaces description
</commit_message>
<xml_diff>
--- a/Presentation/lesson-01.pptx
+++ b/Presentation/lesson-01.pptx
@@ -39,6 +39,7 @@
     <p:sldId id="277" r:id="rId33"/>
     <p:sldId id="292" r:id="rId34"/>
     <p:sldId id="281" r:id="rId35"/>
+    <p:sldId id="301" r:id="rId36"/>
   </p:sldIdLst>
   <p:sldSz cx="9144000" cy="6858000" type="screen4x3"/>
   <p:notesSz cx="6858000" cy="9144000"/>
@@ -14952,15 +14953,7 @@
                   <a:schemeClr val="bg1"/>
                 </a:solidFill>
               </a:rPr>
-              <a:t>последовательности трактуются как обычные </a:t>
-            </a:r>
-            <a:r>
-              <a:rPr lang="ru-RU" dirty="0" smtClean="0">
-                <a:solidFill>
-                  <a:schemeClr val="bg1"/>
-                </a:solidFill>
-              </a:rPr>
-              <a:t>символы</a:t>
+              <a:t>последовательности трактуются как обычные символы</a:t>
             </a:r>
             <a:endParaRPr lang="en-US" dirty="0" smtClean="0">
               <a:solidFill>
@@ -31334,6 +31327,399 @@
     <p:bg>
       <p:bgPr>
         <a:solidFill>
+          <a:schemeClr val="accent2">
+            <a:lumMod val="75000"/>
+          </a:schemeClr>
+        </a:solidFill>
+        <a:effectLst/>
+      </p:bgPr>
+    </p:bg>
+    <p:spTree>
+      <p:nvGrpSpPr>
+        <p:cNvPr id="1" name=""/>
+        <p:cNvGrpSpPr/>
+        <p:nvPr/>
+      </p:nvGrpSpPr>
+      <p:grpSpPr>
+        <a:xfrm>
+          <a:off x="0" y="0"/>
+          <a:ext cx="0" cy="0"/>
+          <a:chOff x="0" y="0"/>
+          <a:chExt cx="0" cy="0"/>
+        </a:xfrm>
+      </p:grpSpPr>
+      <p:sp>
+        <p:nvSpPr>
+          <p:cNvPr id="22530" name="Прямоугольник 6"/>
+          <p:cNvSpPr>
+            <a:spLocks noChangeArrowheads="1"/>
+          </p:cNvSpPr>
+          <p:nvPr/>
+        </p:nvSpPr>
+        <p:spPr bwMode="auto">
+          <a:xfrm>
+            <a:off x="685800" y="71438"/>
+            <a:ext cx="7924800" cy="461962"/>
+          </a:xfrm>
+          <a:prstGeom prst="rect">
+            <a:avLst/>
+          </a:prstGeom>
+          <a:noFill/>
+          <a:ln>
+            <a:noFill/>
+          </a:ln>
+          <a:extLst>
+            <a:ext uri="{909E8E84-426E-40DD-AFC4-6F175D3DCCD1}">
+              <a14:hiddenFill xmlns:a14="http://schemas.microsoft.com/office/drawing/2010/main">
+                <a:solidFill>
+                  <a:srgbClr val="FFFFFF"/>
+                </a:solidFill>
+              </a14:hiddenFill>
+            </a:ext>
+            <a:ext uri="{91240B29-F687-4F45-9708-019B960494DF}">
+              <a14:hiddenLine xmlns:a14="http://schemas.microsoft.com/office/drawing/2010/main" w="9525">
+                <a:solidFill>
+                  <a:srgbClr val="000000"/>
+                </a:solidFill>
+                <a:miter lim="800000"/>
+                <a:headEnd/>
+                <a:tailEnd/>
+              </a14:hiddenLine>
+            </a:ext>
+          </a:extLst>
+        </p:spPr>
+        <p:txBody>
+          <a:bodyPr>
+            <a:spAutoFit/>
+          </a:bodyPr>
+          <a:lstStyle/>
+          <a:p>
+            <a:pPr algn="ctr" eaLnBrk="0" hangingPunct="0">
+              <a:tabLst>
+                <a:tab pos="457200" algn="l"/>
+              </a:tabLst>
+            </a:pPr>
+            <a:r>
+              <a:rPr lang="ru-RU" sz="2400" dirty="0" smtClean="0">
+                <a:solidFill>
+                  <a:schemeClr val="bg1"/>
+                </a:solidFill>
+                <a:cs typeface="Times New Roman" pitchFamily="18" charset="0"/>
+              </a:rPr>
+              <a:t>Задани</a:t>
+            </a:r>
+            <a:r>
+              <a:rPr lang="ru-RU" sz="2400" dirty="0" smtClean="0">
+                <a:solidFill>
+                  <a:schemeClr val="bg1"/>
+                </a:solidFill>
+                <a:cs typeface="Times New Roman" pitchFamily="18" charset="0"/>
+              </a:rPr>
+              <a:t>я в классе</a:t>
+            </a:r>
+            <a:endParaRPr lang="ru-RU" sz="2400" dirty="0">
+              <a:solidFill>
+                <a:schemeClr val="bg1"/>
+              </a:solidFill>
+            </a:endParaRPr>
+          </a:p>
+        </p:txBody>
+      </p:sp>
+      <p:sp>
+        <p:nvSpPr>
+          <p:cNvPr id="22531" name="Прямоугольник 4"/>
+          <p:cNvSpPr>
+            <a:spLocks noChangeArrowheads="1"/>
+          </p:cNvSpPr>
+          <p:nvPr/>
+        </p:nvSpPr>
+        <p:spPr bwMode="auto">
+          <a:xfrm>
+            <a:off x="0" y="733425"/>
+            <a:ext cx="9144000" cy="3139321"/>
+          </a:xfrm>
+          <a:prstGeom prst="rect">
+            <a:avLst/>
+          </a:prstGeom>
+          <a:noFill/>
+          <a:ln>
+            <a:noFill/>
+          </a:ln>
+          <a:extLst>
+            <a:ext uri="{909E8E84-426E-40DD-AFC4-6F175D3DCCD1}">
+              <a14:hiddenFill xmlns:a14="http://schemas.microsoft.com/office/drawing/2010/main">
+                <a:solidFill>
+                  <a:srgbClr val="FFFFFF"/>
+                </a:solidFill>
+              </a14:hiddenFill>
+            </a:ext>
+            <a:ext uri="{91240B29-F687-4F45-9708-019B960494DF}">
+              <a14:hiddenLine xmlns:a14="http://schemas.microsoft.com/office/drawing/2010/main" w="9525">
+                <a:solidFill>
+                  <a:srgbClr val="000000"/>
+                </a:solidFill>
+                <a:miter lim="800000"/>
+                <a:headEnd/>
+                <a:tailEnd/>
+              </a14:hiddenLine>
+            </a:ext>
+          </a:extLst>
+        </p:spPr>
+        <p:txBody>
+          <a:bodyPr>
+            <a:spAutoFit/>
+          </a:bodyPr>
+          <a:lstStyle/>
+          <a:p>
+            <a:pPr marL="342900" indent="-342900">
+              <a:buFont typeface="+mj-lt"/>
+              <a:buAutoNum type="arabicPeriod"/>
+            </a:pPr>
+            <a:r>
+              <a:rPr lang="ru-RU" dirty="0" smtClean="0">
+                <a:solidFill>
+                  <a:schemeClr val="bg1"/>
+                </a:solidFill>
+                <a:cs typeface="Arial" charset="0"/>
+              </a:rPr>
+              <a:t>Создайте новое консольное приложение </a:t>
+            </a:r>
+            <a:r>
+              <a:rPr lang="en-US" dirty="0" smtClean="0">
+                <a:solidFill>
+                  <a:schemeClr val="bg1"/>
+                </a:solidFill>
+                <a:cs typeface="Arial" charset="0"/>
+              </a:rPr>
+              <a:t>(Console Application)</a:t>
+            </a:r>
+          </a:p>
+          <a:p>
+            <a:pPr marL="342900" indent="-342900">
+              <a:buFont typeface="+mj-lt"/>
+              <a:buAutoNum type="arabicPeriod"/>
+            </a:pPr>
+            <a:r>
+              <a:rPr lang="ru-RU" dirty="0" smtClean="0">
+                <a:solidFill>
+                  <a:schemeClr val="bg1"/>
+                </a:solidFill>
+                <a:cs typeface="Arial" charset="0"/>
+              </a:rPr>
+              <a:t>Выведите на экран свое имя с помощью функции </a:t>
+            </a:r>
+            <a:r>
+              <a:rPr lang="en-US" dirty="0" err="1" smtClean="0">
+                <a:solidFill>
+                  <a:schemeClr val="bg1"/>
+                </a:solidFill>
+                <a:cs typeface="Arial" charset="0"/>
+              </a:rPr>
+              <a:t>Console.WriteLine</a:t>
+            </a:r>
+            <a:r>
+              <a:rPr lang="en-US" dirty="0" smtClean="0">
+                <a:solidFill>
+                  <a:schemeClr val="bg1"/>
+                </a:solidFill>
+                <a:cs typeface="Arial" charset="0"/>
+              </a:rPr>
+              <a:t>()</a:t>
+            </a:r>
+          </a:p>
+          <a:p>
+            <a:pPr marL="342900" indent="-342900">
+              <a:buFont typeface="+mj-lt"/>
+              <a:buAutoNum type="arabicPeriod"/>
+            </a:pPr>
+            <a:r>
+              <a:rPr lang="ru-RU" dirty="0" smtClean="0">
+                <a:solidFill>
+                  <a:schemeClr val="bg1"/>
+                </a:solidFill>
+                <a:cs typeface="Arial" charset="0"/>
+              </a:rPr>
+              <a:t>Сделайте так чтобы имя выводилось 7 раз</a:t>
+            </a:r>
+          </a:p>
+          <a:p>
+            <a:pPr marL="800100" lvl="1" indent="-342900">
+              <a:buFont typeface="+mj-lt"/>
+              <a:buAutoNum type="alphaLcPeriod"/>
+            </a:pPr>
+            <a:r>
+              <a:rPr lang="ru-RU" dirty="0" smtClean="0">
+                <a:solidFill>
+                  <a:schemeClr val="bg1"/>
+                </a:solidFill>
+                <a:cs typeface="Arial" charset="0"/>
+              </a:rPr>
+              <a:t>Сделайте это используя цикл </a:t>
+            </a:r>
+            <a:r>
+              <a:rPr lang="en-US" dirty="0" smtClean="0">
+                <a:solidFill>
+                  <a:schemeClr val="bg1"/>
+                </a:solidFill>
+                <a:cs typeface="Arial" charset="0"/>
+              </a:rPr>
+              <a:t>for</a:t>
+            </a:r>
+          </a:p>
+          <a:p>
+            <a:pPr marL="800100" lvl="1" indent="-342900">
+              <a:buFont typeface="+mj-lt"/>
+              <a:buAutoNum type="alphaLcPeriod"/>
+            </a:pPr>
+            <a:r>
+              <a:rPr lang="ru-RU" dirty="0" smtClean="0">
+                <a:solidFill>
+                  <a:schemeClr val="bg1"/>
+                </a:solidFill>
+                <a:cs typeface="Arial" charset="0"/>
+              </a:rPr>
+              <a:t>Теперь попробуйте тоже самое с помощью цикла </a:t>
+            </a:r>
+            <a:r>
+              <a:rPr lang="en-US" dirty="0" smtClean="0">
+                <a:solidFill>
+                  <a:schemeClr val="bg1"/>
+                </a:solidFill>
+                <a:cs typeface="Arial" charset="0"/>
+              </a:rPr>
+              <a:t>while</a:t>
+            </a:r>
+            <a:endParaRPr lang="ru-RU" dirty="0" smtClean="0">
+              <a:solidFill>
+                <a:schemeClr val="bg1"/>
+              </a:solidFill>
+              <a:cs typeface="Arial" charset="0"/>
+            </a:endParaRPr>
+          </a:p>
+          <a:p>
+            <a:pPr marL="342900" indent="-342900">
+              <a:buFont typeface="+mj-lt"/>
+              <a:buAutoNum type="arabicPeriod"/>
+            </a:pPr>
+            <a:r>
+              <a:rPr lang="ru-RU" dirty="0" smtClean="0">
+                <a:solidFill>
+                  <a:schemeClr val="bg1"/>
+                </a:solidFill>
+                <a:cs typeface="Arial" charset="0"/>
+              </a:rPr>
+              <a:t>Добавьте в начале каждой строки порядковый номер</a:t>
+            </a:r>
+            <a:endParaRPr lang="en-US" dirty="0" smtClean="0">
+              <a:solidFill>
+                <a:schemeClr val="bg1"/>
+              </a:solidFill>
+              <a:cs typeface="Arial" charset="0"/>
+            </a:endParaRPr>
+          </a:p>
+          <a:p>
+            <a:pPr marL="342900" indent="-342900">
+              <a:buFont typeface="+mj-lt"/>
+              <a:buAutoNum type="arabicPeriod"/>
+            </a:pPr>
+            <a:r>
+              <a:rPr lang="ru-RU" dirty="0" smtClean="0">
+                <a:solidFill>
+                  <a:schemeClr val="bg1"/>
+                </a:solidFill>
+                <a:cs typeface="Arial" charset="0"/>
+              </a:rPr>
+              <a:t>Дайте пользователю возможность ввести имя с клавиатуры. Выведите в цикле введенное имя. Для ввода данных используйте функцию </a:t>
+            </a:r>
+            <a:r>
+              <a:rPr lang="en-US" dirty="0" err="1" smtClean="0">
+                <a:solidFill>
+                  <a:schemeClr val="bg1"/>
+                </a:solidFill>
+                <a:cs typeface="Arial" charset="0"/>
+              </a:rPr>
+              <a:t>Console.ReadLine</a:t>
+            </a:r>
+            <a:r>
+              <a:rPr lang="en-US" dirty="0" smtClean="0">
+                <a:solidFill>
+                  <a:schemeClr val="bg1"/>
+                </a:solidFill>
+                <a:cs typeface="Arial" charset="0"/>
+              </a:rPr>
+              <a:t>()</a:t>
+            </a:r>
+            <a:endParaRPr lang="ru-RU" dirty="0" smtClean="0">
+              <a:solidFill>
+                <a:schemeClr val="bg1"/>
+              </a:solidFill>
+              <a:cs typeface="Arial" charset="0"/>
+            </a:endParaRPr>
+          </a:p>
+          <a:p>
+            <a:pPr marL="342900" indent="-342900">
+              <a:buFont typeface="+mj-lt"/>
+              <a:buAutoNum type="arabicPeriod"/>
+            </a:pPr>
+            <a:endParaRPr lang="ru-RU" dirty="0">
+              <a:solidFill>
+                <a:schemeClr val="bg1"/>
+              </a:solidFill>
+              <a:cs typeface="Arial" charset="0"/>
+            </a:endParaRPr>
+          </a:p>
+          <a:p>
+            <a:pPr marL="342900" indent="-342900">
+              <a:buFont typeface="+mj-lt"/>
+              <a:buAutoNum type="arabicPeriod"/>
+            </a:pPr>
+            <a:endParaRPr lang="en-US" dirty="0" smtClean="0">
+              <a:solidFill>
+                <a:schemeClr val="bg1"/>
+              </a:solidFill>
+              <a:cs typeface="Arial" charset="0"/>
+            </a:endParaRPr>
+          </a:p>
+          <a:p>
+            <a:pPr marL="342900" indent="-342900">
+              <a:buFont typeface="+mj-lt"/>
+              <a:buAutoNum type="arabicPeriod"/>
+            </a:pPr>
+            <a:endParaRPr lang="ru-RU" dirty="0">
+              <a:solidFill>
+                <a:schemeClr val="bg1"/>
+              </a:solidFill>
+              <a:cs typeface="Arial" charset="0"/>
+            </a:endParaRPr>
+          </a:p>
+        </p:txBody>
+      </p:sp>
+    </p:spTree>
+    <p:extLst>
+      <p:ext uri="{BB962C8B-B14F-4D97-AF65-F5344CB8AC3E}">
+        <p14:creationId xmlns:p14="http://schemas.microsoft.com/office/powerpoint/2010/main" val="879209850"/>
+      </p:ext>
+    </p:extLst>
+  </p:cSld>
+  <p:clrMapOvr>
+    <a:masterClrMapping/>
+  </p:clrMapOvr>
+  <p:timing>
+    <p:tnLst>
+      <p:par>
+        <p:cTn id="1" dur="indefinite" restart="never" nodeType="tmRoot"/>
+      </p:par>
+    </p:tnLst>
+  </p:timing>
+</p:sld>
+</file>
+
+<file path=ppt/slides/slide34.xml><?xml version="1.0" encoding="utf-8"?>
+<p:sld xmlns:a="http://schemas.openxmlformats.org/drawingml/2006/main" xmlns:r="http://schemas.openxmlformats.org/officeDocument/2006/relationships" xmlns:p="http://schemas.openxmlformats.org/presentationml/2006/main">
+  <p:cSld>
+    <p:bg>
+      <p:bgPr>
+        <a:solidFill>
           <a:srgbClr val="6600CC"/>
         </a:solidFill>
         <a:effectLst/>
@@ -31405,13 +31791,13 @@
               </a:tabLst>
             </a:pPr>
             <a:r>
-              <a:rPr lang="ru-RU" sz="2400" dirty="0">
+              <a:rPr lang="ru-RU" sz="2400" dirty="0" smtClean="0">
                 <a:solidFill>
                   <a:schemeClr val="bg1"/>
                 </a:solidFill>
                 <a:cs typeface="Times New Roman" pitchFamily="18" charset="0"/>
               </a:rPr>
-              <a:t>Задание</a:t>
+              <a:t>Домашнее задание</a:t>
             </a:r>
             <a:endParaRPr lang="ru-RU" sz="2400" dirty="0">
               <a:solidFill>
@@ -31846,7 +32232,7 @@
     </p:spTree>
     <p:extLst>
       <p:ext uri="{BB962C8B-B14F-4D97-AF65-F5344CB8AC3E}">
-        <p14:creationId xmlns:p14="http://schemas.microsoft.com/office/powerpoint/2010/main" val="879209850"/>
+        <p14:creationId xmlns:p14="http://schemas.microsoft.com/office/powerpoint/2010/main" val="2276232674"/>
       </p:ext>
     </p:extLst>
   </p:cSld>

</xml_diff>